<commit_message>
pipeline to be added
</commit_message>
<xml_diff>
--- a/Report/diagrams.pptx
+++ b/Report/diagrams.pptx
@@ -5,12 +5,22 @@
     <p:sldMasterId id="2147483648" r:id="rId1"/>
   </p:sldMasterIdLst>
   <p:sldIdLst>
-    <p:sldId id="256" r:id="rId2"/>
-    <p:sldId id="257" r:id="rId3"/>
-    <p:sldId id="258" r:id="rId4"/>
-    <p:sldId id="259" r:id="rId5"/>
-    <p:sldId id="260" r:id="rId6"/>
-    <p:sldId id="261" r:id="rId7"/>
+    <p:sldId id="267" r:id="rId2"/>
+    <p:sldId id="266" r:id="rId3"/>
+    <p:sldId id="265" r:id="rId4"/>
+    <p:sldId id="256" r:id="rId5"/>
+    <p:sldId id="257" r:id="rId6"/>
+    <p:sldId id="258" r:id="rId7"/>
+    <p:sldId id="259" r:id="rId8"/>
+    <p:sldId id="260" r:id="rId9"/>
+    <p:sldId id="261" r:id="rId10"/>
+    <p:sldId id="262" r:id="rId11"/>
+    <p:sldId id="268" r:id="rId12"/>
+    <p:sldId id="269" r:id="rId13"/>
+    <p:sldId id="270" r:id="rId14"/>
+    <p:sldId id="271" r:id="rId15"/>
+    <p:sldId id="272" r:id="rId16"/>
+    <p:sldId id="274" r:id="rId17"/>
   </p:sldIdLst>
   <p:sldSz cx="12192000" cy="6858000"/>
   <p:notesSz cx="6858000" cy="9144000"/>
@@ -266,7 +276,7 @@
           <a:p>
             <a:fld id="{474A10D8-129C-4533-999D-9A7118D03750}" type="datetimeFigureOut">
               <a:rPr lang="de-DE" smtClean="0"/>
-              <a:t>01.02.2024</a:t>
+              <a:t>16.02.2024</a:t>
             </a:fld>
             <a:endParaRPr lang="de-DE"/>
           </a:p>
@@ -466,7 +476,7 @@
           <a:p>
             <a:fld id="{474A10D8-129C-4533-999D-9A7118D03750}" type="datetimeFigureOut">
               <a:rPr lang="de-DE" smtClean="0"/>
-              <a:t>01.02.2024</a:t>
+              <a:t>16.02.2024</a:t>
             </a:fld>
             <a:endParaRPr lang="de-DE"/>
           </a:p>
@@ -676,7 +686,7 @@
           <a:p>
             <a:fld id="{474A10D8-129C-4533-999D-9A7118D03750}" type="datetimeFigureOut">
               <a:rPr lang="de-DE" smtClean="0"/>
-              <a:t>01.02.2024</a:t>
+              <a:t>16.02.2024</a:t>
             </a:fld>
             <a:endParaRPr lang="de-DE"/>
           </a:p>
@@ -876,7 +886,7 @@
           <a:p>
             <a:fld id="{474A10D8-129C-4533-999D-9A7118D03750}" type="datetimeFigureOut">
               <a:rPr lang="de-DE" smtClean="0"/>
-              <a:t>01.02.2024</a:t>
+              <a:t>16.02.2024</a:t>
             </a:fld>
             <a:endParaRPr lang="de-DE"/>
           </a:p>
@@ -1152,7 +1162,7 @@
           <a:p>
             <a:fld id="{474A10D8-129C-4533-999D-9A7118D03750}" type="datetimeFigureOut">
               <a:rPr lang="de-DE" smtClean="0"/>
-              <a:t>01.02.2024</a:t>
+              <a:t>16.02.2024</a:t>
             </a:fld>
             <a:endParaRPr lang="de-DE"/>
           </a:p>
@@ -1420,7 +1430,7 @@
           <a:p>
             <a:fld id="{474A10D8-129C-4533-999D-9A7118D03750}" type="datetimeFigureOut">
               <a:rPr lang="de-DE" smtClean="0"/>
-              <a:t>01.02.2024</a:t>
+              <a:t>16.02.2024</a:t>
             </a:fld>
             <a:endParaRPr lang="de-DE"/>
           </a:p>
@@ -1835,7 +1845,7 @@
           <a:p>
             <a:fld id="{474A10D8-129C-4533-999D-9A7118D03750}" type="datetimeFigureOut">
               <a:rPr lang="de-DE" smtClean="0"/>
-              <a:t>01.02.2024</a:t>
+              <a:t>16.02.2024</a:t>
             </a:fld>
             <a:endParaRPr lang="de-DE"/>
           </a:p>
@@ -1977,7 +1987,7 @@
           <a:p>
             <a:fld id="{474A10D8-129C-4533-999D-9A7118D03750}" type="datetimeFigureOut">
               <a:rPr lang="de-DE" smtClean="0"/>
-              <a:t>01.02.2024</a:t>
+              <a:t>16.02.2024</a:t>
             </a:fld>
             <a:endParaRPr lang="de-DE"/>
           </a:p>
@@ -2090,7 +2100,7 @@
           <a:p>
             <a:fld id="{474A10D8-129C-4533-999D-9A7118D03750}" type="datetimeFigureOut">
               <a:rPr lang="de-DE" smtClean="0"/>
-              <a:t>01.02.2024</a:t>
+              <a:t>16.02.2024</a:t>
             </a:fld>
             <a:endParaRPr lang="de-DE"/>
           </a:p>
@@ -2403,7 +2413,7 @@
           <a:p>
             <a:fld id="{474A10D8-129C-4533-999D-9A7118D03750}" type="datetimeFigureOut">
               <a:rPr lang="de-DE" smtClean="0"/>
-              <a:t>01.02.2024</a:t>
+              <a:t>16.02.2024</a:t>
             </a:fld>
             <a:endParaRPr lang="de-DE"/>
           </a:p>
@@ -2692,7 +2702,7 @@
           <a:p>
             <a:fld id="{474A10D8-129C-4533-999D-9A7118D03750}" type="datetimeFigureOut">
               <a:rPr lang="de-DE" smtClean="0"/>
-              <a:t>01.02.2024</a:t>
+              <a:t>16.02.2024</a:t>
             </a:fld>
             <a:endParaRPr lang="de-DE"/>
           </a:p>
@@ -2935,7 +2945,7 @@
           <a:p>
             <a:fld id="{474A10D8-129C-4533-999D-9A7118D03750}" type="datetimeFigureOut">
               <a:rPr lang="de-DE" smtClean="0"/>
-              <a:t>01.02.2024</a:t>
+              <a:t>16.02.2024</a:t>
             </a:fld>
             <a:endParaRPr lang="de-DE"/>
           </a:p>
@@ -3354,6 +3364,3332 @@
       </p:grpSpPr>
       <p:pic>
         <p:nvPicPr>
+          <p:cNvPr id="5" name="Picture 4">
+            <a:extLst>
+              <a:ext uri="{FF2B5EF4-FFF2-40B4-BE49-F238E27FC236}">
+                <a16:creationId xmlns:a16="http://schemas.microsoft.com/office/drawing/2014/main" id="{27C7BC83-3E4C-AE35-290B-8403BFFC3C29}"/>
+              </a:ext>
+            </a:extLst>
+          </p:cNvPr>
+          <p:cNvPicPr>
+            <a:picLocks noChangeAspect="1"/>
+          </p:cNvPicPr>
+          <p:nvPr/>
+        </p:nvPicPr>
+        <p:blipFill>
+          <a:blip r:embed="rId2"/>
+          <a:stretch>
+            <a:fillRect/>
+          </a:stretch>
+        </p:blipFill>
+        <p:spPr>
+          <a:xfrm>
+            <a:off x="2563824" y="2621210"/>
+            <a:ext cx="7064352" cy="1615580"/>
+          </a:xfrm>
+          <a:prstGeom prst="rect">
+            <a:avLst/>
+          </a:prstGeom>
+        </p:spPr>
+      </p:pic>
+    </p:spTree>
+    <p:extLst>
+      <p:ext uri="{BB962C8B-B14F-4D97-AF65-F5344CB8AC3E}">
+        <p14:creationId xmlns:p14="http://schemas.microsoft.com/office/powerpoint/2010/main" val="530182241"/>
+      </p:ext>
+    </p:extLst>
+  </p:cSld>
+  <p:clrMapOvr>
+    <a:masterClrMapping/>
+  </p:clrMapOvr>
+</p:sld>
+</file>
+
+<file path=ppt/slides/slide10.xml><?xml version="1.0" encoding="utf-8"?>
+<p:sld xmlns:a="http://schemas.openxmlformats.org/drawingml/2006/main" xmlns:r="http://schemas.openxmlformats.org/officeDocument/2006/relationships" xmlns:p="http://schemas.openxmlformats.org/presentationml/2006/main">
+  <p:cSld>
+    <p:bg>
+      <p:bgPr>
+        <a:solidFill>
+          <a:schemeClr val="bg1"/>
+        </a:solidFill>
+        <a:effectLst/>
+      </p:bgPr>
+    </p:bg>
+    <p:spTree>
+      <p:nvGrpSpPr>
+        <p:cNvPr id="1" name=""/>
+        <p:cNvGrpSpPr/>
+        <p:nvPr/>
+      </p:nvGrpSpPr>
+      <p:grpSpPr>
+        <a:xfrm>
+          <a:off x="0" y="0"/>
+          <a:ext cx="0" cy="0"/>
+          <a:chOff x="0" y="0"/>
+          <a:chExt cx="0" cy="0"/>
+        </a:xfrm>
+      </p:grpSpPr>
+      <p:pic>
+        <p:nvPicPr>
+          <p:cNvPr id="5" name="Picture 4" descr="A computer screen shot of a program code&#10;&#10;Description automatically generated">
+            <a:extLst>
+              <a:ext uri="{FF2B5EF4-FFF2-40B4-BE49-F238E27FC236}">
+                <a16:creationId xmlns:a16="http://schemas.microsoft.com/office/drawing/2014/main" id="{5A032E2F-D2CF-DF80-826B-C62BD0FB7AF9}"/>
+              </a:ext>
+            </a:extLst>
+          </p:cNvPr>
+          <p:cNvPicPr>
+            <a:picLocks noChangeAspect="1"/>
+          </p:cNvPicPr>
+          <p:nvPr/>
+        </p:nvPicPr>
+        <p:blipFill>
+          <a:blip r:embed="rId2"/>
+          <a:stretch>
+            <a:fillRect/>
+          </a:stretch>
+        </p:blipFill>
+        <p:spPr>
+          <a:xfrm>
+            <a:off x="360162" y="905435"/>
+            <a:ext cx="5798591" cy="5118847"/>
+          </a:xfrm>
+          <a:prstGeom prst="rect">
+            <a:avLst/>
+          </a:prstGeom>
+        </p:spPr>
+      </p:pic>
+    </p:spTree>
+    <p:extLst>
+      <p:ext uri="{BB962C8B-B14F-4D97-AF65-F5344CB8AC3E}">
+        <p14:creationId xmlns:p14="http://schemas.microsoft.com/office/powerpoint/2010/main" val="2405647614"/>
+      </p:ext>
+    </p:extLst>
+  </p:cSld>
+  <p:clrMapOvr>
+    <a:masterClrMapping/>
+  </p:clrMapOvr>
+</p:sld>
+</file>
+
+<file path=ppt/slides/slide11.xml><?xml version="1.0" encoding="utf-8"?>
+<p:sld xmlns:a="http://schemas.openxmlformats.org/drawingml/2006/main" xmlns:r="http://schemas.openxmlformats.org/officeDocument/2006/relationships" xmlns:p="http://schemas.openxmlformats.org/presentationml/2006/main">
+  <p:cSld>
+    <p:spTree>
+      <p:nvGrpSpPr>
+        <p:cNvPr id="1" name=""/>
+        <p:cNvGrpSpPr/>
+        <p:nvPr/>
+      </p:nvGrpSpPr>
+      <p:grpSpPr>
+        <a:xfrm>
+          <a:off x="0" y="0"/>
+          <a:ext cx="0" cy="0"/>
+          <a:chOff x="0" y="0"/>
+          <a:chExt cx="0" cy="0"/>
+        </a:xfrm>
+      </p:grpSpPr>
+      <p:pic>
+        <p:nvPicPr>
+          <p:cNvPr id="5" name="Picture 4">
+            <a:extLst>
+              <a:ext uri="{FF2B5EF4-FFF2-40B4-BE49-F238E27FC236}">
+                <a16:creationId xmlns:a16="http://schemas.microsoft.com/office/drawing/2014/main" id="{2F2A66B4-A077-4A54-35DC-D225BD16FB11}"/>
+              </a:ext>
+            </a:extLst>
+          </p:cNvPr>
+          <p:cNvPicPr>
+            <a:picLocks noChangeAspect="1"/>
+          </p:cNvPicPr>
+          <p:nvPr/>
+        </p:nvPicPr>
+        <p:blipFill>
+          <a:blip r:embed="rId2"/>
+          <a:stretch>
+            <a:fillRect/>
+          </a:stretch>
+        </p:blipFill>
+        <p:spPr>
+          <a:xfrm>
+            <a:off x="154465" y="1863398"/>
+            <a:ext cx="6078384" cy="3635055"/>
+          </a:xfrm>
+          <a:prstGeom prst="rect">
+            <a:avLst/>
+          </a:prstGeom>
+        </p:spPr>
+      </p:pic>
+    </p:spTree>
+    <p:extLst>
+      <p:ext uri="{BB962C8B-B14F-4D97-AF65-F5344CB8AC3E}">
+        <p14:creationId xmlns:p14="http://schemas.microsoft.com/office/powerpoint/2010/main" val="957216553"/>
+      </p:ext>
+    </p:extLst>
+  </p:cSld>
+  <p:clrMapOvr>
+    <a:masterClrMapping/>
+  </p:clrMapOvr>
+</p:sld>
+</file>
+
+<file path=ppt/slides/slide12.xml><?xml version="1.0" encoding="utf-8"?>
+<p:sld xmlns:a="http://schemas.openxmlformats.org/drawingml/2006/main" xmlns:r="http://schemas.openxmlformats.org/officeDocument/2006/relationships" xmlns:p="http://schemas.openxmlformats.org/presentationml/2006/main">
+  <p:cSld>
+    <p:spTree>
+      <p:nvGrpSpPr>
+        <p:cNvPr id="1" name=""/>
+        <p:cNvGrpSpPr/>
+        <p:nvPr/>
+      </p:nvGrpSpPr>
+      <p:grpSpPr>
+        <a:xfrm>
+          <a:off x="0" y="0"/>
+          <a:ext cx="0" cy="0"/>
+          <a:chOff x="0" y="0"/>
+          <a:chExt cx="0" cy="0"/>
+        </a:xfrm>
+      </p:grpSpPr>
+      <p:pic>
+        <p:nvPicPr>
+          <p:cNvPr id="7" name="Picture 6">
+            <a:extLst>
+              <a:ext uri="{FF2B5EF4-FFF2-40B4-BE49-F238E27FC236}">
+                <a16:creationId xmlns:a16="http://schemas.microsoft.com/office/drawing/2014/main" id="{220ED135-BA8E-4C59-B842-FA1A8267D41C}"/>
+              </a:ext>
+            </a:extLst>
+          </p:cNvPr>
+          <p:cNvPicPr>
+            <a:picLocks noChangeAspect="1"/>
+          </p:cNvPicPr>
+          <p:nvPr/>
+        </p:nvPicPr>
+        <p:blipFill>
+          <a:blip r:embed="rId2"/>
+          <a:stretch>
+            <a:fillRect/>
+          </a:stretch>
+        </p:blipFill>
+        <p:spPr>
+          <a:xfrm>
+            <a:off x="2539549" y="1655837"/>
+            <a:ext cx="7430144" cy="4404742"/>
+          </a:xfrm>
+          <a:prstGeom prst="rect">
+            <a:avLst/>
+          </a:prstGeom>
+        </p:spPr>
+      </p:pic>
+    </p:spTree>
+    <p:extLst>
+      <p:ext uri="{BB962C8B-B14F-4D97-AF65-F5344CB8AC3E}">
+        <p14:creationId xmlns:p14="http://schemas.microsoft.com/office/powerpoint/2010/main" val="764329628"/>
+      </p:ext>
+    </p:extLst>
+  </p:cSld>
+  <p:clrMapOvr>
+    <a:masterClrMapping/>
+  </p:clrMapOvr>
+</p:sld>
+</file>
+
+<file path=ppt/slides/slide13.xml><?xml version="1.0" encoding="utf-8"?>
+<p:sld xmlns:a="http://schemas.openxmlformats.org/drawingml/2006/main" xmlns:r="http://schemas.openxmlformats.org/officeDocument/2006/relationships" xmlns:p="http://schemas.openxmlformats.org/presentationml/2006/main">
+  <p:cSld>
+    <p:spTree>
+      <p:nvGrpSpPr>
+        <p:cNvPr id="1" name=""/>
+        <p:cNvGrpSpPr/>
+        <p:nvPr/>
+      </p:nvGrpSpPr>
+      <p:grpSpPr>
+        <a:xfrm>
+          <a:off x="0" y="0"/>
+          <a:ext cx="0" cy="0"/>
+          <a:chOff x="0" y="0"/>
+          <a:chExt cx="0" cy="0"/>
+        </a:xfrm>
+      </p:grpSpPr>
+      <p:sp>
+        <p:nvSpPr>
+          <p:cNvPr id="4" name="Oval 3">
+            <a:extLst>
+              <a:ext uri="{FF2B5EF4-FFF2-40B4-BE49-F238E27FC236}">
+                <a16:creationId xmlns:a16="http://schemas.microsoft.com/office/drawing/2014/main" id="{128A135B-D762-5A65-7AB6-2527D348E819}"/>
+              </a:ext>
+            </a:extLst>
+          </p:cNvPr>
+          <p:cNvSpPr/>
+          <p:nvPr/>
+        </p:nvSpPr>
+        <p:spPr>
+          <a:xfrm>
+            <a:off x="5707158" y="387685"/>
+            <a:ext cx="233083" cy="249810"/>
+          </a:xfrm>
+          <a:prstGeom prst="ellipse">
+            <a:avLst/>
+          </a:prstGeom>
+        </p:spPr>
+        <p:style>
+          <a:lnRef idx="2">
+            <a:schemeClr val="dk1">
+              <a:shade val="50000"/>
+            </a:schemeClr>
+          </a:lnRef>
+          <a:fillRef idx="1">
+            <a:schemeClr val="dk1"/>
+          </a:fillRef>
+          <a:effectRef idx="0">
+            <a:schemeClr val="dk1"/>
+          </a:effectRef>
+          <a:fontRef idx="minor">
+            <a:schemeClr val="lt1"/>
+          </a:fontRef>
+        </p:style>
+        <p:txBody>
+          <a:bodyPr rtlCol="0" anchor="ctr"/>
+          <a:lstStyle/>
+          <a:p>
+            <a:pPr algn="ctr"/>
+            <a:endParaRPr lang="en-DE"/>
+          </a:p>
+        </p:txBody>
+      </p:sp>
+      <p:cxnSp>
+        <p:nvCxnSpPr>
+          <p:cNvPr id="5" name="Straight Arrow Connector 4">
+            <a:extLst>
+              <a:ext uri="{FF2B5EF4-FFF2-40B4-BE49-F238E27FC236}">
+                <a16:creationId xmlns:a16="http://schemas.microsoft.com/office/drawing/2014/main" id="{430BBFC3-6C09-8C5F-E470-F748ED968808}"/>
+              </a:ext>
+            </a:extLst>
+          </p:cNvPr>
+          <p:cNvCxnSpPr>
+            <a:cxnSpLocks/>
+            <a:stCxn id="4" idx="4"/>
+          </p:cNvCxnSpPr>
+          <p:nvPr/>
+        </p:nvCxnSpPr>
+        <p:spPr>
+          <a:xfrm>
+            <a:off x="5823700" y="637495"/>
+            <a:ext cx="0" cy="358588"/>
+          </a:xfrm>
+          <a:prstGeom prst="straightConnector1">
+            <a:avLst/>
+          </a:prstGeom>
+          <a:ln>
+            <a:tailEnd type="triangle"/>
+          </a:ln>
+        </p:spPr>
+        <p:style>
+          <a:lnRef idx="1">
+            <a:schemeClr val="accent1"/>
+          </a:lnRef>
+          <a:fillRef idx="0">
+            <a:schemeClr val="accent1"/>
+          </a:fillRef>
+          <a:effectRef idx="0">
+            <a:schemeClr val="accent1"/>
+          </a:effectRef>
+          <a:fontRef idx="minor">
+            <a:schemeClr val="tx1"/>
+          </a:fontRef>
+        </p:style>
+      </p:cxnSp>
+      <p:sp>
+        <p:nvSpPr>
+          <p:cNvPr id="6" name="Rectangle 5">
+            <a:extLst>
+              <a:ext uri="{FF2B5EF4-FFF2-40B4-BE49-F238E27FC236}">
+                <a16:creationId xmlns:a16="http://schemas.microsoft.com/office/drawing/2014/main" id="{174D111A-94A0-AB00-F259-4858301BAF4D}"/>
+              </a:ext>
+            </a:extLst>
+          </p:cNvPr>
+          <p:cNvSpPr/>
+          <p:nvPr/>
+        </p:nvSpPr>
+        <p:spPr>
+          <a:xfrm>
+            <a:off x="4700873" y="996083"/>
+            <a:ext cx="2285999" cy="735106"/>
+          </a:xfrm>
+          <a:prstGeom prst="rect">
+            <a:avLst/>
+          </a:prstGeom>
+          <a:gradFill flip="none" rotWithShape="1">
+            <a:gsLst>
+              <a:gs pos="0">
+                <a:schemeClr val="accent4">
+                  <a:lumMod val="67000"/>
+                </a:schemeClr>
+              </a:gs>
+              <a:gs pos="48000">
+                <a:schemeClr val="accent4">
+                  <a:lumMod val="97000"/>
+                  <a:lumOff val="3000"/>
+                </a:schemeClr>
+              </a:gs>
+              <a:gs pos="100000">
+                <a:schemeClr val="accent4">
+                  <a:lumMod val="60000"/>
+                  <a:lumOff val="40000"/>
+                </a:schemeClr>
+              </a:gs>
+            </a:gsLst>
+            <a:lin ang="16200000" scaled="1"/>
+            <a:tileRect/>
+          </a:gradFill>
+          <a:ln>
+            <a:noFill/>
+          </a:ln>
+        </p:spPr>
+        <p:style>
+          <a:lnRef idx="0">
+            <a:scrgbClr r="0" g="0" b="0"/>
+          </a:lnRef>
+          <a:fillRef idx="0">
+            <a:scrgbClr r="0" g="0" b="0"/>
+          </a:fillRef>
+          <a:effectRef idx="0">
+            <a:scrgbClr r="0" g="0" b="0"/>
+          </a:effectRef>
+          <a:fontRef idx="minor">
+            <a:schemeClr val="lt1"/>
+          </a:fontRef>
+        </p:style>
+        <p:txBody>
+          <a:bodyPr rtlCol="0" anchor="ctr"/>
+          <a:lstStyle/>
+          <a:p>
+            <a:pPr algn="ctr"/>
+            <a:r>
+              <a:rPr lang="en-US" dirty="0">
+                <a:solidFill>
+                  <a:schemeClr val="tx1"/>
+                </a:solidFill>
+              </a:rPr>
+              <a:t>GetSensorDefinition()</a:t>
+            </a:r>
+            <a:endParaRPr lang="en-DE" dirty="0">
+              <a:solidFill>
+                <a:schemeClr val="tx1"/>
+              </a:solidFill>
+            </a:endParaRPr>
+          </a:p>
+        </p:txBody>
+      </p:sp>
+    </p:spTree>
+    <p:extLst>
+      <p:ext uri="{BB962C8B-B14F-4D97-AF65-F5344CB8AC3E}">
+        <p14:creationId xmlns:p14="http://schemas.microsoft.com/office/powerpoint/2010/main" val="3619406225"/>
+      </p:ext>
+    </p:extLst>
+  </p:cSld>
+  <p:clrMapOvr>
+    <a:masterClrMapping/>
+  </p:clrMapOvr>
+</p:sld>
+</file>
+
+<file path=ppt/slides/slide14.xml><?xml version="1.0" encoding="utf-8"?>
+<p:sld xmlns:a="http://schemas.openxmlformats.org/drawingml/2006/main" xmlns:r="http://schemas.openxmlformats.org/officeDocument/2006/relationships" xmlns:p="http://schemas.openxmlformats.org/presentationml/2006/main">
+  <p:cSld>
+    <p:bg>
+      <p:bgPr>
+        <a:solidFill>
+          <a:schemeClr val="bg1"/>
+        </a:solidFill>
+        <a:effectLst/>
+      </p:bgPr>
+    </p:bg>
+    <p:spTree>
+      <p:nvGrpSpPr>
+        <p:cNvPr id="1" name=""/>
+        <p:cNvGrpSpPr/>
+        <p:nvPr/>
+      </p:nvGrpSpPr>
+      <p:grpSpPr>
+        <a:xfrm>
+          <a:off x="0" y="0"/>
+          <a:ext cx="0" cy="0"/>
+          <a:chOff x="0" y="0"/>
+          <a:chExt cx="0" cy="0"/>
+        </a:xfrm>
+      </p:grpSpPr>
+      <p:sp>
+        <p:nvSpPr>
+          <p:cNvPr id="12" name="Rectangle 11">
+            <a:extLst>
+              <a:ext uri="{FF2B5EF4-FFF2-40B4-BE49-F238E27FC236}">
+                <a16:creationId xmlns:a16="http://schemas.microsoft.com/office/drawing/2014/main" id="{A9F529C3-C941-49FD-8C67-82F134F64BDB}"/>
+              </a:ext>
+              <a:ext uri="{C183D7F6-B498-43B3-948B-1728B52AA6E4}">
+                <adec:decorative xmlns:adec="http://schemas.microsoft.com/office/drawing/2017/decorative" val="1"/>
+              </a:ext>
+            </a:extLst>
+          </p:cNvPr>
+          <p:cNvSpPr>
+            <a:spLocks noGrp="1" noRot="1" noChangeAspect="1" noMove="1" noResize="1" noEditPoints="1" noAdjustHandles="1" noChangeArrowheads="1" noChangeShapeType="1" noTextEdit="1"/>
+          </p:cNvSpPr>
+          <p:nvPr>
+            <p:extLst>
+              <p:ext uri="{386F3935-93C4-4BCD-93E2-E3B085C9AB24}">
+                <p16:designElem xmlns:p16="http://schemas.microsoft.com/office/powerpoint/2015/main" val="1"/>
+              </p:ext>
+            </p:extLst>
+          </p:nvPr>
+        </p:nvSpPr>
+        <p:spPr>
+          <a:xfrm>
+            <a:off x="0" y="0"/>
+            <a:ext cx="12192000" cy="6858000"/>
+          </a:xfrm>
+          <a:prstGeom prst="rect">
+            <a:avLst/>
+          </a:prstGeom>
+          <a:solidFill>
+            <a:schemeClr val="tx1">
+              <a:lumMod val="50000"/>
+              <a:lumOff val="50000"/>
+              <a:alpha val="30000"/>
+            </a:schemeClr>
+          </a:solidFill>
+          <a:ln>
+            <a:noFill/>
+          </a:ln>
+        </p:spPr>
+        <p:style>
+          <a:lnRef idx="2">
+            <a:schemeClr val="accent1">
+              <a:shade val="50000"/>
+            </a:schemeClr>
+          </a:lnRef>
+          <a:fillRef idx="1">
+            <a:schemeClr val="accent1"/>
+          </a:fillRef>
+          <a:effectRef idx="0">
+            <a:schemeClr val="accent1"/>
+          </a:effectRef>
+          <a:fontRef idx="minor">
+            <a:schemeClr val="lt1"/>
+          </a:fontRef>
+        </p:style>
+        <p:txBody>
+          <a:bodyPr rtlCol="0" anchor="ctr"/>
+          <a:lstStyle/>
+          <a:p>
+            <a:pPr algn="ctr"/>
+            <a:endParaRPr lang="en-US"/>
+          </a:p>
+        </p:txBody>
+      </p:sp>
+      <p:sp>
+        <p:nvSpPr>
+          <p:cNvPr id="14" name="Rectangle 13">
+            <a:extLst>
+              <a:ext uri="{FF2B5EF4-FFF2-40B4-BE49-F238E27FC236}">
+                <a16:creationId xmlns:a16="http://schemas.microsoft.com/office/drawing/2014/main" id="{20586029-32A0-47E5-9AEC-AE3ABA6B94D0}"/>
+              </a:ext>
+              <a:ext uri="{C183D7F6-B498-43B3-948B-1728B52AA6E4}">
+                <adec:decorative xmlns:adec="http://schemas.microsoft.com/office/drawing/2017/decorative" val="1"/>
+              </a:ext>
+            </a:extLst>
+          </p:cNvPr>
+          <p:cNvSpPr>
+            <a:spLocks noGrp="1" noRot="1" noChangeAspect="1" noMove="1" noResize="1" noEditPoints="1" noAdjustHandles="1" noChangeArrowheads="1" noChangeShapeType="1" noTextEdit="1"/>
+          </p:cNvSpPr>
+          <p:nvPr>
+            <p:extLst>
+              <p:ext uri="{386F3935-93C4-4BCD-93E2-E3B085C9AB24}">
+                <p16:designElem xmlns:p16="http://schemas.microsoft.com/office/powerpoint/2015/main" val="1"/>
+              </p:ext>
+            </p:extLst>
+          </p:nvPr>
+        </p:nvSpPr>
+        <p:spPr>
+          <a:xfrm>
+            <a:off x="477012" y="480060"/>
+            <a:ext cx="11237976" cy="5897880"/>
+          </a:xfrm>
+          <a:prstGeom prst="rect">
+            <a:avLst/>
+          </a:prstGeom>
+          <a:solidFill>
+            <a:srgbClr val="FFFFFF"/>
+          </a:solidFill>
+          <a:ln w="9525">
+            <a:noFill/>
+          </a:ln>
+          <a:effectLst>
+            <a:outerShdw blurRad="63500" dist="17780" dir="5400000" algn="t" rotWithShape="0">
+              <a:prstClr val="black">
+                <a:alpha val="43000"/>
+              </a:prstClr>
+            </a:outerShdw>
+          </a:effectLst>
+        </p:spPr>
+        <p:style>
+          <a:lnRef idx="2">
+            <a:schemeClr val="accent1">
+              <a:shade val="50000"/>
+            </a:schemeClr>
+          </a:lnRef>
+          <a:fillRef idx="1">
+            <a:schemeClr val="accent1"/>
+          </a:fillRef>
+          <a:effectRef idx="0">
+            <a:schemeClr val="accent1"/>
+          </a:effectRef>
+          <a:fontRef idx="minor">
+            <a:schemeClr val="lt1"/>
+          </a:fontRef>
+        </p:style>
+        <p:txBody>
+          <a:bodyPr rtlCol="0" anchor="ctr"/>
+          <a:lstStyle/>
+          <a:p>
+            <a:pPr algn="ctr"/>
+            <a:endParaRPr lang="en-US"/>
+          </a:p>
+        </p:txBody>
+      </p:sp>
+      <p:pic>
+        <p:nvPicPr>
+          <p:cNvPr id="5" name="Picture 4">
+            <a:extLst>
+              <a:ext uri="{FF2B5EF4-FFF2-40B4-BE49-F238E27FC236}">
+                <a16:creationId xmlns:a16="http://schemas.microsoft.com/office/drawing/2014/main" id="{63174875-3278-66E0-FCF9-6F9B07845DAC}"/>
+              </a:ext>
+            </a:extLst>
+          </p:cNvPr>
+          <p:cNvPicPr>
+            <a:picLocks noChangeAspect="1"/>
+          </p:cNvPicPr>
+          <p:nvPr/>
+        </p:nvPicPr>
+        <p:blipFill>
+          <a:blip r:embed="rId2"/>
+          <a:stretch>
+            <a:fillRect/>
+          </a:stretch>
+        </p:blipFill>
+        <p:spPr>
+          <a:xfrm>
+            <a:off x="6222283" y="2164886"/>
+            <a:ext cx="5294716" cy="2528226"/>
+          </a:xfrm>
+          <a:prstGeom prst="rect">
+            <a:avLst/>
+          </a:prstGeom>
+        </p:spPr>
+      </p:pic>
+      <p:cxnSp>
+        <p:nvCxnSpPr>
+          <p:cNvPr id="16" name="Straight Connector 15">
+            <a:extLst>
+              <a:ext uri="{FF2B5EF4-FFF2-40B4-BE49-F238E27FC236}">
+                <a16:creationId xmlns:a16="http://schemas.microsoft.com/office/drawing/2014/main" id="{8C730EAB-A532-4295-A302-FB4B90DB9F5E}"/>
+              </a:ext>
+              <a:ext uri="{C183D7F6-B498-43B3-948B-1728B52AA6E4}">
+                <adec:decorative xmlns:adec="http://schemas.microsoft.com/office/drawing/2017/decorative" val="1"/>
+              </a:ext>
+            </a:extLst>
+          </p:cNvPr>
+          <p:cNvCxnSpPr>
+            <a:cxnSpLocks noGrp="1" noRot="1" noChangeAspect="1" noMove="1" noResize="1" noEditPoints="1" noAdjustHandles="1" noChangeArrowheads="1" noChangeShapeType="1"/>
+          </p:cNvCxnSpPr>
+          <p:nvPr>
+            <p:extLst>
+              <p:ext uri="{386F3935-93C4-4BCD-93E2-E3B085C9AB24}">
+                <p16:designElem xmlns:p16="http://schemas.microsoft.com/office/powerpoint/2015/main" val="1"/>
+              </p:ext>
+            </p:extLst>
+          </p:nvPr>
+        </p:nvCxnSpPr>
+        <p:spPr>
+          <a:xfrm>
+            <a:off x="6079958" y="1143000"/>
+            <a:ext cx="0" cy="4572000"/>
+          </a:xfrm>
+          <a:prstGeom prst="line">
+            <a:avLst/>
+          </a:prstGeom>
+          <a:ln>
+            <a:solidFill>
+              <a:srgbClr val="4E4E4E"/>
+            </a:solidFill>
+          </a:ln>
+        </p:spPr>
+        <p:style>
+          <a:lnRef idx="1">
+            <a:schemeClr val="accent1"/>
+          </a:lnRef>
+          <a:fillRef idx="0">
+            <a:schemeClr val="accent1"/>
+          </a:fillRef>
+          <a:effectRef idx="0">
+            <a:schemeClr val="accent1"/>
+          </a:effectRef>
+          <a:fontRef idx="minor">
+            <a:schemeClr val="tx1"/>
+          </a:fontRef>
+        </p:style>
+      </p:cxnSp>
+      <p:pic>
+        <p:nvPicPr>
+          <p:cNvPr id="7" name="Picture 6">
+            <a:extLst>
+              <a:ext uri="{FF2B5EF4-FFF2-40B4-BE49-F238E27FC236}">
+                <a16:creationId xmlns:a16="http://schemas.microsoft.com/office/drawing/2014/main" id="{EBDBE15D-D564-A819-101D-0956B60A167A}"/>
+              </a:ext>
+            </a:extLst>
+          </p:cNvPr>
+          <p:cNvPicPr>
+            <a:picLocks noChangeAspect="1"/>
+          </p:cNvPicPr>
+          <p:nvPr/>
+        </p:nvPicPr>
+        <p:blipFill>
+          <a:blip r:embed="rId3"/>
+          <a:stretch>
+            <a:fillRect/>
+          </a:stretch>
+        </p:blipFill>
+        <p:spPr>
+          <a:xfrm>
+            <a:off x="642919" y="2032519"/>
+            <a:ext cx="5294715" cy="2792961"/>
+          </a:xfrm>
+          <a:prstGeom prst="rect">
+            <a:avLst/>
+          </a:prstGeom>
+        </p:spPr>
+      </p:pic>
+    </p:spTree>
+    <p:extLst>
+      <p:ext uri="{BB962C8B-B14F-4D97-AF65-F5344CB8AC3E}">
+        <p14:creationId xmlns:p14="http://schemas.microsoft.com/office/powerpoint/2010/main" val="1068135587"/>
+      </p:ext>
+    </p:extLst>
+  </p:cSld>
+  <p:clrMapOvr>
+    <a:masterClrMapping/>
+  </p:clrMapOvr>
+</p:sld>
+</file>
+
+<file path=ppt/slides/slide15.xml><?xml version="1.0" encoding="utf-8"?>
+<p:sld xmlns:a="http://schemas.openxmlformats.org/drawingml/2006/main" xmlns:r="http://schemas.openxmlformats.org/officeDocument/2006/relationships" xmlns:p="http://schemas.openxmlformats.org/presentationml/2006/main">
+  <p:cSld>
+    <p:bg>
+      <p:bgPr>
+        <a:solidFill>
+          <a:schemeClr val="bg1"/>
+        </a:solidFill>
+        <a:effectLst/>
+      </p:bgPr>
+    </p:bg>
+    <p:spTree>
+      <p:nvGrpSpPr>
+        <p:cNvPr id="1" name=""/>
+        <p:cNvGrpSpPr/>
+        <p:nvPr/>
+      </p:nvGrpSpPr>
+      <p:grpSpPr>
+        <a:xfrm>
+          <a:off x="0" y="0"/>
+          <a:ext cx="0" cy="0"/>
+          <a:chOff x="0" y="0"/>
+          <a:chExt cx="0" cy="0"/>
+        </a:xfrm>
+      </p:grpSpPr>
+      <p:sp>
+        <p:nvSpPr>
+          <p:cNvPr id="12" name="Rectangle 11">
+            <a:extLst>
+              <a:ext uri="{FF2B5EF4-FFF2-40B4-BE49-F238E27FC236}">
+                <a16:creationId xmlns:a16="http://schemas.microsoft.com/office/drawing/2014/main" id="{A9F529C3-C941-49FD-8C67-82F134F64BDB}"/>
+              </a:ext>
+              <a:ext uri="{C183D7F6-B498-43B3-948B-1728B52AA6E4}">
+                <adec:decorative xmlns:adec="http://schemas.microsoft.com/office/drawing/2017/decorative" val="1"/>
+              </a:ext>
+            </a:extLst>
+          </p:cNvPr>
+          <p:cNvSpPr>
+            <a:spLocks noGrp="1" noRot="1" noChangeAspect="1" noMove="1" noResize="1" noEditPoints="1" noAdjustHandles="1" noChangeArrowheads="1" noChangeShapeType="1" noTextEdit="1"/>
+          </p:cNvSpPr>
+          <p:nvPr>
+            <p:extLst>
+              <p:ext uri="{386F3935-93C4-4BCD-93E2-E3B085C9AB24}">
+                <p16:designElem xmlns:p16="http://schemas.microsoft.com/office/powerpoint/2015/main" val="1"/>
+              </p:ext>
+            </p:extLst>
+          </p:nvPr>
+        </p:nvSpPr>
+        <p:spPr>
+          <a:xfrm>
+            <a:off x="0" y="0"/>
+            <a:ext cx="12192000" cy="6858000"/>
+          </a:xfrm>
+          <a:prstGeom prst="rect">
+            <a:avLst/>
+          </a:prstGeom>
+          <a:solidFill>
+            <a:schemeClr val="tx1">
+              <a:lumMod val="50000"/>
+              <a:lumOff val="50000"/>
+              <a:alpha val="30000"/>
+            </a:schemeClr>
+          </a:solidFill>
+          <a:ln>
+            <a:noFill/>
+          </a:ln>
+        </p:spPr>
+        <p:style>
+          <a:lnRef idx="2">
+            <a:schemeClr val="accent1">
+              <a:shade val="50000"/>
+            </a:schemeClr>
+          </a:lnRef>
+          <a:fillRef idx="1">
+            <a:schemeClr val="accent1"/>
+          </a:fillRef>
+          <a:effectRef idx="0">
+            <a:schemeClr val="accent1"/>
+          </a:effectRef>
+          <a:fontRef idx="minor">
+            <a:schemeClr val="lt1"/>
+          </a:fontRef>
+        </p:style>
+        <p:txBody>
+          <a:bodyPr rtlCol="0" anchor="ctr"/>
+          <a:lstStyle/>
+          <a:p>
+            <a:pPr algn="ctr"/>
+            <a:endParaRPr lang="en-US"/>
+          </a:p>
+        </p:txBody>
+      </p:sp>
+      <p:sp>
+        <p:nvSpPr>
+          <p:cNvPr id="14" name="Rectangle 13">
+            <a:extLst>
+              <a:ext uri="{FF2B5EF4-FFF2-40B4-BE49-F238E27FC236}">
+                <a16:creationId xmlns:a16="http://schemas.microsoft.com/office/drawing/2014/main" id="{20586029-32A0-47E5-9AEC-AE3ABA6B94D0}"/>
+              </a:ext>
+              <a:ext uri="{C183D7F6-B498-43B3-948B-1728B52AA6E4}">
+                <adec:decorative xmlns:adec="http://schemas.microsoft.com/office/drawing/2017/decorative" val="1"/>
+              </a:ext>
+            </a:extLst>
+          </p:cNvPr>
+          <p:cNvSpPr>
+            <a:spLocks noGrp="1" noRot="1" noChangeAspect="1" noMove="1" noResize="1" noEditPoints="1" noAdjustHandles="1" noChangeArrowheads="1" noChangeShapeType="1" noTextEdit="1"/>
+          </p:cNvSpPr>
+          <p:nvPr>
+            <p:extLst>
+              <p:ext uri="{386F3935-93C4-4BCD-93E2-E3B085C9AB24}">
+                <p16:designElem xmlns:p16="http://schemas.microsoft.com/office/powerpoint/2015/main" val="1"/>
+              </p:ext>
+            </p:extLst>
+          </p:nvPr>
+        </p:nvSpPr>
+        <p:spPr>
+          <a:xfrm>
+            <a:off x="477012" y="480060"/>
+            <a:ext cx="11237976" cy="5897880"/>
+          </a:xfrm>
+          <a:prstGeom prst="rect">
+            <a:avLst/>
+          </a:prstGeom>
+          <a:solidFill>
+            <a:srgbClr val="FFFFFF"/>
+          </a:solidFill>
+          <a:ln w="9525">
+            <a:noFill/>
+          </a:ln>
+          <a:effectLst>
+            <a:outerShdw blurRad="63500" dist="17780" dir="5400000" algn="t" rotWithShape="0">
+              <a:prstClr val="black">
+                <a:alpha val="43000"/>
+              </a:prstClr>
+            </a:outerShdw>
+          </a:effectLst>
+        </p:spPr>
+        <p:style>
+          <a:lnRef idx="2">
+            <a:schemeClr val="accent1">
+              <a:shade val="50000"/>
+            </a:schemeClr>
+          </a:lnRef>
+          <a:fillRef idx="1">
+            <a:schemeClr val="accent1"/>
+          </a:fillRef>
+          <a:effectRef idx="0">
+            <a:schemeClr val="accent1"/>
+          </a:effectRef>
+          <a:fontRef idx="minor">
+            <a:schemeClr val="lt1"/>
+          </a:fontRef>
+        </p:style>
+        <p:txBody>
+          <a:bodyPr rtlCol="0" anchor="ctr"/>
+          <a:lstStyle/>
+          <a:p>
+            <a:pPr algn="ctr"/>
+            <a:endParaRPr lang="en-US"/>
+          </a:p>
+        </p:txBody>
+      </p:sp>
+      <p:pic>
+        <p:nvPicPr>
+          <p:cNvPr id="5" name="Picture 4">
+            <a:extLst>
+              <a:ext uri="{FF2B5EF4-FFF2-40B4-BE49-F238E27FC236}">
+                <a16:creationId xmlns:a16="http://schemas.microsoft.com/office/drawing/2014/main" id="{16EEA3DD-0C14-0047-5F04-651ADCD1B600}"/>
+              </a:ext>
+            </a:extLst>
+          </p:cNvPr>
+          <p:cNvPicPr>
+            <a:picLocks noChangeAspect="1"/>
+          </p:cNvPicPr>
+          <p:nvPr/>
+        </p:nvPicPr>
+        <p:blipFill>
+          <a:blip r:embed="rId2"/>
+          <a:stretch>
+            <a:fillRect/>
+          </a:stretch>
+        </p:blipFill>
+        <p:spPr>
+          <a:xfrm>
+            <a:off x="6167893" y="2257425"/>
+            <a:ext cx="5459159" cy="2343150"/>
+          </a:xfrm>
+          <a:prstGeom prst="rect">
+            <a:avLst/>
+          </a:prstGeom>
+        </p:spPr>
+      </p:pic>
+      <p:cxnSp>
+        <p:nvCxnSpPr>
+          <p:cNvPr id="16" name="Straight Connector 15">
+            <a:extLst>
+              <a:ext uri="{FF2B5EF4-FFF2-40B4-BE49-F238E27FC236}">
+                <a16:creationId xmlns:a16="http://schemas.microsoft.com/office/drawing/2014/main" id="{8C730EAB-A532-4295-A302-FB4B90DB9F5E}"/>
+              </a:ext>
+              <a:ext uri="{C183D7F6-B498-43B3-948B-1728B52AA6E4}">
+                <adec:decorative xmlns:adec="http://schemas.microsoft.com/office/drawing/2017/decorative" val="1"/>
+              </a:ext>
+            </a:extLst>
+          </p:cNvPr>
+          <p:cNvCxnSpPr>
+            <a:cxnSpLocks noGrp="1" noRot="1" noChangeAspect="1" noMove="1" noResize="1" noEditPoints="1" noAdjustHandles="1" noChangeArrowheads="1" noChangeShapeType="1"/>
+          </p:cNvCxnSpPr>
+          <p:nvPr>
+            <p:extLst>
+              <p:ext uri="{386F3935-93C4-4BCD-93E2-E3B085C9AB24}">
+                <p16:designElem xmlns:p16="http://schemas.microsoft.com/office/powerpoint/2015/main" val="1"/>
+              </p:ext>
+            </p:extLst>
+          </p:nvPr>
+        </p:nvCxnSpPr>
+        <p:spPr>
+          <a:xfrm>
+            <a:off x="6079958" y="1143000"/>
+            <a:ext cx="0" cy="4572000"/>
+          </a:xfrm>
+          <a:prstGeom prst="line">
+            <a:avLst/>
+          </a:prstGeom>
+          <a:ln>
+            <a:solidFill>
+              <a:srgbClr val="4E4E4E"/>
+            </a:solidFill>
+          </a:ln>
+        </p:spPr>
+        <p:style>
+          <a:lnRef idx="1">
+            <a:schemeClr val="accent1"/>
+          </a:lnRef>
+          <a:fillRef idx="0">
+            <a:schemeClr val="accent1"/>
+          </a:fillRef>
+          <a:effectRef idx="0">
+            <a:schemeClr val="accent1"/>
+          </a:effectRef>
+          <a:fontRef idx="minor">
+            <a:schemeClr val="tx1"/>
+          </a:fontRef>
+        </p:style>
+      </p:cxnSp>
+      <p:pic>
+        <p:nvPicPr>
+          <p:cNvPr id="7" name="Picture 6">
+            <a:extLst>
+              <a:ext uri="{FF2B5EF4-FFF2-40B4-BE49-F238E27FC236}">
+                <a16:creationId xmlns:a16="http://schemas.microsoft.com/office/drawing/2014/main" id="{E3C02FC0-D9B2-A1C6-0084-E6E050F9092C}"/>
+              </a:ext>
+            </a:extLst>
+          </p:cNvPr>
+          <p:cNvPicPr>
+            <a:picLocks noChangeAspect="1"/>
+          </p:cNvPicPr>
+          <p:nvPr/>
+        </p:nvPicPr>
+        <p:blipFill>
+          <a:blip r:embed="rId3"/>
+          <a:stretch>
+            <a:fillRect/>
+          </a:stretch>
+        </p:blipFill>
+        <p:spPr>
+          <a:xfrm>
+            <a:off x="697308" y="2190750"/>
+            <a:ext cx="5294715" cy="2343150"/>
+          </a:xfrm>
+          <a:prstGeom prst="rect">
+            <a:avLst/>
+          </a:prstGeom>
+        </p:spPr>
+      </p:pic>
+    </p:spTree>
+    <p:extLst>
+      <p:ext uri="{BB962C8B-B14F-4D97-AF65-F5344CB8AC3E}">
+        <p14:creationId xmlns:p14="http://schemas.microsoft.com/office/powerpoint/2010/main" val="307383714"/>
+      </p:ext>
+    </p:extLst>
+  </p:cSld>
+  <p:clrMapOvr>
+    <a:masterClrMapping/>
+  </p:clrMapOvr>
+</p:sld>
+</file>
+
+<file path=ppt/slides/slide16.xml><?xml version="1.0" encoding="utf-8"?>
+<p:sld xmlns:a="http://schemas.openxmlformats.org/drawingml/2006/main" xmlns:r="http://schemas.openxmlformats.org/officeDocument/2006/relationships" xmlns:p="http://schemas.openxmlformats.org/presentationml/2006/main">
+  <p:cSld>
+    <p:spTree>
+      <p:nvGrpSpPr>
+        <p:cNvPr id="1" name=""/>
+        <p:cNvGrpSpPr/>
+        <p:nvPr/>
+      </p:nvGrpSpPr>
+      <p:grpSpPr>
+        <a:xfrm>
+          <a:off x="0" y="0"/>
+          <a:ext cx="0" cy="0"/>
+          <a:chOff x="0" y="0"/>
+          <a:chExt cx="0" cy="0"/>
+        </a:xfrm>
+      </p:grpSpPr>
+      <p:pic>
+        <p:nvPicPr>
+          <p:cNvPr id="4" name="Picture 3" descr="A computer screen with white text&#10;&#10;Description automatically generated">
+            <a:extLst>
+              <a:ext uri="{FF2B5EF4-FFF2-40B4-BE49-F238E27FC236}">
+                <a16:creationId xmlns:a16="http://schemas.microsoft.com/office/drawing/2014/main" id="{796EAC22-420D-3FC4-A890-95AD9A5E8EC1}"/>
+              </a:ext>
+            </a:extLst>
+          </p:cNvPr>
+          <p:cNvPicPr>
+            <a:picLocks noChangeAspect="1"/>
+          </p:cNvPicPr>
+          <p:nvPr/>
+        </p:nvPicPr>
+        <p:blipFill>
+          <a:blip r:embed="rId2"/>
+          <a:stretch>
+            <a:fillRect/>
+          </a:stretch>
+        </p:blipFill>
+        <p:spPr>
+          <a:xfrm>
+            <a:off x="3161662" y="3754303"/>
+            <a:ext cx="5568979" cy="2343150"/>
+          </a:xfrm>
+          <a:prstGeom prst="rect">
+            <a:avLst/>
+          </a:prstGeom>
+        </p:spPr>
+      </p:pic>
+      <p:pic>
+        <p:nvPicPr>
+          <p:cNvPr id="5" name="Picture 4">
+            <a:extLst>
+              <a:ext uri="{FF2B5EF4-FFF2-40B4-BE49-F238E27FC236}">
+                <a16:creationId xmlns:a16="http://schemas.microsoft.com/office/drawing/2014/main" id="{EA32CD15-0804-5E6D-E1E0-B1CA60358A78}"/>
+              </a:ext>
+            </a:extLst>
+          </p:cNvPr>
+          <p:cNvPicPr>
+            <a:picLocks noChangeAspect="1"/>
+          </p:cNvPicPr>
+          <p:nvPr/>
+        </p:nvPicPr>
+        <p:blipFill>
+          <a:blip r:embed="rId3"/>
+          <a:stretch>
+            <a:fillRect/>
+          </a:stretch>
+        </p:blipFill>
+        <p:spPr>
+          <a:xfrm>
+            <a:off x="3298795" y="958299"/>
+            <a:ext cx="5294715" cy="2343150"/>
+          </a:xfrm>
+          <a:prstGeom prst="rect">
+            <a:avLst/>
+          </a:prstGeom>
+        </p:spPr>
+      </p:pic>
+      <p:sp>
+        <p:nvSpPr>
+          <p:cNvPr id="6" name="TextBox 5">
+            <a:extLst>
+              <a:ext uri="{FF2B5EF4-FFF2-40B4-BE49-F238E27FC236}">
+                <a16:creationId xmlns:a16="http://schemas.microsoft.com/office/drawing/2014/main" id="{ECC76625-4B3A-7AF8-2FC0-FE62009923A5}"/>
+              </a:ext>
+            </a:extLst>
+          </p:cNvPr>
+          <p:cNvSpPr txBox="1"/>
+          <p:nvPr/>
+        </p:nvSpPr>
+        <p:spPr>
+          <a:xfrm>
+            <a:off x="3298796" y="619745"/>
+            <a:ext cx="2406680" cy="338554"/>
+          </a:xfrm>
+          <a:prstGeom prst="rect">
+            <a:avLst/>
+          </a:prstGeom>
+          <a:noFill/>
+        </p:spPr>
+        <p:txBody>
+          <a:bodyPr wrap="square" rtlCol="0">
+            <a:spAutoFit/>
+          </a:bodyPr>
+          <a:lstStyle/>
+          <a:p>
+            <a:r>
+              <a:rPr lang="en-US" sz="1600" dirty="0">
+                <a:solidFill>
+                  <a:schemeClr val="accent4">
+                    <a:lumMod val="75000"/>
+                  </a:schemeClr>
+                </a:solidFill>
+              </a:rPr>
+              <a:t>Unmodified sensor output</a:t>
+            </a:r>
+            <a:endParaRPr lang="en-DE" sz="1600" dirty="0">
+              <a:solidFill>
+                <a:schemeClr val="accent4">
+                  <a:lumMod val="75000"/>
+                </a:schemeClr>
+              </a:solidFill>
+            </a:endParaRPr>
+          </a:p>
+        </p:txBody>
+      </p:sp>
+      <p:sp>
+        <p:nvSpPr>
+          <p:cNvPr id="7" name="TextBox 6">
+            <a:extLst>
+              <a:ext uri="{FF2B5EF4-FFF2-40B4-BE49-F238E27FC236}">
+                <a16:creationId xmlns:a16="http://schemas.microsoft.com/office/drawing/2014/main" id="{3ED0699F-4902-539C-71C7-3B0848FF8785}"/>
+              </a:ext>
+            </a:extLst>
+          </p:cNvPr>
+          <p:cNvSpPr txBox="1"/>
+          <p:nvPr/>
+        </p:nvSpPr>
+        <p:spPr>
+          <a:xfrm>
+            <a:off x="3222596" y="3415749"/>
+            <a:ext cx="2406680" cy="338554"/>
+          </a:xfrm>
+          <a:prstGeom prst="rect">
+            <a:avLst/>
+          </a:prstGeom>
+          <a:noFill/>
+        </p:spPr>
+        <p:txBody>
+          <a:bodyPr wrap="square" rtlCol="0">
+            <a:spAutoFit/>
+          </a:bodyPr>
+          <a:lstStyle/>
+          <a:p>
+            <a:r>
+              <a:rPr lang="en-US" sz="1600" dirty="0">
+                <a:solidFill>
+                  <a:schemeClr val="accent4">
+                    <a:lumMod val="75000"/>
+                  </a:schemeClr>
+                </a:solidFill>
+              </a:rPr>
+              <a:t>Modified sensor output</a:t>
+            </a:r>
+            <a:endParaRPr lang="en-DE" sz="1600" dirty="0">
+              <a:solidFill>
+                <a:schemeClr val="accent4">
+                  <a:lumMod val="75000"/>
+                </a:schemeClr>
+              </a:solidFill>
+            </a:endParaRPr>
+          </a:p>
+        </p:txBody>
+      </p:sp>
+    </p:spTree>
+    <p:extLst>
+      <p:ext uri="{BB962C8B-B14F-4D97-AF65-F5344CB8AC3E}">
+        <p14:creationId xmlns:p14="http://schemas.microsoft.com/office/powerpoint/2010/main" val="895847369"/>
+      </p:ext>
+    </p:extLst>
+  </p:cSld>
+  <p:clrMapOvr>
+    <a:masterClrMapping/>
+  </p:clrMapOvr>
+</p:sld>
+</file>
+
+<file path=ppt/slides/slide2.xml><?xml version="1.0" encoding="utf-8"?>
+<p:sld xmlns:a="http://schemas.openxmlformats.org/drawingml/2006/main" xmlns:r="http://schemas.openxmlformats.org/officeDocument/2006/relationships" xmlns:p="http://schemas.openxmlformats.org/presentationml/2006/main">
+  <p:cSld>
+    <p:spTree>
+      <p:nvGrpSpPr>
+        <p:cNvPr id="1" name=""/>
+        <p:cNvGrpSpPr/>
+        <p:nvPr/>
+      </p:nvGrpSpPr>
+      <p:grpSpPr>
+        <a:xfrm>
+          <a:off x="0" y="0"/>
+          <a:ext cx="0" cy="0"/>
+          <a:chOff x="0" y="0"/>
+          <a:chExt cx="0" cy="0"/>
+        </a:xfrm>
+      </p:grpSpPr>
+      <p:sp>
+        <p:nvSpPr>
+          <p:cNvPr id="4" name="Oval 3">
+            <a:extLst>
+              <a:ext uri="{FF2B5EF4-FFF2-40B4-BE49-F238E27FC236}">
+                <a16:creationId xmlns:a16="http://schemas.microsoft.com/office/drawing/2014/main" id="{19ACB740-47E2-1E22-70A1-5ED1D484CCB2}"/>
+              </a:ext>
+            </a:extLst>
+          </p:cNvPr>
+          <p:cNvSpPr/>
+          <p:nvPr/>
+        </p:nvSpPr>
+        <p:spPr>
+          <a:xfrm>
+            <a:off x="5707158" y="387685"/>
+            <a:ext cx="233083" cy="249810"/>
+          </a:xfrm>
+          <a:prstGeom prst="ellipse">
+            <a:avLst/>
+          </a:prstGeom>
+        </p:spPr>
+        <p:style>
+          <a:lnRef idx="2">
+            <a:schemeClr val="dk1">
+              <a:shade val="50000"/>
+            </a:schemeClr>
+          </a:lnRef>
+          <a:fillRef idx="1">
+            <a:schemeClr val="dk1"/>
+          </a:fillRef>
+          <a:effectRef idx="0">
+            <a:schemeClr val="dk1"/>
+          </a:effectRef>
+          <a:fontRef idx="minor">
+            <a:schemeClr val="lt1"/>
+          </a:fontRef>
+        </p:style>
+        <p:txBody>
+          <a:bodyPr rtlCol="0" anchor="ctr"/>
+          <a:lstStyle/>
+          <a:p>
+            <a:pPr algn="ctr"/>
+            <a:endParaRPr lang="en-DE"/>
+          </a:p>
+        </p:txBody>
+      </p:sp>
+      <p:cxnSp>
+        <p:nvCxnSpPr>
+          <p:cNvPr id="5" name="Straight Arrow Connector 4">
+            <a:extLst>
+              <a:ext uri="{FF2B5EF4-FFF2-40B4-BE49-F238E27FC236}">
+                <a16:creationId xmlns:a16="http://schemas.microsoft.com/office/drawing/2014/main" id="{9652EC82-0455-7DCB-C31B-5A434F6FEBC9}"/>
+              </a:ext>
+            </a:extLst>
+          </p:cNvPr>
+          <p:cNvCxnSpPr>
+            <a:cxnSpLocks/>
+            <a:stCxn id="4" idx="4"/>
+          </p:cNvCxnSpPr>
+          <p:nvPr/>
+        </p:nvCxnSpPr>
+        <p:spPr>
+          <a:xfrm>
+            <a:off x="5823700" y="637495"/>
+            <a:ext cx="0" cy="358588"/>
+          </a:xfrm>
+          <a:prstGeom prst="straightConnector1">
+            <a:avLst/>
+          </a:prstGeom>
+          <a:ln>
+            <a:tailEnd type="triangle"/>
+          </a:ln>
+        </p:spPr>
+        <p:style>
+          <a:lnRef idx="1">
+            <a:schemeClr val="accent1"/>
+          </a:lnRef>
+          <a:fillRef idx="0">
+            <a:schemeClr val="accent1"/>
+          </a:fillRef>
+          <a:effectRef idx="0">
+            <a:schemeClr val="accent1"/>
+          </a:effectRef>
+          <a:fontRef idx="minor">
+            <a:schemeClr val="tx1"/>
+          </a:fontRef>
+        </p:style>
+      </p:cxnSp>
+      <p:sp>
+        <p:nvSpPr>
+          <p:cNvPr id="6" name="Rectangle 5">
+            <a:extLst>
+              <a:ext uri="{FF2B5EF4-FFF2-40B4-BE49-F238E27FC236}">
+                <a16:creationId xmlns:a16="http://schemas.microsoft.com/office/drawing/2014/main" id="{CB82730B-253D-3183-9D05-1933076EDD63}"/>
+              </a:ext>
+            </a:extLst>
+          </p:cNvPr>
+          <p:cNvSpPr/>
+          <p:nvPr/>
+        </p:nvSpPr>
+        <p:spPr>
+          <a:xfrm>
+            <a:off x="4987744" y="2089777"/>
+            <a:ext cx="1712258" cy="735106"/>
+          </a:xfrm>
+          <a:prstGeom prst="rect">
+            <a:avLst/>
+          </a:prstGeom>
+          <a:gradFill flip="none" rotWithShape="1">
+            <a:gsLst>
+              <a:gs pos="0">
+                <a:schemeClr val="accent4">
+                  <a:lumMod val="67000"/>
+                </a:schemeClr>
+              </a:gs>
+              <a:gs pos="48000">
+                <a:schemeClr val="accent4">
+                  <a:lumMod val="97000"/>
+                  <a:lumOff val="3000"/>
+                </a:schemeClr>
+              </a:gs>
+              <a:gs pos="100000">
+                <a:schemeClr val="accent4">
+                  <a:lumMod val="60000"/>
+                  <a:lumOff val="40000"/>
+                </a:schemeClr>
+              </a:gs>
+            </a:gsLst>
+            <a:lin ang="16200000" scaled="1"/>
+            <a:tileRect/>
+          </a:gradFill>
+          <a:ln>
+            <a:noFill/>
+          </a:ln>
+        </p:spPr>
+        <p:style>
+          <a:lnRef idx="0">
+            <a:scrgbClr r="0" g="0" b="0"/>
+          </a:lnRef>
+          <a:fillRef idx="0">
+            <a:scrgbClr r="0" g="0" b="0"/>
+          </a:fillRef>
+          <a:effectRef idx="0">
+            <a:scrgbClr r="0" g="0" b="0"/>
+          </a:effectRef>
+          <a:fontRef idx="minor">
+            <a:schemeClr val="lt1"/>
+          </a:fontRef>
+        </p:style>
+        <p:txBody>
+          <a:bodyPr rtlCol="0" anchor="ctr"/>
+          <a:lstStyle/>
+          <a:p>
+            <a:pPr algn="ctr"/>
+            <a:r>
+              <a:rPr lang="en-US" dirty="0">
+                <a:solidFill>
+                  <a:schemeClr val="tx1"/>
+                </a:solidFill>
+              </a:rPr>
+              <a:t>ARadar()</a:t>
+            </a:r>
+            <a:endParaRPr lang="en-DE" dirty="0">
+              <a:solidFill>
+                <a:schemeClr val="tx1"/>
+              </a:solidFill>
+            </a:endParaRPr>
+          </a:p>
+        </p:txBody>
+      </p:sp>
+      <p:sp>
+        <p:nvSpPr>
+          <p:cNvPr id="7" name="Rectangle 6">
+            <a:extLst>
+              <a:ext uri="{FF2B5EF4-FFF2-40B4-BE49-F238E27FC236}">
+                <a16:creationId xmlns:a16="http://schemas.microsoft.com/office/drawing/2014/main" id="{B9446832-187C-F547-886B-D3AA24AA9FDA}"/>
+              </a:ext>
+            </a:extLst>
+          </p:cNvPr>
+          <p:cNvSpPr/>
+          <p:nvPr/>
+        </p:nvSpPr>
+        <p:spPr>
+          <a:xfrm>
+            <a:off x="4987744" y="3183471"/>
+            <a:ext cx="1712258" cy="735106"/>
+          </a:xfrm>
+          <a:prstGeom prst="rect">
+            <a:avLst/>
+          </a:prstGeom>
+          <a:gradFill flip="none" rotWithShape="1">
+            <a:gsLst>
+              <a:gs pos="0">
+                <a:schemeClr val="accent4">
+                  <a:lumMod val="67000"/>
+                </a:schemeClr>
+              </a:gs>
+              <a:gs pos="48000">
+                <a:schemeClr val="accent4">
+                  <a:lumMod val="97000"/>
+                  <a:lumOff val="3000"/>
+                </a:schemeClr>
+              </a:gs>
+              <a:gs pos="100000">
+                <a:schemeClr val="accent4">
+                  <a:lumMod val="60000"/>
+                  <a:lumOff val="40000"/>
+                </a:schemeClr>
+              </a:gs>
+            </a:gsLst>
+            <a:lin ang="16200000" scaled="1"/>
+            <a:tileRect/>
+          </a:gradFill>
+          <a:ln>
+            <a:noFill/>
+          </a:ln>
+        </p:spPr>
+        <p:style>
+          <a:lnRef idx="0">
+            <a:scrgbClr r="0" g="0" b="0"/>
+          </a:lnRef>
+          <a:fillRef idx="0">
+            <a:scrgbClr r="0" g="0" b="0"/>
+          </a:fillRef>
+          <a:effectRef idx="0">
+            <a:scrgbClr r="0" g="0" b="0"/>
+          </a:effectRef>
+          <a:fontRef idx="minor">
+            <a:schemeClr val="lt1"/>
+          </a:fontRef>
+        </p:style>
+        <p:txBody>
+          <a:bodyPr rtlCol="0" anchor="ctr"/>
+          <a:lstStyle/>
+          <a:p>
+            <a:pPr algn="ctr"/>
+            <a:r>
+              <a:rPr lang="en-US" dirty="0">
+                <a:solidFill>
+                  <a:schemeClr val="tx1"/>
+                </a:solidFill>
+              </a:rPr>
+              <a:t>Set()</a:t>
+            </a:r>
+            <a:endParaRPr lang="en-DE" dirty="0">
+              <a:solidFill>
+                <a:schemeClr val="tx1"/>
+              </a:solidFill>
+            </a:endParaRPr>
+          </a:p>
+        </p:txBody>
+      </p:sp>
+      <p:sp>
+        <p:nvSpPr>
+          <p:cNvPr id="8" name="Rectangle 7">
+            <a:extLst>
+              <a:ext uri="{FF2B5EF4-FFF2-40B4-BE49-F238E27FC236}">
+                <a16:creationId xmlns:a16="http://schemas.microsoft.com/office/drawing/2014/main" id="{90B8ABAC-CFFA-E989-2542-711BD31E96A4}"/>
+              </a:ext>
+            </a:extLst>
+          </p:cNvPr>
+          <p:cNvSpPr/>
+          <p:nvPr/>
+        </p:nvSpPr>
+        <p:spPr>
+          <a:xfrm>
+            <a:off x="4987744" y="5141685"/>
+            <a:ext cx="1712258" cy="735106"/>
+          </a:xfrm>
+          <a:prstGeom prst="rect">
+            <a:avLst/>
+          </a:prstGeom>
+          <a:gradFill flip="none" rotWithShape="1">
+            <a:gsLst>
+              <a:gs pos="0">
+                <a:schemeClr val="accent4">
+                  <a:lumMod val="67000"/>
+                </a:schemeClr>
+              </a:gs>
+              <a:gs pos="48000">
+                <a:schemeClr val="accent4">
+                  <a:lumMod val="97000"/>
+                  <a:lumOff val="3000"/>
+                </a:schemeClr>
+              </a:gs>
+              <a:gs pos="100000">
+                <a:schemeClr val="accent4">
+                  <a:lumMod val="60000"/>
+                  <a:lumOff val="40000"/>
+                </a:schemeClr>
+              </a:gs>
+            </a:gsLst>
+            <a:lin ang="16200000" scaled="1"/>
+            <a:tileRect/>
+          </a:gradFill>
+          <a:ln>
+            <a:noFill/>
+          </a:ln>
+        </p:spPr>
+        <p:style>
+          <a:lnRef idx="0">
+            <a:scrgbClr r="0" g="0" b="0"/>
+          </a:lnRef>
+          <a:fillRef idx="0">
+            <a:scrgbClr r="0" g="0" b="0"/>
+          </a:fillRef>
+          <a:effectRef idx="0">
+            <a:scrgbClr r="0" g="0" b="0"/>
+          </a:effectRef>
+          <a:fontRef idx="minor">
+            <a:schemeClr val="lt1"/>
+          </a:fontRef>
+        </p:style>
+        <p:txBody>
+          <a:bodyPr rtlCol="0" anchor="ctr"/>
+          <a:lstStyle/>
+          <a:p>
+            <a:pPr algn="ctr"/>
+            <a:r>
+              <a:rPr lang="en-US" dirty="0">
+                <a:solidFill>
+                  <a:schemeClr val="tx1"/>
+                </a:solidFill>
+              </a:rPr>
+              <a:t>BeginPlay()</a:t>
+            </a:r>
+            <a:endParaRPr lang="en-DE" dirty="0">
+              <a:solidFill>
+                <a:schemeClr val="tx1"/>
+              </a:solidFill>
+            </a:endParaRPr>
+          </a:p>
+        </p:txBody>
+      </p:sp>
+      <p:sp>
+        <p:nvSpPr>
+          <p:cNvPr id="9" name="Oval 8">
+            <a:extLst>
+              <a:ext uri="{FF2B5EF4-FFF2-40B4-BE49-F238E27FC236}">
+                <a16:creationId xmlns:a16="http://schemas.microsoft.com/office/drawing/2014/main" id="{EC2AB193-094B-0F16-6DF7-3179600AB40C}"/>
+              </a:ext>
+            </a:extLst>
+          </p:cNvPr>
+          <p:cNvSpPr/>
+          <p:nvPr/>
+        </p:nvSpPr>
+        <p:spPr>
+          <a:xfrm>
+            <a:off x="5727330" y="6183463"/>
+            <a:ext cx="233083" cy="249810"/>
+          </a:xfrm>
+          <a:prstGeom prst="ellipse">
+            <a:avLst/>
+          </a:prstGeom>
+        </p:spPr>
+        <p:style>
+          <a:lnRef idx="2">
+            <a:schemeClr val="dk1">
+              <a:shade val="50000"/>
+            </a:schemeClr>
+          </a:lnRef>
+          <a:fillRef idx="1">
+            <a:schemeClr val="dk1"/>
+          </a:fillRef>
+          <a:effectRef idx="0">
+            <a:schemeClr val="dk1"/>
+          </a:effectRef>
+          <a:fontRef idx="minor">
+            <a:schemeClr val="lt1"/>
+          </a:fontRef>
+        </p:style>
+        <p:txBody>
+          <a:bodyPr rtlCol="0" anchor="ctr"/>
+          <a:lstStyle/>
+          <a:p>
+            <a:pPr algn="ctr"/>
+            <a:endParaRPr lang="en-DE"/>
+          </a:p>
+        </p:txBody>
+      </p:sp>
+      <p:sp>
+        <p:nvSpPr>
+          <p:cNvPr id="10" name="TextBox 9">
+            <a:extLst>
+              <a:ext uri="{FF2B5EF4-FFF2-40B4-BE49-F238E27FC236}">
+                <a16:creationId xmlns:a16="http://schemas.microsoft.com/office/drawing/2014/main" id="{C0D74ABE-ED81-87A1-1CDB-4588C705E31D}"/>
+              </a:ext>
+            </a:extLst>
+          </p:cNvPr>
+          <p:cNvSpPr txBox="1"/>
+          <p:nvPr/>
+        </p:nvSpPr>
+        <p:spPr>
+          <a:xfrm>
+            <a:off x="5509934" y="88869"/>
+            <a:ext cx="627529" cy="369332"/>
+          </a:xfrm>
+          <a:prstGeom prst="rect">
+            <a:avLst/>
+          </a:prstGeom>
+          <a:noFill/>
+        </p:spPr>
+        <p:txBody>
+          <a:bodyPr wrap="square" rtlCol="0">
+            <a:spAutoFit/>
+          </a:bodyPr>
+          <a:lstStyle/>
+          <a:p>
+            <a:r>
+              <a:rPr lang="en-US" dirty="0"/>
+              <a:t>Start</a:t>
+            </a:r>
+            <a:endParaRPr lang="en-DE" dirty="0"/>
+          </a:p>
+        </p:txBody>
+      </p:sp>
+      <p:sp>
+        <p:nvSpPr>
+          <p:cNvPr id="11" name="TextBox 10">
+            <a:extLst>
+              <a:ext uri="{FF2B5EF4-FFF2-40B4-BE49-F238E27FC236}">
+                <a16:creationId xmlns:a16="http://schemas.microsoft.com/office/drawing/2014/main" id="{08B55222-B9F5-0013-7081-7438C79209EE}"/>
+              </a:ext>
+            </a:extLst>
+          </p:cNvPr>
+          <p:cNvSpPr txBox="1"/>
+          <p:nvPr/>
+        </p:nvSpPr>
+        <p:spPr>
+          <a:xfrm>
+            <a:off x="5184965" y="6399597"/>
+            <a:ext cx="1317814" cy="369332"/>
+          </a:xfrm>
+          <a:prstGeom prst="rect">
+            <a:avLst/>
+          </a:prstGeom>
+          <a:noFill/>
+        </p:spPr>
+        <p:txBody>
+          <a:bodyPr wrap="square" rtlCol="0">
+            <a:spAutoFit/>
+          </a:bodyPr>
+          <a:lstStyle/>
+          <a:p>
+            <a:r>
+              <a:rPr lang="en-US" dirty="0"/>
+              <a:t>Wait for tick</a:t>
+            </a:r>
+            <a:endParaRPr lang="en-DE" dirty="0"/>
+          </a:p>
+        </p:txBody>
+      </p:sp>
+      <p:cxnSp>
+        <p:nvCxnSpPr>
+          <p:cNvPr id="12" name="Straight Arrow Connector 11">
+            <a:extLst>
+              <a:ext uri="{FF2B5EF4-FFF2-40B4-BE49-F238E27FC236}">
+                <a16:creationId xmlns:a16="http://schemas.microsoft.com/office/drawing/2014/main" id="{C9850592-FF59-75CA-56FF-DFA2F236D120}"/>
+              </a:ext>
+            </a:extLst>
+          </p:cNvPr>
+          <p:cNvCxnSpPr>
+            <a:stCxn id="6" idx="2"/>
+            <a:endCxn id="7" idx="0"/>
+          </p:cNvCxnSpPr>
+          <p:nvPr/>
+        </p:nvCxnSpPr>
+        <p:spPr>
+          <a:xfrm>
+            <a:off x="5843873" y="2824883"/>
+            <a:ext cx="0" cy="358588"/>
+          </a:xfrm>
+          <a:prstGeom prst="straightConnector1">
+            <a:avLst/>
+          </a:prstGeom>
+          <a:ln>
+            <a:tailEnd type="triangle"/>
+          </a:ln>
+        </p:spPr>
+        <p:style>
+          <a:lnRef idx="1">
+            <a:schemeClr val="accent1"/>
+          </a:lnRef>
+          <a:fillRef idx="0">
+            <a:schemeClr val="accent1"/>
+          </a:fillRef>
+          <a:effectRef idx="0">
+            <a:schemeClr val="accent1"/>
+          </a:effectRef>
+          <a:fontRef idx="minor">
+            <a:schemeClr val="tx1"/>
+          </a:fontRef>
+        </p:style>
+      </p:cxnSp>
+      <p:cxnSp>
+        <p:nvCxnSpPr>
+          <p:cNvPr id="13" name="Straight Arrow Connector 12">
+            <a:extLst>
+              <a:ext uri="{FF2B5EF4-FFF2-40B4-BE49-F238E27FC236}">
+                <a16:creationId xmlns:a16="http://schemas.microsoft.com/office/drawing/2014/main" id="{FD453FA8-4FE1-39CF-DEB5-B95A11F8AC7E}"/>
+              </a:ext>
+            </a:extLst>
+          </p:cNvPr>
+          <p:cNvCxnSpPr>
+            <a:stCxn id="7" idx="2"/>
+            <a:endCxn id="8" idx="0"/>
+          </p:cNvCxnSpPr>
+          <p:nvPr/>
+        </p:nvCxnSpPr>
+        <p:spPr>
+          <a:xfrm>
+            <a:off x="5843873" y="3918577"/>
+            <a:ext cx="0" cy="1223108"/>
+          </a:xfrm>
+          <a:prstGeom prst="straightConnector1">
+            <a:avLst/>
+          </a:prstGeom>
+          <a:ln>
+            <a:tailEnd type="triangle"/>
+          </a:ln>
+        </p:spPr>
+        <p:style>
+          <a:lnRef idx="1">
+            <a:schemeClr val="accent1"/>
+          </a:lnRef>
+          <a:fillRef idx="0">
+            <a:schemeClr val="accent1"/>
+          </a:fillRef>
+          <a:effectRef idx="0">
+            <a:schemeClr val="accent1"/>
+          </a:effectRef>
+          <a:fontRef idx="minor">
+            <a:schemeClr val="tx1"/>
+          </a:fontRef>
+        </p:style>
+      </p:cxnSp>
+      <p:cxnSp>
+        <p:nvCxnSpPr>
+          <p:cNvPr id="14" name="Straight Arrow Connector 13">
+            <a:extLst>
+              <a:ext uri="{FF2B5EF4-FFF2-40B4-BE49-F238E27FC236}">
+                <a16:creationId xmlns:a16="http://schemas.microsoft.com/office/drawing/2014/main" id="{BFCEEE83-AA85-9E96-EB8E-647BDCC4AE58}"/>
+              </a:ext>
+            </a:extLst>
+          </p:cNvPr>
+          <p:cNvCxnSpPr>
+            <a:stCxn id="8" idx="2"/>
+            <a:endCxn id="9" idx="0"/>
+          </p:cNvCxnSpPr>
+          <p:nvPr/>
+        </p:nvCxnSpPr>
+        <p:spPr>
+          <a:xfrm flipH="1">
+            <a:off x="5843872" y="5876791"/>
+            <a:ext cx="1" cy="306672"/>
+          </a:xfrm>
+          <a:prstGeom prst="straightConnector1">
+            <a:avLst/>
+          </a:prstGeom>
+          <a:ln>
+            <a:tailEnd type="triangle"/>
+          </a:ln>
+        </p:spPr>
+        <p:style>
+          <a:lnRef idx="1">
+            <a:schemeClr val="accent1"/>
+          </a:lnRef>
+          <a:fillRef idx="0">
+            <a:schemeClr val="accent1"/>
+          </a:fillRef>
+          <a:effectRef idx="0">
+            <a:schemeClr val="accent1"/>
+          </a:effectRef>
+          <a:fontRef idx="minor">
+            <a:schemeClr val="tx1"/>
+          </a:fontRef>
+        </p:style>
+      </p:cxnSp>
+      <p:sp>
+        <p:nvSpPr>
+          <p:cNvPr id="15" name="Rectangle 14">
+            <a:extLst>
+              <a:ext uri="{FF2B5EF4-FFF2-40B4-BE49-F238E27FC236}">
+                <a16:creationId xmlns:a16="http://schemas.microsoft.com/office/drawing/2014/main" id="{2C837AA7-DB93-8516-D467-46662511612B}"/>
+              </a:ext>
+            </a:extLst>
+          </p:cNvPr>
+          <p:cNvSpPr/>
+          <p:nvPr/>
+        </p:nvSpPr>
+        <p:spPr>
+          <a:xfrm>
+            <a:off x="4700873" y="996083"/>
+            <a:ext cx="2285999" cy="735106"/>
+          </a:xfrm>
+          <a:prstGeom prst="rect">
+            <a:avLst/>
+          </a:prstGeom>
+          <a:gradFill flip="none" rotWithShape="1">
+            <a:gsLst>
+              <a:gs pos="0">
+                <a:schemeClr val="accent4">
+                  <a:lumMod val="67000"/>
+                </a:schemeClr>
+              </a:gs>
+              <a:gs pos="48000">
+                <a:schemeClr val="accent4">
+                  <a:lumMod val="97000"/>
+                  <a:lumOff val="3000"/>
+                </a:schemeClr>
+              </a:gs>
+              <a:gs pos="100000">
+                <a:schemeClr val="accent4">
+                  <a:lumMod val="60000"/>
+                  <a:lumOff val="40000"/>
+                </a:schemeClr>
+              </a:gs>
+            </a:gsLst>
+            <a:lin ang="16200000" scaled="1"/>
+            <a:tileRect/>
+          </a:gradFill>
+          <a:ln>
+            <a:noFill/>
+          </a:ln>
+        </p:spPr>
+        <p:style>
+          <a:lnRef idx="0">
+            <a:scrgbClr r="0" g="0" b="0"/>
+          </a:lnRef>
+          <a:fillRef idx="0">
+            <a:scrgbClr r="0" g="0" b="0"/>
+          </a:fillRef>
+          <a:effectRef idx="0">
+            <a:scrgbClr r="0" g="0" b="0"/>
+          </a:effectRef>
+          <a:fontRef idx="minor">
+            <a:schemeClr val="lt1"/>
+          </a:fontRef>
+        </p:style>
+        <p:txBody>
+          <a:bodyPr rtlCol="0" anchor="ctr"/>
+          <a:lstStyle/>
+          <a:p>
+            <a:pPr algn="ctr"/>
+            <a:r>
+              <a:rPr lang="en-US" dirty="0">
+                <a:solidFill>
+                  <a:schemeClr val="tx1"/>
+                </a:solidFill>
+              </a:rPr>
+              <a:t>GetSensorDefinition()</a:t>
+            </a:r>
+            <a:endParaRPr lang="en-DE" dirty="0">
+              <a:solidFill>
+                <a:schemeClr val="tx1"/>
+              </a:solidFill>
+            </a:endParaRPr>
+          </a:p>
+        </p:txBody>
+      </p:sp>
+      <p:cxnSp>
+        <p:nvCxnSpPr>
+          <p:cNvPr id="16" name="Straight Arrow Connector 15">
+            <a:extLst>
+              <a:ext uri="{FF2B5EF4-FFF2-40B4-BE49-F238E27FC236}">
+                <a16:creationId xmlns:a16="http://schemas.microsoft.com/office/drawing/2014/main" id="{52863B99-B692-3742-AF49-D4B7A85DFACD}"/>
+              </a:ext>
+            </a:extLst>
+          </p:cNvPr>
+          <p:cNvCxnSpPr>
+            <a:cxnSpLocks/>
+            <a:stCxn id="15" idx="2"/>
+            <a:endCxn id="6" idx="0"/>
+          </p:cNvCxnSpPr>
+          <p:nvPr/>
+        </p:nvCxnSpPr>
+        <p:spPr>
+          <a:xfrm>
+            <a:off x="5843873" y="1731189"/>
+            <a:ext cx="0" cy="358588"/>
+          </a:xfrm>
+          <a:prstGeom prst="straightConnector1">
+            <a:avLst/>
+          </a:prstGeom>
+          <a:ln>
+            <a:tailEnd type="triangle"/>
+          </a:ln>
+        </p:spPr>
+        <p:style>
+          <a:lnRef idx="1">
+            <a:schemeClr val="accent1"/>
+          </a:lnRef>
+          <a:fillRef idx="0">
+            <a:schemeClr val="accent1"/>
+          </a:fillRef>
+          <a:effectRef idx="0">
+            <a:schemeClr val="accent1"/>
+          </a:effectRef>
+          <a:fontRef idx="minor">
+            <a:schemeClr val="tx1"/>
+          </a:fontRef>
+        </p:style>
+      </p:cxnSp>
+      <p:sp>
+        <p:nvSpPr>
+          <p:cNvPr id="17" name="Rectangle 16">
+            <a:extLst>
+              <a:ext uri="{FF2B5EF4-FFF2-40B4-BE49-F238E27FC236}">
+                <a16:creationId xmlns:a16="http://schemas.microsoft.com/office/drawing/2014/main" id="{E990DEA3-8431-C254-88BE-D8721650A365}"/>
+              </a:ext>
+            </a:extLst>
+          </p:cNvPr>
+          <p:cNvSpPr/>
+          <p:nvPr/>
+        </p:nvSpPr>
+        <p:spPr>
+          <a:xfrm>
+            <a:off x="2339242" y="3183471"/>
+            <a:ext cx="2285999" cy="735106"/>
+          </a:xfrm>
+          <a:prstGeom prst="rect">
+            <a:avLst/>
+          </a:prstGeom>
+          <a:gradFill flip="none" rotWithShape="1">
+            <a:gsLst>
+              <a:gs pos="0">
+                <a:schemeClr val="accent4">
+                  <a:lumMod val="67000"/>
+                </a:schemeClr>
+              </a:gs>
+              <a:gs pos="48000">
+                <a:schemeClr val="accent4">
+                  <a:lumMod val="97000"/>
+                  <a:lumOff val="3000"/>
+                </a:schemeClr>
+              </a:gs>
+              <a:gs pos="100000">
+                <a:schemeClr val="accent4">
+                  <a:lumMod val="60000"/>
+                  <a:lumOff val="40000"/>
+                </a:schemeClr>
+              </a:gs>
+            </a:gsLst>
+            <a:lin ang="16200000" scaled="1"/>
+            <a:tileRect/>
+          </a:gradFill>
+          <a:ln>
+            <a:noFill/>
+          </a:ln>
+        </p:spPr>
+        <p:style>
+          <a:lnRef idx="0">
+            <a:scrgbClr r="0" g="0" b="0"/>
+          </a:lnRef>
+          <a:fillRef idx="0">
+            <a:scrgbClr r="0" g="0" b="0"/>
+          </a:fillRef>
+          <a:effectRef idx="0">
+            <a:scrgbClr r="0" g="0" b="0"/>
+          </a:effectRef>
+          <a:fontRef idx="minor">
+            <a:schemeClr val="lt1"/>
+          </a:fontRef>
+        </p:style>
+        <p:txBody>
+          <a:bodyPr rtlCol="0" anchor="ctr"/>
+          <a:lstStyle/>
+          <a:p>
+            <a:pPr algn="ctr"/>
+            <a:r>
+              <a:rPr lang="en-US" dirty="0">
+                <a:solidFill>
+                  <a:schemeClr val="tx1"/>
+                </a:solidFill>
+              </a:rPr>
+              <a:t>GetSensorDefinition()</a:t>
+            </a:r>
+            <a:endParaRPr lang="en-DE" dirty="0">
+              <a:solidFill>
+                <a:schemeClr val="tx1"/>
+              </a:solidFill>
+            </a:endParaRPr>
+          </a:p>
+        </p:txBody>
+      </p:sp>
+      <p:sp>
+        <p:nvSpPr>
+          <p:cNvPr id="18" name="Rectangle 17">
+            <a:extLst>
+              <a:ext uri="{FF2B5EF4-FFF2-40B4-BE49-F238E27FC236}">
+                <a16:creationId xmlns:a16="http://schemas.microsoft.com/office/drawing/2014/main" id="{4E67E427-DBD9-771E-68A5-DE0FA7688ED5}"/>
+              </a:ext>
+            </a:extLst>
+          </p:cNvPr>
+          <p:cNvSpPr/>
+          <p:nvPr/>
+        </p:nvSpPr>
+        <p:spPr>
+          <a:xfrm>
+            <a:off x="7061391" y="3183471"/>
+            <a:ext cx="2285999" cy="735106"/>
+          </a:xfrm>
+          <a:prstGeom prst="rect">
+            <a:avLst/>
+          </a:prstGeom>
+          <a:gradFill flip="none" rotWithShape="1">
+            <a:gsLst>
+              <a:gs pos="0">
+                <a:schemeClr val="accent4">
+                  <a:lumMod val="67000"/>
+                </a:schemeClr>
+              </a:gs>
+              <a:gs pos="48000">
+                <a:schemeClr val="accent4">
+                  <a:lumMod val="97000"/>
+                  <a:lumOff val="3000"/>
+                </a:schemeClr>
+              </a:gs>
+              <a:gs pos="100000">
+                <a:schemeClr val="accent4">
+                  <a:lumMod val="60000"/>
+                  <a:lumOff val="40000"/>
+                </a:schemeClr>
+              </a:gs>
+            </a:gsLst>
+            <a:lin ang="16200000" scaled="1"/>
+            <a:tileRect/>
+          </a:gradFill>
+          <a:ln>
+            <a:noFill/>
+          </a:ln>
+        </p:spPr>
+        <p:style>
+          <a:lnRef idx="0">
+            <a:scrgbClr r="0" g="0" b="0"/>
+          </a:lnRef>
+          <a:fillRef idx="0">
+            <a:scrgbClr r="0" g="0" b="0"/>
+          </a:fillRef>
+          <a:effectRef idx="0">
+            <a:scrgbClr r="0" g="0" b="0"/>
+          </a:effectRef>
+          <a:fontRef idx="minor">
+            <a:schemeClr val="lt1"/>
+          </a:fontRef>
+        </p:style>
+        <p:txBody>
+          <a:bodyPr rtlCol="0" anchor="ctr"/>
+          <a:lstStyle/>
+          <a:p>
+            <a:pPr algn="ctr"/>
+            <a:r>
+              <a:rPr lang="en-US" dirty="0">
+                <a:solidFill>
+                  <a:schemeClr val="tx1"/>
+                </a:solidFill>
+              </a:rPr>
+              <a:t>GetSensorDefinition()</a:t>
+            </a:r>
+            <a:endParaRPr lang="en-DE" dirty="0">
+              <a:solidFill>
+                <a:schemeClr val="tx1"/>
+              </a:solidFill>
+            </a:endParaRPr>
+          </a:p>
+        </p:txBody>
+      </p:sp>
+      <p:sp>
+        <p:nvSpPr>
+          <p:cNvPr id="19" name="Rectangle 18">
+            <a:extLst>
+              <a:ext uri="{FF2B5EF4-FFF2-40B4-BE49-F238E27FC236}">
+                <a16:creationId xmlns:a16="http://schemas.microsoft.com/office/drawing/2014/main" id="{414D812C-505C-DAD7-4399-873FDC9A2D83}"/>
+              </a:ext>
+            </a:extLst>
+          </p:cNvPr>
+          <p:cNvSpPr/>
+          <p:nvPr/>
+        </p:nvSpPr>
+        <p:spPr>
+          <a:xfrm>
+            <a:off x="3460388" y="4298512"/>
+            <a:ext cx="2285999" cy="735106"/>
+          </a:xfrm>
+          <a:prstGeom prst="rect">
+            <a:avLst/>
+          </a:prstGeom>
+          <a:gradFill flip="none" rotWithShape="1">
+            <a:gsLst>
+              <a:gs pos="0">
+                <a:schemeClr val="accent4">
+                  <a:lumMod val="67000"/>
+                </a:schemeClr>
+              </a:gs>
+              <a:gs pos="48000">
+                <a:schemeClr val="accent4">
+                  <a:lumMod val="97000"/>
+                  <a:lumOff val="3000"/>
+                </a:schemeClr>
+              </a:gs>
+              <a:gs pos="100000">
+                <a:schemeClr val="accent4">
+                  <a:lumMod val="60000"/>
+                  <a:lumOff val="40000"/>
+                </a:schemeClr>
+              </a:gs>
+            </a:gsLst>
+            <a:lin ang="16200000" scaled="1"/>
+            <a:tileRect/>
+          </a:gradFill>
+          <a:ln>
+            <a:noFill/>
+          </a:ln>
+        </p:spPr>
+        <p:style>
+          <a:lnRef idx="0">
+            <a:scrgbClr r="0" g="0" b="0"/>
+          </a:lnRef>
+          <a:fillRef idx="0">
+            <a:scrgbClr r="0" g="0" b="0"/>
+          </a:fillRef>
+          <a:effectRef idx="0">
+            <a:scrgbClr r="0" g="0" b="0"/>
+          </a:effectRef>
+          <a:fontRef idx="minor">
+            <a:schemeClr val="lt1"/>
+          </a:fontRef>
+        </p:style>
+        <p:txBody>
+          <a:bodyPr rtlCol="0" anchor="ctr"/>
+          <a:lstStyle/>
+          <a:p>
+            <a:pPr algn="ctr"/>
+            <a:r>
+              <a:rPr lang="en-US" dirty="0">
+                <a:solidFill>
+                  <a:schemeClr val="tx1"/>
+                </a:solidFill>
+              </a:rPr>
+              <a:t>GetSensorDefinition()</a:t>
+            </a:r>
+            <a:endParaRPr lang="en-DE" dirty="0">
+              <a:solidFill>
+                <a:schemeClr val="tx1"/>
+              </a:solidFill>
+            </a:endParaRPr>
+          </a:p>
+        </p:txBody>
+      </p:sp>
+      <p:sp>
+        <p:nvSpPr>
+          <p:cNvPr id="20" name="Rectangle 19">
+            <a:extLst>
+              <a:ext uri="{FF2B5EF4-FFF2-40B4-BE49-F238E27FC236}">
+                <a16:creationId xmlns:a16="http://schemas.microsoft.com/office/drawing/2014/main" id="{0432A504-C936-83CD-5A20-DEA4D2B35DDF}"/>
+              </a:ext>
+            </a:extLst>
+          </p:cNvPr>
+          <p:cNvSpPr/>
+          <p:nvPr/>
+        </p:nvSpPr>
+        <p:spPr>
+          <a:xfrm>
+            <a:off x="5960411" y="4277165"/>
+            <a:ext cx="2285999" cy="735106"/>
+          </a:xfrm>
+          <a:prstGeom prst="rect">
+            <a:avLst/>
+          </a:prstGeom>
+          <a:gradFill flip="none" rotWithShape="1">
+            <a:gsLst>
+              <a:gs pos="0">
+                <a:schemeClr val="accent4">
+                  <a:lumMod val="67000"/>
+                </a:schemeClr>
+              </a:gs>
+              <a:gs pos="48000">
+                <a:schemeClr val="accent4">
+                  <a:lumMod val="97000"/>
+                  <a:lumOff val="3000"/>
+                </a:schemeClr>
+              </a:gs>
+              <a:gs pos="100000">
+                <a:schemeClr val="accent4">
+                  <a:lumMod val="60000"/>
+                  <a:lumOff val="40000"/>
+                </a:schemeClr>
+              </a:gs>
+            </a:gsLst>
+            <a:lin ang="16200000" scaled="1"/>
+            <a:tileRect/>
+          </a:gradFill>
+          <a:ln>
+            <a:noFill/>
+          </a:ln>
+        </p:spPr>
+        <p:style>
+          <a:lnRef idx="0">
+            <a:scrgbClr r="0" g="0" b="0"/>
+          </a:lnRef>
+          <a:fillRef idx="0">
+            <a:scrgbClr r="0" g="0" b="0"/>
+          </a:fillRef>
+          <a:effectRef idx="0">
+            <a:scrgbClr r="0" g="0" b="0"/>
+          </a:effectRef>
+          <a:fontRef idx="minor">
+            <a:schemeClr val="lt1"/>
+          </a:fontRef>
+        </p:style>
+        <p:txBody>
+          <a:bodyPr rtlCol="0" anchor="ctr"/>
+          <a:lstStyle/>
+          <a:p>
+            <a:pPr algn="ctr"/>
+            <a:r>
+              <a:rPr lang="en-US" dirty="0">
+                <a:solidFill>
+                  <a:schemeClr val="tx1"/>
+                </a:solidFill>
+              </a:rPr>
+              <a:t>GetSensorDefinition()</a:t>
+            </a:r>
+            <a:endParaRPr lang="en-DE" dirty="0">
+              <a:solidFill>
+                <a:schemeClr val="tx1"/>
+              </a:solidFill>
+            </a:endParaRPr>
+          </a:p>
+        </p:txBody>
+      </p:sp>
+      <p:cxnSp>
+        <p:nvCxnSpPr>
+          <p:cNvPr id="21" name="Straight Arrow Connector 20">
+            <a:extLst>
+              <a:ext uri="{FF2B5EF4-FFF2-40B4-BE49-F238E27FC236}">
+                <a16:creationId xmlns:a16="http://schemas.microsoft.com/office/drawing/2014/main" id="{F06AAADF-261C-974C-F0BE-A0C62F4F4A82}"/>
+              </a:ext>
+            </a:extLst>
+          </p:cNvPr>
+          <p:cNvCxnSpPr>
+            <a:stCxn id="7" idx="1"/>
+            <a:endCxn id="17" idx="3"/>
+          </p:cNvCxnSpPr>
+          <p:nvPr/>
+        </p:nvCxnSpPr>
+        <p:spPr>
+          <a:xfrm flipH="1">
+            <a:off x="4625241" y="3551024"/>
+            <a:ext cx="362503" cy="0"/>
+          </a:xfrm>
+          <a:prstGeom prst="straightConnector1">
+            <a:avLst/>
+          </a:prstGeom>
+          <a:ln>
+            <a:tailEnd type="triangle"/>
+          </a:ln>
+        </p:spPr>
+        <p:style>
+          <a:lnRef idx="1">
+            <a:schemeClr val="accent1"/>
+          </a:lnRef>
+          <a:fillRef idx="0">
+            <a:schemeClr val="accent1"/>
+          </a:fillRef>
+          <a:effectRef idx="0">
+            <a:schemeClr val="accent1"/>
+          </a:effectRef>
+          <a:fontRef idx="minor">
+            <a:schemeClr val="tx1"/>
+          </a:fontRef>
+        </p:style>
+      </p:cxnSp>
+      <p:cxnSp>
+        <p:nvCxnSpPr>
+          <p:cNvPr id="22" name="Straight Arrow Connector 21">
+            <a:extLst>
+              <a:ext uri="{FF2B5EF4-FFF2-40B4-BE49-F238E27FC236}">
+                <a16:creationId xmlns:a16="http://schemas.microsoft.com/office/drawing/2014/main" id="{828B5D21-D58A-4AA5-615B-75A2C185E54B}"/>
+              </a:ext>
+            </a:extLst>
+          </p:cNvPr>
+          <p:cNvCxnSpPr>
+            <a:stCxn id="7" idx="3"/>
+            <a:endCxn id="18" idx="1"/>
+          </p:cNvCxnSpPr>
+          <p:nvPr/>
+        </p:nvCxnSpPr>
+        <p:spPr>
+          <a:xfrm>
+            <a:off x="6700002" y="3551024"/>
+            <a:ext cx="361389" cy="0"/>
+          </a:xfrm>
+          <a:prstGeom prst="straightConnector1">
+            <a:avLst/>
+          </a:prstGeom>
+          <a:ln>
+            <a:tailEnd type="triangle"/>
+          </a:ln>
+        </p:spPr>
+        <p:style>
+          <a:lnRef idx="1">
+            <a:schemeClr val="accent1"/>
+          </a:lnRef>
+          <a:fillRef idx="0">
+            <a:schemeClr val="accent1"/>
+          </a:fillRef>
+          <a:effectRef idx="0">
+            <a:schemeClr val="accent1"/>
+          </a:effectRef>
+          <a:fontRef idx="minor">
+            <a:schemeClr val="tx1"/>
+          </a:fontRef>
+        </p:style>
+      </p:cxnSp>
+      <p:cxnSp>
+        <p:nvCxnSpPr>
+          <p:cNvPr id="23" name="Straight Arrow Connector 22">
+            <a:extLst>
+              <a:ext uri="{FF2B5EF4-FFF2-40B4-BE49-F238E27FC236}">
+                <a16:creationId xmlns:a16="http://schemas.microsoft.com/office/drawing/2014/main" id="{578E79DA-E998-C547-3209-87DA98B56673}"/>
+              </a:ext>
+            </a:extLst>
+          </p:cNvPr>
+          <p:cNvCxnSpPr>
+            <a:stCxn id="7" idx="2"/>
+            <a:endCxn id="19" idx="0"/>
+          </p:cNvCxnSpPr>
+          <p:nvPr/>
+        </p:nvCxnSpPr>
+        <p:spPr>
+          <a:xfrm flipH="1">
+            <a:off x="4603388" y="3918577"/>
+            <a:ext cx="1240485" cy="379935"/>
+          </a:xfrm>
+          <a:prstGeom prst="straightConnector1">
+            <a:avLst/>
+          </a:prstGeom>
+          <a:ln>
+            <a:tailEnd type="triangle"/>
+          </a:ln>
+        </p:spPr>
+        <p:style>
+          <a:lnRef idx="1">
+            <a:schemeClr val="accent1"/>
+          </a:lnRef>
+          <a:fillRef idx="0">
+            <a:schemeClr val="accent1"/>
+          </a:fillRef>
+          <a:effectRef idx="0">
+            <a:schemeClr val="accent1"/>
+          </a:effectRef>
+          <a:fontRef idx="minor">
+            <a:schemeClr val="tx1"/>
+          </a:fontRef>
+        </p:style>
+      </p:cxnSp>
+      <p:cxnSp>
+        <p:nvCxnSpPr>
+          <p:cNvPr id="24" name="Straight Arrow Connector 23">
+            <a:extLst>
+              <a:ext uri="{FF2B5EF4-FFF2-40B4-BE49-F238E27FC236}">
+                <a16:creationId xmlns:a16="http://schemas.microsoft.com/office/drawing/2014/main" id="{D09B6EC6-E305-E4D2-3C19-F2DA23C56667}"/>
+              </a:ext>
+            </a:extLst>
+          </p:cNvPr>
+          <p:cNvCxnSpPr>
+            <a:stCxn id="7" idx="2"/>
+            <a:endCxn id="20" idx="0"/>
+          </p:cNvCxnSpPr>
+          <p:nvPr/>
+        </p:nvCxnSpPr>
+        <p:spPr>
+          <a:xfrm>
+            <a:off x="5843873" y="3918577"/>
+            <a:ext cx="1259538" cy="358588"/>
+          </a:xfrm>
+          <a:prstGeom prst="straightConnector1">
+            <a:avLst/>
+          </a:prstGeom>
+          <a:ln>
+            <a:tailEnd type="triangle"/>
+          </a:ln>
+        </p:spPr>
+        <p:style>
+          <a:lnRef idx="1">
+            <a:schemeClr val="accent1"/>
+          </a:lnRef>
+          <a:fillRef idx="0">
+            <a:schemeClr val="accent1"/>
+          </a:fillRef>
+          <a:effectRef idx="0">
+            <a:schemeClr val="accent1"/>
+          </a:effectRef>
+          <a:fontRef idx="minor">
+            <a:schemeClr val="tx1"/>
+          </a:fontRef>
+        </p:style>
+      </p:cxnSp>
+    </p:spTree>
+    <p:extLst>
+      <p:ext uri="{BB962C8B-B14F-4D97-AF65-F5344CB8AC3E}">
+        <p14:creationId xmlns:p14="http://schemas.microsoft.com/office/powerpoint/2010/main" val="1063544817"/>
+      </p:ext>
+    </p:extLst>
+  </p:cSld>
+  <p:clrMapOvr>
+    <a:masterClrMapping/>
+  </p:clrMapOvr>
+</p:sld>
+</file>
+
+<file path=ppt/slides/slide3.xml><?xml version="1.0" encoding="utf-8"?>
+<p:sld xmlns:a="http://schemas.openxmlformats.org/drawingml/2006/main" xmlns:r="http://schemas.openxmlformats.org/officeDocument/2006/relationships" xmlns:p="http://schemas.openxmlformats.org/presentationml/2006/main">
+  <p:cSld>
+    <p:spTree>
+      <p:nvGrpSpPr>
+        <p:cNvPr id="1" name=""/>
+        <p:cNvGrpSpPr/>
+        <p:nvPr/>
+      </p:nvGrpSpPr>
+      <p:grpSpPr>
+        <a:xfrm>
+          <a:off x="0" y="0"/>
+          <a:ext cx="0" cy="0"/>
+          <a:chOff x="0" y="0"/>
+          <a:chExt cx="0" cy="0"/>
+        </a:xfrm>
+      </p:grpSpPr>
+      <p:sp>
+        <p:nvSpPr>
+          <p:cNvPr id="4" name="Oval 3">
+            <a:extLst>
+              <a:ext uri="{FF2B5EF4-FFF2-40B4-BE49-F238E27FC236}">
+                <a16:creationId xmlns:a16="http://schemas.microsoft.com/office/drawing/2014/main" id="{42BA037A-344A-E4D9-CA96-D19F34C1235C}"/>
+              </a:ext>
+            </a:extLst>
+          </p:cNvPr>
+          <p:cNvSpPr/>
+          <p:nvPr/>
+        </p:nvSpPr>
+        <p:spPr>
+          <a:xfrm>
+            <a:off x="5738536" y="835920"/>
+            <a:ext cx="233083" cy="249810"/>
+          </a:xfrm>
+          <a:prstGeom prst="ellipse">
+            <a:avLst/>
+          </a:prstGeom>
+        </p:spPr>
+        <p:style>
+          <a:lnRef idx="2">
+            <a:schemeClr val="dk1">
+              <a:shade val="50000"/>
+            </a:schemeClr>
+          </a:lnRef>
+          <a:fillRef idx="1">
+            <a:schemeClr val="dk1"/>
+          </a:fillRef>
+          <a:effectRef idx="0">
+            <a:schemeClr val="dk1"/>
+          </a:effectRef>
+          <a:fontRef idx="minor">
+            <a:schemeClr val="lt1"/>
+          </a:fontRef>
+        </p:style>
+        <p:txBody>
+          <a:bodyPr rtlCol="0" anchor="ctr"/>
+          <a:lstStyle/>
+          <a:p>
+            <a:pPr algn="ctr"/>
+            <a:endParaRPr lang="en-DE"/>
+          </a:p>
+        </p:txBody>
+      </p:sp>
+      <p:sp>
+        <p:nvSpPr>
+          <p:cNvPr id="5" name="TextBox 4">
+            <a:extLst>
+              <a:ext uri="{FF2B5EF4-FFF2-40B4-BE49-F238E27FC236}">
+                <a16:creationId xmlns:a16="http://schemas.microsoft.com/office/drawing/2014/main" id="{22C8304A-C836-0204-41F0-CF3CC4C9DBB8}"/>
+              </a:ext>
+            </a:extLst>
+          </p:cNvPr>
+          <p:cNvSpPr txBox="1"/>
+          <p:nvPr/>
+        </p:nvSpPr>
+        <p:spPr>
+          <a:xfrm>
+            <a:off x="5310464" y="466588"/>
+            <a:ext cx="1089214" cy="369332"/>
+          </a:xfrm>
+          <a:prstGeom prst="rect">
+            <a:avLst/>
+          </a:prstGeom>
+          <a:noFill/>
+        </p:spPr>
+        <p:txBody>
+          <a:bodyPr wrap="square" rtlCol="0">
+            <a:spAutoFit/>
+          </a:bodyPr>
+          <a:lstStyle/>
+          <a:p>
+            <a:r>
+              <a:rPr lang="en-US" dirty="0"/>
+              <a:t>Every tick</a:t>
+            </a:r>
+            <a:endParaRPr lang="en-DE" dirty="0"/>
+          </a:p>
+        </p:txBody>
+      </p:sp>
+      <p:sp>
+        <p:nvSpPr>
+          <p:cNvPr id="6" name="Rectangle 5">
+            <a:extLst>
+              <a:ext uri="{FF2B5EF4-FFF2-40B4-BE49-F238E27FC236}">
+                <a16:creationId xmlns:a16="http://schemas.microsoft.com/office/drawing/2014/main" id="{F73D0873-F99B-C567-2013-3436552EB78D}"/>
+              </a:ext>
+            </a:extLst>
+          </p:cNvPr>
+          <p:cNvSpPr/>
+          <p:nvPr/>
+        </p:nvSpPr>
+        <p:spPr>
+          <a:xfrm>
+            <a:off x="4830860" y="1444318"/>
+            <a:ext cx="2048433" cy="735106"/>
+          </a:xfrm>
+          <a:prstGeom prst="rect">
+            <a:avLst/>
+          </a:prstGeom>
+          <a:gradFill flip="none" rotWithShape="1">
+            <a:gsLst>
+              <a:gs pos="0">
+                <a:schemeClr val="accent4">
+                  <a:lumMod val="67000"/>
+                </a:schemeClr>
+              </a:gs>
+              <a:gs pos="48000">
+                <a:schemeClr val="accent4">
+                  <a:lumMod val="97000"/>
+                  <a:lumOff val="3000"/>
+                </a:schemeClr>
+              </a:gs>
+              <a:gs pos="100000">
+                <a:schemeClr val="accent4">
+                  <a:lumMod val="60000"/>
+                  <a:lumOff val="40000"/>
+                </a:schemeClr>
+              </a:gs>
+            </a:gsLst>
+            <a:lin ang="16200000" scaled="1"/>
+            <a:tileRect/>
+          </a:gradFill>
+          <a:ln>
+            <a:noFill/>
+          </a:ln>
+        </p:spPr>
+        <p:style>
+          <a:lnRef idx="0">
+            <a:scrgbClr r="0" g="0" b="0"/>
+          </a:lnRef>
+          <a:fillRef idx="0">
+            <a:scrgbClr r="0" g="0" b="0"/>
+          </a:fillRef>
+          <a:effectRef idx="0">
+            <a:scrgbClr r="0" g="0" b="0"/>
+          </a:effectRef>
+          <a:fontRef idx="minor">
+            <a:schemeClr val="lt1"/>
+          </a:fontRef>
+        </p:style>
+        <p:txBody>
+          <a:bodyPr rtlCol="0" anchor="ctr"/>
+          <a:lstStyle/>
+          <a:p>
+            <a:pPr algn="ctr"/>
+            <a:r>
+              <a:rPr lang="en-US" sz="1800" dirty="0">
+                <a:solidFill>
+                  <a:srgbClr val="000000"/>
+                </a:solidFill>
+                <a:latin typeface="Consolas" panose="020B0609020204030204" pitchFamily="49" charset="0"/>
+              </a:rPr>
+              <a:t>PostPhysTick()</a:t>
+            </a:r>
+            <a:endParaRPr lang="en-DE" dirty="0">
+              <a:solidFill>
+                <a:schemeClr val="tx1"/>
+              </a:solidFill>
+            </a:endParaRPr>
+          </a:p>
+        </p:txBody>
+      </p:sp>
+      <p:cxnSp>
+        <p:nvCxnSpPr>
+          <p:cNvPr id="7" name="Straight Arrow Connector 6">
+            <a:extLst>
+              <a:ext uri="{FF2B5EF4-FFF2-40B4-BE49-F238E27FC236}">
+                <a16:creationId xmlns:a16="http://schemas.microsoft.com/office/drawing/2014/main" id="{7A1F3BBC-F454-E012-9735-96EE38D31635}"/>
+              </a:ext>
+            </a:extLst>
+          </p:cNvPr>
+          <p:cNvCxnSpPr>
+            <a:cxnSpLocks/>
+            <a:stCxn id="4" idx="4"/>
+            <a:endCxn id="6" idx="0"/>
+          </p:cNvCxnSpPr>
+          <p:nvPr/>
+        </p:nvCxnSpPr>
+        <p:spPr>
+          <a:xfrm flipH="1">
+            <a:off x="5855077" y="1085730"/>
+            <a:ext cx="1" cy="358588"/>
+          </a:xfrm>
+          <a:prstGeom prst="straightConnector1">
+            <a:avLst/>
+          </a:prstGeom>
+          <a:ln>
+            <a:tailEnd type="triangle"/>
+          </a:ln>
+        </p:spPr>
+        <p:style>
+          <a:lnRef idx="1">
+            <a:schemeClr val="accent1"/>
+          </a:lnRef>
+          <a:fillRef idx="0">
+            <a:schemeClr val="accent1"/>
+          </a:fillRef>
+          <a:effectRef idx="0">
+            <a:schemeClr val="accent1"/>
+          </a:effectRef>
+          <a:fontRef idx="minor">
+            <a:schemeClr val="tx1"/>
+          </a:fontRef>
+        </p:style>
+      </p:cxnSp>
+      <p:sp>
+        <p:nvSpPr>
+          <p:cNvPr id="8" name="Rectangle 7">
+            <a:extLst>
+              <a:ext uri="{FF2B5EF4-FFF2-40B4-BE49-F238E27FC236}">
+                <a16:creationId xmlns:a16="http://schemas.microsoft.com/office/drawing/2014/main" id="{36853CCA-3AFA-8819-DA58-67076B794319}"/>
+              </a:ext>
+            </a:extLst>
+          </p:cNvPr>
+          <p:cNvSpPr/>
+          <p:nvPr/>
+        </p:nvSpPr>
+        <p:spPr>
+          <a:xfrm>
+            <a:off x="6367178" y="2568548"/>
+            <a:ext cx="3527607" cy="735106"/>
+          </a:xfrm>
+          <a:prstGeom prst="rect">
+            <a:avLst/>
+          </a:prstGeom>
+          <a:gradFill flip="none" rotWithShape="1">
+            <a:gsLst>
+              <a:gs pos="0">
+                <a:schemeClr val="accent4">
+                  <a:lumMod val="67000"/>
+                </a:schemeClr>
+              </a:gs>
+              <a:gs pos="48000">
+                <a:schemeClr val="accent4">
+                  <a:lumMod val="97000"/>
+                  <a:lumOff val="3000"/>
+                </a:schemeClr>
+              </a:gs>
+              <a:gs pos="100000">
+                <a:schemeClr val="accent4">
+                  <a:lumMod val="60000"/>
+                  <a:lumOff val="40000"/>
+                </a:schemeClr>
+              </a:gs>
+            </a:gsLst>
+            <a:lin ang="16200000" scaled="1"/>
+            <a:tileRect/>
+          </a:gradFill>
+          <a:ln>
+            <a:noFill/>
+          </a:ln>
+        </p:spPr>
+        <p:style>
+          <a:lnRef idx="0">
+            <a:scrgbClr r="0" g="0" b="0"/>
+          </a:lnRef>
+          <a:fillRef idx="0">
+            <a:scrgbClr r="0" g="0" b="0"/>
+          </a:fillRef>
+          <a:effectRef idx="0">
+            <a:scrgbClr r="0" g="0" b="0"/>
+          </a:effectRef>
+          <a:fontRef idx="minor">
+            <a:schemeClr val="lt1"/>
+          </a:fontRef>
+        </p:style>
+        <p:txBody>
+          <a:bodyPr rtlCol="0" anchor="ctr"/>
+          <a:lstStyle/>
+          <a:p>
+            <a:pPr algn="ctr"/>
+            <a:r>
+              <a:rPr lang="en-US" sz="1800" dirty="0">
+                <a:solidFill>
+                  <a:srgbClr val="000000"/>
+                </a:solidFill>
+                <a:latin typeface="Consolas" panose="020B0609020204030204" pitchFamily="49" charset="0"/>
+              </a:rPr>
+              <a:t>CalculateCurrentVelocity()</a:t>
+            </a:r>
+            <a:endParaRPr lang="en-DE" dirty="0">
+              <a:solidFill>
+                <a:schemeClr val="tx1"/>
+              </a:solidFill>
+            </a:endParaRPr>
+          </a:p>
+        </p:txBody>
+      </p:sp>
+      <p:sp>
+        <p:nvSpPr>
+          <p:cNvPr id="9" name="Rectangle 8">
+            <a:extLst>
+              <a:ext uri="{FF2B5EF4-FFF2-40B4-BE49-F238E27FC236}">
+                <a16:creationId xmlns:a16="http://schemas.microsoft.com/office/drawing/2014/main" id="{147222AF-52E6-717E-F123-3565220A123B}"/>
+              </a:ext>
+            </a:extLst>
+          </p:cNvPr>
+          <p:cNvSpPr/>
+          <p:nvPr/>
+        </p:nvSpPr>
+        <p:spPr>
+          <a:xfrm>
+            <a:off x="3065933" y="2568548"/>
+            <a:ext cx="2277033" cy="735106"/>
+          </a:xfrm>
+          <a:prstGeom prst="rect">
+            <a:avLst/>
+          </a:prstGeom>
+          <a:gradFill flip="none" rotWithShape="1">
+            <a:gsLst>
+              <a:gs pos="0">
+                <a:schemeClr val="accent4">
+                  <a:lumMod val="67000"/>
+                </a:schemeClr>
+              </a:gs>
+              <a:gs pos="48000">
+                <a:schemeClr val="accent4">
+                  <a:lumMod val="97000"/>
+                  <a:lumOff val="3000"/>
+                </a:schemeClr>
+              </a:gs>
+              <a:gs pos="100000">
+                <a:schemeClr val="accent4">
+                  <a:lumMod val="60000"/>
+                  <a:lumOff val="40000"/>
+                </a:schemeClr>
+              </a:gs>
+            </a:gsLst>
+            <a:lin ang="16200000" scaled="1"/>
+            <a:tileRect/>
+          </a:gradFill>
+          <a:ln>
+            <a:noFill/>
+          </a:ln>
+        </p:spPr>
+        <p:style>
+          <a:lnRef idx="0">
+            <a:scrgbClr r="0" g="0" b="0"/>
+          </a:lnRef>
+          <a:fillRef idx="0">
+            <a:scrgbClr r="0" g="0" b="0"/>
+          </a:fillRef>
+          <a:effectRef idx="0">
+            <a:scrgbClr r="0" g="0" b="0"/>
+          </a:effectRef>
+          <a:fontRef idx="minor">
+            <a:schemeClr val="lt1"/>
+          </a:fontRef>
+        </p:style>
+        <p:txBody>
+          <a:bodyPr rtlCol="0" anchor="ctr"/>
+          <a:lstStyle/>
+          <a:p>
+            <a:pPr algn="ctr"/>
+            <a:r>
+              <a:rPr lang="en-US" sz="1800" dirty="0">
+                <a:solidFill>
+                  <a:srgbClr val="000000"/>
+                </a:solidFill>
+                <a:latin typeface="Consolas" panose="020B0609020204030204" pitchFamily="49" charset="0"/>
+              </a:rPr>
+              <a:t>DataStream.Send</a:t>
+            </a:r>
+            <a:r>
+              <a:rPr lang="en-US" dirty="0">
+                <a:solidFill>
+                  <a:schemeClr val="tx1"/>
+                </a:solidFill>
+              </a:rPr>
+              <a:t>()</a:t>
+            </a:r>
+            <a:endParaRPr lang="en-DE" dirty="0">
+              <a:solidFill>
+                <a:schemeClr val="tx1"/>
+              </a:solidFill>
+            </a:endParaRPr>
+          </a:p>
+        </p:txBody>
+      </p:sp>
+      <p:cxnSp>
+        <p:nvCxnSpPr>
+          <p:cNvPr id="10" name="Straight Arrow Connector 9">
+            <a:extLst>
+              <a:ext uri="{FF2B5EF4-FFF2-40B4-BE49-F238E27FC236}">
+                <a16:creationId xmlns:a16="http://schemas.microsoft.com/office/drawing/2014/main" id="{3B47A8AB-CD7A-68AC-0BFF-7DE484F29CAF}"/>
+              </a:ext>
+            </a:extLst>
+          </p:cNvPr>
+          <p:cNvCxnSpPr>
+            <a:cxnSpLocks/>
+            <a:stCxn id="6" idx="2"/>
+            <a:endCxn id="8" idx="0"/>
+          </p:cNvCxnSpPr>
+          <p:nvPr/>
+        </p:nvCxnSpPr>
+        <p:spPr>
+          <a:xfrm>
+            <a:off x="5855077" y="2179424"/>
+            <a:ext cx="2275905" cy="389124"/>
+          </a:xfrm>
+          <a:prstGeom prst="straightConnector1">
+            <a:avLst/>
+          </a:prstGeom>
+          <a:ln>
+            <a:tailEnd type="triangle"/>
+          </a:ln>
+        </p:spPr>
+        <p:style>
+          <a:lnRef idx="1">
+            <a:schemeClr val="accent1"/>
+          </a:lnRef>
+          <a:fillRef idx="0">
+            <a:schemeClr val="accent1"/>
+          </a:fillRef>
+          <a:effectRef idx="0">
+            <a:schemeClr val="accent1"/>
+          </a:effectRef>
+          <a:fontRef idx="minor">
+            <a:schemeClr val="tx1"/>
+          </a:fontRef>
+        </p:style>
+      </p:cxnSp>
+      <p:cxnSp>
+        <p:nvCxnSpPr>
+          <p:cNvPr id="11" name="Straight Arrow Connector 10">
+            <a:extLst>
+              <a:ext uri="{FF2B5EF4-FFF2-40B4-BE49-F238E27FC236}">
+                <a16:creationId xmlns:a16="http://schemas.microsoft.com/office/drawing/2014/main" id="{3BEF3B9C-0A8A-4A5A-ADD5-774820A1BF39}"/>
+              </a:ext>
+            </a:extLst>
+          </p:cNvPr>
+          <p:cNvCxnSpPr>
+            <a:cxnSpLocks/>
+            <a:endCxn id="9" idx="0"/>
+          </p:cNvCxnSpPr>
+          <p:nvPr/>
+        </p:nvCxnSpPr>
+        <p:spPr>
+          <a:xfrm flipH="1">
+            <a:off x="4204450" y="2180464"/>
+            <a:ext cx="1650625" cy="388084"/>
+          </a:xfrm>
+          <a:prstGeom prst="straightConnector1">
+            <a:avLst/>
+          </a:prstGeom>
+          <a:ln>
+            <a:tailEnd type="triangle"/>
+          </a:ln>
+        </p:spPr>
+        <p:style>
+          <a:lnRef idx="1">
+            <a:schemeClr val="accent1"/>
+          </a:lnRef>
+          <a:fillRef idx="0">
+            <a:schemeClr val="accent1"/>
+          </a:fillRef>
+          <a:effectRef idx="0">
+            <a:schemeClr val="accent1"/>
+          </a:effectRef>
+          <a:fontRef idx="minor">
+            <a:schemeClr val="tx1"/>
+          </a:fontRef>
+        </p:style>
+      </p:cxnSp>
+      <p:sp>
+        <p:nvSpPr>
+          <p:cNvPr id="12" name="Rectangle 11">
+            <a:extLst>
+              <a:ext uri="{FF2B5EF4-FFF2-40B4-BE49-F238E27FC236}">
+                <a16:creationId xmlns:a16="http://schemas.microsoft.com/office/drawing/2014/main" id="{9FC508A5-C8B1-B03F-EE8F-CCDC62024703}"/>
+              </a:ext>
+            </a:extLst>
+          </p:cNvPr>
+          <p:cNvSpPr/>
+          <p:nvPr/>
+        </p:nvSpPr>
+        <p:spPr>
+          <a:xfrm>
+            <a:off x="4549588" y="3482667"/>
+            <a:ext cx="2610967" cy="735106"/>
+          </a:xfrm>
+          <a:prstGeom prst="rect">
+            <a:avLst/>
+          </a:prstGeom>
+          <a:gradFill flip="none" rotWithShape="1">
+            <a:gsLst>
+              <a:gs pos="0">
+                <a:schemeClr val="accent4">
+                  <a:lumMod val="67000"/>
+                </a:schemeClr>
+              </a:gs>
+              <a:gs pos="48000">
+                <a:schemeClr val="accent4">
+                  <a:lumMod val="97000"/>
+                  <a:lumOff val="3000"/>
+                </a:schemeClr>
+              </a:gs>
+              <a:gs pos="100000">
+                <a:schemeClr val="accent4">
+                  <a:lumMod val="60000"/>
+                  <a:lumOff val="40000"/>
+                </a:schemeClr>
+              </a:gs>
+            </a:gsLst>
+            <a:lin ang="16200000" scaled="1"/>
+            <a:tileRect/>
+          </a:gradFill>
+          <a:ln>
+            <a:noFill/>
+          </a:ln>
+        </p:spPr>
+        <p:style>
+          <a:lnRef idx="0">
+            <a:scrgbClr r="0" g="0" b="0"/>
+          </a:lnRef>
+          <a:fillRef idx="0">
+            <a:scrgbClr r="0" g="0" b="0"/>
+          </a:fillRef>
+          <a:effectRef idx="0">
+            <a:scrgbClr r="0" g="0" b="0"/>
+          </a:effectRef>
+          <a:fontRef idx="minor">
+            <a:schemeClr val="lt1"/>
+          </a:fontRef>
+        </p:style>
+        <p:txBody>
+          <a:bodyPr rtlCol="0" anchor="ctr"/>
+          <a:lstStyle/>
+          <a:p>
+            <a:pPr algn="ctr"/>
+            <a:r>
+              <a:rPr lang="en-US" sz="1800" dirty="0">
+                <a:solidFill>
+                  <a:srgbClr val="000000"/>
+                </a:solidFill>
+                <a:latin typeface="Consolas" panose="020B0609020204030204" pitchFamily="49" charset="0"/>
+              </a:rPr>
+              <a:t>SendLineTraces</a:t>
+            </a:r>
+            <a:r>
+              <a:rPr lang="en-US" dirty="0">
+                <a:solidFill>
+                  <a:schemeClr val="tx1"/>
+                </a:solidFill>
+              </a:rPr>
+              <a:t>()</a:t>
+            </a:r>
+            <a:endParaRPr lang="en-DE" dirty="0">
+              <a:solidFill>
+                <a:schemeClr val="tx1"/>
+              </a:solidFill>
+            </a:endParaRPr>
+          </a:p>
+        </p:txBody>
+      </p:sp>
+      <p:sp>
+        <p:nvSpPr>
+          <p:cNvPr id="13" name="Rectangle 12">
+            <a:extLst>
+              <a:ext uri="{FF2B5EF4-FFF2-40B4-BE49-F238E27FC236}">
+                <a16:creationId xmlns:a16="http://schemas.microsoft.com/office/drawing/2014/main" id="{B4DF1972-A2F0-AEDC-57EF-0B5E93CD8CC4}"/>
+              </a:ext>
+            </a:extLst>
+          </p:cNvPr>
+          <p:cNvSpPr/>
+          <p:nvPr/>
+        </p:nvSpPr>
+        <p:spPr>
+          <a:xfrm>
+            <a:off x="4091270" y="4547195"/>
+            <a:ext cx="3527605" cy="735106"/>
+          </a:xfrm>
+          <a:prstGeom prst="rect">
+            <a:avLst/>
+          </a:prstGeom>
+          <a:gradFill flip="none" rotWithShape="1">
+            <a:gsLst>
+              <a:gs pos="0">
+                <a:schemeClr val="accent4">
+                  <a:lumMod val="67000"/>
+                </a:schemeClr>
+              </a:gs>
+              <a:gs pos="48000">
+                <a:schemeClr val="accent4">
+                  <a:lumMod val="97000"/>
+                  <a:lumOff val="3000"/>
+                </a:schemeClr>
+              </a:gs>
+              <a:gs pos="100000">
+                <a:schemeClr val="accent4">
+                  <a:lumMod val="60000"/>
+                  <a:lumOff val="40000"/>
+                </a:schemeClr>
+              </a:gs>
+            </a:gsLst>
+            <a:lin ang="16200000" scaled="1"/>
+            <a:tileRect/>
+          </a:gradFill>
+          <a:ln>
+            <a:noFill/>
+          </a:ln>
+        </p:spPr>
+        <p:style>
+          <a:lnRef idx="0">
+            <a:scrgbClr r="0" g="0" b="0"/>
+          </a:lnRef>
+          <a:fillRef idx="0">
+            <a:scrgbClr r="0" g="0" b="0"/>
+          </a:fillRef>
+          <a:effectRef idx="0">
+            <a:scrgbClr r="0" g="0" b="0"/>
+          </a:effectRef>
+          <a:fontRef idx="minor">
+            <a:schemeClr val="lt1"/>
+          </a:fontRef>
+        </p:style>
+        <p:txBody>
+          <a:bodyPr rtlCol="0" anchor="ctr"/>
+          <a:lstStyle/>
+          <a:p>
+            <a:pPr algn="ctr"/>
+            <a:r>
+              <a:rPr lang="en-US" sz="1800" dirty="0">
+                <a:solidFill>
+                  <a:srgbClr val="000000"/>
+                </a:solidFill>
+                <a:latin typeface="Consolas" panose="020B0609020204030204" pitchFamily="49" charset="0"/>
+              </a:rPr>
+              <a:t>CalculateRelativeVelocity</a:t>
+            </a:r>
+            <a:r>
+              <a:rPr lang="en-US" dirty="0">
+                <a:solidFill>
+                  <a:schemeClr val="tx1"/>
+                </a:solidFill>
+              </a:rPr>
+              <a:t>()</a:t>
+            </a:r>
+            <a:endParaRPr lang="en-DE" dirty="0">
+              <a:solidFill>
+                <a:schemeClr val="tx1"/>
+              </a:solidFill>
+            </a:endParaRPr>
+          </a:p>
+        </p:txBody>
+      </p:sp>
+      <p:cxnSp>
+        <p:nvCxnSpPr>
+          <p:cNvPr id="14" name="Straight Arrow Connector 13">
+            <a:extLst>
+              <a:ext uri="{FF2B5EF4-FFF2-40B4-BE49-F238E27FC236}">
+                <a16:creationId xmlns:a16="http://schemas.microsoft.com/office/drawing/2014/main" id="{7F315219-E6BC-795D-035D-B0C4D05CB8C4}"/>
+              </a:ext>
+            </a:extLst>
+          </p:cNvPr>
+          <p:cNvCxnSpPr>
+            <a:stCxn id="6" idx="2"/>
+            <a:endCxn id="12" idx="0"/>
+          </p:cNvCxnSpPr>
+          <p:nvPr/>
+        </p:nvCxnSpPr>
+        <p:spPr>
+          <a:xfrm flipH="1">
+            <a:off x="5855072" y="2179424"/>
+            <a:ext cx="5" cy="1303243"/>
+          </a:xfrm>
+          <a:prstGeom prst="straightConnector1">
+            <a:avLst/>
+          </a:prstGeom>
+          <a:ln>
+            <a:tailEnd type="triangle"/>
+          </a:ln>
+        </p:spPr>
+        <p:style>
+          <a:lnRef idx="1">
+            <a:schemeClr val="accent1"/>
+          </a:lnRef>
+          <a:fillRef idx="0">
+            <a:schemeClr val="accent1"/>
+          </a:fillRef>
+          <a:effectRef idx="0">
+            <a:schemeClr val="accent1"/>
+          </a:effectRef>
+          <a:fontRef idx="minor">
+            <a:schemeClr val="tx1"/>
+          </a:fontRef>
+        </p:style>
+      </p:cxnSp>
+      <p:cxnSp>
+        <p:nvCxnSpPr>
+          <p:cNvPr id="15" name="Straight Arrow Connector 14">
+            <a:extLst>
+              <a:ext uri="{FF2B5EF4-FFF2-40B4-BE49-F238E27FC236}">
+                <a16:creationId xmlns:a16="http://schemas.microsoft.com/office/drawing/2014/main" id="{571AAD02-AF21-E9BD-F697-D7686EA528B5}"/>
+              </a:ext>
+            </a:extLst>
+          </p:cNvPr>
+          <p:cNvCxnSpPr>
+            <a:cxnSpLocks/>
+            <a:stCxn id="12" idx="2"/>
+            <a:endCxn id="13" idx="0"/>
+          </p:cNvCxnSpPr>
+          <p:nvPr/>
+        </p:nvCxnSpPr>
+        <p:spPr>
+          <a:xfrm>
+            <a:off x="5855072" y="4217773"/>
+            <a:ext cx="1" cy="329422"/>
+          </a:xfrm>
+          <a:prstGeom prst="straightConnector1">
+            <a:avLst/>
+          </a:prstGeom>
+          <a:ln>
+            <a:tailEnd type="triangle"/>
+          </a:ln>
+        </p:spPr>
+        <p:style>
+          <a:lnRef idx="1">
+            <a:schemeClr val="accent1"/>
+          </a:lnRef>
+          <a:fillRef idx="0">
+            <a:schemeClr val="accent1"/>
+          </a:fillRef>
+          <a:effectRef idx="0">
+            <a:schemeClr val="accent1"/>
+          </a:effectRef>
+          <a:fontRef idx="minor">
+            <a:schemeClr val="tx1"/>
+          </a:fontRef>
+        </p:style>
+      </p:cxnSp>
+      <p:sp>
+        <p:nvSpPr>
+          <p:cNvPr id="16" name="Oval 15">
+            <a:extLst>
+              <a:ext uri="{FF2B5EF4-FFF2-40B4-BE49-F238E27FC236}">
+                <a16:creationId xmlns:a16="http://schemas.microsoft.com/office/drawing/2014/main" id="{1C71852A-EE16-5814-4EA6-DAD9A3F55FFF}"/>
+              </a:ext>
+            </a:extLst>
+          </p:cNvPr>
+          <p:cNvSpPr/>
+          <p:nvPr/>
+        </p:nvSpPr>
+        <p:spPr>
+          <a:xfrm>
+            <a:off x="5738536" y="5658780"/>
+            <a:ext cx="233083" cy="249810"/>
+          </a:xfrm>
+          <a:prstGeom prst="ellipse">
+            <a:avLst/>
+          </a:prstGeom>
+        </p:spPr>
+        <p:style>
+          <a:lnRef idx="2">
+            <a:schemeClr val="dk1">
+              <a:shade val="50000"/>
+            </a:schemeClr>
+          </a:lnRef>
+          <a:fillRef idx="1">
+            <a:schemeClr val="dk1"/>
+          </a:fillRef>
+          <a:effectRef idx="0">
+            <a:schemeClr val="dk1"/>
+          </a:effectRef>
+          <a:fontRef idx="minor">
+            <a:schemeClr val="lt1"/>
+          </a:fontRef>
+        </p:style>
+        <p:txBody>
+          <a:bodyPr rtlCol="0" anchor="ctr"/>
+          <a:lstStyle/>
+          <a:p>
+            <a:pPr algn="ctr"/>
+            <a:endParaRPr lang="en-DE"/>
+          </a:p>
+        </p:txBody>
+      </p:sp>
+      <p:sp>
+        <p:nvSpPr>
+          <p:cNvPr id="17" name="TextBox 16">
+            <a:extLst>
+              <a:ext uri="{FF2B5EF4-FFF2-40B4-BE49-F238E27FC236}">
+                <a16:creationId xmlns:a16="http://schemas.microsoft.com/office/drawing/2014/main" id="{F8385720-F9FA-FDE2-2AF8-3332C37FACBA}"/>
+              </a:ext>
+            </a:extLst>
+          </p:cNvPr>
+          <p:cNvSpPr txBox="1"/>
+          <p:nvPr/>
+        </p:nvSpPr>
+        <p:spPr>
+          <a:xfrm>
+            <a:off x="5196164" y="5915522"/>
+            <a:ext cx="1317814" cy="369332"/>
+          </a:xfrm>
+          <a:prstGeom prst="rect">
+            <a:avLst/>
+          </a:prstGeom>
+          <a:noFill/>
+        </p:spPr>
+        <p:txBody>
+          <a:bodyPr wrap="square" rtlCol="0">
+            <a:spAutoFit/>
+          </a:bodyPr>
+          <a:lstStyle/>
+          <a:p>
+            <a:r>
+              <a:rPr lang="en-US" dirty="0"/>
+              <a:t>Wait for tick</a:t>
+            </a:r>
+            <a:endParaRPr lang="en-DE" dirty="0"/>
+          </a:p>
+        </p:txBody>
+      </p:sp>
+      <p:cxnSp>
+        <p:nvCxnSpPr>
+          <p:cNvPr id="18" name="Straight Arrow Connector 17">
+            <a:extLst>
+              <a:ext uri="{FF2B5EF4-FFF2-40B4-BE49-F238E27FC236}">
+                <a16:creationId xmlns:a16="http://schemas.microsoft.com/office/drawing/2014/main" id="{553B4378-4CC4-5A70-A5E3-945B4ABA622F}"/>
+              </a:ext>
+            </a:extLst>
+          </p:cNvPr>
+          <p:cNvCxnSpPr>
+            <a:cxnSpLocks/>
+            <a:stCxn id="13" idx="2"/>
+            <a:endCxn id="16" idx="0"/>
+          </p:cNvCxnSpPr>
+          <p:nvPr/>
+        </p:nvCxnSpPr>
+        <p:spPr>
+          <a:xfrm>
+            <a:off x="5855073" y="5282301"/>
+            <a:ext cx="5" cy="376479"/>
+          </a:xfrm>
+          <a:prstGeom prst="straightConnector1">
+            <a:avLst/>
+          </a:prstGeom>
+          <a:ln>
+            <a:tailEnd type="triangle"/>
+          </a:ln>
+        </p:spPr>
+        <p:style>
+          <a:lnRef idx="1">
+            <a:schemeClr val="accent1"/>
+          </a:lnRef>
+          <a:fillRef idx="0">
+            <a:schemeClr val="accent1"/>
+          </a:fillRef>
+          <a:effectRef idx="0">
+            <a:schemeClr val="accent1"/>
+          </a:effectRef>
+          <a:fontRef idx="minor">
+            <a:schemeClr val="tx1"/>
+          </a:fontRef>
+        </p:style>
+      </p:cxnSp>
+    </p:spTree>
+    <p:extLst>
+      <p:ext uri="{BB962C8B-B14F-4D97-AF65-F5344CB8AC3E}">
+        <p14:creationId xmlns:p14="http://schemas.microsoft.com/office/powerpoint/2010/main" val="3746979498"/>
+      </p:ext>
+    </p:extLst>
+  </p:cSld>
+  <p:clrMapOvr>
+    <a:masterClrMapping/>
+  </p:clrMapOvr>
+</p:sld>
+</file>
+
+<file path=ppt/slides/slide4.xml><?xml version="1.0" encoding="utf-8"?>
+<p:sld xmlns:a="http://schemas.openxmlformats.org/drawingml/2006/main" xmlns:r="http://schemas.openxmlformats.org/officeDocument/2006/relationships" xmlns:p="http://schemas.openxmlformats.org/presentationml/2006/main">
+  <p:cSld>
+    <p:spTree>
+      <p:nvGrpSpPr>
+        <p:cNvPr id="1" name=""/>
+        <p:cNvGrpSpPr/>
+        <p:nvPr/>
+      </p:nvGrpSpPr>
+      <p:grpSpPr>
+        <a:xfrm>
+          <a:off x="0" y="0"/>
+          <a:ext cx="0" cy="0"/>
+          <a:chOff x="0" y="0"/>
+          <a:chExt cx="0" cy="0"/>
+        </a:xfrm>
+      </p:grpSpPr>
+      <p:pic>
+        <p:nvPicPr>
           <p:cNvPr id="3" name="Picture 2">
             <a:extLst>
               <a:ext uri="{FF2B5EF4-FFF2-40B4-BE49-F238E27FC236}">
@@ -3455,7 +6791,7 @@
 </p:sld>
 </file>
 
-<file path=ppt/slides/slide2.xml><?xml version="1.0" encoding="utf-8"?>
+<file path=ppt/slides/slide5.xml><?xml version="1.0" encoding="utf-8"?>
 <p:sld xmlns:a="http://schemas.openxmlformats.org/drawingml/2006/main" xmlns:r="http://schemas.openxmlformats.org/officeDocument/2006/relationships" xmlns:p="http://schemas.openxmlformats.org/presentationml/2006/main">
   <p:cSld>
     <p:spTree>
@@ -3942,7 +7278,7 @@
 </p:sld>
 </file>
 
-<file path=ppt/slides/slide3.xml><?xml version="1.0" encoding="utf-8"?>
+<file path=ppt/slides/slide6.xml><?xml version="1.0" encoding="utf-8"?>
 <p:sld xmlns:a="http://schemas.openxmlformats.org/drawingml/2006/main" xmlns:r="http://schemas.openxmlformats.org/officeDocument/2006/relationships" xmlns:p="http://schemas.openxmlformats.org/presentationml/2006/main">
   <p:cSld>
     <p:spTree>
@@ -7313,7 +10649,7 @@
 </p:sld>
 </file>
 
-<file path=ppt/slides/slide4.xml><?xml version="1.0" encoding="utf-8"?>
+<file path=ppt/slides/slide7.xml><?xml version="1.0" encoding="utf-8"?>
 <p:sld xmlns:a="http://schemas.openxmlformats.org/drawingml/2006/main" xmlns:r="http://schemas.openxmlformats.org/officeDocument/2006/relationships" xmlns:p="http://schemas.openxmlformats.org/presentationml/2006/main">
   <p:cSld>
     <p:spTree>
@@ -8191,7 +11527,7 @@
 </p:sld>
 </file>
 
-<file path=ppt/slides/slide5.xml><?xml version="1.0" encoding="utf-8"?>
+<file path=ppt/slides/slide8.xml><?xml version="1.0" encoding="utf-8"?>
 <p:sld xmlns:a="http://schemas.openxmlformats.org/drawingml/2006/main" xmlns:r="http://schemas.openxmlformats.org/officeDocument/2006/relationships" xmlns:p="http://schemas.openxmlformats.org/presentationml/2006/main">
   <p:cSld>
     <p:spTree>
@@ -11923,7 +15259,7 @@
 </p:sld>
 </file>
 
-<file path=ppt/slides/slide6.xml><?xml version="1.0" encoding="utf-8"?>
+<file path=ppt/slides/slide9.xml><?xml version="1.0" encoding="utf-8"?>
 <p:sld xmlns:a="http://schemas.openxmlformats.org/drawingml/2006/main" xmlns:r="http://schemas.openxmlformats.org/officeDocument/2006/relationships" xmlns:p="http://schemas.openxmlformats.org/presentationml/2006/main">
   <p:cSld>
     <p:spTree>

</xml_diff>

<commit_message>
Changing the radar sensor in carla completed. Pipeline Completed
</commit_message>
<xml_diff>
--- a/Report/diagrams.pptx
+++ b/Report/diagrams.pptx
@@ -6,21 +6,22 @@
   </p:sldMasterIdLst>
   <p:sldIdLst>
     <p:sldId id="267" r:id="rId2"/>
-    <p:sldId id="266" r:id="rId3"/>
-    <p:sldId id="265" r:id="rId4"/>
-    <p:sldId id="256" r:id="rId5"/>
-    <p:sldId id="257" r:id="rId6"/>
-    <p:sldId id="258" r:id="rId7"/>
-    <p:sldId id="259" r:id="rId8"/>
-    <p:sldId id="260" r:id="rId9"/>
-    <p:sldId id="261" r:id="rId10"/>
-    <p:sldId id="262" r:id="rId11"/>
-    <p:sldId id="268" r:id="rId12"/>
-    <p:sldId id="269" r:id="rId13"/>
-    <p:sldId id="270" r:id="rId14"/>
-    <p:sldId id="271" r:id="rId15"/>
-    <p:sldId id="272" r:id="rId16"/>
-    <p:sldId id="274" r:id="rId17"/>
+    <p:sldId id="277" r:id="rId3"/>
+    <p:sldId id="256" r:id="rId4"/>
+    <p:sldId id="257" r:id="rId5"/>
+    <p:sldId id="258" r:id="rId6"/>
+    <p:sldId id="259" r:id="rId7"/>
+    <p:sldId id="260" r:id="rId8"/>
+    <p:sldId id="261" r:id="rId9"/>
+    <p:sldId id="262" r:id="rId10"/>
+    <p:sldId id="268" r:id="rId11"/>
+    <p:sldId id="269" r:id="rId12"/>
+    <p:sldId id="270" r:id="rId13"/>
+    <p:sldId id="271" r:id="rId14"/>
+    <p:sldId id="272" r:id="rId15"/>
+    <p:sldId id="274" r:id="rId16"/>
+    <p:sldId id="275" r:id="rId17"/>
+    <p:sldId id="276" r:id="rId18"/>
   </p:sldIdLst>
   <p:sldSz cx="12192000" cy="6858000"/>
   <p:notesSz cx="6858000" cy="9144000"/>
@@ -3408,14 +3409,6 @@
 <file path=ppt/slides/slide10.xml><?xml version="1.0" encoding="utf-8"?>
 <p:sld xmlns:a="http://schemas.openxmlformats.org/drawingml/2006/main" xmlns:r="http://schemas.openxmlformats.org/officeDocument/2006/relationships" xmlns:p="http://schemas.openxmlformats.org/presentationml/2006/main">
   <p:cSld>
-    <p:bg>
-      <p:bgPr>
-        <a:solidFill>
-          <a:schemeClr val="bg1"/>
-        </a:solidFill>
-        <a:effectLst/>
-      </p:bgPr>
-    </p:bg>
     <p:spTree>
       <p:nvGrpSpPr>
         <p:cNvPr id="1" name=""/>
@@ -3432,10 +3425,10 @@
       </p:grpSpPr>
       <p:pic>
         <p:nvPicPr>
-          <p:cNvPr id="5" name="Picture 4" descr="A computer screen shot of a program code&#10;&#10;Description automatically generated">
-            <a:extLst>
-              <a:ext uri="{FF2B5EF4-FFF2-40B4-BE49-F238E27FC236}">
-                <a16:creationId xmlns:a16="http://schemas.microsoft.com/office/drawing/2014/main" id="{5A032E2F-D2CF-DF80-826B-C62BD0FB7AF9}"/>
+          <p:cNvPr id="5" name="Picture 4">
+            <a:extLst>
+              <a:ext uri="{FF2B5EF4-FFF2-40B4-BE49-F238E27FC236}">
+                <a16:creationId xmlns:a16="http://schemas.microsoft.com/office/drawing/2014/main" id="{2F2A66B4-A077-4A54-35DC-D225BD16FB11}"/>
               </a:ext>
             </a:extLst>
           </p:cNvPr>
@@ -3452,8 +3445,8 @@
         </p:blipFill>
         <p:spPr>
           <a:xfrm>
-            <a:off x="360162" y="905435"/>
-            <a:ext cx="5798591" cy="5118847"/>
+            <a:off x="154465" y="1863398"/>
+            <a:ext cx="6078384" cy="3635055"/>
           </a:xfrm>
           <a:prstGeom prst="rect">
             <a:avLst/>
@@ -3463,7 +3456,7 @@
     </p:spTree>
     <p:extLst>
       <p:ext uri="{BB962C8B-B14F-4D97-AF65-F5344CB8AC3E}">
-        <p14:creationId xmlns:p14="http://schemas.microsoft.com/office/powerpoint/2010/main" val="2405647614"/>
+        <p14:creationId xmlns:p14="http://schemas.microsoft.com/office/powerpoint/2010/main" val="957216553"/>
       </p:ext>
     </p:extLst>
   </p:cSld>
@@ -3492,10 +3485,10 @@
       </p:grpSpPr>
       <p:pic>
         <p:nvPicPr>
-          <p:cNvPr id="5" name="Picture 4">
-            <a:extLst>
-              <a:ext uri="{FF2B5EF4-FFF2-40B4-BE49-F238E27FC236}">
-                <a16:creationId xmlns:a16="http://schemas.microsoft.com/office/drawing/2014/main" id="{2F2A66B4-A077-4A54-35DC-D225BD16FB11}"/>
+          <p:cNvPr id="7" name="Picture 6">
+            <a:extLst>
+              <a:ext uri="{FF2B5EF4-FFF2-40B4-BE49-F238E27FC236}">
+                <a16:creationId xmlns:a16="http://schemas.microsoft.com/office/drawing/2014/main" id="{220ED135-BA8E-4C59-B842-FA1A8267D41C}"/>
               </a:ext>
             </a:extLst>
           </p:cNvPr>
@@ -3512,8 +3505,8 @@
         </p:blipFill>
         <p:spPr>
           <a:xfrm>
-            <a:off x="154465" y="1863398"/>
-            <a:ext cx="6078384" cy="3635055"/>
+            <a:off x="2539549" y="1655837"/>
+            <a:ext cx="7430144" cy="4404742"/>
           </a:xfrm>
           <a:prstGeom prst="rect">
             <a:avLst/>
@@ -3523,7 +3516,7 @@
     </p:spTree>
     <p:extLst>
       <p:ext uri="{BB962C8B-B14F-4D97-AF65-F5344CB8AC3E}">
-        <p14:creationId xmlns:p14="http://schemas.microsoft.com/office/powerpoint/2010/main" val="957216553"/>
+        <p14:creationId xmlns:p14="http://schemas.microsoft.com/office/powerpoint/2010/main" val="764329628"/>
       </p:ext>
     </p:extLst>
   </p:cSld>
@@ -3550,40 +3543,495 @@
           <a:chExt cx="0" cy="0"/>
         </a:xfrm>
       </p:grpSpPr>
-      <p:pic>
-        <p:nvPicPr>
-          <p:cNvPr id="7" name="Picture 6">
-            <a:extLst>
-              <a:ext uri="{FF2B5EF4-FFF2-40B4-BE49-F238E27FC236}">
-                <a16:creationId xmlns:a16="http://schemas.microsoft.com/office/drawing/2014/main" id="{220ED135-BA8E-4C59-B842-FA1A8267D41C}"/>
-              </a:ext>
-            </a:extLst>
-          </p:cNvPr>
-          <p:cNvPicPr>
-            <a:picLocks noChangeAspect="1"/>
-          </p:cNvPicPr>
-          <p:nvPr/>
-        </p:nvPicPr>
-        <p:blipFill>
-          <a:blip r:embed="rId2"/>
-          <a:stretch>
-            <a:fillRect/>
-          </a:stretch>
-        </p:blipFill>
-        <p:spPr>
-          <a:xfrm>
-            <a:off x="2539549" y="1655837"/>
-            <a:ext cx="7430144" cy="4404742"/>
+      <p:sp>
+        <p:nvSpPr>
+          <p:cNvPr id="4" name="Oval 3">
+            <a:extLst>
+              <a:ext uri="{FF2B5EF4-FFF2-40B4-BE49-F238E27FC236}">
+                <a16:creationId xmlns:a16="http://schemas.microsoft.com/office/drawing/2014/main" id="{128A135B-D762-5A65-7AB6-2527D348E819}"/>
+              </a:ext>
+            </a:extLst>
+          </p:cNvPr>
+          <p:cNvSpPr/>
+          <p:nvPr/>
+        </p:nvSpPr>
+        <p:spPr>
+          <a:xfrm>
+            <a:off x="2080038" y="82885"/>
+            <a:ext cx="233083" cy="249810"/>
+          </a:xfrm>
+          <a:prstGeom prst="ellipse">
+            <a:avLst/>
+          </a:prstGeom>
+        </p:spPr>
+        <p:style>
+          <a:lnRef idx="2">
+            <a:schemeClr val="dk1">
+              <a:shade val="50000"/>
+            </a:schemeClr>
+          </a:lnRef>
+          <a:fillRef idx="1">
+            <a:schemeClr val="dk1"/>
+          </a:fillRef>
+          <a:effectRef idx="0">
+            <a:schemeClr val="dk1"/>
+          </a:effectRef>
+          <a:fontRef idx="minor">
+            <a:schemeClr val="lt1"/>
+          </a:fontRef>
+        </p:style>
+        <p:txBody>
+          <a:bodyPr rtlCol="0" anchor="ctr"/>
+          <a:lstStyle/>
+          <a:p>
+            <a:pPr algn="ctr"/>
+            <a:endParaRPr lang="en-DE"/>
+          </a:p>
+        </p:txBody>
+      </p:sp>
+      <p:cxnSp>
+        <p:nvCxnSpPr>
+          <p:cNvPr id="5" name="Straight Arrow Connector 4">
+            <a:extLst>
+              <a:ext uri="{FF2B5EF4-FFF2-40B4-BE49-F238E27FC236}">
+                <a16:creationId xmlns:a16="http://schemas.microsoft.com/office/drawing/2014/main" id="{430BBFC3-6C09-8C5F-E470-F748ED968808}"/>
+              </a:ext>
+            </a:extLst>
+          </p:cNvPr>
+          <p:cNvCxnSpPr>
+            <a:cxnSpLocks/>
+            <a:stCxn id="4" idx="4"/>
+            <a:endCxn id="6" idx="0"/>
+          </p:cNvCxnSpPr>
+          <p:nvPr/>
+        </p:nvCxnSpPr>
+        <p:spPr>
+          <a:xfrm flipH="1">
+            <a:off x="2196579" y="332695"/>
+            <a:ext cx="1" cy="246426"/>
+          </a:xfrm>
+          <a:prstGeom prst="straightConnector1">
+            <a:avLst/>
+          </a:prstGeom>
+          <a:ln>
+            <a:tailEnd type="triangle"/>
+          </a:ln>
+        </p:spPr>
+        <p:style>
+          <a:lnRef idx="1">
+            <a:schemeClr val="accent1"/>
+          </a:lnRef>
+          <a:fillRef idx="0">
+            <a:schemeClr val="accent1"/>
+          </a:fillRef>
+          <a:effectRef idx="0">
+            <a:schemeClr val="accent1"/>
+          </a:effectRef>
+          <a:fontRef idx="minor">
+            <a:schemeClr val="tx1"/>
+          </a:fontRef>
+        </p:style>
+      </p:cxnSp>
+      <p:sp>
+        <p:nvSpPr>
+          <p:cNvPr id="6" name="Rectangle 5">
+            <a:extLst>
+              <a:ext uri="{FF2B5EF4-FFF2-40B4-BE49-F238E27FC236}">
+                <a16:creationId xmlns:a16="http://schemas.microsoft.com/office/drawing/2014/main" id="{174D111A-94A0-AB00-F259-4858301BAF4D}"/>
+              </a:ext>
+            </a:extLst>
+          </p:cNvPr>
+          <p:cNvSpPr/>
+          <p:nvPr/>
+        </p:nvSpPr>
+        <p:spPr>
+          <a:xfrm>
+            <a:off x="1053579" y="579121"/>
+            <a:ext cx="2285999" cy="457200"/>
           </a:xfrm>
           <a:prstGeom prst="rect">
             <a:avLst/>
           </a:prstGeom>
-        </p:spPr>
-      </p:pic>
+          <a:gradFill>
+            <a:gsLst>
+              <a:gs pos="0">
+                <a:schemeClr val="accent5"/>
+              </a:gs>
+              <a:gs pos="100000">
+                <a:schemeClr val="accent1"/>
+              </a:gs>
+            </a:gsLst>
+            <a:lin ang="16200000" scaled="1"/>
+          </a:gradFill>
+          <a:ln>
+            <a:noFill/>
+          </a:ln>
+        </p:spPr>
+        <p:style>
+          <a:lnRef idx="0">
+            <a:scrgbClr r="0" g="0" b="0"/>
+          </a:lnRef>
+          <a:fillRef idx="0">
+            <a:scrgbClr r="0" g="0" b="0"/>
+          </a:fillRef>
+          <a:effectRef idx="0">
+            <a:scrgbClr r="0" g="0" b="0"/>
+          </a:effectRef>
+          <a:fontRef idx="minor">
+            <a:schemeClr val="lt1"/>
+          </a:fontRef>
+        </p:style>
+        <p:txBody>
+          <a:bodyPr rtlCol="0" anchor="ctr"/>
+          <a:lstStyle/>
+          <a:p>
+            <a:pPr algn="ctr"/>
+            <a:r>
+              <a:rPr lang="en-US" dirty="0">
+                <a:solidFill>
+                  <a:schemeClr val="tx1"/>
+                </a:solidFill>
+              </a:rPr>
+              <a:t>Calculate Radar FOV</a:t>
+            </a:r>
+            <a:endParaRPr lang="en-DE" dirty="0">
+              <a:solidFill>
+                <a:schemeClr val="tx1"/>
+              </a:solidFill>
+            </a:endParaRPr>
+          </a:p>
+        </p:txBody>
+      </p:sp>
+      <p:sp>
+        <p:nvSpPr>
+          <p:cNvPr id="11" name="Rectangle 10">
+            <a:extLst>
+              <a:ext uri="{FF2B5EF4-FFF2-40B4-BE49-F238E27FC236}">
+                <a16:creationId xmlns:a16="http://schemas.microsoft.com/office/drawing/2014/main" id="{C71E46A4-5C63-4642-9EBA-37E2601024CF}"/>
+              </a:ext>
+            </a:extLst>
+          </p:cNvPr>
+          <p:cNvSpPr/>
+          <p:nvPr/>
+        </p:nvSpPr>
+        <p:spPr>
+          <a:xfrm>
+            <a:off x="254000" y="1432560"/>
+            <a:ext cx="4033519" cy="548639"/>
+          </a:xfrm>
+          <a:prstGeom prst="rect">
+            <a:avLst/>
+          </a:prstGeom>
+          <a:gradFill>
+            <a:gsLst>
+              <a:gs pos="0">
+                <a:schemeClr val="accent5"/>
+              </a:gs>
+              <a:gs pos="100000">
+                <a:schemeClr val="accent1"/>
+              </a:gs>
+            </a:gsLst>
+            <a:lin ang="16200000" scaled="1"/>
+          </a:gradFill>
+          <a:ln>
+            <a:noFill/>
+          </a:ln>
+        </p:spPr>
+        <p:style>
+          <a:lnRef idx="0">
+            <a:scrgbClr r="0" g="0" b="0"/>
+          </a:lnRef>
+          <a:fillRef idx="0">
+            <a:scrgbClr r="0" g="0" b="0"/>
+          </a:fillRef>
+          <a:effectRef idx="0">
+            <a:scrgbClr r="0" g="0" b="0"/>
+          </a:effectRef>
+          <a:fontRef idx="minor">
+            <a:schemeClr val="lt1"/>
+          </a:fontRef>
+        </p:style>
+        <p:txBody>
+          <a:bodyPr rtlCol="0" anchor="ctr"/>
+          <a:lstStyle/>
+          <a:p>
+            <a:pPr algn="ctr"/>
+            <a:r>
+              <a:rPr lang="en-US" dirty="0">
+                <a:solidFill>
+                  <a:schemeClr val="tx1"/>
+                </a:solidFill>
+              </a:rPr>
+              <a:t>Calculate number of traces, angle and radius of traces</a:t>
+            </a:r>
+            <a:endParaRPr lang="en-DE" dirty="0">
+              <a:solidFill>
+                <a:schemeClr val="tx1"/>
+              </a:solidFill>
+            </a:endParaRPr>
+          </a:p>
+        </p:txBody>
+      </p:sp>
+      <p:sp>
+        <p:nvSpPr>
+          <p:cNvPr id="12" name="Rectangle 11">
+            <a:extLst>
+              <a:ext uri="{FF2B5EF4-FFF2-40B4-BE49-F238E27FC236}">
+                <a16:creationId xmlns:a16="http://schemas.microsoft.com/office/drawing/2014/main" id="{58B67DCC-494C-C0E1-D4DB-AB52B14401D0}"/>
+              </a:ext>
+            </a:extLst>
+          </p:cNvPr>
+          <p:cNvSpPr/>
+          <p:nvPr/>
+        </p:nvSpPr>
+        <p:spPr>
+          <a:xfrm>
+            <a:off x="254000" y="2377439"/>
+            <a:ext cx="4033519" cy="447042"/>
+          </a:xfrm>
+          <a:prstGeom prst="rect">
+            <a:avLst/>
+          </a:prstGeom>
+          <a:gradFill>
+            <a:gsLst>
+              <a:gs pos="0">
+                <a:schemeClr val="accent5"/>
+              </a:gs>
+              <a:gs pos="100000">
+                <a:schemeClr val="accent1"/>
+              </a:gs>
+            </a:gsLst>
+            <a:lin ang="16200000" scaled="1"/>
+          </a:gradFill>
+          <a:ln>
+            <a:noFill/>
+          </a:ln>
+        </p:spPr>
+        <p:style>
+          <a:lnRef idx="0">
+            <a:scrgbClr r="0" g="0" b="0"/>
+          </a:lnRef>
+          <a:fillRef idx="0">
+            <a:scrgbClr r="0" g="0" b="0"/>
+          </a:fillRef>
+          <a:effectRef idx="0">
+            <a:scrgbClr r="0" g="0" b="0"/>
+          </a:effectRef>
+          <a:fontRef idx="minor">
+            <a:schemeClr val="lt1"/>
+          </a:fontRef>
+        </p:style>
+        <p:txBody>
+          <a:bodyPr rtlCol="0" anchor="ctr"/>
+          <a:lstStyle/>
+          <a:p>
+            <a:pPr algn="ctr"/>
+            <a:r>
+              <a:rPr lang="en-US" dirty="0">
+                <a:solidFill>
+                  <a:schemeClr val="tx1"/>
+                </a:solidFill>
+              </a:rPr>
+              <a:t>Create Mutex and Parallel Threads</a:t>
+            </a:r>
+            <a:endParaRPr lang="en-DE" dirty="0">
+              <a:solidFill>
+                <a:schemeClr val="tx1"/>
+              </a:solidFill>
+            </a:endParaRPr>
+          </a:p>
+        </p:txBody>
+      </p:sp>
+      <p:sp>
+        <p:nvSpPr>
+          <p:cNvPr id="13" name="Rectangle 12">
+            <a:extLst>
+              <a:ext uri="{FF2B5EF4-FFF2-40B4-BE49-F238E27FC236}">
+                <a16:creationId xmlns:a16="http://schemas.microsoft.com/office/drawing/2014/main" id="{DD467CB8-6E30-510A-B417-85AFDFF689C8}"/>
+              </a:ext>
+            </a:extLst>
+          </p:cNvPr>
+          <p:cNvSpPr/>
+          <p:nvPr/>
+        </p:nvSpPr>
+        <p:spPr>
+          <a:xfrm>
+            <a:off x="254000" y="3220721"/>
+            <a:ext cx="4033519" cy="447042"/>
+          </a:xfrm>
+          <a:prstGeom prst="rect">
+            <a:avLst/>
+          </a:prstGeom>
+          <a:gradFill>
+            <a:gsLst>
+              <a:gs pos="0">
+                <a:schemeClr val="accent5"/>
+              </a:gs>
+              <a:gs pos="100000">
+                <a:schemeClr val="accent1"/>
+              </a:gs>
+            </a:gsLst>
+            <a:lin ang="16200000" scaled="1"/>
+          </a:gradFill>
+          <a:ln>
+            <a:noFill/>
+          </a:ln>
+        </p:spPr>
+        <p:style>
+          <a:lnRef idx="0">
+            <a:scrgbClr r="0" g="0" b="0"/>
+          </a:lnRef>
+          <a:fillRef idx="0">
+            <a:scrgbClr r="0" g="0" b="0"/>
+          </a:fillRef>
+          <a:effectRef idx="0">
+            <a:scrgbClr r="0" g="0" b="0"/>
+          </a:effectRef>
+          <a:fontRef idx="minor">
+            <a:schemeClr val="lt1"/>
+          </a:fontRef>
+        </p:style>
+        <p:txBody>
+          <a:bodyPr rtlCol="0" anchor="ctr"/>
+          <a:lstStyle/>
+          <a:p>
+            <a:pPr algn="ctr"/>
+            <a:r>
+              <a:rPr lang="en-US" dirty="0">
+                <a:solidFill>
+                  <a:schemeClr val="tx1"/>
+                </a:solidFill>
+              </a:rPr>
+              <a:t>Shooting Traces and Storing Data</a:t>
+            </a:r>
+            <a:endParaRPr lang="en-DE" dirty="0">
+              <a:solidFill>
+                <a:schemeClr val="tx1"/>
+              </a:solidFill>
+            </a:endParaRPr>
+          </a:p>
+        </p:txBody>
+      </p:sp>
+      <p:sp>
+        <p:nvSpPr>
+          <p:cNvPr id="14" name="Rectangle 13">
+            <a:extLst>
+              <a:ext uri="{FF2B5EF4-FFF2-40B4-BE49-F238E27FC236}">
+                <a16:creationId xmlns:a16="http://schemas.microsoft.com/office/drawing/2014/main" id="{DB4ADB60-ED6B-C11E-4E0F-309728ADAD80}"/>
+              </a:ext>
+            </a:extLst>
+          </p:cNvPr>
+          <p:cNvSpPr/>
+          <p:nvPr/>
+        </p:nvSpPr>
+        <p:spPr>
+          <a:xfrm>
+            <a:off x="1283560" y="4064003"/>
+            <a:ext cx="1974398" cy="447042"/>
+          </a:xfrm>
+          <a:prstGeom prst="rect">
+            <a:avLst/>
+          </a:prstGeom>
+          <a:gradFill>
+            <a:gsLst>
+              <a:gs pos="0">
+                <a:schemeClr val="accent5"/>
+              </a:gs>
+              <a:gs pos="100000">
+                <a:schemeClr val="accent1"/>
+              </a:gs>
+            </a:gsLst>
+            <a:lin ang="16200000" scaled="1"/>
+          </a:gradFill>
+          <a:ln>
+            <a:noFill/>
+          </a:ln>
+        </p:spPr>
+        <p:style>
+          <a:lnRef idx="0">
+            <a:scrgbClr r="0" g="0" b="0"/>
+          </a:lnRef>
+          <a:fillRef idx="0">
+            <a:scrgbClr r="0" g="0" b="0"/>
+          </a:fillRef>
+          <a:effectRef idx="0">
+            <a:scrgbClr r="0" g="0" b="0"/>
+          </a:effectRef>
+          <a:fontRef idx="minor">
+            <a:schemeClr val="lt1"/>
+          </a:fontRef>
+        </p:style>
+        <p:txBody>
+          <a:bodyPr rtlCol="0" anchor="ctr"/>
+          <a:lstStyle/>
+          <a:p>
+            <a:pPr algn="ctr"/>
+            <a:r>
+              <a:rPr lang="en-US" dirty="0">
+                <a:solidFill>
+                  <a:schemeClr val="tx1"/>
+                </a:solidFill>
+              </a:rPr>
+              <a:t>Close Threads</a:t>
+            </a:r>
+            <a:endParaRPr lang="en-DE" dirty="0">
+              <a:solidFill>
+                <a:schemeClr val="tx1"/>
+              </a:solidFill>
+            </a:endParaRPr>
+          </a:p>
+        </p:txBody>
+      </p:sp>
+      <p:sp>
+        <p:nvSpPr>
+          <p:cNvPr id="15" name="Diamond 14">
+            <a:extLst>
+              <a:ext uri="{FF2B5EF4-FFF2-40B4-BE49-F238E27FC236}">
+                <a16:creationId xmlns:a16="http://schemas.microsoft.com/office/drawing/2014/main" id="{EDB6EBD3-C1F2-8E95-B12D-D53E5ABDF797}"/>
+              </a:ext>
+            </a:extLst>
+          </p:cNvPr>
+          <p:cNvSpPr/>
+          <p:nvPr/>
+        </p:nvSpPr>
+        <p:spPr>
+          <a:xfrm>
+            <a:off x="505650" y="4876795"/>
+            <a:ext cx="3614941" cy="944880"/>
+          </a:xfrm>
+          <a:prstGeom prst="diamond">
+            <a:avLst/>
+          </a:prstGeom>
+        </p:spPr>
+        <p:style>
+          <a:lnRef idx="2">
+            <a:schemeClr val="accent1">
+              <a:shade val="15000"/>
+            </a:schemeClr>
+          </a:lnRef>
+          <a:fillRef idx="1">
+            <a:schemeClr val="accent1"/>
+          </a:fillRef>
+          <a:effectRef idx="0">
+            <a:schemeClr val="accent1"/>
+          </a:effectRef>
+          <a:fontRef idx="minor">
+            <a:schemeClr val="lt1"/>
+          </a:fontRef>
+        </p:style>
+        <p:txBody>
+          <a:bodyPr rtlCol="0" anchor="ctr"/>
+          <a:lstStyle/>
+          <a:p>
+            <a:pPr algn="ctr"/>
+            <a:endParaRPr lang="en-DE"/>
+          </a:p>
+        </p:txBody>
+      </p:sp>
     </p:spTree>
     <p:extLst>
       <p:ext uri="{BB962C8B-B14F-4D97-AF65-F5344CB8AC3E}">
-        <p14:creationId xmlns:p14="http://schemas.microsoft.com/office/powerpoint/2010/main" val="764329628"/>
+        <p14:creationId xmlns:p14="http://schemas.microsoft.com/office/powerpoint/2010/main" val="3619406225"/>
       </p:ext>
     </p:extLst>
   </p:cSld>
@@ -3596,6 +4044,14 @@
 <file path=ppt/slides/slide13.xml><?xml version="1.0" encoding="utf-8"?>
 <p:sld xmlns:a="http://schemas.openxmlformats.org/drawingml/2006/main" xmlns:r="http://schemas.openxmlformats.org/officeDocument/2006/relationships" xmlns:p="http://schemas.openxmlformats.org/presentationml/2006/main">
   <p:cSld>
+    <p:bg>
+      <p:bgPr>
+        <a:solidFill>
+          <a:schemeClr val="bg1"/>
+        </a:solidFill>
+        <a:effectLst/>
+      </p:bgPr>
+    </p:bg>
     <p:spTree>
       <p:nvGrpSpPr>
         <p:cNvPr id="1" name=""/>
@@ -3612,36 +4068,57 @@
       </p:grpSpPr>
       <p:sp>
         <p:nvSpPr>
-          <p:cNvPr id="4" name="Oval 3">
-            <a:extLst>
-              <a:ext uri="{FF2B5EF4-FFF2-40B4-BE49-F238E27FC236}">
-                <a16:creationId xmlns:a16="http://schemas.microsoft.com/office/drawing/2014/main" id="{128A135B-D762-5A65-7AB6-2527D348E819}"/>
-              </a:ext>
-            </a:extLst>
-          </p:cNvPr>
-          <p:cNvSpPr/>
-          <p:nvPr/>
-        </p:nvSpPr>
-        <p:spPr>
-          <a:xfrm>
-            <a:off x="5707158" y="387685"/>
-            <a:ext cx="233083" cy="249810"/>
-          </a:xfrm>
-          <a:prstGeom prst="ellipse">
-            <a:avLst/>
-          </a:prstGeom>
+          <p:cNvPr id="12" name="Rectangle 11">
+            <a:extLst>
+              <a:ext uri="{FF2B5EF4-FFF2-40B4-BE49-F238E27FC236}">
+                <a16:creationId xmlns:a16="http://schemas.microsoft.com/office/drawing/2014/main" id="{A9F529C3-C941-49FD-8C67-82F134F64BDB}"/>
+              </a:ext>
+              <a:ext uri="{C183D7F6-B498-43B3-948B-1728B52AA6E4}">
+                <adec:decorative xmlns:adec="http://schemas.microsoft.com/office/drawing/2017/decorative" val="1"/>
+              </a:ext>
+            </a:extLst>
+          </p:cNvPr>
+          <p:cNvSpPr>
+            <a:spLocks noGrp="1" noRot="1" noChangeAspect="1" noMove="1" noResize="1" noEditPoints="1" noAdjustHandles="1" noChangeArrowheads="1" noChangeShapeType="1" noTextEdit="1"/>
+          </p:cNvSpPr>
+          <p:nvPr>
+            <p:extLst>
+              <p:ext uri="{386F3935-93C4-4BCD-93E2-E3B085C9AB24}">
+                <p16:designElem xmlns:p16="http://schemas.microsoft.com/office/powerpoint/2015/main" val="1"/>
+              </p:ext>
+            </p:extLst>
+          </p:nvPr>
+        </p:nvSpPr>
+        <p:spPr>
+          <a:xfrm>
+            <a:off x="0" y="0"/>
+            <a:ext cx="12192000" cy="6858000"/>
+          </a:xfrm>
+          <a:prstGeom prst="rect">
+            <a:avLst/>
+          </a:prstGeom>
+          <a:solidFill>
+            <a:schemeClr val="tx1">
+              <a:lumMod val="50000"/>
+              <a:lumOff val="50000"/>
+              <a:alpha val="30000"/>
+            </a:schemeClr>
+          </a:solidFill>
+          <a:ln>
+            <a:noFill/>
+          </a:ln>
         </p:spPr>
         <p:style>
           <a:lnRef idx="2">
-            <a:schemeClr val="dk1">
+            <a:schemeClr val="accent1">
               <a:shade val="50000"/>
             </a:schemeClr>
           </a:lnRef>
           <a:fillRef idx="1">
-            <a:schemeClr val="dk1"/>
+            <a:schemeClr val="accent1"/>
           </a:fillRef>
           <a:effectRef idx="0">
-            <a:schemeClr val="dk1"/>
+            <a:schemeClr val="accent1"/>
           </a:effectRef>
           <a:fontRef idx="minor">
             <a:schemeClr val="lt1"/>
@@ -3652,35 +4129,145 @@
           <a:lstStyle/>
           <a:p>
             <a:pPr algn="ctr"/>
-            <a:endParaRPr lang="en-DE"/>
-          </a:p>
-        </p:txBody>
-      </p:sp>
+            <a:endParaRPr lang="en-US"/>
+          </a:p>
+        </p:txBody>
+      </p:sp>
+      <p:sp>
+        <p:nvSpPr>
+          <p:cNvPr id="14" name="Rectangle 13">
+            <a:extLst>
+              <a:ext uri="{FF2B5EF4-FFF2-40B4-BE49-F238E27FC236}">
+                <a16:creationId xmlns:a16="http://schemas.microsoft.com/office/drawing/2014/main" id="{20586029-32A0-47E5-9AEC-AE3ABA6B94D0}"/>
+              </a:ext>
+              <a:ext uri="{C183D7F6-B498-43B3-948B-1728B52AA6E4}">
+                <adec:decorative xmlns:adec="http://schemas.microsoft.com/office/drawing/2017/decorative" val="1"/>
+              </a:ext>
+            </a:extLst>
+          </p:cNvPr>
+          <p:cNvSpPr>
+            <a:spLocks noGrp="1" noRot="1" noChangeAspect="1" noMove="1" noResize="1" noEditPoints="1" noAdjustHandles="1" noChangeArrowheads="1" noChangeShapeType="1" noTextEdit="1"/>
+          </p:cNvSpPr>
+          <p:nvPr>
+            <p:extLst>
+              <p:ext uri="{386F3935-93C4-4BCD-93E2-E3B085C9AB24}">
+                <p16:designElem xmlns:p16="http://schemas.microsoft.com/office/powerpoint/2015/main" val="1"/>
+              </p:ext>
+            </p:extLst>
+          </p:nvPr>
+        </p:nvSpPr>
+        <p:spPr>
+          <a:xfrm>
+            <a:off x="477012" y="480060"/>
+            <a:ext cx="11237976" cy="5897880"/>
+          </a:xfrm>
+          <a:prstGeom prst="rect">
+            <a:avLst/>
+          </a:prstGeom>
+          <a:solidFill>
+            <a:srgbClr val="FFFFFF"/>
+          </a:solidFill>
+          <a:ln w="9525">
+            <a:noFill/>
+          </a:ln>
+          <a:effectLst>
+            <a:outerShdw blurRad="63500" dist="17780" dir="5400000" algn="t" rotWithShape="0">
+              <a:prstClr val="black">
+                <a:alpha val="43000"/>
+              </a:prstClr>
+            </a:outerShdw>
+          </a:effectLst>
+        </p:spPr>
+        <p:style>
+          <a:lnRef idx="2">
+            <a:schemeClr val="accent1">
+              <a:shade val="50000"/>
+            </a:schemeClr>
+          </a:lnRef>
+          <a:fillRef idx="1">
+            <a:schemeClr val="accent1"/>
+          </a:fillRef>
+          <a:effectRef idx="0">
+            <a:schemeClr val="accent1"/>
+          </a:effectRef>
+          <a:fontRef idx="minor">
+            <a:schemeClr val="lt1"/>
+          </a:fontRef>
+        </p:style>
+        <p:txBody>
+          <a:bodyPr rtlCol="0" anchor="ctr"/>
+          <a:lstStyle/>
+          <a:p>
+            <a:pPr algn="ctr"/>
+            <a:endParaRPr lang="en-US"/>
+          </a:p>
+        </p:txBody>
+      </p:sp>
+      <p:pic>
+        <p:nvPicPr>
+          <p:cNvPr id="5" name="Picture 4">
+            <a:extLst>
+              <a:ext uri="{FF2B5EF4-FFF2-40B4-BE49-F238E27FC236}">
+                <a16:creationId xmlns:a16="http://schemas.microsoft.com/office/drawing/2014/main" id="{63174875-3278-66E0-FCF9-6F9B07845DAC}"/>
+              </a:ext>
+            </a:extLst>
+          </p:cNvPr>
+          <p:cNvPicPr>
+            <a:picLocks noChangeAspect="1"/>
+          </p:cNvPicPr>
+          <p:nvPr/>
+        </p:nvPicPr>
+        <p:blipFill>
+          <a:blip r:embed="rId2"/>
+          <a:stretch>
+            <a:fillRect/>
+          </a:stretch>
+        </p:blipFill>
+        <p:spPr>
+          <a:xfrm>
+            <a:off x="6222283" y="2164886"/>
+            <a:ext cx="5294716" cy="2528226"/>
+          </a:xfrm>
+          <a:prstGeom prst="rect">
+            <a:avLst/>
+          </a:prstGeom>
+        </p:spPr>
+      </p:pic>
       <p:cxnSp>
         <p:nvCxnSpPr>
-          <p:cNvPr id="5" name="Straight Arrow Connector 4">
-            <a:extLst>
-              <a:ext uri="{FF2B5EF4-FFF2-40B4-BE49-F238E27FC236}">
-                <a16:creationId xmlns:a16="http://schemas.microsoft.com/office/drawing/2014/main" id="{430BBFC3-6C09-8C5F-E470-F748ED968808}"/>
+          <p:cNvPr id="16" name="Straight Connector 15">
+            <a:extLst>
+              <a:ext uri="{FF2B5EF4-FFF2-40B4-BE49-F238E27FC236}">
+                <a16:creationId xmlns:a16="http://schemas.microsoft.com/office/drawing/2014/main" id="{8C730EAB-A532-4295-A302-FB4B90DB9F5E}"/>
+              </a:ext>
+              <a:ext uri="{C183D7F6-B498-43B3-948B-1728B52AA6E4}">
+                <adec:decorative xmlns:adec="http://schemas.microsoft.com/office/drawing/2017/decorative" val="1"/>
               </a:ext>
             </a:extLst>
           </p:cNvPr>
           <p:cNvCxnSpPr>
-            <a:cxnSpLocks/>
-            <a:stCxn id="4" idx="4"/>
+            <a:cxnSpLocks noGrp="1" noRot="1" noChangeAspect="1" noMove="1" noResize="1" noEditPoints="1" noAdjustHandles="1" noChangeArrowheads="1" noChangeShapeType="1"/>
           </p:cNvCxnSpPr>
-          <p:nvPr/>
+          <p:nvPr>
+            <p:extLst>
+              <p:ext uri="{386F3935-93C4-4BCD-93E2-E3B085C9AB24}">
+                <p16:designElem xmlns:p16="http://schemas.microsoft.com/office/powerpoint/2015/main" val="1"/>
+              </p:ext>
+            </p:extLst>
+          </p:nvPr>
         </p:nvCxnSpPr>
         <p:spPr>
           <a:xfrm>
-            <a:off x="5823700" y="637495"/>
-            <a:ext cx="0" cy="358588"/>
-          </a:xfrm>
-          <a:prstGeom prst="straightConnector1">
+            <a:off x="6079958" y="1143000"/>
+            <a:ext cx="0" cy="4572000"/>
+          </a:xfrm>
+          <a:prstGeom prst="line">
             <a:avLst/>
           </a:prstGeom>
           <a:ln>
-            <a:tailEnd type="triangle"/>
+            <a:solidFill>
+              <a:srgbClr val="4E4E4E"/>
+            </a:solidFill>
           </a:ln>
         </p:spPr>
         <p:style>
@@ -3698,92 +4285,40 @@
           </a:fontRef>
         </p:style>
       </p:cxnSp>
-      <p:sp>
-        <p:nvSpPr>
-          <p:cNvPr id="6" name="Rectangle 5">
-            <a:extLst>
-              <a:ext uri="{FF2B5EF4-FFF2-40B4-BE49-F238E27FC236}">
-                <a16:creationId xmlns:a16="http://schemas.microsoft.com/office/drawing/2014/main" id="{174D111A-94A0-AB00-F259-4858301BAF4D}"/>
-              </a:ext>
-            </a:extLst>
-          </p:cNvPr>
-          <p:cNvSpPr/>
-          <p:nvPr/>
-        </p:nvSpPr>
-        <p:spPr>
-          <a:xfrm>
-            <a:off x="4700873" y="996083"/>
-            <a:ext cx="2285999" cy="735106"/>
+      <p:pic>
+        <p:nvPicPr>
+          <p:cNvPr id="7" name="Picture 6">
+            <a:extLst>
+              <a:ext uri="{FF2B5EF4-FFF2-40B4-BE49-F238E27FC236}">
+                <a16:creationId xmlns:a16="http://schemas.microsoft.com/office/drawing/2014/main" id="{EBDBE15D-D564-A819-101D-0956B60A167A}"/>
+              </a:ext>
+            </a:extLst>
+          </p:cNvPr>
+          <p:cNvPicPr>
+            <a:picLocks noChangeAspect="1"/>
+          </p:cNvPicPr>
+          <p:nvPr/>
+        </p:nvPicPr>
+        <p:blipFill>
+          <a:blip r:embed="rId3"/>
+          <a:stretch>
+            <a:fillRect/>
+          </a:stretch>
+        </p:blipFill>
+        <p:spPr>
+          <a:xfrm>
+            <a:off x="642919" y="2032519"/>
+            <a:ext cx="5294715" cy="2792961"/>
           </a:xfrm>
           <a:prstGeom prst="rect">
             <a:avLst/>
           </a:prstGeom>
-          <a:gradFill flip="none" rotWithShape="1">
-            <a:gsLst>
-              <a:gs pos="0">
-                <a:schemeClr val="accent4">
-                  <a:lumMod val="67000"/>
-                </a:schemeClr>
-              </a:gs>
-              <a:gs pos="48000">
-                <a:schemeClr val="accent4">
-                  <a:lumMod val="97000"/>
-                  <a:lumOff val="3000"/>
-                </a:schemeClr>
-              </a:gs>
-              <a:gs pos="100000">
-                <a:schemeClr val="accent4">
-                  <a:lumMod val="60000"/>
-                  <a:lumOff val="40000"/>
-                </a:schemeClr>
-              </a:gs>
-            </a:gsLst>
-            <a:lin ang="16200000" scaled="1"/>
-            <a:tileRect/>
-          </a:gradFill>
-          <a:ln>
-            <a:noFill/>
-          </a:ln>
-        </p:spPr>
-        <p:style>
-          <a:lnRef idx="0">
-            <a:scrgbClr r="0" g="0" b="0"/>
-          </a:lnRef>
-          <a:fillRef idx="0">
-            <a:scrgbClr r="0" g="0" b="0"/>
-          </a:fillRef>
-          <a:effectRef idx="0">
-            <a:scrgbClr r="0" g="0" b="0"/>
-          </a:effectRef>
-          <a:fontRef idx="minor">
-            <a:schemeClr val="lt1"/>
-          </a:fontRef>
-        </p:style>
-        <p:txBody>
-          <a:bodyPr rtlCol="0" anchor="ctr"/>
-          <a:lstStyle/>
-          <a:p>
-            <a:pPr algn="ctr"/>
-            <a:r>
-              <a:rPr lang="en-US" dirty="0">
-                <a:solidFill>
-                  <a:schemeClr val="tx1"/>
-                </a:solidFill>
-              </a:rPr>
-              <a:t>GetSensorDefinition()</a:t>
-            </a:r>
-            <a:endParaRPr lang="en-DE" dirty="0">
-              <a:solidFill>
-                <a:schemeClr val="tx1"/>
-              </a:solidFill>
-            </a:endParaRPr>
-          </a:p>
-        </p:txBody>
-      </p:sp>
+        </p:spPr>
+      </p:pic>
     </p:spTree>
     <p:extLst>
       <p:ext uri="{BB962C8B-B14F-4D97-AF65-F5344CB8AC3E}">
-        <p14:creationId xmlns:p14="http://schemas.microsoft.com/office/powerpoint/2010/main" val="3619406225"/>
+        <p14:creationId xmlns:p14="http://schemas.microsoft.com/office/powerpoint/2010/main" val="1068135587"/>
       </p:ext>
     </p:extLst>
   </p:cSld>
@@ -3960,7 +4495,7 @@
           <p:cNvPr id="5" name="Picture 4">
             <a:extLst>
               <a:ext uri="{FF2B5EF4-FFF2-40B4-BE49-F238E27FC236}">
-                <a16:creationId xmlns:a16="http://schemas.microsoft.com/office/drawing/2014/main" id="{63174875-3278-66E0-FCF9-6F9B07845DAC}"/>
+                <a16:creationId xmlns:a16="http://schemas.microsoft.com/office/drawing/2014/main" id="{16EEA3DD-0C14-0047-5F04-651ADCD1B600}"/>
               </a:ext>
             </a:extLst>
           </p:cNvPr>
@@ -3977,8 +4512,8 @@
         </p:blipFill>
         <p:spPr>
           <a:xfrm>
-            <a:off x="6222283" y="2164886"/>
-            <a:ext cx="5294716" cy="2528226"/>
+            <a:off x="6167893" y="2257425"/>
+            <a:ext cx="5459159" cy="2343150"/>
           </a:xfrm>
           <a:prstGeom prst="rect">
             <a:avLst/>
@@ -4042,7 +4577,7 @@
           <p:cNvPr id="7" name="Picture 6">
             <a:extLst>
               <a:ext uri="{FF2B5EF4-FFF2-40B4-BE49-F238E27FC236}">
-                <a16:creationId xmlns:a16="http://schemas.microsoft.com/office/drawing/2014/main" id="{EBDBE15D-D564-A819-101D-0956B60A167A}"/>
+                <a16:creationId xmlns:a16="http://schemas.microsoft.com/office/drawing/2014/main" id="{E3C02FC0-D9B2-A1C6-0084-E6E050F9092C}"/>
               </a:ext>
             </a:extLst>
           </p:cNvPr>
@@ -4059,8 +4594,8 @@
         </p:blipFill>
         <p:spPr>
           <a:xfrm>
-            <a:off x="642919" y="2032519"/>
-            <a:ext cx="5294715" cy="2792961"/>
+            <a:off x="697308" y="2190750"/>
+            <a:ext cx="5294715" cy="2343150"/>
           </a:xfrm>
           <a:prstGeom prst="rect">
             <a:avLst/>
@@ -4070,7 +4605,7 @@
     </p:spTree>
     <p:extLst>
       <p:ext uri="{BB962C8B-B14F-4D97-AF65-F5344CB8AC3E}">
-        <p14:creationId xmlns:p14="http://schemas.microsoft.com/office/powerpoint/2010/main" val="1068135587"/>
+        <p14:creationId xmlns:p14="http://schemas.microsoft.com/office/powerpoint/2010/main" val="307383714"/>
       </p:ext>
     </p:extLst>
   </p:cSld>
@@ -4083,14 +4618,6 @@
 <file path=ppt/slides/slide15.xml><?xml version="1.0" encoding="utf-8"?>
 <p:sld xmlns:a="http://schemas.openxmlformats.org/drawingml/2006/main" xmlns:r="http://schemas.openxmlformats.org/officeDocument/2006/relationships" xmlns:p="http://schemas.openxmlformats.org/presentationml/2006/main">
   <p:cSld>
-    <p:bg>
-      <p:bgPr>
-        <a:solidFill>
-          <a:schemeClr val="bg1"/>
-        </a:solidFill>
-        <a:effectLst/>
-      </p:bgPr>
-    </p:bg>
     <p:spTree>
       <p:nvGrpSpPr>
         <p:cNvPr id="1" name=""/>
@@ -4105,149 +4632,12 @@
           <a:chExt cx="0" cy="0"/>
         </a:xfrm>
       </p:grpSpPr>
-      <p:sp>
-        <p:nvSpPr>
-          <p:cNvPr id="12" name="Rectangle 11">
-            <a:extLst>
-              <a:ext uri="{FF2B5EF4-FFF2-40B4-BE49-F238E27FC236}">
-                <a16:creationId xmlns:a16="http://schemas.microsoft.com/office/drawing/2014/main" id="{A9F529C3-C941-49FD-8C67-82F134F64BDB}"/>
-              </a:ext>
-              <a:ext uri="{C183D7F6-B498-43B3-948B-1728B52AA6E4}">
-                <adec:decorative xmlns:adec="http://schemas.microsoft.com/office/drawing/2017/decorative" val="1"/>
-              </a:ext>
-            </a:extLst>
-          </p:cNvPr>
-          <p:cNvSpPr>
-            <a:spLocks noGrp="1" noRot="1" noChangeAspect="1" noMove="1" noResize="1" noEditPoints="1" noAdjustHandles="1" noChangeArrowheads="1" noChangeShapeType="1" noTextEdit="1"/>
-          </p:cNvSpPr>
-          <p:nvPr>
-            <p:extLst>
-              <p:ext uri="{386F3935-93C4-4BCD-93E2-E3B085C9AB24}">
-                <p16:designElem xmlns:p16="http://schemas.microsoft.com/office/powerpoint/2015/main" val="1"/>
-              </p:ext>
-            </p:extLst>
-          </p:nvPr>
-        </p:nvSpPr>
-        <p:spPr>
-          <a:xfrm>
-            <a:off x="0" y="0"/>
-            <a:ext cx="12192000" cy="6858000"/>
-          </a:xfrm>
-          <a:prstGeom prst="rect">
-            <a:avLst/>
-          </a:prstGeom>
-          <a:solidFill>
-            <a:schemeClr val="tx1">
-              <a:lumMod val="50000"/>
-              <a:lumOff val="50000"/>
-              <a:alpha val="30000"/>
-            </a:schemeClr>
-          </a:solidFill>
-          <a:ln>
-            <a:noFill/>
-          </a:ln>
-        </p:spPr>
-        <p:style>
-          <a:lnRef idx="2">
-            <a:schemeClr val="accent1">
-              <a:shade val="50000"/>
-            </a:schemeClr>
-          </a:lnRef>
-          <a:fillRef idx="1">
-            <a:schemeClr val="accent1"/>
-          </a:fillRef>
-          <a:effectRef idx="0">
-            <a:schemeClr val="accent1"/>
-          </a:effectRef>
-          <a:fontRef idx="minor">
-            <a:schemeClr val="lt1"/>
-          </a:fontRef>
-        </p:style>
-        <p:txBody>
-          <a:bodyPr rtlCol="0" anchor="ctr"/>
-          <a:lstStyle/>
-          <a:p>
-            <a:pPr algn="ctr"/>
-            <a:endParaRPr lang="en-US"/>
-          </a:p>
-        </p:txBody>
-      </p:sp>
-      <p:sp>
-        <p:nvSpPr>
-          <p:cNvPr id="14" name="Rectangle 13">
-            <a:extLst>
-              <a:ext uri="{FF2B5EF4-FFF2-40B4-BE49-F238E27FC236}">
-                <a16:creationId xmlns:a16="http://schemas.microsoft.com/office/drawing/2014/main" id="{20586029-32A0-47E5-9AEC-AE3ABA6B94D0}"/>
-              </a:ext>
-              <a:ext uri="{C183D7F6-B498-43B3-948B-1728B52AA6E4}">
-                <adec:decorative xmlns:adec="http://schemas.microsoft.com/office/drawing/2017/decorative" val="1"/>
-              </a:ext>
-            </a:extLst>
-          </p:cNvPr>
-          <p:cNvSpPr>
-            <a:spLocks noGrp="1" noRot="1" noChangeAspect="1" noMove="1" noResize="1" noEditPoints="1" noAdjustHandles="1" noChangeArrowheads="1" noChangeShapeType="1" noTextEdit="1"/>
-          </p:cNvSpPr>
-          <p:nvPr>
-            <p:extLst>
-              <p:ext uri="{386F3935-93C4-4BCD-93E2-E3B085C9AB24}">
-                <p16:designElem xmlns:p16="http://schemas.microsoft.com/office/powerpoint/2015/main" val="1"/>
-              </p:ext>
-            </p:extLst>
-          </p:nvPr>
-        </p:nvSpPr>
-        <p:spPr>
-          <a:xfrm>
-            <a:off x="477012" y="480060"/>
-            <a:ext cx="11237976" cy="5897880"/>
-          </a:xfrm>
-          <a:prstGeom prst="rect">
-            <a:avLst/>
-          </a:prstGeom>
-          <a:solidFill>
-            <a:srgbClr val="FFFFFF"/>
-          </a:solidFill>
-          <a:ln w="9525">
-            <a:noFill/>
-          </a:ln>
-          <a:effectLst>
-            <a:outerShdw blurRad="63500" dist="17780" dir="5400000" algn="t" rotWithShape="0">
-              <a:prstClr val="black">
-                <a:alpha val="43000"/>
-              </a:prstClr>
-            </a:outerShdw>
-          </a:effectLst>
-        </p:spPr>
-        <p:style>
-          <a:lnRef idx="2">
-            <a:schemeClr val="accent1">
-              <a:shade val="50000"/>
-            </a:schemeClr>
-          </a:lnRef>
-          <a:fillRef idx="1">
-            <a:schemeClr val="accent1"/>
-          </a:fillRef>
-          <a:effectRef idx="0">
-            <a:schemeClr val="accent1"/>
-          </a:effectRef>
-          <a:fontRef idx="minor">
-            <a:schemeClr val="lt1"/>
-          </a:fontRef>
-        </p:style>
-        <p:txBody>
-          <a:bodyPr rtlCol="0" anchor="ctr"/>
-          <a:lstStyle/>
-          <a:p>
-            <a:pPr algn="ctr"/>
-            <a:endParaRPr lang="en-US"/>
-          </a:p>
-        </p:txBody>
-      </p:sp>
       <p:pic>
         <p:nvPicPr>
-          <p:cNvPr id="5" name="Picture 4">
-            <a:extLst>
-              <a:ext uri="{FF2B5EF4-FFF2-40B4-BE49-F238E27FC236}">
-                <a16:creationId xmlns:a16="http://schemas.microsoft.com/office/drawing/2014/main" id="{16EEA3DD-0C14-0047-5F04-651ADCD1B600}"/>
+          <p:cNvPr id="4" name="Picture 3" descr="A computer screen with white text&#10;&#10;Description automatically generated">
+            <a:extLst>
+              <a:ext uri="{FF2B5EF4-FFF2-40B4-BE49-F238E27FC236}">
+                <a16:creationId xmlns:a16="http://schemas.microsoft.com/office/drawing/2014/main" id="{796EAC22-420D-3FC4-A890-95AD9A5E8EC1}"/>
               </a:ext>
             </a:extLst>
           </p:cNvPr>
@@ -4264,72 +4654,20 @@
         </p:blipFill>
         <p:spPr>
           <a:xfrm>
-            <a:off x="6167893" y="2257425"/>
-            <a:ext cx="5459159" cy="2343150"/>
+            <a:off x="3161662" y="3754303"/>
+            <a:ext cx="5568979" cy="2343150"/>
           </a:xfrm>
           <a:prstGeom prst="rect">
             <a:avLst/>
           </a:prstGeom>
         </p:spPr>
       </p:pic>
-      <p:cxnSp>
-        <p:nvCxnSpPr>
-          <p:cNvPr id="16" name="Straight Connector 15">
-            <a:extLst>
-              <a:ext uri="{FF2B5EF4-FFF2-40B4-BE49-F238E27FC236}">
-                <a16:creationId xmlns:a16="http://schemas.microsoft.com/office/drawing/2014/main" id="{8C730EAB-A532-4295-A302-FB4B90DB9F5E}"/>
-              </a:ext>
-              <a:ext uri="{C183D7F6-B498-43B3-948B-1728B52AA6E4}">
-                <adec:decorative xmlns:adec="http://schemas.microsoft.com/office/drawing/2017/decorative" val="1"/>
-              </a:ext>
-            </a:extLst>
-          </p:cNvPr>
-          <p:cNvCxnSpPr>
-            <a:cxnSpLocks noGrp="1" noRot="1" noChangeAspect="1" noMove="1" noResize="1" noEditPoints="1" noAdjustHandles="1" noChangeArrowheads="1" noChangeShapeType="1"/>
-          </p:cNvCxnSpPr>
-          <p:nvPr>
-            <p:extLst>
-              <p:ext uri="{386F3935-93C4-4BCD-93E2-E3B085C9AB24}">
-                <p16:designElem xmlns:p16="http://schemas.microsoft.com/office/powerpoint/2015/main" val="1"/>
-              </p:ext>
-            </p:extLst>
-          </p:nvPr>
-        </p:nvCxnSpPr>
-        <p:spPr>
-          <a:xfrm>
-            <a:off x="6079958" y="1143000"/>
-            <a:ext cx="0" cy="4572000"/>
-          </a:xfrm>
-          <a:prstGeom prst="line">
-            <a:avLst/>
-          </a:prstGeom>
-          <a:ln>
-            <a:solidFill>
-              <a:srgbClr val="4E4E4E"/>
-            </a:solidFill>
-          </a:ln>
-        </p:spPr>
-        <p:style>
-          <a:lnRef idx="1">
-            <a:schemeClr val="accent1"/>
-          </a:lnRef>
-          <a:fillRef idx="0">
-            <a:schemeClr val="accent1"/>
-          </a:fillRef>
-          <a:effectRef idx="0">
-            <a:schemeClr val="accent1"/>
-          </a:effectRef>
-          <a:fontRef idx="minor">
-            <a:schemeClr val="tx1"/>
-          </a:fontRef>
-        </p:style>
-      </p:cxnSp>
       <p:pic>
         <p:nvPicPr>
-          <p:cNvPr id="7" name="Picture 6">
-            <a:extLst>
-              <a:ext uri="{FF2B5EF4-FFF2-40B4-BE49-F238E27FC236}">
-                <a16:creationId xmlns:a16="http://schemas.microsoft.com/office/drawing/2014/main" id="{E3C02FC0-D9B2-A1C6-0084-E6E050F9092C}"/>
+          <p:cNvPr id="5" name="Picture 4">
+            <a:extLst>
+              <a:ext uri="{FF2B5EF4-FFF2-40B4-BE49-F238E27FC236}">
+                <a16:creationId xmlns:a16="http://schemas.microsoft.com/office/drawing/2014/main" id="{EA32CD15-0804-5E6D-E1E0-B1CA60358A78}"/>
               </a:ext>
             </a:extLst>
           </p:cNvPr>
@@ -4346,7 +4684,7 @@
         </p:blipFill>
         <p:spPr>
           <a:xfrm>
-            <a:off x="697308" y="2190750"/>
+            <a:off x="3298795" y="958299"/>
             <a:ext cx="5294715" cy="2343150"/>
           </a:xfrm>
           <a:prstGeom prst="rect">
@@ -4354,10 +4692,106 @@
           </a:prstGeom>
         </p:spPr>
       </p:pic>
+      <p:sp>
+        <p:nvSpPr>
+          <p:cNvPr id="6" name="TextBox 5">
+            <a:extLst>
+              <a:ext uri="{FF2B5EF4-FFF2-40B4-BE49-F238E27FC236}">
+                <a16:creationId xmlns:a16="http://schemas.microsoft.com/office/drawing/2014/main" id="{ECC76625-4B3A-7AF8-2FC0-FE62009923A5}"/>
+              </a:ext>
+            </a:extLst>
+          </p:cNvPr>
+          <p:cNvSpPr txBox="1"/>
+          <p:nvPr/>
+        </p:nvSpPr>
+        <p:spPr>
+          <a:xfrm>
+            <a:off x="3298796" y="619745"/>
+            <a:ext cx="2406680" cy="338554"/>
+          </a:xfrm>
+          <a:prstGeom prst="rect">
+            <a:avLst/>
+          </a:prstGeom>
+          <a:noFill/>
+        </p:spPr>
+        <p:txBody>
+          <a:bodyPr wrap="square" rtlCol="0">
+            <a:spAutoFit/>
+          </a:bodyPr>
+          <a:lstStyle/>
+          <a:p>
+            <a:r>
+              <a:rPr lang="en-US" sz="1600" dirty="0">
+                <a:solidFill>
+                  <a:schemeClr val="accent4">
+                    <a:lumMod val="75000"/>
+                  </a:schemeClr>
+                </a:solidFill>
+              </a:rPr>
+              <a:t>Unmodified sensor output</a:t>
+            </a:r>
+            <a:endParaRPr lang="en-DE" sz="1600" dirty="0">
+              <a:solidFill>
+                <a:schemeClr val="accent4">
+                  <a:lumMod val="75000"/>
+                </a:schemeClr>
+              </a:solidFill>
+            </a:endParaRPr>
+          </a:p>
+        </p:txBody>
+      </p:sp>
+      <p:sp>
+        <p:nvSpPr>
+          <p:cNvPr id="7" name="TextBox 6">
+            <a:extLst>
+              <a:ext uri="{FF2B5EF4-FFF2-40B4-BE49-F238E27FC236}">
+                <a16:creationId xmlns:a16="http://schemas.microsoft.com/office/drawing/2014/main" id="{3ED0699F-4902-539C-71C7-3B0848FF8785}"/>
+              </a:ext>
+            </a:extLst>
+          </p:cNvPr>
+          <p:cNvSpPr txBox="1"/>
+          <p:nvPr/>
+        </p:nvSpPr>
+        <p:spPr>
+          <a:xfrm>
+            <a:off x="3222596" y="3415749"/>
+            <a:ext cx="2406680" cy="338554"/>
+          </a:xfrm>
+          <a:prstGeom prst="rect">
+            <a:avLst/>
+          </a:prstGeom>
+          <a:noFill/>
+        </p:spPr>
+        <p:txBody>
+          <a:bodyPr wrap="square" rtlCol="0">
+            <a:spAutoFit/>
+          </a:bodyPr>
+          <a:lstStyle/>
+          <a:p>
+            <a:r>
+              <a:rPr lang="en-US" sz="1600" dirty="0">
+                <a:solidFill>
+                  <a:schemeClr val="accent4">
+                    <a:lumMod val="75000"/>
+                  </a:schemeClr>
+                </a:solidFill>
+              </a:rPr>
+              <a:t>Modified sensor output</a:t>
+            </a:r>
+            <a:endParaRPr lang="en-DE" sz="1600" dirty="0">
+              <a:solidFill>
+                <a:schemeClr val="accent4">
+                  <a:lumMod val="75000"/>
+                </a:schemeClr>
+              </a:solidFill>
+            </a:endParaRPr>
+          </a:p>
+        </p:txBody>
+      </p:sp>
     </p:spTree>
     <p:extLst>
       <p:ext uri="{BB962C8B-B14F-4D97-AF65-F5344CB8AC3E}">
-        <p14:creationId xmlns:p14="http://schemas.microsoft.com/office/powerpoint/2010/main" val="307383714"/>
+        <p14:creationId xmlns:p14="http://schemas.microsoft.com/office/powerpoint/2010/main" val="895847369"/>
       </p:ext>
     </p:extLst>
   </p:cSld>
@@ -4384,12 +4818,194 @@
           <a:chExt cx="0" cy="0"/>
         </a:xfrm>
       </p:grpSpPr>
+      <p:sp>
+        <p:nvSpPr>
+          <p:cNvPr id="6" name="TextBox 5">
+            <a:extLst>
+              <a:ext uri="{FF2B5EF4-FFF2-40B4-BE49-F238E27FC236}">
+                <a16:creationId xmlns:a16="http://schemas.microsoft.com/office/drawing/2014/main" id="{AC02E233-2D20-C6E4-F736-F74F95A49840}"/>
+              </a:ext>
+            </a:extLst>
+          </p:cNvPr>
+          <p:cNvSpPr txBox="1"/>
+          <p:nvPr/>
+        </p:nvSpPr>
+        <p:spPr>
+          <a:xfrm>
+            <a:off x="7034549" y="3981086"/>
+            <a:ext cx="3157201" cy="307777"/>
+          </a:xfrm>
+          <a:prstGeom prst="rect">
+            <a:avLst/>
+          </a:prstGeom>
+          <a:noFill/>
+        </p:spPr>
+        <p:txBody>
+          <a:bodyPr wrap="square" rtlCol="0">
+            <a:spAutoFit/>
+          </a:bodyPr>
+          <a:lstStyle/>
+          <a:p>
+            <a:r>
+              <a:rPr lang="en-US" sz="1400" dirty="0"/>
+              <a:t>Searching for Object IDs in the Actor list</a:t>
+            </a:r>
+            <a:endParaRPr lang="en-DE" sz="1400" dirty="0"/>
+          </a:p>
+        </p:txBody>
+      </p:sp>
+      <p:sp>
+        <p:nvSpPr>
+          <p:cNvPr id="7" name="Rectangle 6">
+            <a:extLst>
+              <a:ext uri="{FF2B5EF4-FFF2-40B4-BE49-F238E27FC236}">
+                <a16:creationId xmlns:a16="http://schemas.microsoft.com/office/drawing/2014/main" id="{0D90DE7A-7C14-4492-DFE4-36B0DEE56D1A}"/>
+              </a:ext>
+            </a:extLst>
+          </p:cNvPr>
+          <p:cNvSpPr/>
+          <p:nvPr/>
+        </p:nvSpPr>
+        <p:spPr>
+          <a:xfrm>
+            <a:off x="7034549" y="3981086"/>
+            <a:ext cx="3157201" cy="307777"/>
+          </a:xfrm>
+          <a:prstGeom prst="rect">
+            <a:avLst/>
+          </a:prstGeom>
+          <a:noFill/>
+          <a:ln w="44450">
+            <a:solidFill>
+              <a:schemeClr val="accent6">
+                <a:lumMod val="60000"/>
+                <a:lumOff val="40000"/>
+              </a:schemeClr>
+            </a:solidFill>
+          </a:ln>
+        </p:spPr>
+        <p:style>
+          <a:lnRef idx="2">
+            <a:schemeClr val="accent1">
+              <a:shade val="15000"/>
+            </a:schemeClr>
+          </a:lnRef>
+          <a:fillRef idx="1">
+            <a:schemeClr val="accent1"/>
+          </a:fillRef>
+          <a:effectRef idx="0">
+            <a:schemeClr val="accent1"/>
+          </a:effectRef>
+          <a:fontRef idx="minor">
+            <a:schemeClr val="lt1"/>
+          </a:fontRef>
+        </p:style>
+        <p:txBody>
+          <a:bodyPr rtlCol="0" anchor="ctr"/>
+          <a:lstStyle/>
+          <a:p>
+            <a:pPr algn="ctr"/>
+            <a:endParaRPr lang="en-DE"/>
+          </a:p>
+        </p:txBody>
+      </p:sp>
+      <p:sp>
+        <p:nvSpPr>
+          <p:cNvPr id="8" name="TextBox 7">
+            <a:extLst>
+              <a:ext uri="{FF2B5EF4-FFF2-40B4-BE49-F238E27FC236}">
+                <a16:creationId xmlns:a16="http://schemas.microsoft.com/office/drawing/2014/main" id="{EF166E7F-9FE9-16AB-8C80-CA349855E9E0}"/>
+              </a:ext>
+            </a:extLst>
+          </p:cNvPr>
+          <p:cNvSpPr txBox="1"/>
+          <p:nvPr/>
+        </p:nvSpPr>
+        <p:spPr>
+          <a:xfrm>
+            <a:off x="7034549" y="4465835"/>
+            <a:ext cx="2023726" cy="307777"/>
+          </a:xfrm>
+          <a:prstGeom prst="rect">
+            <a:avLst/>
+          </a:prstGeom>
+          <a:noFill/>
+        </p:spPr>
+        <p:txBody>
+          <a:bodyPr wrap="square" rtlCol="0">
+            <a:spAutoFit/>
+          </a:bodyPr>
+          <a:lstStyle/>
+          <a:p>
+            <a:r>
+              <a:rPr lang="en-US" sz="1400" dirty="0"/>
+              <a:t>Storing the data in a File</a:t>
+            </a:r>
+            <a:endParaRPr lang="en-DE" sz="1400" dirty="0"/>
+          </a:p>
+        </p:txBody>
+      </p:sp>
+      <p:sp>
+        <p:nvSpPr>
+          <p:cNvPr id="9" name="Rectangle 8">
+            <a:extLst>
+              <a:ext uri="{FF2B5EF4-FFF2-40B4-BE49-F238E27FC236}">
+                <a16:creationId xmlns:a16="http://schemas.microsoft.com/office/drawing/2014/main" id="{C84CCCDB-C7AF-2A18-553B-427E9C4D190F}"/>
+              </a:ext>
+            </a:extLst>
+          </p:cNvPr>
+          <p:cNvSpPr/>
+          <p:nvPr/>
+        </p:nvSpPr>
+        <p:spPr>
+          <a:xfrm>
+            <a:off x="7034549" y="4450446"/>
+            <a:ext cx="2023726" cy="323166"/>
+          </a:xfrm>
+          <a:prstGeom prst="rect">
+            <a:avLst/>
+          </a:prstGeom>
+          <a:noFill/>
+          <a:ln w="44450">
+            <a:solidFill>
+              <a:schemeClr val="accent6">
+                <a:lumMod val="60000"/>
+                <a:lumOff val="40000"/>
+              </a:schemeClr>
+            </a:solidFill>
+          </a:ln>
+        </p:spPr>
+        <p:style>
+          <a:lnRef idx="2">
+            <a:schemeClr val="accent1">
+              <a:shade val="15000"/>
+            </a:schemeClr>
+          </a:lnRef>
+          <a:fillRef idx="1">
+            <a:schemeClr val="accent1"/>
+          </a:fillRef>
+          <a:effectRef idx="0">
+            <a:schemeClr val="accent1"/>
+          </a:effectRef>
+          <a:fontRef idx="minor">
+            <a:schemeClr val="lt1"/>
+          </a:fontRef>
+        </p:style>
+        <p:txBody>
+          <a:bodyPr rtlCol="0" anchor="ctr"/>
+          <a:lstStyle/>
+          <a:p>
+            <a:pPr algn="ctr"/>
+            <a:endParaRPr lang="en-DE"/>
+          </a:p>
+        </p:txBody>
+      </p:sp>
       <p:pic>
         <p:nvPicPr>
-          <p:cNvPr id="4" name="Picture 3" descr="A computer screen with white text&#10;&#10;Description automatically generated">
-            <a:extLst>
-              <a:ext uri="{FF2B5EF4-FFF2-40B4-BE49-F238E27FC236}">
-                <a16:creationId xmlns:a16="http://schemas.microsoft.com/office/drawing/2014/main" id="{796EAC22-420D-3FC4-A890-95AD9A5E8EC1}"/>
+          <p:cNvPr id="11" name="Picture 10">
+            <a:extLst>
+              <a:ext uri="{FF2B5EF4-FFF2-40B4-BE49-F238E27FC236}">
+                <a16:creationId xmlns:a16="http://schemas.microsoft.com/office/drawing/2014/main" id="{F65DA11E-5EFE-6175-5262-ADC89DF8ECA9}"/>
               </a:ext>
             </a:extLst>
           </p:cNvPr>
@@ -4406,50 +5022,20 @@
         </p:blipFill>
         <p:spPr>
           <a:xfrm>
-            <a:off x="3161662" y="3754303"/>
-            <a:ext cx="5568979" cy="2343150"/>
+            <a:off x="354051" y="1876425"/>
+            <a:ext cx="6589673" cy="3952875"/>
           </a:xfrm>
           <a:prstGeom prst="rect">
             <a:avLst/>
           </a:prstGeom>
         </p:spPr>
       </p:pic>
-      <p:pic>
-        <p:nvPicPr>
-          <p:cNvPr id="5" name="Picture 4">
-            <a:extLst>
-              <a:ext uri="{FF2B5EF4-FFF2-40B4-BE49-F238E27FC236}">
-                <a16:creationId xmlns:a16="http://schemas.microsoft.com/office/drawing/2014/main" id="{EA32CD15-0804-5E6D-E1E0-B1CA60358A78}"/>
-              </a:ext>
-            </a:extLst>
-          </p:cNvPr>
-          <p:cNvPicPr>
-            <a:picLocks noChangeAspect="1"/>
-          </p:cNvPicPr>
-          <p:nvPr/>
-        </p:nvPicPr>
-        <p:blipFill>
-          <a:blip r:embed="rId3"/>
-          <a:stretch>
-            <a:fillRect/>
-          </a:stretch>
-        </p:blipFill>
-        <p:spPr>
-          <a:xfrm>
-            <a:off x="3298795" y="958299"/>
-            <a:ext cx="5294715" cy="2343150"/>
-          </a:xfrm>
-          <a:prstGeom prst="rect">
-            <a:avLst/>
-          </a:prstGeom>
-        </p:spPr>
-      </p:pic>
-      <p:sp>
-        <p:nvSpPr>
-          <p:cNvPr id="6" name="TextBox 5">
-            <a:extLst>
-              <a:ext uri="{FF2B5EF4-FFF2-40B4-BE49-F238E27FC236}">
-                <a16:creationId xmlns:a16="http://schemas.microsoft.com/office/drawing/2014/main" id="{ECC76625-4B3A-7AF8-2FC0-FE62009923A5}"/>
+      <p:sp>
+        <p:nvSpPr>
+          <p:cNvPr id="14" name="TextBox 13">
+            <a:extLst>
+              <a:ext uri="{FF2B5EF4-FFF2-40B4-BE49-F238E27FC236}">
+                <a16:creationId xmlns:a16="http://schemas.microsoft.com/office/drawing/2014/main" id="{EC74CD53-7DA7-A9F6-A0FD-4AD5860D0A55}"/>
               </a:ext>
             </a:extLst>
           </p:cNvPr>
@@ -4458,8 +5044,8 @@
         </p:nvSpPr>
         <p:spPr>
           <a:xfrm>
-            <a:off x="3298796" y="619745"/>
-            <a:ext cx="2406680" cy="338554"/>
+            <a:off x="7034549" y="2848703"/>
+            <a:ext cx="3071476" cy="307777"/>
           </a:xfrm>
           <a:prstGeom prst="rect">
             <a:avLst/>
@@ -4473,31 +5059,208 @@
           <a:lstStyle/>
           <a:p>
             <a:r>
-              <a:rPr lang="en-US" sz="1600" dirty="0">
-                <a:solidFill>
-                  <a:schemeClr val="accent4">
-                    <a:lumMod val="75000"/>
-                  </a:schemeClr>
-                </a:solidFill>
-              </a:rPr>
-              <a:t>Unmodified sensor output</a:t>
+              <a:rPr lang="en-US" sz="1400" dirty="0"/>
+              <a:t>Loop to extract all detections in a frame</a:t>
             </a:r>
-            <a:endParaRPr lang="en-DE" sz="1600" dirty="0">
-              <a:solidFill>
-                <a:schemeClr val="accent4">
-                  <a:lumMod val="75000"/>
-                </a:schemeClr>
-              </a:solidFill>
-            </a:endParaRPr>
-          </a:p>
-        </p:txBody>
-      </p:sp>
-      <p:sp>
-        <p:nvSpPr>
-          <p:cNvPr id="7" name="TextBox 6">
-            <a:extLst>
-              <a:ext uri="{FF2B5EF4-FFF2-40B4-BE49-F238E27FC236}">
-                <a16:creationId xmlns:a16="http://schemas.microsoft.com/office/drawing/2014/main" id="{3ED0699F-4902-539C-71C7-3B0848FF8785}"/>
+            <a:endParaRPr lang="en-DE" sz="1400" dirty="0"/>
+          </a:p>
+        </p:txBody>
+      </p:sp>
+      <p:sp>
+        <p:nvSpPr>
+          <p:cNvPr id="15" name="Rectangle 14">
+            <a:extLst>
+              <a:ext uri="{FF2B5EF4-FFF2-40B4-BE49-F238E27FC236}">
+                <a16:creationId xmlns:a16="http://schemas.microsoft.com/office/drawing/2014/main" id="{5C0ABCC4-5C52-C326-D383-70EF272FF91B}"/>
+              </a:ext>
+            </a:extLst>
+          </p:cNvPr>
+          <p:cNvSpPr/>
+          <p:nvPr/>
+        </p:nvSpPr>
+        <p:spPr>
+          <a:xfrm>
+            <a:off x="7034549" y="2848703"/>
+            <a:ext cx="3071476" cy="307777"/>
+          </a:xfrm>
+          <a:prstGeom prst="rect">
+            <a:avLst/>
+          </a:prstGeom>
+          <a:noFill/>
+          <a:ln w="44450">
+            <a:solidFill>
+              <a:schemeClr val="accent6">
+                <a:lumMod val="60000"/>
+                <a:lumOff val="40000"/>
+              </a:schemeClr>
+            </a:solidFill>
+          </a:ln>
+        </p:spPr>
+        <p:style>
+          <a:lnRef idx="2">
+            <a:schemeClr val="accent1">
+              <a:shade val="15000"/>
+            </a:schemeClr>
+          </a:lnRef>
+          <a:fillRef idx="1">
+            <a:schemeClr val="accent1"/>
+          </a:fillRef>
+          <a:effectRef idx="0">
+            <a:schemeClr val="accent1"/>
+          </a:effectRef>
+          <a:fontRef idx="minor">
+            <a:schemeClr val="lt1"/>
+          </a:fontRef>
+        </p:style>
+        <p:txBody>
+          <a:bodyPr rtlCol="0" anchor="ctr"/>
+          <a:lstStyle/>
+          <a:p>
+            <a:pPr algn="ctr"/>
+            <a:endParaRPr lang="en-DE"/>
+          </a:p>
+        </p:txBody>
+      </p:sp>
+      <p:cxnSp>
+        <p:nvCxnSpPr>
+          <p:cNvPr id="17" name="Straight Arrow Connector 16">
+            <a:extLst>
+              <a:ext uri="{FF2B5EF4-FFF2-40B4-BE49-F238E27FC236}">
+                <a16:creationId xmlns:a16="http://schemas.microsoft.com/office/drawing/2014/main" id="{2A8D51A8-37B5-3304-9AFA-1420C5E38EBF}"/>
+              </a:ext>
+            </a:extLst>
+          </p:cNvPr>
+          <p:cNvCxnSpPr>
+            <a:stCxn id="15" idx="1"/>
+          </p:cNvCxnSpPr>
+          <p:nvPr/>
+        </p:nvCxnSpPr>
+        <p:spPr>
+          <a:xfrm flipH="1" flipV="1">
+            <a:off x="3305175" y="2933700"/>
+            <a:ext cx="3729374" cy="68892"/>
+          </a:xfrm>
+          <a:prstGeom prst="straightConnector1">
+            <a:avLst/>
+          </a:prstGeom>
+          <a:ln w="41275">
+            <a:solidFill>
+              <a:srgbClr val="FF0000"/>
+            </a:solidFill>
+            <a:tailEnd type="triangle"/>
+          </a:ln>
+        </p:spPr>
+        <p:style>
+          <a:lnRef idx="1">
+            <a:schemeClr val="accent1"/>
+          </a:lnRef>
+          <a:fillRef idx="0">
+            <a:schemeClr val="accent1"/>
+          </a:fillRef>
+          <a:effectRef idx="0">
+            <a:schemeClr val="accent1"/>
+          </a:effectRef>
+          <a:fontRef idx="minor">
+            <a:schemeClr val="tx1"/>
+          </a:fontRef>
+        </p:style>
+      </p:cxnSp>
+      <p:cxnSp>
+        <p:nvCxnSpPr>
+          <p:cNvPr id="18" name="Straight Arrow Connector 17">
+            <a:extLst>
+              <a:ext uri="{FF2B5EF4-FFF2-40B4-BE49-F238E27FC236}">
+                <a16:creationId xmlns:a16="http://schemas.microsoft.com/office/drawing/2014/main" id="{75E223F5-94A0-6683-51BF-61C0EA1719C0}"/>
+              </a:ext>
+            </a:extLst>
+          </p:cNvPr>
+          <p:cNvCxnSpPr>
+            <a:cxnSpLocks/>
+            <a:stCxn id="7" idx="1"/>
+          </p:cNvCxnSpPr>
+          <p:nvPr/>
+        </p:nvCxnSpPr>
+        <p:spPr>
+          <a:xfrm flipH="1">
+            <a:off x="5676900" y="4134975"/>
+            <a:ext cx="1357649" cy="169277"/>
+          </a:xfrm>
+          <a:prstGeom prst="straightConnector1">
+            <a:avLst/>
+          </a:prstGeom>
+          <a:ln w="41275">
+            <a:solidFill>
+              <a:srgbClr val="FF0000"/>
+            </a:solidFill>
+            <a:tailEnd type="triangle"/>
+          </a:ln>
+        </p:spPr>
+        <p:style>
+          <a:lnRef idx="1">
+            <a:schemeClr val="accent1"/>
+          </a:lnRef>
+          <a:fillRef idx="0">
+            <a:schemeClr val="accent1"/>
+          </a:fillRef>
+          <a:effectRef idx="0">
+            <a:schemeClr val="accent1"/>
+          </a:effectRef>
+          <a:fontRef idx="minor">
+            <a:schemeClr val="tx1"/>
+          </a:fontRef>
+        </p:style>
+      </p:cxnSp>
+      <p:cxnSp>
+        <p:nvCxnSpPr>
+          <p:cNvPr id="21" name="Straight Arrow Connector 20">
+            <a:extLst>
+              <a:ext uri="{FF2B5EF4-FFF2-40B4-BE49-F238E27FC236}">
+                <a16:creationId xmlns:a16="http://schemas.microsoft.com/office/drawing/2014/main" id="{0C855CB7-0B76-9C00-3C39-1BCDAF05D0E6}"/>
+              </a:ext>
+            </a:extLst>
+          </p:cNvPr>
+          <p:cNvCxnSpPr>
+            <a:cxnSpLocks/>
+            <a:stCxn id="9" idx="1"/>
+          </p:cNvCxnSpPr>
+          <p:nvPr/>
+        </p:nvCxnSpPr>
+        <p:spPr>
+          <a:xfrm flipH="1" flipV="1">
+            <a:off x="3228975" y="4541999"/>
+            <a:ext cx="3805574" cy="70030"/>
+          </a:xfrm>
+          <a:prstGeom prst="straightConnector1">
+            <a:avLst/>
+          </a:prstGeom>
+          <a:ln w="41275">
+            <a:solidFill>
+              <a:srgbClr val="FF0000"/>
+            </a:solidFill>
+            <a:tailEnd type="triangle"/>
+          </a:ln>
+        </p:spPr>
+        <p:style>
+          <a:lnRef idx="1">
+            <a:schemeClr val="accent1"/>
+          </a:lnRef>
+          <a:fillRef idx="0">
+            <a:schemeClr val="accent1"/>
+          </a:fillRef>
+          <a:effectRef idx="0">
+            <a:schemeClr val="accent1"/>
+          </a:effectRef>
+          <a:fontRef idx="minor">
+            <a:schemeClr val="tx1"/>
+          </a:fontRef>
+        </p:style>
+      </p:cxnSp>
+      <p:sp>
+        <p:nvSpPr>
+          <p:cNvPr id="24" name="TextBox 23">
+            <a:extLst>
+              <a:ext uri="{FF2B5EF4-FFF2-40B4-BE49-F238E27FC236}">
+                <a16:creationId xmlns:a16="http://schemas.microsoft.com/office/drawing/2014/main" id="{669F4654-CEA4-0D6D-B69A-A6E02CA19DB6}"/>
               </a:ext>
             </a:extLst>
           </p:cNvPr>
@@ -4506,8 +5269,8 @@
         </p:nvSpPr>
         <p:spPr>
           <a:xfrm>
-            <a:off x="3222596" y="3415749"/>
-            <a:ext cx="2406680" cy="338554"/>
+            <a:off x="7051972" y="3318449"/>
+            <a:ext cx="3071476" cy="523220"/>
           </a:xfrm>
           <a:prstGeom prst="rect">
             <a:avLst/>
@@ -4521,29 +5284,117 @@
           <a:lstStyle/>
           <a:p>
             <a:r>
-              <a:rPr lang="en-US" sz="1600" dirty="0">
-                <a:solidFill>
-                  <a:schemeClr val="accent4">
-                    <a:lumMod val="75000"/>
-                  </a:schemeClr>
-                </a:solidFill>
-              </a:rPr>
-              <a:t>Modified sensor output</a:t>
+              <a:rPr lang="en-US" sz="1400" dirty="0"/>
+              <a:t>Accessing the Actor List from the World Object</a:t>
             </a:r>
-            <a:endParaRPr lang="en-DE" sz="1600" dirty="0">
-              <a:solidFill>
-                <a:schemeClr val="accent4">
-                  <a:lumMod val="75000"/>
-                </a:schemeClr>
-              </a:solidFill>
-            </a:endParaRPr>
-          </a:p>
-        </p:txBody>
-      </p:sp>
+            <a:endParaRPr lang="en-DE" sz="1400" dirty="0"/>
+          </a:p>
+        </p:txBody>
+      </p:sp>
+      <p:sp>
+        <p:nvSpPr>
+          <p:cNvPr id="25" name="Rectangle 24">
+            <a:extLst>
+              <a:ext uri="{FF2B5EF4-FFF2-40B4-BE49-F238E27FC236}">
+                <a16:creationId xmlns:a16="http://schemas.microsoft.com/office/drawing/2014/main" id="{B8679F33-A4E6-5F9A-B923-86A603555329}"/>
+              </a:ext>
+            </a:extLst>
+          </p:cNvPr>
+          <p:cNvSpPr/>
+          <p:nvPr/>
+        </p:nvSpPr>
+        <p:spPr>
+          <a:xfrm>
+            <a:off x="7051972" y="3318449"/>
+            <a:ext cx="3071476" cy="501054"/>
+          </a:xfrm>
+          <a:prstGeom prst="rect">
+            <a:avLst/>
+          </a:prstGeom>
+          <a:noFill/>
+          <a:ln w="44450">
+            <a:solidFill>
+              <a:schemeClr val="accent6">
+                <a:lumMod val="60000"/>
+                <a:lumOff val="40000"/>
+              </a:schemeClr>
+            </a:solidFill>
+          </a:ln>
+        </p:spPr>
+        <p:style>
+          <a:lnRef idx="2">
+            <a:schemeClr val="accent1">
+              <a:shade val="15000"/>
+            </a:schemeClr>
+          </a:lnRef>
+          <a:fillRef idx="1">
+            <a:schemeClr val="accent1"/>
+          </a:fillRef>
+          <a:effectRef idx="0">
+            <a:schemeClr val="accent1"/>
+          </a:effectRef>
+          <a:fontRef idx="minor">
+            <a:schemeClr val="lt1"/>
+          </a:fontRef>
+        </p:style>
+        <p:txBody>
+          <a:bodyPr rtlCol="0" anchor="ctr"/>
+          <a:lstStyle/>
+          <a:p>
+            <a:pPr algn="ctr"/>
+            <a:endParaRPr lang="en-DE"/>
+          </a:p>
+        </p:txBody>
+      </p:sp>
+      <p:cxnSp>
+        <p:nvCxnSpPr>
+          <p:cNvPr id="26" name="Straight Arrow Connector 25">
+            <a:extLst>
+              <a:ext uri="{FF2B5EF4-FFF2-40B4-BE49-F238E27FC236}">
+                <a16:creationId xmlns:a16="http://schemas.microsoft.com/office/drawing/2014/main" id="{5D9B8B26-659D-AF49-FF85-459B299810D4}"/>
+              </a:ext>
+            </a:extLst>
+          </p:cNvPr>
+          <p:cNvCxnSpPr>
+            <a:cxnSpLocks/>
+            <a:stCxn id="25" idx="1"/>
+          </p:cNvCxnSpPr>
+          <p:nvPr/>
+        </p:nvCxnSpPr>
+        <p:spPr>
+          <a:xfrm flipH="1" flipV="1">
+            <a:off x="3648887" y="3164175"/>
+            <a:ext cx="3403085" cy="404801"/>
+          </a:xfrm>
+          <a:prstGeom prst="straightConnector1">
+            <a:avLst/>
+          </a:prstGeom>
+          <a:ln w="41275">
+            <a:solidFill>
+              <a:srgbClr val="FF0000"/>
+            </a:solidFill>
+            <a:tailEnd type="triangle"/>
+          </a:ln>
+        </p:spPr>
+        <p:style>
+          <a:lnRef idx="1">
+            <a:schemeClr val="accent1"/>
+          </a:lnRef>
+          <a:fillRef idx="0">
+            <a:schemeClr val="accent1"/>
+          </a:fillRef>
+          <a:effectRef idx="0">
+            <a:schemeClr val="accent1"/>
+          </a:effectRef>
+          <a:fontRef idx="minor">
+            <a:schemeClr val="tx1"/>
+          </a:fontRef>
+        </p:style>
+      </p:cxnSp>
     </p:spTree>
     <p:extLst>
       <p:ext uri="{BB962C8B-B14F-4D97-AF65-F5344CB8AC3E}">
-        <p14:creationId xmlns:p14="http://schemas.microsoft.com/office/powerpoint/2010/main" val="895847369"/>
+        <p14:creationId xmlns:p14="http://schemas.microsoft.com/office/powerpoint/2010/main" val="741456465"/>
       </p:ext>
     </p:extLst>
   </p:cSld>
@@ -4553,7 +5404,7 @@
 </p:sld>
 </file>
 
-<file path=ppt/slides/slide2.xml><?xml version="1.0" encoding="utf-8"?>
+<file path=ppt/slides/slide17.xml><?xml version="1.0" encoding="utf-8"?>
 <p:sld xmlns:a="http://schemas.openxmlformats.org/drawingml/2006/main" xmlns:r="http://schemas.openxmlformats.org/officeDocument/2006/relationships" xmlns:p="http://schemas.openxmlformats.org/presentationml/2006/main">
   <p:cSld>
     <p:spTree>
@@ -4570,12 +5421,78 @@
           <a:chExt cx="0" cy="0"/>
         </a:xfrm>
       </p:grpSpPr>
+      <p:pic>
+        <p:nvPicPr>
+          <p:cNvPr id="5" name="Picture 4">
+            <a:extLst>
+              <a:ext uri="{FF2B5EF4-FFF2-40B4-BE49-F238E27FC236}">
+                <a16:creationId xmlns:a16="http://schemas.microsoft.com/office/drawing/2014/main" id="{4C99D3F3-7ED0-DF6A-5189-5E7BD7FCA69A}"/>
+              </a:ext>
+            </a:extLst>
+          </p:cNvPr>
+          <p:cNvPicPr>
+            <a:picLocks noChangeAspect="1"/>
+          </p:cNvPicPr>
+          <p:nvPr/>
+        </p:nvPicPr>
+        <p:blipFill>
+          <a:blip r:embed="rId2"/>
+          <a:stretch>
+            <a:fillRect/>
+          </a:stretch>
+        </p:blipFill>
+        <p:spPr>
+          <a:xfrm>
+            <a:off x="3729785" y="45427"/>
+            <a:ext cx="4732430" cy="6767146"/>
+          </a:xfrm>
+          <a:prstGeom prst="rect">
+            <a:avLst/>
+          </a:prstGeom>
+        </p:spPr>
+      </p:pic>
+    </p:spTree>
+    <p:extLst>
+      <p:ext uri="{BB962C8B-B14F-4D97-AF65-F5344CB8AC3E}">
+        <p14:creationId xmlns:p14="http://schemas.microsoft.com/office/powerpoint/2010/main" val="973856263"/>
+      </p:ext>
+    </p:extLst>
+  </p:cSld>
+  <p:clrMapOvr>
+    <a:masterClrMapping/>
+  </p:clrMapOvr>
+</p:sld>
+</file>
+
+<file path=ppt/slides/slide2.xml><?xml version="1.0" encoding="utf-8"?>
+<p:sld xmlns:a="http://schemas.openxmlformats.org/drawingml/2006/main" xmlns:r="http://schemas.openxmlformats.org/officeDocument/2006/relationships" xmlns:p="http://schemas.openxmlformats.org/presentationml/2006/main">
+  <p:cSld>
+    <p:spTree>
+      <p:nvGrpSpPr>
+        <p:cNvPr id="1" name="">
+          <a:extLst>
+            <a:ext uri="{FF2B5EF4-FFF2-40B4-BE49-F238E27FC236}">
+              <a16:creationId xmlns:a16="http://schemas.microsoft.com/office/drawing/2014/main" id="{B13AE235-486A-6FEC-7E3F-EA8BE491A6CD}"/>
+            </a:ext>
+          </a:extLst>
+        </p:cNvPr>
+        <p:cNvGrpSpPr/>
+        <p:nvPr/>
+      </p:nvGrpSpPr>
+      <p:grpSpPr>
+        <a:xfrm>
+          <a:off x="0" y="0"/>
+          <a:ext cx="0" cy="0"/>
+          <a:chOff x="0" y="0"/>
+          <a:chExt cx="0" cy="0"/>
+        </a:xfrm>
+      </p:grpSpPr>
       <p:sp>
         <p:nvSpPr>
           <p:cNvPr id="4" name="Oval 3">
             <a:extLst>
               <a:ext uri="{FF2B5EF4-FFF2-40B4-BE49-F238E27FC236}">
-                <a16:creationId xmlns:a16="http://schemas.microsoft.com/office/drawing/2014/main" id="{19ACB740-47E2-1E22-70A1-5ED1D484CCB2}"/>
+                <a16:creationId xmlns:a16="http://schemas.microsoft.com/office/drawing/2014/main" id="{D53F45BB-5AD2-4C34-28CB-CC880CA46762}"/>
               </a:ext>
             </a:extLst>
           </p:cNvPr>
@@ -4584,7 +5501,7 @@
         </p:nvSpPr>
         <p:spPr>
           <a:xfrm>
-            <a:off x="5707158" y="387685"/>
+            <a:off x="2945917" y="367898"/>
             <a:ext cx="233083" cy="249810"/>
           </a:xfrm>
           <a:prstGeom prst="ellipse">
@@ -4621,20 +5538,21 @@
           <p:cNvPr id="5" name="Straight Arrow Connector 4">
             <a:extLst>
               <a:ext uri="{FF2B5EF4-FFF2-40B4-BE49-F238E27FC236}">
-                <a16:creationId xmlns:a16="http://schemas.microsoft.com/office/drawing/2014/main" id="{9652EC82-0455-7DCB-C31B-5A434F6FEBC9}"/>
+                <a16:creationId xmlns:a16="http://schemas.microsoft.com/office/drawing/2014/main" id="{5DAB33E5-4F50-A257-9069-E75FCC5A0EC2}"/>
               </a:ext>
             </a:extLst>
           </p:cNvPr>
           <p:cNvCxnSpPr>
             <a:cxnSpLocks/>
             <a:stCxn id="4" idx="4"/>
+            <a:endCxn id="15" idx="0"/>
           </p:cNvCxnSpPr>
           <p:nvPr/>
         </p:nvCxnSpPr>
         <p:spPr>
           <a:xfrm>
-            <a:off x="5823700" y="637495"/>
-            <a:ext cx="0" cy="358588"/>
+            <a:off x="3062459" y="617708"/>
+            <a:ext cx="0" cy="263836"/>
           </a:xfrm>
           <a:prstGeom prst="straightConnector1">
             <a:avLst/>
@@ -4663,7 +5581,7 @@
           <p:cNvPr id="6" name="Rectangle 5">
             <a:extLst>
               <a:ext uri="{FF2B5EF4-FFF2-40B4-BE49-F238E27FC236}">
-                <a16:creationId xmlns:a16="http://schemas.microsoft.com/office/drawing/2014/main" id="{CB82730B-253D-3183-9D05-1933076EDD63}"/>
+                <a16:creationId xmlns:a16="http://schemas.microsoft.com/office/drawing/2014/main" id="{79FCB22A-826E-63E8-7973-137B5A499C92}"/>
               </a:ext>
             </a:extLst>
           </p:cNvPr>
@@ -4672,8 +5590,8 @@
         </p:nvSpPr>
         <p:spPr>
           <a:xfrm>
-            <a:off x="4987744" y="2089777"/>
-            <a:ext cx="1712258" cy="735106"/>
+            <a:off x="2369936" y="1970755"/>
+            <a:ext cx="1385047" cy="735106"/>
           </a:xfrm>
           <a:prstGeom prst="rect">
             <a:avLst/>
@@ -4725,14 +5643,14 @@
           <a:p>
             <a:pPr algn="ctr"/>
             <a:r>
-              <a:rPr lang="en-US" dirty="0">
+              <a:rPr lang="en-US" sz="1600" dirty="0">
                 <a:solidFill>
                   <a:schemeClr val="tx1"/>
                 </a:solidFill>
               </a:rPr>
               <a:t>ARadar()</a:t>
             </a:r>
-            <a:endParaRPr lang="en-DE" dirty="0">
+            <a:endParaRPr lang="en-DE" sz="1600" dirty="0">
               <a:solidFill>
                 <a:schemeClr val="tx1"/>
               </a:solidFill>
@@ -4745,7 +5663,7 @@
           <p:cNvPr id="7" name="Rectangle 6">
             <a:extLst>
               <a:ext uri="{FF2B5EF4-FFF2-40B4-BE49-F238E27FC236}">
-                <a16:creationId xmlns:a16="http://schemas.microsoft.com/office/drawing/2014/main" id="{B9446832-187C-F547-886B-D3AA24AA9FDA}"/>
+                <a16:creationId xmlns:a16="http://schemas.microsoft.com/office/drawing/2014/main" id="{DC5DB8D2-C167-268E-1263-190A1E8B89CF}"/>
               </a:ext>
             </a:extLst>
           </p:cNvPr>
@@ -4754,8 +5672,8 @@
         </p:nvSpPr>
         <p:spPr>
           <a:xfrm>
-            <a:off x="4987744" y="3183471"/>
-            <a:ext cx="1712258" cy="735106"/>
+            <a:off x="2370794" y="3094602"/>
+            <a:ext cx="1385047" cy="735106"/>
           </a:xfrm>
           <a:prstGeom prst="rect">
             <a:avLst/>
@@ -4807,14 +5725,14 @@
           <a:p>
             <a:pPr algn="ctr"/>
             <a:r>
-              <a:rPr lang="en-US" dirty="0">
+              <a:rPr lang="en-US" sz="1600" dirty="0">
                 <a:solidFill>
                   <a:schemeClr val="tx1"/>
                 </a:solidFill>
               </a:rPr>
               <a:t>Set()</a:t>
             </a:r>
-            <a:endParaRPr lang="en-DE" dirty="0">
+            <a:endParaRPr lang="en-DE" sz="1600" dirty="0">
               <a:solidFill>
                 <a:schemeClr val="tx1"/>
               </a:solidFill>
@@ -4827,7 +5745,7 @@
           <p:cNvPr id="8" name="Rectangle 7">
             <a:extLst>
               <a:ext uri="{FF2B5EF4-FFF2-40B4-BE49-F238E27FC236}">
-                <a16:creationId xmlns:a16="http://schemas.microsoft.com/office/drawing/2014/main" id="{90B8ABAC-CFFA-E989-2542-711BD31E96A4}"/>
+                <a16:creationId xmlns:a16="http://schemas.microsoft.com/office/drawing/2014/main" id="{E747923A-BD9B-5B0F-583C-66820595F17E}"/>
               </a:ext>
             </a:extLst>
           </p:cNvPr>
@@ -4836,8 +5754,8 @@
         </p:nvSpPr>
         <p:spPr>
           <a:xfrm>
-            <a:off x="4987744" y="5141685"/>
-            <a:ext cx="1712258" cy="735106"/>
+            <a:off x="2455100" y="5033083"/>
+            <a:ext cx="1214713" cy="735106"/>
           </a:xfrm>
           <a:prstGeom prst="rect">
             <a:avLst/>
@@ -4889,14 +5807,14 @@
           <a:p>
             <a:pPr algn="ctr"/>
             <a:r>
-              <a:rPr lang="en-US" dirty="0">
+              <a:rPr lang="en-US" sz="1600" dirty="0">
                 <a:solidFill>
                   <a:schemeClr val="tx1"/>
                 </a:solidFill>
               </a:rPr>
               <a:t>BeginPlay()</a:t>
             </a:r>
-            <a:endParaRPr lang="en-DE" dirty="0">
+            <a:endParaRPr lang="en-DE" sz="1600" dirty="0">
               <a:solidFill>
                 <a:schemeClr val="tx1"/>
               </a:solidFill>
@@ -4909,7 +5827,7 @@
           <p:cNvPr id="9" name="Oval 8">
             <a:extLst>
               <a:ext uri="{FF2B5EF4-FFF2-40B4-BE49-F238E27FC236}">
-                <a16:creationId xmlns:a16="http://schemas.microsoft.com/office/drawing/2014/main" id="{EC2AB193-094B-0F16-6DF7-3179600AB40C}"/>
+                <a16:creationId xmlns:a16="http://schemas.microsoft.com/office/drawing/2014/main" id="{E7BAC79D-A720-2C02-134E-E5EAE9277C35}"/>
               </a:ext>
             </a:extLst>
           </p:cNvPr>
@@ -4918,7 +5836,7 @@
         </p:nvSpPr>
         <p:spPr>
           <a:xfrm>
-            <a:off x="5727330" y="6183463"/>
+            <a:off x="2938859" y="6115387"/>
             <a:ext cx="233083" cy="249810"/>
           </a:xfrm>
           <a:prstGeom prst="ellipse">
@@ -4955,7 +5873,7 @@
           <p:cNvPr id="10" name="TextBox 9">
             <a:extLst>
               <a:ext uri="{FF2B5EF4-FFF2-40B4-BE49-F238E27FC236}">
-                <a16:creationId xmlns:a16="http://schemas.microsoft.com/office/drawing/2014/main" id="{C0D74ABE-ED81-87A1-1CDB-4588C705E31D}"/>
+                <a16:creationId xmlns:a16="http://schemas.microsoft.com/office/drawing/2014/main" id="{D1FA47B9-4D7E-825E-EE75-E650C92F7714}"/>
               </a:ext>
             </a:extLst>
           </p:cNvPr>
@@ -4964,8 +5882,8 @@
         </p:nvSpPr>
         <p:spPr>
           <a:xfrm>
-            <a:off x="5509934" y="88869"/>
-            <a:ext cx="627529" cy="369332"/>
+            <a:off x="2748693" y="121502"/>
+            <a:ext cx="627529" cy="338554"/>
           </a:xfrm>
           <a:prstGeom prst="rect">
             <a:avLst/>
@@ -4979,10 +5897,10 @@
           <a:lstStyle/>
           <a:p>
             <a:r>
-              <a:rPr lang="en-US" dirty="0"/>
+              <a:rPr lang="en-US" sz="1600" dirty="0"/>
               <a:t>Start</a:t>
             </a:r>
-            <a:endParaRPr lang="en-DE" dirty="0"/>
+            <a:endParaRPr lang="en-DE" sz="1600" dirty="0"/>
           </a:p>
         </p:txBody>
       </p:sp>
@@ -4991,7 +5909,7 @@
           <p:cNvPr id="11" name="TextBox 10">
             <a:extLst>
               <a:ext uri="{FF2B5EF4-FFF2-40B4-BE49-F238E27FC236}">
-                <a16:creationId xmlns:a16="http://schemas.microsoft.com/office/drawing/2014/main" id="{08B55222-B9F5-0013-7081-7438C79209EE}"/>
+                <a16:creationId xmlns:a16="http://schemas.microsoft.com/office/drawing/2014/main" id="{AA3E8735-F5E9-90E0-46F9-AEA6F0C9FA86}"/>
               </a:ext>
             </a:extLst>
           </p:cNvPr>
@@ -5000,8 +5918,8 @@
         </p:nvSpPr>
         <p:spPr>
           <a:xfrm>
-            <a:off x="5184965" y="6399597"/>
-            <a:ext cx="1317814" cy="369332"/>
+            <a:off x="2403549" y="6365197"/>
+            <a:ext cx="1317814" cy="338554"/>
           </a:xfrm>
           <a:prstGeom prst="rect">
             <a:avLst/>
@@ -5015,10 +5933,10 @@
           <a:lstStyle/>
           <a:p>
             <a:r>
-              <a:rPr lang="en-US" dirty="0"/>
+              <a:rPr lang="en-US" sz="1600" dirty="0"/>
               <a:t>Wait for tick</a:t>
             </a:r>
-            <a:endParaRPr lang="en-DE" dirty="0"/>
+            <a:endParaRPr lang="en-DE" sz="1600" dirty="0"/>
           </a:p>
         </p:txBody>
       </p:sp>
@@ -5027,11 +5945,12 @@
           <p:cNvPr id="12" name="Straight Arrow Connector 11">
             <a:extLst>
               <a:ext uri="{FF2B5EF4-FFF2-40B4-BE49-F238E27FC236}">
-                <a16:creationId xmlns:a16="http://schemas.microsoft.com/office/drawing/2014/main" id="{C9850592-FF59-75CA-56FF-DFA2F236D120}"/>
+                <a16:creationId xmlns:a16="http://schemas.microsoft.com/office/drawing/2014/main" id="{2C090FB2-7307-1CD4-94D0-06BED98C0769}"/>
               </a:ext>
             </a:extLst>
           </p:cNvPr>
           <p:cNvCxnSpPr>
+            <a:cxnSpLocks/>
             <a:stCxn id="6" idx="2"/>
             <a:endCxn id="7" idx="0"/>
           </p:cNvCxnSpPr>
@@ -5039,8 +5958,8 @@
         </p:nvCxnSpPr>
         <p:spPr>
           <a:xfrm>
-            <a:off x="5843873" y="2824883"/>
-            <a:ext cx="0" cy="358588"/>
+            <a:off x="3062460" y="2705861"/>
+            <a:ext cx="858" cy="388741"/>
           </a:xfrm>
           <a:prstGeom prst="straightConnector1">
             <a:avLst/>
@@ -5069,20 +5988,21 @@
           <p:cNvPr id="13" name="Straight Arrow Connector 12">
             <a:extLst>
               <a:ext uri="{FF2B5EF4-FFF2-40B4-BE49-F238E27FC236}">
-                <a16:creationId xmlns:a16="http://schemas.microsoft.com/office/drawing/2014/main" id="{FD453FA8-4FE1-39CF-DEB5-B95A11F8AC7E}"/>
+                <a16:creationId xmlns:a16="http://schemas.microsoft.com/office/drawing/2014/main" id="{C55420A8-C092-9CEB-9693-7AEE69846153}"/>
               </a:ext>
             </a:extLst>
           </p:cNvPr>
           <p:cNvCxnSpPr>
+            <a:cxnSpLocks/>
             <a:stCxn id="7" idx="2"/>
             <a:endCxn id="8" idx="0"/>
           </p:cNvCxnSpPr>
           <p:nvPr/>
         </p:nvCxnSpPr>
         <p:spPr>
-          <a:xfrm>
-            <a:off x="5843873" y="3918577"/>
-            <a:ext cx="0" cy="1223108"/>
+          <a:xfrm flipH="1">
+            <a:off x="3062457" y="3829708"/>
+            <a:ext cx="861" cy="1203375"/>
           </a:xfrm>
           <a:prstGeom prst="straightConnector1">
             <a:avLst/>
@@ -5111,11 +6031,12 @@
           <p:cNvPr id="14" name="Straight Arrow Connector 13">
             <a:extLst>
               <a:ext uri="{FF2B5EF4-FFF2-40B4-BE49-F238E27FC236}">
-                <a16:creationId xmlns:a16="http://schemas.microsoft.com/office/drawing/2014/main" id="{BFCEEE83-AA85-9E96-EB8E-647BDCC4AE58}"/>
+                <a16:creationId xmlns:a16="http://schemas.microsoft.com/office/drawing/2014/main" id="{579376C1-3533-93B1-E0E6-994EED48514F}"/>
               </a:ext>
             </a:extLst>
           </p:cNvPr>
           <p:cNvCxnSpPr>
+            <a:cxnSpLocks/>
             <a:stCxn id="8" idx="2"/>
             <a:endCxn id="9" idx="0"/>
           </p:cNvCxnSpPr>
@@ -5123,8 +6044,8 @@
         </p:nvCxnSpPr>
         <p:spPr>
           <a:xfrm flipH="1">
-            <a:off x="5843872" y="5876791"/>
-            <a:ext cx="1" cy="306672"/>
+            <a:off x="3055401" y="5768189"/>
+            <a:ext cx="7056" cy="347198"/>
           </a:xfrm>
           <a:prstGeom prst="straightConnector1">
             <a:avLst/>
@@ -5153,7 +6074,7 @@
           <p:cNvPr id="15" name="Rectangle 14">
             <a:extLst>
               <a:ext uri="{FF2B5EF4-FFF2-40B4-BE49-F238E27FC236}">
-                <a16:creationId xmlns:a16="http://schemas.microsoft.com/office/drawing/2014/main" id="{2C837AA7-DB93-8516-D467-46662511612B}"/>
+                <a16:creationId xmlns:a16="http://schemas.microsoft.com/office/drawing/2014/main" id="{3B4B58C9-436F-97C5-573C-98DF1BDAD46B}"/>
               </a:ext>
             </a:extLst>
           </p:cNvPr>
@@ -5162,8 +6083,8 @@
         </p:nvSpPr>
         <p:spPr>
           <a:xfrm>
-            <a:off x="4700873" y="996083"/>
-            <a:ext cx="2285999" cy="735106"/>
+            <a:off x="2014376" y="881544"/>
+            <a:ext cx="2096166" cy="735106"/>
           </a:xfrm>
           <a:prstGeom prst="rect">
             <a:avLst/>
@@ -5215,14 +6136,14 @@
           <a:p>
             <a:pPr algn="ctr"/>
             <a:r>
-              <a:rPr lang="en-US" dirty="0">
+              <a:rPr lang="en-US" sz="1600" dirty="0">
                 <a:solidFill>
                   <a:schemeClr val="tx1"/>
                 </a:solidFill>
               </a:rPr>
               <a:t>GetSensorDefinition()</a:t>
             </a:r>
-            <a:endParaRPr lang="en-DE" dirty="0">
+            <a:endParaRPr lang="en-DE" sz="1600" dirty="0">
               <a:solidFill>
                 <a:schemeClr val="tx1"/>
               </a:solidFill>
@@ -5235,7 +6156,7 @@
           <p:cNvPr id="16" name="Straight Arrow Connector 15">
             <a:extLst>
               <a:ext uri="{FF2B5EF4-FFF2-40B4-BE49-F238E27FC236}">
-                <a16:creationId xmlns:a16="http://schemas.microsoft.com/office/drawing/2014/main" id="{52863B99-B692-3742-AF49-D4B7A85DFACD}"/>
+                <a16:creationId xmlns:a16="http://schemas.microsoft.com/office/drawing/2014/main" id="{C0863CDC-7D75-60C2-2C69-5B1D5968A0BF}"/>
               </a:ext>
             </a:extLst>
           </p:cNvPr>
@@ -5248,8 +6169,8 @@
         </p:nvCxnSpPr>
         <p:spPr>
           <a:xfrm>
-            <a:off x="5843873" y="1731189"/>
-            <a:ext cx="0" cy="358588"/>
+            <a:off x="3062459" y="1616650"/>
+            <a:ext cx="1" cy="354105"/>
           </a:xfrm>
           <a:prstGeom prst="straightConnector1">
             <a:avLst/>
@@ -5278,7 +6199,7 @@
           <p:cNvPr id="17" name="Rectangle 16">
             <a:extLst>
               <a:ext uri="{FF2B5EF4-FFF2-40B4-BE49-F238E27FC236}">
-                <a16:creationId xmlns:a16="http://schemas.microsoft.com/office/drawing/2014/main" id="{E990DEA3-8431-C254-88BE-D8721650A365}"/>
+                <a16:creationId xmlns:a16="http://schemas.microsoft.com/office/drawing/2014/main" id="{61906291-42B9-5D67-9FDD-BDFF0B6CAB01}"/>
               </a:ext>
             </a:extLst>
           </p:cNvPr>
@@ -5287,8 +6208,8 @@
         </p:nvSpPr>
         <p:spPr>
           <a:xfrm>
-            <a:off x="2339242" y="3183471"/>
-            <a:ext cx="2285999" cy="735106"/>
+            <a:off x="154843" y="3094602"/>
+            <a:ext cx="1989595" cy="735106"/>
           </a:xfrm>
           <a:prstGeom prst="rect">
             <a:avLst/>
@@ -5340,14 +6261,14 @@
           <a:p>
             <a:pPr algn="ctr"/>
             <a:r>
-              <a:rPr lang="en-US" dirty="0">
+              <a:rPr lang="en-US" sz="1600" dirty="0">
                 <a:solidFill>
                   <a:schemeClr val="tx1"/>
                 </a:solidFill>
               </a:rPr>
               <a:t>GetSensorDefinition()</a:t>
             </a:r>
-            <a:endParaRPr lang="en-DE" dirty="0">
+            <a:endParaRPr lang="en-DE" sz="1600" dirty="0">
               <a:solidFill>
                 <a:schemeClr val="tx1"/>
               </a:solidFill>
@@ -5360,7 +6281,7 @@
           <p:cNvPr id="18" name="Rectangle 17">
             <a:extLst>
               <a:ext uri="{FF2B5EF4-FFF2-40B4-BE49-F238E27FC236}">
-                <a16:creationId xmlns:a16="http://schemas.microsoft.com/office/drawing/2014/main" id="{4E67E427-DBD9-771E-68A5-DE0FA7688ED5}"/>
+                <a16:creationId xmlns:a16="http://schemas.microsoft.com/office/drawing/2014/main" id="{1EC8BCED-0DF2-AAA8-A472-3029209647A8}"/>
               </a:ext>
             </a:extLst>
           </p:cNvPr>
@@ -5369,8 +6290,8 @@
         </p:nvSpPr>
         <p:spPr>
           <a:xfrm>
-            <a:off x="7061391" y="3183471"/>
-            <a:ext cx="2285999" cy="735106"/>
+            <a:off x="3987319" y="3094602"/>
+            <a:ext cx="2016091" cy="735106"/>
           </a:xfrm>
           <a:prstGeom prst="rect">
             <a:avLst/>
@@ -5422,14 +6343,14 @@
           <a:p>
             <a:pPr algn="ctr"/>
             <a:r>
-              <a:rPr lang="en-US" dirty="0">
+              <a:rPr lang="en-US" sz="1600" dirty="0">
                 <a:solidFill>
                   <a:schemeClr val="tx1"/>
                 </a:solidFill>
               </a:rPr>
               <a:t>GetSensorDefinition()</a:t>
             </a:r>
-            <a:endParaRPr lang="en-DE" dirty="0">
+            <a:endParaRPr lang="en-DE" sz="1600" dirty="0">
               <a:solidFill>
                 <a:schemeClr val="tx1"/>
               </a:solidFill>
@@ -5442,7 +6363,7 @@
           <p:cNvPr id="19" name="Rectangle 18">
             <a:extLst>
               <a:ext uri="{FF2B5EF4-FFF2-40B4-BE49-F238E27FC236}">
-                <a16:creationId xmlns:a16="http://schemas.microsoft.com/office/drawing/2014/main" id="{414D812C-505C-DAD7-4399-873FDC9A2D83}"/>
+                <a16:creationId xmlns:a16="http://schemas.microsoft.com/office/drawing/2014/main" id="{9285FE25-0286-E10B-2756-8CB69F685C91}"/>
               </a:ext>
             </a:extLst>
           </p:cNvPr>
@@ -5451,8 +6372,8 @@
         </p:nvSpPr>
         <p:spPr>
           <a:xfrm>
-            <a:off x="3460388" y="4298512"/>
-            <a:ext cx="2285999" cy="735106"/>
+            <a:off x="691419" y="4195021"/>
+            <a:ext cx="1989596" cy="735106"/>
           </a:xfrm>
           <a:prstGeom prst="rect">
             <a:avLst/>
@@ -5504,14 +6425,14 @@
           <a:p>
             <a:pPr algn="ctr"/>
             <a:r>
-              <a:rPr lang="en-US" dirty="0">
+              <a:rPr lang="en-US" sz="1600" dirty="0">
                 <a:solidFill>
                   <a:schemeClr val="tx1"/>
                 </a:solidFill>
               </a:rPr>
               <a:t>GetSensorDefinition()</a:t>
             </a:r>
-            <a:endParaRPr lang="en-DE" dirty="0">
+            <a:endParaRPr lang="en-DE" sz="1600" dirty="0">
               <a:solidFill>
                 <a:schemeClr val="tx1"/>
               </a:solidFill>
@@ -5524,7 +6445,7 @@
           <p:cNvPr id="20" name="Rectangle 19">
             <a:extLst>
               <a:ext uri="{FF2B5EF4-FFF2-40B4-BE49-F238E27FC236}">
-                <a16:creationId xmlns:a16="http://schemas.microsoft.com/office/drawing/2014/main" id="{0432A504-C936-83CD-5A20-DEA4D2B35DDF}"/>
+                <a16:creationId xmlns:a16="http://schemas.microsoft.com/office/drawing/2014/main" id="{7D6D1805-3F14-910C-B6DA-B49BFBF06AC0}"/>
               </a:ext>
             </a:extLst>
           </p:cNvPr>
@@ -5533,7 +6454,7 @@
         </p:nvSpPr>
         <p:spPr>
           <a:xfrm>
-            <a:off x="5960411" y="4277165"/>
+            <a:off x="3400243" y="4195021"/>
             <a:ext cx="2285999" cy="735106"/>
           </a:xfrm>
           <a:prstGeom prst="rect">
@@ -5586,14 +6507,14 @@
           <a:p>
             <a:pPr algn="ctr"/>
             <a:r>
-              <a:rPr lang="en-US" dirty="0">
+              <a:rPr lang="en-US" sz="1600" dirty="0">
                 <a:solidFill>
                   <a:schemeClr val="tx1"/>
                 </a:solidFill>
               </a:rPr>
               <a:t>GetSensorDefinition()</a:t>
             </a:r>
-            <a:endParaRPr lang="en-DE" dirty="0">
+            <a:endParaRPr lang="en-DE" sz="1600" dirty="0">
               <a:solidFill>
                 <a:schemeClr val="tx1"/>
               </a:solidFill>
@@ -5606,11 +6527,12 @@
           <p:cNvPr id="21" name="Straight Arrow Connector 20">
             <a:extLst>
               <a:ext uri="{FF2B5EF4-FFF2-40B4-BE49-F238E27FC236}">
-                <a16:creationId xmlns:a16="http://schemas.microsoft.com/office/drawing/2014/main" id="{F06AAADF-261C-974C-F0BE-A0C62F4F4A82}"/>
+                <a16:creationId xmlns:a16="http://schemas.microsoft.com/office/drawing/2014/main" id="{31264F20-1B02-8383-8DC2-43CBEC3ADC8A}"/>
               </a:ext>
             </a:extLst>
           </p:cNvPr>
           <p:cNvCxnSpPr>
+            <a:cxnSpLocks/>
             <a:stCxn id="7" idx="1"/>
             <a:endCxn id="17" idx="3"/>
           </p:cNvCxnSpPr>
@@ -5618,8 +6540,8 @@
         </p:nvCxnSpPr>
         <p:spPr>
           <a:xfrm flipH="1">
-            <a:off x="4625241" y="3551024"/>
-            <a:ext cx="362503" cy="0"/>
+            <a:off x="2144438" y="3462155"/>
+            <a:ext cx="226356" cy="0"/>
           </a:xfrm>
           <a:prstGeom prst="straightConnector1">
             <a:avLst/>
@@ -5648,11 +6570,12 @@
           <p:cNvPr id="22" name="Straight Arrow Connector 21">
             <a:extLst>
               <a:ext uri="{FF2B5EF4-FFF2-40B4-BE49-F238E27FC236}">
-                <a16:creationId xmlns:a16="http://schemas.microsoft.com/office/drawing/2014/main" id="{828B5D21-D58A-4AA5-615B-75A2C185E54B}"/>
+                <a16:creationId xmlns:a16="http://schemas.microsoft.com/office/drawing/2014/main" id="{F12AB711-68BF-D6D7-8082-E57AAA9FB3E2}"/>
               </a:ext>
             </a:extLst>
           </p:cNvPr>
           <p:cNvCxnSpPr>
+            <a:cxnSpLocks/>
             <a:stCxn id="7" idx="3"/>
             <a:endCxn id="18" idx="1"/>
           </p:cNvCxnSpPr>
@@ -5660,8 +6583,8 @@
         </p:nvCxnSpPr>
         <p:spPr>
           <a:xfrm>
-            <a:off x="6700002" y="3551024"/>
-            <a:ext cx="361389" cy="0"/>
+            <a:off x="3755841" y="3462155"/>
+            <a:ext cx="231478" cy="0"/>
           </a:xfrm>
           <a:prstGeom prst="straightConnector1">
             <a:avLst/>
@@ -5690,11 +6613,12 @@
           <p:cNvPr id="23" name="Straight Arrow Connector 22">
             <a:extLst>
               <a:ext uri="{FF2B5EF4-FFF2-40B4-BE49-F238E27FC236}">
-                <a16:creationId xmlns:a16="http://schemas.microsoft.com/office/drawing/2014/main" id="{578E79DA-E998-C547-3209-87DA98B56673}"/>
+                <a16:creationId xmlns:a16="http://schemas.microsoft.com/office/drawing/2014/main" id="{3F554B25-86DF-E91D-3B4B-1846A2210000}"/>
               </a:ext>
             </a:extLst>
           </p:cNvPr>
           <p:cNvCxnSpPr>
+            <a:cxnSpLocks/>
             <a:stCxn id="7" idx="2"/>
             <a:endCxn id="19" idx="0"/>
           </p:cNvCxnSpPr>
@@ -5702,8 +6626,8 @@
         </p:nvCxnSpPr>
         <p:spPr>
           <a:xfrm flipH="1">
-            <a:off x="4603388" y="3918577"/>
-            <a:ext cx="1240485" cy="379935"/>
+            <a:off x="1686217" y="3829708"/>
+            <a:ext cx="1377101" cy="365313"/>
           </a:xfrm>
           <a:prstGeom prst="straightConnector1">
             <a:avLst/>
@@ -5732,11 +6656,12 @@
           <p:cNvPr id="24" name="Straight Arrow Connector 23">
             <a:extLst>
               <a:ext uri="{FF2B5EF4-FFF2-40B4-BE49-F238E27FC236}">
-                <a16:creationId xmlns:a16="http://schemas.microsoft.com/office/drawing/2014/main" id="{D09B6EC6-E305-E4D2-3C19-F2DA23C56667}"/>
+                <a16:creationId xmlns:a16="http://schemas.microsoft.com/office/drawing/2014/main" id="{11E51FD0-D870-CE52-4250-2BB9DD21D42E}"/>
               </a:ext>
             </a:extLst>
           </p:cNvPr>
           <p:cNvCxnSpPr>
+            <a:cxnSpLocks/>
             <a:stCxn id="7" idx="2"/>
             <a:endCxn id="20" idx="0"/>
           </p:cNvCxnSpPr>
@@ -5744,8 +6669,878 @@
         </p:nvCxnSpPr>
         <p:spPr>
           <a:xfrm>
-            <a:off x="5843873" y="3918577"/>
-            <a:ext cx="1259538" cy="358588"/>
+            <a:off x="3063318" y="3829708"/>
+            <a:ext cx="1479925" cy="365313"/>
+          </a:xfrm>
+          <a:prstGeom prst="straightConnector1">
+            <a:avLst/>
+          </a:prstGeom>
+          <a:ln>
+            <a:tailEnd type="triangle"/>
+          </a:ln>
+        </p:spPr>
+        <p:style>
+          <a:lnRef idx="1">
+            <a:schemeClr val="accent1"/>
+          </a:lnRef>
+          <a:fillRef idx="0">
+            <a:schemeClr val="accent1"/>
+          </a:fillRef>
+          <a:effectRef idx="0">
+            <a:schemeClr val="accent1"/>
+          </a:effectRef>
+          <a:fontRef idx="minor">
+            <a:schemeClr val="tx1"/>
+          </a:fontRef>
+        </p:style>
+      </p:cxnSp>
+      <p:sp>
+        <p:nvSpPr>
+          <p:cNvPr id="2" name="Oval 1">
+            <a:extLst>
+              <a:ext uri="{FF2B5EF4-FFF2-40B4-BE49-F238E27FC236}">
+                <a16:creationId xmlns:a16="http://schemas.microsoft.com/office/drawing/2014/main" id="{28E8DB62-9018-1091-2D72-4D6C23187A22}"/>
+              </a:ext>
+            </a:extLst>
+          </p:cNvPr>
+          <p:cNvSpPr/>
+          <p:nvPr/>
+        </p:nvSpPr>
+        <p:spPr>
+          <a:xfrm>
+            <a:off x="8436159" y="460583"/>
+            <a:ext cx="233083" cy="249810"/>
+          </a:xfrm>
+          <a:prstGeom prst="ellipse">
+            <a:avLst/>
+          </a:prstGeom>
+        </p:spPr>
+        <p:style>
+          <a:lnRef idx="2">
+            <a:schemeClr val="dk1">
+              <a:shade val="50000"/>
+            </a:schemeClr>
+          </a:lnRef>
+          <a:fillRef idx="1">
+            <a:schemeClr val="dk1"/>
+          </a:fillRef>
+          <a:effectRef idx="0">
+            <a:schemeClr val="dk1"/>
+          </a:effectRef>
+          <a:fontRef idx="minor">
+            <a:schemeClr val="lt1"/>
+          </a:fontRef>
+        </p:style>
+        <p:txBody>
+          <a:bodyPr rtlCol="0" anchor="ctr"/>
+          <a:lstStyle/>
+          <a:p>
+            <a:pPr algn="ctr"/>
+            <a:endParaRPr lang="en-DE"/>
+          </a:p>
+        </p:txBody>
+      </p:sp>
+      <p:sp>
+        <p:nvSpPr>
+          <p:cNvPr id="3" name="TextBox 2">
+            <a:extLst>
+              <a:ext uri="{FF2B5EF4-FFF2-40B4-BE49-F238E27FC236}">
+                <a16:creationId xmlns:a16="http://schemas.microsoft.com/office/drawing/2014/main" id="{4F3D1826-1146-ACE0-5DFC-CA3B3507A7D7}"/>
+              </a:ext>
+            </a:extLst>
+          </p:cNvPr>
+          <p:cNvSpPr txBox="1"/>
+          <p:nvPr/>
+        </p:nvSpPr>
+        <p:spPr>
+          <a:xfrm>
+            <a:off x="8122393" y="117731"/>
+            <a:ext cx="1089214" cy="338554"/>
+          </a:xfrm>
+          <a:prstGeom prst="rect">
+            <a:avLst/>
+          </a:prstGeom>
+          <a:noFill/>
+        </p:spPr>
+        <p:txBody>
+          <a:bodyPr wrap="square" rtlCol="0">
+            <a:spAutoFit/>
+          </a:bodyPr>
+          <a:lstStyle/>
+          <a:p>
+            <a:r>
+              <a:rPr lang="en-US" sz="1600" dirty="0"/>
+              <a:t>Every tick</a:t>
+            </a:r>
+            <a:endParaRPr lang="en-DE" sz="1600" dirty="0"/>
+          </a:p>
+        </p:txBody>
+      </p:sp>
+      <p:sp>
+        <p:nvSpPr>
+          <p:cNvPr id="25" name="Rectangle 24">
+            <a:extLst>
+              <a:ext uri="{FF2B5EF4-FFF2-40B4-BE49-F238E27FC236}">
+                <a16:creationId xmlns:a16="http://schemas.microsoft.com/office/drawing/2014/main" id="{9B4D1A41-0C38-C65B-396D-BACD7883E4B0}"/>
+              </a:ext>
+            </a:extLst>
+          </p:cNvPr>
+          <p:cNvSpPr/>
+          <p:nvPr/>
+        </p:nvSpPr>
+        <p:spPr>
+          <a:xfrm>
+            <a:off x="7670239" y="1084258"/>
+            <a:ext cx="1764924" cy="735106"/>
+          </a:xfrm>
+          <a:prstGeom prst="rect">
+            <a:avLst/>
+          </a:prstGeom>
+          <a:gradFill flip="none" rotWithShape="1">
+            <a:gsLst>
+              <a:gs pos="0">
+                <a:schemeClr val="accent4">
+                  <a:lumMod val="67000"/>
+                </a:schemeClr>
+              </a:gs>
+              <a:gs pos="48000">
+                <a:schemeClr val="accent4">
+                  <a:lumMod val="97000"/>
+                  <a:lumOff val="3000"/>
+                </a:schemeClr>
+              </a:gs>
+              <a:gs pos="100000">
+                <a:schemeClr val="accent4">
+                  <a:lumMod val="60000"/>
+                  <a:lumOff val="40000"/>
+                </a:schemeClr>
+              </a:gs>
+            </a:gsLst>
+            <a:lin ang="16200000" scaled="1"/>
+            <a:tileRect/>
+          </a:gradFill>
+          <a:ln>
+            <a:noFill/>
+          </a:ln>
+        </p:spPr>
+        <p:style>
+          <a:lnRef idx="0">
+            <a:scrgbClr r="0" g="0" b="0"/>
+          </a:lnRef>
+          <a:fillRef idx="0">
+            <a:scrgbClr r="0" g="0" b="0"/>
+          </a:fillRef>
+          <a:effectRef idx="0">
+            <a:scrgbClr r="0" g="0" b="0"/>
+          </a:effectRef>
+          <a:fontRef idx="minor">
+            <a:schemeClr val="lt1"/>
+          </a:fontRef>
+        </p:style>
+        <p:txBody>
+          <a:bodyPr rtlCol="0" anchor="ctr"/>
+          <a:lstStyle/>
+          <a:p>
+            <a:pPr algn="ctr"/>
+            <a:r>
+              <a:rPr lang="en-US" sz="1600" dirty="0">
+                <a:solidFill>
+                  <a:srgbClr val="000000"/>
+                </a:solidFill>
+                <a:latin typeface="Consolas" panose="020B0609020204030204" pitchFamily="49" charset="0"/>
+              </a:rPr>
+              <a:t>PostPhysTick()</a:t>
+            </a:r>
+            <a:endParaRPr lang="en-DE" sz="1600" dirty="0">
+              <a:solidFill>
+                <a:schemeClr val="tx1"/>
+              </a:solidFill>
+            </a:endParaRPr>
+          </a:p>
+        </p:txBody>
+      </p:sp>
+      <p:cxnSp>
+        <p:nvCxnSpPr>
+          <p:cNvPr id="26" name="Straight Arrow Connector 25">
+            <a:extLst>
+              <a:ext uri="{FF2B5EF4-FFF2-40B4-BE49-F238E27FC236}">
+                <a16:creationId xmlns:a16="http://schemas.microsoft.com/office/drawing/2014/main" id="{864BC9C9-E71A-8A98-1ED4-4D88CDCFFF00}"/>
+              </a:ext>
+            </a:extLst>
+          </p:cNvPr>
+          <p:cNvCxnSpPr>
+            <a:cxnSpLocks/>
+            <a:stCxn id="2" idx="4"/>
+            <a:endCxn id="25" idx="0"/>
+          </p:cNvCxnSpPr>
+          <p:nvPr/>
+        </p:nvCxnSpPr>
+        <p:spPr>
+          <a:xfrm>
+            <a:off x="8552701" y="710393"/>
+            <a:ext cx="0" cy="373865"/>
+          </a:xfrm>
+          <a:prstGeom prst="straightConnector1">
+            <a:avLst/>
+          </a:prstGeom>
+          <a:ln>
+            <a:tailEnd type="triangle"/>
+          </a:ln>
+        </p:spPr>
+        <p:style>
+          <a:lnRef idx="1">
+            <a:schemeClr val="accent1"/>
+          </a:lnRef>
+          <a:fillRef idx="0">
+            <a:schemeClr val="accent1"/>
+          </a:fillRef>
+          <a:effectRef idx="0">
+            <a:schemeClr val="accent1"/>
+          </a:effectRef>
+          <a:fontRef idx="minor">
+            <a:schemeClr val="tx1"/>
+          </a:fontRef>
+        </p:style>
+      </p:cxnSp>
+      <p:sp>
+        <p:nvSpPr>
+          <p:cNvPr id="27" name="Rectangle 26">
+            <a:extLst>
+              <a:ext uri="{FF2B5EF4-FFF2-40B4-BE49-F238E27FC236}">
+                <a16:creationId xmlns:a16="http://schemas.microsoft.com/office/drawing/2014/main" id="{5856942C-BB14-F652-F83F-C8075667D0C6}"/>
+              </a:ext>
+            </a:extLst>
+          </p:cNvPr>
+          <p:cNvSpPr/>
+          <p:nvPr/>
+        </p:nvSpPr>
+        <p:spPr>
+          <a:xfrm>
+            <a:off x="8923049" y="2216374"/>
+            <a:ext cx="3132422" cy="735106"/>
+          </a:xfrm>
+          <a:prstGeom prst="rect">
+            <a:avLst/>
+          </a:prstGeom>
+          <a:gradFill flip="none" rotWithShape="1">
+            <a:gsLst>
+              <a:gs pos="0">
+                <a:schemeClr val="accent4">
+                  <a:lumMod val="67000"/>
+                </a:schemeClr>
+              </a:gs>
+              <a:gs pos="48000">
+                <a:schemeClr val="accent4">
+                  <a:lumMod val="97000"/>
+                  <a:lumOff val="3000"/>
+                </a:schemeClr>
+              </a:gs>
+              <a:gs pos="100000">
+                <a:schemeClr val="accent4">
+                  <a:lumMod val="60000"/>
+                  <a:lumOff val="40000"/>
+                </a:schemeClr>
+              </a:gs>
+            </a:gsLst>
+            <a:lin ang="16200000" scaled="1"/>
+            <a:tileRect/>
+          </a:gradFill>
+          <a:ln>
+            <a:noFill/>
+          </a:ln>
+        </p:spPr>
+        <p:style>
+          <a:lnRef idx="0">
+            <a:scrgbClr r="0" g="0" b="0"/>
+          </a:lnRef>
+          <a:fillRef idx="0">
+            <a:scrgbClr r="0" g="0" b="0"/>
+          </a:fillRef>
+          <a:effectRef idx="0">
+            <a:scrgbClr r="0" g="0" b="0"/>
+          </a:effectRef>
+          <a:fontRef idx="minor">
+            <a:schemeClr val="lt1"/>
+          </a:fontRef>
+        </p:style>
+        <p:txBody>
+          <a:bodyPr rtlCol="0" anchor="ctr"/>
+          <a:lstStyle/>
+          <a:p>
+            <a:pPr algn="ctr"/>
+            <a:r>
+              <a:rPr lang="en-US" sz="1600" dirty="0">
+                <a:solidFill>
+                  <a:srgbClr val="000000"/>
+                </a:solidFill>
+                <a:latin typeface="Consolas" panose="020B0609020204030204" pitchFamily="49" charset="0"/>
+              </a:rPr>
+              <a:t>CalculateCurrentVelocity</a:t>
+            </a:r>
+            <a:r>
+              <a:rPr lang="en-US" sz="1800" dirty="0">
+                <a:solidFill>
+                  <a:srgbClr val="000000"/>
+                </a:solidFill>
+                <a:latin typeface="Consolas" panose="020B0609020204030204" pitchFamily="49" charset="0"/>
+              </a:rPr>
+              <a:t>()</a:t>
+            </a:r>
+            <a:endParaRPr lang="en-DE" dirty="0">
+              <a:solidFill>
+                <a:schemeClr val="tx1"/>
+              </a:solidFill>
+            </a:endParaRPr>
+          </a:p>
+        </p:txBody>
+      </p:sp>
+      <p:sp>
+        <p:nvSpPr>
+          <p:cNvPr id="28" name="Rectangle 27">
+            <a:extLst>
+              <a:ext uri="{FF2B5EF4-FFF2-40B4-BE49-F238E27FC236}">
+                <a16:creationId xmlns:a16="http://schemas.microsoft.com/office/drawing/2014/main" id="{C2AC0239-C751-D495-7E0B-5B6ED3380660}"/>
+              </a:ext>
+            </a:extLst>
+          </p:cNvPr>
+          <p:cNvSpPr/>
+          <p:nvPr/>
+        </p:nvSpPr>
+        <p:spPr>
+          <a:xfrm>
+            <a:off x="6133919" y="2216374"/>
+            <a:ext cx="2048434" cy="735106"/>
+          </a:xfrm>
+          <a:prstGeom prst="rect">
+            <a:avLst/>
+          </a:prstGeom>
+          <a:gradFill flip="none" rotWithShape="1">
+            <a:gsLst>
+              <a:gs pos="0">
+                <a:schemeClr val="accent4">
+                  <a:lumMod val="67000"/>
+                </a:schemeClr>
+              </a:gs>
+              <a:gs pos="48000">
+                <a:schemeClr val="accent4">
+                  <a:lumMod val="97000"/>
+                  <a:lumOff val="3000"/>
+                </a:schemeClr>
+              </a:gs>
+              <a:gs pos="100000">
+                <a:schemeClr val="accent4">
+                  <a:lumMod val="60000"/>
+                  <a:lumOff val="40000"/>
+                </a:schemeClr>
+              </a:gs>
+            </a:gsLst>
+            <a:lin ang="16200000" scaled="1"/>
+            <a:tileRect/>
+          </a:gradFill>
+          <a:ln>
+            <a:noFill/>
+          </a:ln>
+        </p:spPr>
+        <p:style>
+          <a:lnRef idx="0">
+            <a:scrgbClr r="0" g="0" b="0"/>
+          </a:lnRef>
+          <a:fillRef idx="0">
+            <a:scrgbClr r="0" g="0" b="0"/>
+          </a:fillRef>
+          <a:effectRef idx="0">
+            <a:scrgbClr r="0" g="0" b="0"/>
+          </a:effectRef>
+          <a:fontRef idx="minor">
+            <a:schemeClr val="lt1"/>
+          </a:fontRef>
+        </p:style>
+        <p:txBody>
+          <a:bodyPr rtlCol="0" anchor="ctr"/>
+          <a:lstStyle/>
+          <a:p>
+            <a:pPr algn="ctr"/>
+            <a:r>
+              <a:rPr lang="en-US" sz="1600" dirty="0">
+                <a:solidFill>
+                  <a:srgbClr val="000000"/>
+                </a:solidFill>
+                <a:latin typeface="Consolas" panose="020B0609020204030204" pitchFamily="49" charset="0"/>
+              </a:rPr>
+              <a:t>DataStream.Send</a:t>
+            </a:r>
+            <a:r>
+              <a:rPr lang="en-US" sz="1600" dirty="0">
+                <a:solidFill>
+                  <a:schemeClr val="tx1"/>
+                </a:solidFill>
+              </a:rPr>
+              <a:t>()</a:t>
+            </a:r>
+            <a:endParaRPr lang="en-DE" sz="1600" dirty="0">
+              <a:solidFill>
+                <a:schemeClr val="tx1"/>
+              </a:solidFill>
+            </a:endParaRPr>
+          </a:p>
+        </p:txBody>
+      </p:sp>
+      <p:cxnSp>
+        <p:nvCxnSpPr>
+          <p:cNvPr id="29" name="Straight Arrow Connector 28">
+            <a:extLst>
+              <a:ext uri="{FF2B5EF4-FFF2-40B4-BE49-F238E27FC236}">
+                <a16:creationId xmlns:a16="http://schemas.microsoft.com/office/drawing/2014/main" id="{E9385C5F-6E6B-3927-0A3C-53C328800CD0}"/>
+              </a:ext>
+            </a:extLst>
+          </p:cNvPr>
+          <p:cNvCxnSpPr>
+            <a:cxnSpLocks/>
+            <a:stCxn id="25" idx="2"/>
+            <a:endCxn id="27" idx="0"/>
+          </p:cNvCxnSpPr>
+          <p:nvPr/>
+        </p:nvCxnSpPr>
+        <p:spPr>
+          <a:xfrm>
+            <a:off x="8552701" y="1819364"/>
+            <a:ext cx="1936559" cy="397010"/>
+          </a:xfrm>
+          <a:prstGeom prst="straightConnector1">
+            <a:avLst/>
+          </a:prstGeom>
+          <a:ln>
+            <a:tailEnd type="triangle"/>
+          </a:ln>
+        </p:spPr>
+        <p:style>
+          <a:lnRef idx="1">
+            <a:schemeClr val="accent1"/>
+          </a:lnRef>
+          <a:fillRef idx="0">
+            <a:schemeClr val="accent1"/>
+          </a:fillRef>
+          <a:effectRef idx="0">
+            <a:schemeClr val="accent1"/>
+          </a:effectRef>
+          <a:fontRef idx="minor">
+            <a:schemeClr val="tx1"/>
+          </a:fontRef>
+        </p:style>
+      </p:cxnSp>
+      <p:cxnSp>
+        <p:nvCxnSpPr>
+          <p:cNvPr id="30" name="Straight Arrow Connector 29">
+            <a:extLst>
+              <a:ext uri="{FF2B5EF4-FFF2-40B4-BE49-F238E27FC236}">
+                <a16:creationId xmlns:a16="http://schemas.microsoft.com/office/drawing/2014/main" id="{E2F2785E-0F86-6E9C-F217-F95B629FCC2E}"/>
+              </a:ext>
+            </a:extLst>
+          </p:cNvPr>
+          <p:cNvCxnSpPr>
+            <a:cxnSpLocks/>
+            <a:stCxn id="25" idx="2"/>
+            <a:endCxn id="28" idx="0"/>
+          </p:cNvCxnSpPr>
+          <p:nvPr/>
+        </p:nvCxnSpPr>
+        <p:spPr>
+          <a:xfrm flipH="1">
+            <a:off x="7158136" y="1819364"/>
+            <a:ext cx="1394565" cy="397010"/>
+          </a:xfrm>
+          <a:prstGeom prst="straightConnector1">
+            <a:avLst/>
+          </a:prstGeom>
+          <a:ln>
+            <a:tailEnd type="triangle"/>
+          </a:ln>
+        </p:spPr>
+        <p:style>
+          <a:lnRef idx="1">
+            <a:schemeClr val="accent1"/>
+          </a:lnRef>
+          <a:fillRef idx="0">
+            <a:schemeClr val="accent1"/>
+          </a:fillRef>
+          <a:effectRef idx="0">
+            <a:schemeClr val="accent1"/>
+          </a:effectRef>
+          <a:fontRef idx="minor">
+            <a:schemeClr val="tx1"/>
+          </a:fontRef>
+        </p:style>
+      </p:cxnSp>
+      <p:sp>
+        <p:nvSpPr>
+          <p:cNvPr id="31" name="Rectangle 30">
+            <a:extLst>
+              <a:ext uri="{FF2B5EF4-FFF2-40B4-BE49-F238E27FC236}">
+                <a16:creationId xmlns:a16="http://schemas.microsoft.com/office/drawing/2014/main" id="{3A45538A-C3C1-4288-9D1E-9500B884C6F0}"/>
+              </a:ext>
+            </a:extLst>
+          </p:cNvPr>
+          <p:cNvSpPr/>
+          <p:nvPr/>
+        </p:nvSpPr>
+        <p:spPr>
+          <a:xfrm>
+            <a:off x="7570506" y="3143305"/>
+            <a:ext cx="1964390" cy="735106"/>
+          </a:xfrm>
+          <a:prstGeom prst="rect">
+            <a:avLst/>
+          </a:prstGeom>
+          <a:gradFill flip="none" rotWithShape="1">
+            <a:gsLst>
+              <a:gs pos="0">
+                <a:schemeClr val="accent4">
+                  <a:lumMod val="67000"/>
+                </a:schemeClr>
+              </a:gs>
+              <a:gs pos="48000">
+                <a:schemeClr val="accent4">
+                  <a:lumMod val="97000"/>
+                  <a:lumOff val="3000"/>
+                </a:schemeClr>
+              </a:gs>
+              <a:gs pos="100000">
+                <a:schemeClr val="accent4">
+                  <a:lumMod val="60000"/>
+                  <a:lumOff val="40000"/>
+                </a:schemeClr>
+              </a:gs>
+            </a:gsLst>
+            <a:lin ang="16200000" scaled="1"/>
+            <a:tileRect/>
+          </a:gradFill>
+          <a:ln>
+            <a:noFill/>
+          </a:ln>
+        </p:spPr>
+        <p:style>
+          <a:lnRef idx="0">
+            <a:scrgbClr r="0" g="0" b="0"/>
+          </a:lnRef>
+          <a:fillRef idx="0">
+            <a:scrgbClr r="0" g="0" b="0"/>
+          </a:fillRef>
+          <a:effectRef idx="0">
+            <a:scrgbClr r="0" g="0" b="0"/>
+          </a:effectRef>
+          <a:fontRef idx="minor">
+            <a:schemeClr val="lt1"/>
+          </a:fontRef>
+        </p:style>
+        <p:txBody>
+          <a:bodyPr rtlCol="0" anchor="ctr"/>
+          <a:lstStyle/>
+          <a:p>
+            <a:pPr algn="ctr"/>
+            <a:r>
+              <a:rPr lang="en-US" sz="1600" dirty="0">
+                <a:solidFill>
+                  <a:srgbClr val="000000"/>
+                </a:solidFill>
+                <a:latin typeface="Consolas" panose="020B0609020204030204" pitchFamily="49" charset="0"/>
+              </a:rPr>
+              <a:t>SendLineTraces</a:t>
+            </a:r>
+            <a:r>
+              <a:rPr lang="en-US" sz="1600" dirty="0">
+                <a:solidFill>
+                  <a:schemeClr val="tx1"/>
+                </a:solidFill>
+              </a:rPr>
+              <a:t>()</a:t>
+            </a:r>
+            <a:endParaRPr lang="en-DE" sz="1600" dirty="0">
+              <a:solidFill>
+                <a:schemeClr val="tx1"/>
+              </a:solidFill>
+            </a:endParaRPr>
+          </a:p>
+        </p:txBody>
+      </p:sp>
+      <p:sp>
+        <p:nvSpPr>
+          <p:cNvPr id="32" name="Rectangle 31">
+            <a:extLst>
+              <a:ext uri="{FF2B5EF4-FFF2-40B4-BE49-F238E27FC236}">
+                <a16:creationId xmlns:a16="http://schemas.microsoft.com/office/drawing/2014/main" id="{97044EE6-3803-F7BB-6168-F1408A2D9508}"/>
+              </a:ext>
+            </a:extLst>
+          </p:cNvPr>
+          <p:cNvSpPr/>
+          <p:nvPr/>
+        </p:nvSpPr>
+        <p:spPr>
+          <a:xfrm>
+            <a:off x="6986490" y="4195021"/>
+            <a:ext cx="3132422" cy="735106"/>
+          </a:xfrm>
+          <a:prstGeom prst="rect">
+            <a:avLst/>
+          </a:prstGeom>
+          <a:gradFill flip="none" rotWithShape="1">
+            <a:gsLst>
+              <a:gs pos="0">
+                <a:schemeClr val="accent4">
+                  <a:lumMod val="67000"/>
+                </a:schemeClr>
+              </a:gs>
+              <a:gs pos="48000">
+                <a:schemeClr val="accent4">
+                  <a:lumMod val="97000"/>
+                  <a:lumOff val="3000"/>
+                </a:schemeClr>
+              </a:gs>
+              <a:gs pos="100000">
+                <a:schemeClr val="accent4">
+                  <a:lumMod val="60000"/>
+                  <a:lumOff val="40000"/>
+                </a:schemeClr>
+              </a:gs>
+            </a:gsLst>
+            <a:lin ang="16200000" scaled="1"/>
+            <a:tileRect/>
+          </a:gradFill>
+          <a:ln>
+            <a:noFill/>
+          </a:ln>
+        </p:spPr>
+        <p:style>
+          <a:lnRef idx="0">
+            <a:scrgbClr r="0" g="0" b="0"/>
+          </a:lnRef>
+          <a:fillRef idx="0">
+            <a:scrgbClr r="0" g="0" b="0"/>
+          </a:fillRef>
+          <a:effectRef idx="0">
+            <a:scrgbClr r="0" g="0" b="0"/>
+          </a:effectRef>
+          <a:fontRef idx="minor">
+            <a:schemeClr val="lt1"/>
+          </a:fontRef>
+        </p:style>
+        <p:txBody>
+          <a:bodyPr rtlCol="0" anchor="ctr"/>
+          <a:lstStyle/>
+          <a:p>
+            <a:pPr algn="ctr"/>
+            <a:r>
+              <a:rPr lang="en-US" sz="1600" dirty="0">
+                <a:solidFill>
+                  <a:srgbClr val="000000"/>
+                </a:solidFill>
+                <a:latin typeface="Consolas" panose="020B0609020204030204" pitchFamily="49" charset="0"/>
+              </a:rPr>
+              <a:t>CalculateRelativeVelocity</a:t>
+            </a:r>
+            <a:r>
+              <a:rPr lang="en-US" sz="1600" dirty="0">
+                <a:solidFill>
+                  <a:schemeClr val="tx1"/>
+                </a:solidFill>
+              </a:rPr>
+              <a:t>()</a:t>
+            </a:r>
+            <a:endParaRPr lang="en-DE" sz="1600" dirty="0">
+              <a:solidFill>
+                <a:schemeClr val="tx1"/>
+              </a:solidFill>
+            </a:endParaRPr>
+          </a:p>
+        </p:txBody>
+      </p:sp>
+      <p:cxnSp>
+        <p:nvCxnSpPr>
+          <p:cNvPr id="33" name="Straight Arrow Connector 32">
+            <a:extLst>
+              <a:ext uri="{FF2B5EF4-FFF2-40B4-BE49-F238E27FC236}">
+                <a16:creationId xmlns:a16="http://schemas.microsoft.com/office/drawing/2014/main" id="{7E46CE71-9DD5-DEF1-F541-B04DCACCA39B}"/>
+              </a:ext>
+            </a:extLst>
+          </p:cNvPr>
+          <p:cNvCxnSpPr>
+            <a:cxnSpLocks/>
+            <a:stCxn id="25" idx="2"/>
+            <a:endCxn id="31" idx="0"/>
+          </p:cNvCxnSpPr>
+          <p:nvPr/>
+        </p:nvCxnSpPr>
+        <p:spPr>
+          <a:xfrm>
+            <a:off x="8552701" y="1819364"/>
+            <a:ext cx="0" cy="1323941"/>
+          </a:xfrm>
+          <a:prstGeom prst="straightConnector1">
+            <a:avLst/>
+          </a:prstGeom>
+          <a:ln>
+            <a:tailEnd type="triangle"/>
+          </a:ln>
+        </p:spPr>
+        <p:style>
+          <a:lnRef idx="1">
+            <a:schemeClr val="accent1"/>
+          </a:lnRef>
+          <a:fillRef idx="0">
+            <a:schemeClr val="accent1"/>
+          </a:fillRef>
+          <a:effectRef idx="0">
+            <a:schemeClr val="accent1"/>
+          </a:effectRef>
+          <a:fontRef idx="minor">
+            <a:schemeClr val="tx1"/>
+          </a:fontRef>
+        </p:style>
+      </p:cxnSp>
+      <p:cxnSp>
+        <p:nvCxnSpPr>
+          <p:cNvPr id="34" name="Straight Arrow Connector 33">
+            <a:extLst>
+              <a:ext uri="{FF2B5EF4-FFF2-40B4-BE49-F238E27FC236}">
+                <a16:creationId xmlns:a16="http://schemas.microsoft.com/office/drawing/2014/main" id="{45063595-B966-F7A2-7B33-3A8740D56748}"/>
+              </a:ext>
+            </a:extLst>
+          </p:cNvPr>
+          <p:cNvCxnSpPr>
+            <a:cxnSpLocks/>
+            <a:stCxn id="31" idx="2"/>
+            <a:endCxn id="32" idx="0"/>
+          </p:cNvCxnSpPr>
+          <p:nvPr/>
+        </p:nvCxnSpPr>
+        <p:spPr>
+          <a:xfrm>
+            <a:off x="8552701" y="3878411"/>
+            <a:ext cx="0" cy="316610"/>
+          </a:xfrm>
+          <a:prstGeom prst="straightConnector1">
+            <a:avLst/>
+          </a:prstGeom>
+          <a:ln>
+            <a:tailEnd type="triangle"/>
+          </a:ln>
+        </p:spPr>
+        <p:style>
+          <a:lnRef idx="1">
+            <a:schemeClr val="accent1"/>
+          </a:lnRef>
+          <a:fillRef idx="0">
+            <a:schemeClr val="accent1"/>
+          </a:fillRef>
+          <a:effectRef idx="0">
+            <a:schemeClr val="accent1"/>
+          </a:effectRef>
+          <a:fontRef idx="minor">
+            <a:schemeClr val="tx1"/>
+          </a:fontRef>
+        </p:style>
+      </p:cxnSp>
+      <p:sp>
+        <p:nvSpPr>
+          <p:cNvPr id="35" name="Oval 34">
+            <a:extLst>
+              <a:ext uri="{FF2B5EF4-FFF2-40B4-BE49-F238E27FC236}">
+                <a16:creationId xmlns:a16="http://schemas.microsoft.com/office/drawing/2014/main" id="{92ED4CEF-7C83-4822-EE68-4EA42D1A7285}"/>
+              </a:ext>
+            </a:extLst>
+          </p:cNvPr>
+          <p:cNvSpPr/>
+          <p:nvPr/>
+        </p:nvSpPr>
+        <p:spPr>
+          <a:xfrm>
+            <a:off x="8436159" y="5317472"/>
+            <a:ext cx="233083" cy="249810"/>
+          </a:xfrm>
+          <a:prstGeom prst="ellipse">
+            <a:avLst/>
+          </a:prstGeom>
+        </p:spPr>
+        <p:style>
+          <a:lnRef idx="2">
+            <a:schemeClr val="dk1">
+              <a:shade val="50000"/>
+            </a:schemeClr>
+          </a:lnRef>
+          <a:fillRef idx="1">
+            <a:schemeClr val="dk1"/>
+          </a:fillRef>
+          <a:effectRef idx="0">
+            <a:schemeClr val="dk1"/>
+          </a:effectRef>
+          <a:fontRef idx="minor">
+            <a:schemeClr val="lt1"/>
+          </a:fontRef>
+        </p:style>
+        <p:txBody>
+          <a:bodyPr rtlCol="0" anchor="ctr"/>
+          <a:lstStyle/>
+          <a:p>
+            <a:pPr algn="ctr"/>
+            <a:endParaRPr lang="en-DE"/>
+          </a:p>
+        </p:txBody>
+      </p:sp>
+      <p:sp>
+        <p:nvSpPr>
+          <p:cNvPr id="36" name="TextBox 35">
+            <a:extLst>
+              <a:ext uri="{FF2B5EF4-FFF2-40B4-BE49-F238E27FC236}">
+                <a16:creationId xmlns:a16="http://schemas.microsoft.com/office/drawing/2014/main" id="{89020BFF-3F1F-E0ED-4459-DA6C99E90664}"/>
+              </a:ext>
+            </a:extLst>
+          </p:cNvPr>
+          <p:cNvSpPr txBox="1"/>
+          <p:nvPr/>
+        </p:nvSpPr>
+        <p:spPr>
+          <a:xfrm>
+            <a:off x="7893793" y="5654675"/>
+            <a:ext cx="1317814" cy="338554"/>
+          </a:xfrm>
+          <a:prstGeom prst="rect">
+            <a:avLst/>
+          </a:prstGeom>
+          <a:noFill/>
+        </p:spPr>
+        <p:txBody>
+          <a:bodyPr wrap="square" rtlCol="0">
+            <a:spAutoFit/>
+          </a:bodyPr>
+          <a:lstStyle/>
+          <a:p>
+            <a:r>
+              <a:rPr lang="en-US" sz="1600" dirty="0"/>
+              <a:t>Wait for tick</a:t>
+            </a:r>
+            <a:endParaRPr lang="en-DE" sz="1600" dirty="0"/>
+          </a:p>
+        </p:txBody>
+      </p:sp>
+      <p:cxnSp>
+        <p:nvCxnSpPr>
+          <p:cNvPr id="37" name="Straight Arrow Connector 36">
+            <a:extLst>
+              <a:ext uri="{FF2B5EF4-FFF2-40B4-BE49-F238E27FC236}">
+                <a16:creationId xmlns:a16="http://schemas.microsoft.com/office/drawing/2014/main" id="{069171AE-58C8-7765-DFEC-5717CA4DC7DE}"/>
+              </a:ext>
+            </a:extLst>
+          </p:cNvPr>
+          <p:cNvCxnSpPr>
+            <a:cxnSpLocks/>
+            <a:stCxn id="32" idx="2"/>
+            <a:endCxn id="35" idx="0"/>
+          </p:cNvCxnSpPr>
+          <p:nvPr/>
+        </p:nvCxnSpPr>
+        <p:spPr>
+          <a:xfrm>
+            <a:off x="8552701" y="4930127"/>
+            <a:ext cx="0" cy="387345"/>
           </a:xfrm>
           <a:prstGeom prst="straightConnector1">
             <a:avLst/>
@@ -5772,7 +7567,7 @@
     </p:spTree>
     <p:extLst>
       <p:ext uri="{BB962C8B-B14F-4D97-AF65-F5344CB8AC3E}">
-        <p14:creationId xmlns:p14="http://schemas.microsoft.com/office/powerpoint/2010/main" val="1063544817"/>
+        <p14:creationId xmlns:p14="http://schemas.microsoft.com/office/powerpoint/2010/main" val="176418799"/>
       </p:ext>
     </p:extLst>
   </p:cSld>
@@ -5799,895 +7594,6 @@
           <a:chExt cx="0" cy="0"/>
         </a:xfrm>
       </p:grpSpPr>
-      <p:sp>
-        <p:nvSpPr>
-          <p:cNvPr id="4" name="Oval 3">
-            <a:extLst>
-              <a:ext uri="{FF2B5EF4-FFF2-40B4-BE49-F238E27FC236}">
-                <a16:creationId xmlns:a16="http://schemas.microsoft.com/office/drawing/2014/main" id="{42BA037A-344A-E4D9-CA96-D19F34C1235C}"/>
-              </a:ext>
-            </a:extLst>
-          </p:cNvPr>
-          <p:cNvSpPr/>
-          <p:nvPr/>
-        </p:nvSpPr>
-        <p:spPr>
-          <a:xfrm>
-            <a:off x="5738536" y="835920"/>
-            <a:ext cx="233083" cy="249810"/>
-          </a:xfrm>
-          <a:prstGeom prst="ellipse">
-            <a:avLst/>
-          </a:prstGeom>
-        </p:spPr>
-        <p:style>
-          <a:lnRef idx="2">
-            <a:schemeClr val="dk1">
-              <a:shade val="50000"/>
-            </a:schemeClr>
-          </a:lnRef>
-          <a:fillRef idx="1">
-            <a:schemeClr val="dk1"/>
-          </a:fillRef>
-          <a:effectRef idx="0">
-            <a:schemeClr val="dk1"/>
-          </a:effectRef>
-          <a:fontRef idx="minor">
-            <a:schemeClr val="lt1"/>
-          </a:fontRef>
-        </p:style>
-        <p:txBody>
-          <a:bodyPr rtlCol="0" anchor="ctr"/>
-          <a:lstStyle/>
-          <a:p>
-            <a:pPr algn="ctr"/>
-            <a:endParaRPr lang="en-DE"/>
-          </a:p>
-        </p:txBody>
-      </p:sp>
-      <p:sp>
-        <p:nvSpPr>
-          <p:cNvPr id="5" name="TextBox 4">
-            <a:extLst>
-              <a:ext uri="{FF2B5EF4-FFF2-40B4-BE49-F238E27FC236}">
-                <a16:creationId xmlns:a16="http://schemas.microsoft.com/office/drawing/2014/main" id="{22C8304A-C836-0204-41F0-CF3CC4C9DBB8}"/>
-              </a:ext>
-            </a:extLst>
-          </p:cNvPr>
-          <p:cNvSpPr txBox="1"/>
-          <p:nvPr/>
-        </p:nvSpPr>
-        <p:spPr>
-          <a:xfrm>
-            <a:off x="5310464" y="466588"/>
-            <a:ext cx="1089214" cy="369332"/>
-          </a:xfrm>
-          <a:prstGeom prst="rect">
-            <a:avLst/>
-          </a:prstGeom>
-          <a:noFill/>
-        </p:spPr>
-        <p:txBody>
-          <a:bodyPr wrap="square" rtlCol="0">
-            <a:spAutoFit/>
-          </a:bodyPr>
-          <a:lstStyle/>
-          <a:p>
-            <a:r>
-              <a:rPr lang="en-US" dirty="0"/>
-              <a:t>Every tick</a:t>
-            </a:r>
-            <a:endParaRPr lang="en-DE" dirty="0"/>
-          </a:p>
-        </p:txBody>
-      </p:sp>
-      <p:sp>
-        <p:nvSpPr>
-          <p:cNvPr id="6" name="Rectangle 5">
-            <a:extLst>
-              <a:ext uri="{FF2B5EF4-FFF2-40B4-BE49-F238E27FC236}">
-                <a16:creationId xmlns:a16="http://schemas.microsoft.com/office/drawing/2014/main" id="{F73D0873-F99B-C567-2013-3436552EB78D}"/>
-              </a:ext>
-            </a:extLst>
-          </p:cNvPr>
-          <p:cNvSpPr/>
-          <p:nvPr/>
-        </p:nvSpPr>
-        <p:spPr>
-          <a:xfrm>
-            <a:off x="4830860" y="1444318"/>
-            <a:ext cx="2048433" cy="735106"/>
-          </a:xfrm>
-          <a:prstGeom prst="rect">
-            <a:avLst/>
-          </a:prstGeom>
-          <a:gradFill flip="none" rotWithShape="1">
-            <a:gsLst>
-              <a:gs pos="0">
-                <a:schemeClr val="accent4">
-                  <a:lumMod val="67000"/>
-                </a:schemeClr>
-              </a:gs>
-              <a:gs pos="48000">
-                <a:schemeClr val="accent4">
-                  <a:lumMod val="97000"/>
-                  <a:lumOff val="3000"/>
-                </a:schemeClr>
-              </a:gs>
-              <a:gs pos="100000">
-                <a:schemeClr val="accent4">
-                  <a:lumMod val="60000"/>
-                  <a:lumOff val="40000"/>
-                </a:schemeClr>
-              </a:gs>
-            </a:gsLst>
-            <a:lin ang="16200000" scaled="1"/>
-            <a:tileRect/>
-          </a:gradFill>
-          <a:ln>
-            <a:noFill/>
-          </a:ln>
-        </p:spPr>
-        <p:style>
-          <a:lnRef idx="0">
-            <a:scrgbClr r="0" g="0" b="0"/>
-          </a:lnRef>
-          <a:fillRef idx="0">
-            <a:scrgbClr r="0" g="0" b="0"/>
-          </a:fillRef>
-          <a:effectRef idx="0">
-            <a:scrgbClr r="0" g="0" b="0"/>
-          </a:effectRef>
-          <a:fontRef idx="minor">
-            <a:schemeClr val="lt1"/>
-          </a:fontRef>
-        </p:style>
-        <p:txBody>
-          <a:bodyPr rtlCol="0" anchor="ctr"/>
-          <a:lstStyle/>
-          <a:p>
-            <a:pPr algn="ctr"/>
-            <a:r>
-              <a:rPr lang="en-US" sz="1800" dirty="0">
-                <a:solidFill>
-                  <a:srgbClr val="000000"/>
-                </a:solidFill>
-                <a:latin typeface="Consolas" panose="020B0609020204030204" pitchFamily="49" charset="0"/>
-              </a:rPr>
-              <a:t>PostPhysTick()</a:t>
-            </a:r>
-            <a:endParaRPr lang="en-DE" dirty="0">
-              <a:solidFill>
-                <a:schemeClr val="tx1"/>
-              </a:solidFill>
-            </a:endParaRPr>
-          </a:p>
-        </p:txBody>
-      </p:sp>
-      <p:cxnSp>
-        <p:nvCxnSpPr>
-          <p:cNvPr id="7" name="Straight Arrow Connector 6">
-            <a:extLst>
-              <a:ext uri="{FF2B5EF4-FFF2-40B4-BE49-F238E27FC236}">
-                <a16:creationId xmlns:a16="http://schemas.microsoft.com/office/drawing/2014/main" id="{7A1F3BBC-F454-E012-9735-96EE38D31635}"/>
-              </a:ext>
-            </a:extLst>
-          </p:cNvPr>
-          <p:cNvCxnSpPr>
-            <a:cxnSpLocks/>
-            <a:stCxn id="4" idx="4"/>
-            <a:endCxn id="6" idx="0"/>
-          </p:cNvCxnSpPr>
-          <p:nvPr/>
-        </p:nvCxnSpPr>
-        <p:spPr>
-          <a:xfrm flipH="1">
-            <a:off x="5855077" y="1085730"/>
-            <a:ext cx="1" cy="358588"/>
-          </a:xfrm>
-          <a:prstGeom prst="straightConnector1">
-            <a:avLst/>
-          </a:prstGeom>
-          <a:ln>
-            <a:tailEnd type="triangle"/>
-          </a:ln>
-        </p:spPr>
-        <p:style>
-          <a:lnRef idx="1">
-            <a:schemeClr val="accent1"/>
-          </a:lnRef>
-          <a:fillRef idx="0">
-            <a:schemeClr val="accent1"/>
-          </a:fillRef>
-          <a:effectRef idx="0">
-            <a:schemeClr val="accent1"/>
-          </a:effectRef>
-          <a:fontRef idx="minor">
-            <a:schemeClr val="tx1"/>
-          </a:fontRef>
-        </p:style>
-      </p:cxnSp>
-      <p:sp>
-        <p:nvSpPr>
-          <p:cNvPr id="8" name="Rectangle 7">
-            <a:extLst>
-              <a:ext uri="{FF2B5EF4-FFF2-40B4-BE49-F238E27FC236}">
-                <a16:creationId xmlns:a16="http://schemas.microsoft.com/office/drawing/2014/main" id="{36853CCA-3AFA-8819-DA58-67076B794319}"/>
-              </a:ext>
-            </a:extLst>
-          </p:cNvPr>
-          <p:cNvSpPr/>
-          <p:nvPr/>
-        </p:nvSpPr>
-        <p:spPr>
-          <a:xfrm>
-            <a:off x="6367178" y="2568548"/>
-            <a:ext cx="3527607" cy="735106"/>
-          </a:xfrm>
-          <a:prstGeom prst="rect">
-            <a:avLst/>
-          </a:prstGeom>
-          <a:gradFill flip="none" rotWithShape="1">
-            <a:gsLst>
-              <a:gs pos="0">
-                <a:schemeClr val="accent4">
-                  <a:lumMod val="67000"/>
-                </a:schemeClr>
-              </a:gs>
-              <a:gs pos="48000">
-                <a:schemeClr val="accent4">
-                  <a:lumMod val="97000"/>
-                  <a:lumOff val="3000"/>
-                </a:schemeClr>
-              </a:gs>
-              <a:gs pos="100000">
-                <a:schemeClr val="accent4">
-                  <a:lumMod val="60000"/>
-                  <a:lumOff val="40000"/>
-                </a:schemeClr>
-              </a:gs>
-            </a:gsLst>
-            <a:lin ang="16200000" scaled="1"/>
-            <a:tileRect/>
-          </a:gradFill>
-          <a:ln>
-            <a:noFill/>
-          </a:ln>
-        </p:spPr>
-        <p:style>
-          <a:lnRef idx="0">
-            <a:scrgbClr r="0" g="0" b="0"/>
-          </a:lnRef>
-          <a:fillRef idx="0">
-            <a:scrgbClr r="0" g="0" b="0"/>
-          </a:fillRef>
-          <a:effectRef idx="0">
-            <a:scrgbClr r="0" g="0" b="0"/>
-          </a:effectRef>
-          <a:fontRef idx="minor">
-            <a:schemeClr val="lt1"/>
-          </a:fontRef>
-        </p:style>
-        <p:txBody>
-          <a:bodyPr rtlCol="0" anchor="ctr"/>
-          <a:lstStyle/>
-          <a:p>
-            <a:pPr algn="ctr"/>
-            <a:r>
-              <a:rPr lang="en-US" sz="1800" dirty="0">
-                <a:solidFill>
-                  <a:srgbClr val="000000"/>
-                </a:solidFill>
-                <a:latin typeface="Consolas" panose="020B0609020204030204" pitchFamily="49" charset="0"/>
-              </a:rPr>
-              <a:t>CalculateCurrentVelocity()</a:t>
-            </a:r>
-            <a:endParaRPr lang="en-DE" dirty="0">
-              <a:solidFill>
-                <a:schemeClr val="tx1"/>
-              </a:solidFill>
-            </a:endParaRPr>
-          </a:p>
-        </p:txBody>
-      </p:sp>
-      <p:sp>
-        <p:nvSpPr>
-          <p:cNvPr id="9" name="Rectangle 8">
-            <a:extLst>
-              <a:ext uri="{FF2B5EF4-FFF2-40B4-BE49-F238E27FC236}">
-                <a16:creationId xmlns:a16="http://schemas.microsoft.com/office/drawing/2014/main" id="{147222AF-52E6-717E-F123-3565220A123B}"/>
-              </a:ext>
-            </a:extLst>
-          </p:cNvPr>
-          <p:cNvSpPr/>
-          <p:nvPr/>
-        </p:nvSpPr>
-        <p:spPr>
-          <a:xfrm>
-            <a:off x="3065933" y="2568548"/>
-            <a:ext cx="2277033" cy="735106"/>
-          </a:xfrm>
-          <a:prstGeom prst="rect">
-            <a:avLst/>
-          </a:prstGeom>
-          <a:gradFill flip="none" rotWithShape="1">
-            <a:gsLst>
-              <a:gs pos="0">
-                <a:schemeClr val="accent4">
-                  <a:lumMod val="67000"/>
-                </a:schemeClr>
-              </a:gs>
-              <a:gs pos="48000">
-                <a:schemeClr val="accent4">
-                  <a:lumMod val="97000"/>
-                  <a:lumOff val="3000"/>
-                </a:schemeClr>
-              </a:gs>
-              <a:gs pos="100000">
-                <a:schemeClr val="accent4">
-                  <a:lumMod val="60000"/>
-                  <a:lumOff val="40000"/>
-                </a:schemeClr>
-              </a:gs>
-            </a:gsLst>
-            <a:lin ang="16200000" scaled="1"/>
-            <a:tileRect/>
-          </a:gradFill>
-          <a:ln>
-            <a:noFill/>
-          </a:ln>
-        </p:spPr>
-        <p:style>
-          <a:lnRef idx="0">
-            <a:scrgbClr r="0" g="0" b="0"/>
-          </a:lnRef>
-          <a:fillRef idx="0">
-            <a:scrgbClr r="0" g="0" b="0"/>
-          </a:fillRef>
-          <a:effectRef idx="0">
-            <a:scrgbClr r="0" g="0" b="0"/>
-          </a:effectRef>
-          <a:fontRef idx="minor">
-            <a:schemeClr val="lt1"/>
-          </a:fontRef>
-        </p:style>
-        <p:txBody>
-          <a:bodyPr rtlCol="0" anchor="ctr"/>
-          <a:lstStyle/>
-          <a:p>
-            <a:pPr algn="ctr"/>
-            <a:r>
-              <a:rPr lang="en-US" sz="1800" dirty="0">
-                <a:solidFill>
-                  <a:srgbClr val="000000"/>
-                </a:solidFill>
-                <a:latin typeface="Consolas" panose="020B0609020204030204" pitchFamily="49" charset="0"/>
-              </a:rPr>
-              <a:t>DataStream.Send</a:t>
-            </a:r>
-            <a:r>
-              <a:rPr lang="en-US" dirty="0">
-                <a:solidFill>
-                  <a:schemeClr val="tx1"/>
-                </a:solidFill>
-              </a:rPr>
-              <a:t>()</a:t>
-            </a:r>
-            <a:endParaRPr lang="en-DE" dirty="0">
-              <a:solidFill>
-                <a:schemeClr val="tx1"/>
-              </a:solidFill>
-            </a:endParaRPr>
-          </a:p>
-        </p:txBody>
-      </p:sp>
-      <p:cxnSp>
-        <p:nvCxnSpPr>
-          <p:cNvPr id="10" name="Straight Arrow Connector 9">
-            <a:extLst>
-              <a:ext uri="{FF2B5EF4-FFF2-40B4-BE49-F238E27FC236}">
-                <a16:creationId xmlns:a16="http://schemas.microsoft.com/office/drawing/2014/main" id="{3B47A8AB-CD7A-68AC-0BFF-7DE484F29CAF}"/>
-              </a:ext>
-            </a:extLst>
-          </p:cNvPr>
-          <p:cNvCxnSpPr>
-            <a:cxnSpLocks/>
-            <a:stCxn id="6" idx="2"/>
-            <a:endCxn id="8" idx="0"/>
-          </p:cNvCxnSpPr>
-          <p:nvPr/>
-        </p:nvCxnSpPr>
-        <p:spPr>
-          <a:xfrm>
-            <a:off x="5855077" y="2179424"/>
-            <a:ext cx="2275905" cy="389124"/>
-          </a:xfrm>
-          <a:prstGeom prst="straightConnector1">
-            <a:avLst/>
-          </a:prstGeom>
-          <a:ln>
-            <a:tailEnd type="triangle"/>
-          </a:ln>
-        </p:spPr>
-        <p:style>
-          <a:lnRef idx="1">
-            <a:schemeClr val="accent1"/>
-          </a:lnRef>
-          <a:fillRef idx="0">
-            <a:schemeClr val="accent1"/>
-          </a:fillRef>
-          <a:effectRef idx="0">
-            <a:schemeClr val="accent1"/>
-          </a:effectRef>
-          <a:fontRef idx="minor">
-            <a:schemeClr val="tx1"/>
-          </a:fontRef>
-        </p:style>
-      </p:cxnSp>
-      <p:cxnSp>
-        <p:nvCxnSpPr>
-          <p:cNvPr id="11" name="Straight Arrow Connector 10">
-            <a:extLst>
-              <a:ext uri="{FF2B5EF4-FFF2-40B4-BE49-F238E27FC236}">
-                <a16:creationId xmlns:a16="http://schemas.microsoft.com/office/drawing/2014/main" id="{3BEF3B9C-0A8A-4A5A-ADD5-774820A1BF39}"/>
-              </a:ext>
-            </a:extLst>
-          </p:cNvPr>
-          <p:cNvCxnSpPr>
-            <a:cxnSpLocks/>
-            <a:endCxn id="9" idx="0"/>
-          </p:cNvCxnSpPr>
-          <p:nvPr/>
-        </p:nvCxnSpPr>
-        <p:spPr>
-          <a:xfrm flipH="1">
-            <a:off x="4204450" y="2180464"/>
-            <a:ext cx="1650625" cy="388084"/>
-          </a:xfrm>
-          <a:prstGeom prst="straightConnector1">
-            <a:avLst/>
-          </a:prstGeom>
-          <a:ln>
-            <a:tailEnd type="triangle"/>
-          </a:ln>
-        </p:spPr>
-        <p:style>
-          <a:lnRef idx="1">
-            <a:schemeClr val="accent1"/>
-          </a:lnRef>
-          <a:fillRef idx="0">
-            <a:schemeClr val="accent1"/>
-          </a:fillRef>
-          <a:effectRef idx="0">
-            <a:schemeClr val="accent1"/>
-          </a:effectRef>
-          <a:fontRef idx="minor">
-            <a:schemeClr val="tx1"/>
-          </a:fontRef>
-        </p:style>
-      </p:cxnSp>
-      <p:sp>
-        <p:nvSpPr>
-          <p:cNvPr id="12" name="Rectangle 11">
-            <a:extLst>
-              <a:ext uri="{FF2B5EF4-FFF2-40B4-BE49-F238E27FC236}">
-                <a16:creationId xmlns:a16="http://schemas.microsoft.com/office/drawing/2014/main" id="{9FC508A5-C8B1-B03F-EE8F-CCDC62024703}"/>
-              </a:ext>
-            </a:extLst>
-          </p:cNvPr>
-          <p:cNvSpPr/>
-          <p:nvPr/>
-        </p:nvSpPr>
-        <p:spPr>
-          <a:xfrm>
-            <a:off x="4549588" y="3482667"/>
-            <a:ext cx="2610967" cy="735106"/>
-          </a:xfrm>
-          <a:prstGeom prst="rect">
-            <a:avLst/>
-          </a:prstGeom>
-          <a:gradFill flip="none" rotWithShape="1">
-            <a:gsLst>
-              <a:gs pos="0">
-                <a:schemeClr val="accent4">
-                  <a:lumMod val="67000"/>
-                </a:schemeClr>
-              </a:gs>
-              <a:gs pos="48000">
-                <a:schemeClr val="accent4">
-                  <a:lumMod val="97000"/>
-                  <a:lumOff val="3000"/>
-                </a:schemeClr>
-              </a:gs>
-              <a:gs pos="100000">
-                <a:schemeClr val="accent4">
-                  <a:lumMod val="60000"/>
-                  <a:lumOff val="40000"/>
-                </a:schemeClr>
-              </a:gs>
-            </a:gsLst>
-            <a:lin ang="16200000" scaled="1"/>
-            <a:tileRect/>
-          </a:gradFill>
-          <a:ln>
-            <a:noFill/>
-          </a:ln>
-        </p:spPr>
-        <p:style>
-          <a:lnRef idx="0">
-            <a:scrgbClr r="0" g="0" b="0"/>
-          </a:lnRef>
-          <a:fillRef idx="0">
-            <a:scrgbClr r="0" g="0" b="0"/>
-          </a:fillRef>
-          <a:effectRef idx="0">
-            <a:scrgbClr r="0" g="0" b="0"/>
-          </a:effectRef>
-          <a:fontRef idx="minor">
-            <a:schemeClr val="lt1"/>
-          </a:fontRef>
-        </p:style>
-        <p:txBody>
-          <a:bodyPr rtlCol="0" anchor="ctr"/>
-          <a:lstStyle/>
-          <a:p>
-            <a:pPr algn="ctr"/>
-            <a:r>
-              <a:rPr lang="en-US" sz="1800" dirty="0">
-                <a:solidFill>
-                  <a:srgbClr val="000000"/>
-                </a:solidFill>
-                <a:latin typeface="Consolas" panose="020B0609020204030204" pitchFamily="49" charset="0"/>
-              </a:rPr>
-              <a:t>SendLineTraces</a:t>
-            </a:r>
-            <a:r>
-              <a:rPr lang="en-US" dirty="0">
-                <a:solidFill>
-                  <a:schemeClr val="tx1"/>
-                </a:solidFill>
-              </a:rPr>
-              <a:t>()</a:t>
-            </a:r>
-            <a:endParaRPr lang="en-DE" dirty="0">
-              <a:solidFill>
-                <a:schemeClr val="tx1"/>
-              </a:solidFill>
-            </a:endParaRPr>
-          </a:p>
-        </p:txBody>
-      </p:sp>
-      <p:sp>
-        <p:nvSpPr>
-          <p:cNvPr id="13" name="Rectangle 12">
-            <a:extLst>
-              <a:ext uri="{FF2B5EF4-FFF2-40B4-BE49-F238E27FC236}">
-                <a16:creationId xmlns:a16="http://schemas.microsoft.com/office/drawing/2014/main" id="{B4DF1972-A2F0-AEDC-57EF-0B5E93CD8CC4}"/>
-              </a:ext>
-            </a:extLst>
-          </p:cNvPr>
-          <p:cNvSpPr/>
-          <p:nvPr/>
-        </p:nvSpPr>
-        <p:spPr>
-          <a:xfrm>
-            <a:off x="4091270" y="4547195"/>
-            <a:ext cx="3527605" cy="735106"/>
-          </a:xfrm>
-          <a:prstGeom prst="rect">
-            <a:avLst/>
-          </a:prstGeom>
-          <a:gradFill flip="none" rotWithShape="1">
-            <a:gsLst>
-              <a:gs pos="0">
-                <a:schemeClr val="accent4">
-                  <a:lumMod val="67000"/>
-                </a:schemeClr>
-              </a:gs>
-              <a:gs pos="48000">
-                <a:schemeClr val="accent4">
-                  <a:lumMod val="97000"/>
-                  <a:lumOff val="3000"/>
-                </a:schemeClr>
-              </a:gs>
-              <a:gs pos="100000">
-                <a:schemeClr val="accent4">
-                  <a:lumMod val="60000"/>
-                  <a:lumOff val="40000"/>
-                </a:schemeClr>
-              </a:gs>
-            </a:gsLst>
-            <a:lin ang="16200000" scaled="1"/>
-            <a:tileRect/>
-          </a:gradFill>
-          <a:ln>
-            <a:noFill/>
-          </a:ln>
-        </p:spPr>
-        <p:style>
-          <a:lnRef idx="0">
-            <a:scrgbClr r="0" g="0" b="0"/>
-          </a:lnRef>
-          <a:fillRef idx="0">
-            <a:scrgbClr r="0" g="0" b="0"/>
-          </a:fillRef>
-          <a:effectRef idx="0">
-            <a:scrgbClr r="0" g="0" b="0"/>
-          </a:effectRef>
-          <a:fontRef idx="minor">
-            <a:schemeClr val="lt1"/>
-          </a:fontRef>
-        </p:style>
-        <p:txBody>
-          <a:bodyPr rtlCol="0" anchor="ctr"/>
-          <a:lstStyle/>
-          <a:p>
-            <a:pPr algn="ctr"/>
-            <a:r>
-              <a:rPr lang="en-US" sz="1800" dirty="0">
-                <a:solidFill>
-                  <a:srgbClr val="000000"/>
-                </a:solidFill>
-                <a:latin typeface="Consolas" panose="020B0609020204030204" pitchFamily="49" charset="0"/>
-              </a:rPr>
-              <a:t>CalculateRelativeVelocity</a:t>
-            </a:r>
-            <a:r>
-              <a:rPr lang="en-US" dirty="0">
-                <a:solidFill>
-                  <a:schemeClr val="tx1"/>
-                </a:solidFill>
-              </a:rPr>
-              <a:t>()</a:t>
-            </a:r>
-            <a:endParaRPr lang="en-DE" dirty="0">
-              <a:solidFill>
-                <a:schemeClr val="tx1"/>
-              </a:solidFill>
-            </a:endParaRPr>
-          </a:p>
-        </p:txBody>
-      </p:sp>
-      <p:cxnSp>
-        <p:nvCxnSpPr>
-          <p:cNvPr id="14" name="Straight Arrow Connector 13">
-            <a:extLst>
-              <a:ext uri="{FF2B5EF4-FFF2-40B4-BE49-F238E27FC236}">
-                <a16:creationId xmlns:a16="http://schemas.microsoft.com/office/drawing/2014/main" id="{7F315219-E6BC-795D-035D-B0C4D05CB8C4}"/>
-              </a:ext>
-            </a:extLst>
-          </p:cNvPr>
-          <p:cNvCxnSpPr>
-            <a:stCxn id="6" idx="2"/>
-            <a:endCxn id="12" idx="0"/>
-          </p:cNvCxnSpPr>
-          <p:nvPr/>
-        </p:nvCxnSpPr>
-        <p:spPr>
-          <a:xfrm flipH="1">
-            <a:off x="5855072" y="2179424"/>
-            <a:ext cx="5" cy="1303243"/>
-          </a:xfrm>
-          <a:prstGeom prst="straightConnector1">
-            <a:avLst/>
-          </a:prstGeom>
-          <a:ln>
-            <a:tailEnd type="triangle"/>
-          </a:ln>
-        </p:spPr>
-        <p:style>
-          <a:lnRef idx="1">
-            <a:schemeClr val="accent1"/>
-          </a:lnRef>
-          <a:fillRef idx="0">
-            <a:schemeClr val="accent1"/>
-          </a:fillRef>
-          <a:effectRef idx="0">
-            <a:schemeClr val="accent1"/>
-          </a:effectRef>
-          <a:fontRef idx="minor">
-            <a:schemeClr val="tx1"/>
-          </a:fontRef>
-        </p:style>
-      </p:cxnSp>
-      <p:cxnSp>
-        <p:nvCxnSpPr>
-          <p:cNvPr id="15" name="Straight Arrow Connector 14">
-            <a:extLst>
-              <a:ext uri="{FF2B5EF4-FFF2-40B4-BE49-F238E27FC236}">
-                <a16:creationId xmlns:a16="http://schemas.microsoft.com/office/drawing/2014/main" id="{571AAD02-AF21-E9BD-F697-D7686EA528B5}"/>
-              </a:ext>
-            </a:extLst>
-          </p:cNvPr>
-          <p:cNvCxnSpPr>
-            <a:cxnSpLocks/>
-            <a:stCxn id="12" idx="2"/>
-            <a:endCxn id="13" idx="0"/>
-          </p:cNvCxnSpPr>
-          <p:nvPr/>
-        </p:nvCxnSpPr>
-        <p:spPr>
-          <a:xfrm>
-            <a:off x="5855072" y="4217773"/>
-            <a:ext cx="1" cy="329422"/>
-          </a:xfrm>
-          <a:prstGeom prst="straightConnector1">
-            <a:avLst/>
-          </a:prstGeom>
-          <a:ln>
-            <a:tailEnd type="triangle"/>
-          </a:ln>
-        </p:spPr>
-        <p:style>
-          <a:lnRef idx="1">
-            <a:schemeClr val="accent1"/>
-          </a:lnRef>
-          <a:fillRef idx="0">
-            <a:schemeClr val="accent1"/>
-          </a:fillRef>
-          <a:effectRef idx="0">
-            <a:schemeClr val="accent1"/>
-          </a:effectRef>
-          <a:fontRef idx="minor">
-            <a:schemeClr val="tx1"/>
-          </a:fontRef>
-        </p:style>
-      </p:cxnSp>
-      <p:sp>
-        <p:nvSpPr>
-          <p:cNvPr id="16" name="Oval 15">
-            <a:extLst>
-              <a:ext uri="{FF2B5EF4-FFF2-40B4-BE49-F238E27FC236}">
-                <a16:creationId xmlns:a16="http://schemas.microsoft.com/office/drawing/2014/main" id="{1C71852A-EE16-5814-4EA6-DAD9A3F55FFF}"/>
-              </a:ext>
-            </a:extLst>
-          </p:cNvPr>
-          <p:cNvSpPr/>
-          <p:nvPr/>
-        </p:nvSpPr>
-        <p:spPr>
-          <a:xfrm>
-            <a:off x="5738536" y="5658780"/>
-            <a:ext cx="233083" cy="249810"/>
-          </a:xfrm>
-          <a:prstGeom prst="ellipse">
-            <a:avLst/>
-          </a:prstGeom>
-        </p:spPr>
-        <p:style>
-          <a:lnRef idx="2">
-            <a:schemeClr val="dk1">
-              <a:shade val="50000"/>
-            </a:schemeClr>
-          </a:lnRef>
-          <a:fillRef idx="1">
-            <a:schemeClr val="dk1"/>
-          </a:fillRef>
-          <a:effectRef idx="0">
-            <a:schemeClr val="dk1"/>
-          </a:effectRef>
-          <a:fontRef idx="minor">
-            <a:schemeClr val="lt1"/>
-          </a:fontRef>
-        </p:style>
-        <p:txBody>
-          <a:bodyPr rtlCol="0" anchor="ctr"/>
-          <a:lstStyle/>
-          <a:p>
-            <a:pPr algn="ctr"/>
-            <a:endParaRPr lang="en-DE"/>
-          </a:p>
-        </p:txBody>
-      </p:sp>
-      <p:sp>
-        <p:nvSpPr>
-          <p:cNvPr id="17" name="TextBox 16">
-            <a:extLst>
-              <a:ext uri="{FF2B5EF4-FFF2-40B4-BE49-F238E27FC236}">
-                <a16:creationId xmlns:a16="http://schemas.microsoft.com/office/drawing/2014/main" id="{F8385720-F9FA-FDE2-2AF8-3332C37FACBA}"/>
-              </a:ext>
-            </a:extLst>
-          </p:cNvPr>
-          <p:cNvSpPr txBox="1"/>
-          <p:nvPr/>
-        </p:nvSpPr>
-        <p:spPr>
-          <a:xfrm>
-            <a:off x="5196164" y="5915522"/>
-            <a:ext cx="1317814" cy="369332"/>
-          </a:xfrm>
-          <a:prstGeom prst="rect">
-            <a:avLst/>
-          </a:prstGeom>
-          <a:noFill/>
-        </p:spPr>
-        <p:txBody>
-          <a:bodyPr wrap="square" rtlCol="0">
-            <a:spAutoFit/>
-          </a:bodyPr>
-          <a:lstStyle/>
-          <a:p>
-            <a:r>
-              <a:rPr lang="en-US" dirty="0"/>
-              <a:t>Wait for tick</a:t>
-            </a:r>
-            <a:endParaRPr lang="en-DE" dirty="0"/>
-          </a:p>
-        </p:txBody>
-      </p:sp>
-      <p:cxnSp>
-        <p:nvCxnSpPr>
-          <p:cNvPr id="18" name="Straight Arrow Connector 17">
-            <a:extLst>
-              <a:ext uri="{FF2B5EF4-FFF2-40B4-BE49-F238E27FC236}">
-                <a16:creationId xmlns:a16="http://schemas.microsoft.com/office/drawing/2014/main" id="{553B4378-4CC4-5A70-A5E3-945B4ABA622F}"/>
-              </a:ext>
-            </a:extLst>
-          </p:cNvPr>
-          <p:cNvCxnSpPr>
-            <a:cxnSpLocks/>
-            <a:stCxn id="13" idx="2"/>
-            <a:endCxn id="16" idx="0"/>
-          </p:cNvCxnSpPr>
-          <p:nvPr/>
-        </p:nvCxnSpPr>
-        <p:spPr>
-          <a:xfrm>
-            <a:off x="5855073" y="5282301"/>
-            <a:ext cx="5" cy="376479"/>
-          </a:xfrm>
-          <a:prstGeom prst="straightConnector1">
-            <a:avLst/>
-          </a:prstGeom>
-          <a:ln>
-            <a:tailEnd type="triangle"/>
-          </a:ln>
-        </p:spPr>
-        <p:style>
-          <a:lnRef idx="1">
-            <a:schemeClr val="accent1"/>
-          </a:lnRef>
-          <a:fillRef idx="0">
-            <a:schemeClr val="accent1"/>
-          </a:fillRef>
-          <a:effectRef idx="0">
-            <a:schemeClr val="accent1"/>
-          </a:effectRef>
-          <a:fontRef idx="minor">
-            <a:schemeClr val="tx1"/>
-          </a:fontRef>
-        </p:style>
-      </p:cxnSp>
-    </p:spTree>
-    <p:extLst>
-      <p:ext uri="{BB962C8B-B14F-4D97-AF65-F5344CB8AC3E}">
-        <p14:creationId xmlns:p14="http://schemas.microsoft.com/office/powerpoint/2010/main" val="3746979498"/>
-      </p:ext>
-    </p:extLst>
-  </p:cSld>
-  <p:clrMapOvr>
-    <a:masterClrMapping/>
-  </p:clrMapOvr>
-</p:sld>
-</file>
-
-<file path=ppt/slides/slide4.xml><?xml version="1.0" encoding="utf-8"?>
-<p:sld xmlns:a="http://schemas.openxmlformats.org/drawingml/2006/main" xmlns:r="http://schemas.openxmlformats.org/officeDocument/2006/relationships" xmlns:p="http://schemas.openxmlformats.org/presentationml/2006/main">
-  <p:cSld>
-    <p:spTree>
-      <p:nvGrpSpPr>
-        <p:cNvPr id="1" name=""/>
-        <p:cNvGrpSpPr/>
-        <p:nvPr/>
-      </p:nvGrpSpPr>
-      <p:grpSpPr>
-        <a:xfrm>
-          <a:off x="0" y="0"/>
-          <a:ext cx="0" cy="0"/>
-          <a:chOff x="0" y="0"/>
-          <a:chExt cx="0" cy="0"/>
-        </a:xfrm>
-      </p:grpSpPr>
       <p:pic>
         <p:nvPicPr>
           <p:cNvPr id="3" name="Picture 2">
@@ -6791,7 +7697,7 @@
 </p:sld>
 </file>
 
-<file path=ppt/slides/slide5.xml><?xml version="1.0" encoding="utf-8"?>
+<file path=ppt/slides/slide4.xml><?xml version="1.0" encoding="utf-8"?>
 <p:sld xmlns:a="http://schemas.openxmlformats.org/drawingml/2006/main" xmlns:r="http://schemas.openxmlformats.org/officeDocument/2006/relationships" xmlns:p="http://schemas.openxmlformats.org/presentationml/2006/main">
   <p:cSld>
     <p:spTree>
@@ -7278,7 +8184,7 @@
 </p:sld>
 </file>
 
-<file path=ppt/slides/slide6.xml><?xml version="1.0" encoding="utf-8"?>
+<file path=ppt/slides/slide5.xml><?xml version="1.0" encoding="utf-8"?>
 <p:sld xmlns:a="http://schemas.openxmlformats.org/drawingml/2006/main" xmlns:r="http://schemas.openxmlformats.org/officeDocument/2006/relationships" xmlns:p="http://schemas.openxmlformats.org/presentationml/2006/main">
   <p:cSld>
     <p:spTree>
@@ -10649,7 +11555,7 @@
 </p:sld>
 </file>
 
-<file path=ppt/slides/slide7.xml><?xml version="1.0" encoding="utf-8"?>
+<file path=ppt/slides/slide6.xml><?xml version="1.0" encoding="utf-8"?>
 <p:sld xmlns:a="http://schemas.openxmlformats.org/drawingml/2006/main" xmlns:r="http://schemas.openxmlformats.org/officeDocument/2006/relationships" xmlns:p="http://schemas.openxmlformats.org/presentationml/2006/main">
   <p:cSld>
     <p:spTree>
@@ -11527,7 +12433,7 @@
 </p:sld>
 </file>
 
-<file path=ppt/slides/slide8.xml><?xml version="1.0" encoding="utf-8"?>
+<file path=ppt/slides/slide7.xml><?xml version="1.0" encoding="utf-8"?>
 <p:sld xmlns:a="http://schemas.openxmlformats.org/drawingml/2006/main" xmlns:r="http://schemas.openxmlformats.org/officeDocument/2006/relationships" xmlns:p="http://schemas.openxmlformats.org/presentationml/2006/main">
   <p:cSld>
     <p:spTree>
@@ -15259,7 +16165,7 @@
 </p:sld>
 </file>
 
-<file path=ppt/slides/slide9.xml><?xml version="1.0" encoding="utf-8"?>
+<file path=ppt/slides/slide8.xml><?xml version="1.0" encoding="utf-8"?>
 <p:sld xmlns:a="http://schemas.openxmlformats.org/drawingml/2006/main" xmlns:r="http://schemas.openxmlformats.org/officeDocument/2006/relationships" xmlns:p="http://schemas.openxmlformats.org/presentationml/2006/main">
   <p:cSld>
     <p:spTree>
@@ -17102,6 +18008,74 @@
     <p:extLst>
       <p:ext uri="{BB962C8B-B14F-4D97-AF65-F5344CB8AC3E}">
         <p14:creationId xmlns:p14="http://schemas.microsoft.com/office/powerpoint/2010/main" val="2349584213"/>
+      </p:ext>
+    </p:extLst>
+  </p:cSld>
+  <p:clrMapOvr>
+    <a:masterClrMapping/>
+  </p:clrMapOvr>
+</p:sld>
+</file>
+
+<file path=ppt/slides/slide9.xml><?xml version="1.0" encoding="utf-8"?>
+<p:sld xmlns:a="http://schemas.openxmlformats.org/drawingml/2006/main" xmlns:r="http://schemas.openxmlformats.org/officeDocument/2006/relationships" xmlns:p="http://schemas.openxmlformats.org/presentationml/2006/main">
+  <p:cSld>
+    <p:bg>
+      <p:bgPr>
+        <a:solidFill>
+          <a:schemeClr val="bg1"/>
+        </a:solidFill>
+        <a:effectLst/>
+      </p:bgPr>
+    </p:bg>
+    <p:spTree>
+      <p:nvGrpSpPr>
+        <p:cNvPr id="1" name=""/>
+        <p:cNvGrpSpPr/>
+        <p:nvPr/>
+      </p:nvGrpSpPr>
+      <p:grpSpPr>
+        <a:xfrm>
+          <a:off x="0" y="0"/>
+          <a:ext cx="0" cy="0"/>
+          <a:chOff x="0" y="0"/>
+          <a:chExt cx="0" cy="0"/>
+        </a:xfrm>
+      </p:grpSpPr>
+      <p:pic>
+        <p:nvPicPr>
+          <p:cNvPr id="5" name="Picture 4" descr="A computer screen shot of a program code&#10;&#10;Description automatically generated">
+            <a:extLst>
+              <a:ext uri="{FF2B5EF4-FFF2-40B4-BE49-F238E27FC236}">
+                <a16:creationId xmlns:a16="http://schemas.microsoft.com/office/drawing/2014/main" id="{5A032E2F-D2CF-DF80-826B-C62BD0FB7AF9}"/>
+              </a:ext>
+            </a:extLst>
+          </p:cNvPr>
+          <p:cNvPicPr>
+            <a:picLocks noChangeAspect="1"/>
+          </p:cNvPicPr>
+          <p:nvPr/>
+        </p:nvPicPr>
+        <p:blipFill>
+          <a:blip r:embed="rId2"/>
+          <a:stretch>
+            <a:fillRect/>
+          </a:stretch>
+        </p:blipFill>
+        <p:spPr>
+          <a:xfrm>
+            <a:off x="360162" y="905435"/>
+            <a:ext cx="5798591" cy="5118847"/>
+          </a:xfrm>
+          <a:prstGeom prst="rect">
+            <a:avLst/>
+          </a:prstGeom>
+        </p:spPr>
+      </p:pic>
+    </p:spTree>
+    <p:extLst>
+      <p:ext uri="{BB962C8B-B14F-4D97-AF65-F5344CB8AC3E}">
+        <p14:creationId xmlns:p14="http://schemas.microsoft.com/office/powerpoint/2010/main" val="2405647614"/>
       </p:ext>
     </p:extLst>
   </p:cSld>

</xml_diff>

<commit_message>
Scenarios added and filtering completed. more can be added in the filtering side but for now its done.
</commit_message>
<xml_diff>
--- a/Report/diagrams.pptx
+++ b/Report/diagrams.pptx
@@ -22,6 +22,8 @@
     <p:sldId id="274" r:id="rId16"/>
     <p:sldId id="275" r:id="rId17"/>
     <p:sldId id="276" r:id="rId18"/>
+    <p:sldId id="278" r:id="rId19"/>
+    <p:sldId id="279" r:id="rId20"/>
   </p:sldIdLst>
   <p:sldSz cx="12192000" cy="6858000"/>
   <p:notesSz cx="6858000" cy="9144000"/>
@@ -277,7 +279,7 @@
           <a:p>
             <a:fld id="{474A10D8-129C-4533-999D-9A7118D03750}" type="datetimeFigureOut">
               <a:rPr lang="de-DE" smtClean="0"/>
-              <a:t>16.02.2024</a:t>
+              <a:t>17.03.2024</a:t>
             </a:fld>
             <a:endParaRPr lang="de-DE"/>
           </a:p>
@@ -477,7 +479,7 @@
           <a:p>
             <a:fld id="{474A10D8-129C-4533-999D-9A7118D03750}" type="datetimeFigureOut">
               <a:rPr lang="de-DE" smtClean="0"/>
-              <a:t>16.02.2024</a:t>
+              <a:t>17.03.2024</a:t>
             </a:fld>
             <a:endParaRPr lang="de-DE"/>
           </a:p>
@@ -687,7 +689,7 @@
           <a:p>
             <a:fld id="{474A10D8-129C-4533-999D-9A7118D03750}" type="datetimeFigureOut">
               <a:rPr lang="de-DE" smtClean="0"/>
-              <a:t>16.02.2024</a:t>
+              <a:t>17.03.2024</a:t>
             </a:fld>
             <a:endParaRPr lang="de-DE"/>
           </a:p>
@@ -887,7 +889,7 @@
           <a:p>
             <a:fld id="{474A10D8-129C-4533-999D-9A7118D03750}" type="datetimeFigureOut">
               <a:rPr lang="de-DE" smtClean="0"/>
-              <a:t>16.02.2024</a:t>
+              <a:t>17.03.2024</a:t>
             </a:fld>
             <a:endParaRPr lang="de-DE"/>
           </a:p>
@@ -1163,7 +1165,7 @@
           <a:p>
             <a:fld id="{474A10D8-129C-4533-999D-9A7118D03750}" type="datetimeFigureOut">
               <a:rPr lang="de-DE" smtClean="0"/>
-              <a:t>16.02.2024</a:t>
+              <a:t>17.03.2024</a:t>
             </a:fld>
             <a:endParaRPr lang="de-DE"/>
           </a:p>
@@ -1431,7 +1433,7 @@
           <a:p>
             <a:fld id="{474A10D8-129C-4533-999D-9A7118D03750}" type="datetimeFigureOut">
               <a:rPr lang="de-DE" smtClean="0"/>
-              <a:t>16.02.2024</a:t>
+              <a:t>17.03.2024</a:t>
             </a:fld>
             <a:endParaRPr lang="de-DE"/>
           </a:p>
@@ -1846,7 +1848,7 @@
           <a:p>
             <a:fld id="{474A10D8-129C-4533-999D-9A7118D03750}" type="datetimeFigureOut">
               <a:rPr lang="de-DE" smtClean="0"/>
-              <a:t>16.02.2024</a:t>
+              <a:t>17.03.2024</a:t>
             </a:fld>
             <a:endParaRPr lang="de-DE"/>
           </a:p>
@@ -1988,7 +1990,7 @@
           <a:p>
             <a:fld id="{474A10D8-129C-4533-999D-9A7118D03750}" type="datetimeFigureOut">
               <a:rPr lang="de-DE" smtClean="0"/>
-              <a:t>16.02.2024</a:t>
+              <a:t>17.03.2024</a:t>
             </a:fld>
             <a:endParaRPr lang="de-DE"/>
           </a:p>
@@ -2101,7 +2103,7 @@
           <a:p>
             <a:fld id="{474A10D8-129C-4533-999D-9A7118D03750}" type="datetimeFigureOut">
               <a:rPr lang="de-DE" smtClean="0"/>
-              <a:t>16.02.2024</a:t>
+              <a:t>17.03.2024</a:t>
             </a:fld>
             <a:endParaRPr lang="de-DE"/>
           </a:p>
@@ -2414,7 +2416,7 @@
           <a:p>
             <a:fld id="{474A10D8-129C-4533-999D-9A7118D03750}" type="datetimeFigureOut">
               <a:rPr lang="de-DE" smtClean="0"/>
-              <a:t>16.02.2024</a:t>
+              <a:t>17.03.2024</a:t>
             </a:fld>
             <a:endParaRPr lang="de-DE"/>
           </a:p>
@@ -2703,7 +2705,7 @@
           <a:p>
             <a:fld id="{474A10D8-129C-4533-999D-9A7118D03750}" type="datetimeFigureOut">
               <a:rPr lang="de-DE" smtClean="0"/>
-              <a:t>16.02.2024</a:t>
+              <a:t>17.03.2024</a:t>
             </a:fld>
             <a:endParaRPr lang="de-DE"/>
           </a:p>
@@ -2946,7 +2948,7 @@
           <a:p>
             <a:fld id="{474A10D8-129C-4533-999D-9A7118D03750}" type="datetimeFigureOut">
               <a:rPr lang="de-DE" smtClean="0"/>
-              <a:t>16.02.2024</a:t>
+              <a:t>17.03.2024</a:t>
             </a:fld>
             <a:endParaRPr lang="de-DE"/>
           </a:p>
@@ -5464,6 +5466,2001 @@
 </p:sld>
 </file>
 
+<file path=ppt/slides/slide18.xml><?xml version="1.0" encoding="utf-8"?>
+<p:sld xmlns:a="http://schemas.openxmlformats.org/drawingml/2006/main" xmlns:r="http://schemas.openxmlformats.org/officeDocument/2006/relationships" xmlns:p="http://schemas.openxmlformats.org/presentationml/2006/main">
+  <p:cSld>
+    <p:spTree>
+      <p:nvGrpSpPr>
+        <p:cNvPr id="1" name=""/>
+        <p:cNvGrpSpPr/>
+        <p:nvPr/>
+      </p:nvGrpSpPr>
+      <p:grpSpPr>
+        <a:xfrm>
+          <a:off x="0" y="0"/>
+          <a:ext cx="0" cy="0"/>
+          <a:chOff x="0" y="0"/>
+          <a:chExt cx="0" cy="0"/>
+        </a:xfrm>
+      </p:grpSpPr>
+      <p:sp>
+        <p:nvSpPr>
+          <p:cNvPr id="4" name="Rectangle: Rounded Corners 3">
+            <a:extLst>
+              <a:ext uri="{FF2B5EF4-FFF2-40B4-BE49-F238E27FC236}">
+                <a16:creationId xmlns:a16="http://schemas.microsoft.com/office/drawing/2014/main" id="{9D74B385-C42E-2CE3-37F6-D8F5FA177C39}"/>
+              </a:ext>
+            </a:extLst>
+          </p:cNvPr>
+          <p:cNvSpPr/>
+          <p:nvPr/>
+        </p:nvSpPr>
+        <p:spPr>
+          <a:xfrm>
+            <a:off x="6783355" y="494522"/>
+            <a:ext cx="4245429" cy="5868955"/>
+          </a:xfrm>
+          <a:prstGeom prst="roundRect">
+            <a:avLst/>
+          </a:prstGeom>
+        </p:spPr>
+        <p:style>
+          <a:lnRef idx="1">
+            <a:schemeClr val="accent5"/>
+          </a:lnRef>
+          <a:fillRef idx="2">
+            <a:schemeClr val="accent5"/>
+          </a:fillRef>
+          <a:effectRef idx="1">
+            <a:schemeClr val="accent5"/>
+          </a:effectRef>
+          <a:fontRef idx="minor">
+            <a:schemeClr val="dk1"/>
+          </a:fontRef>
+        </p:style>
+        <p:txBody>
+          <a:bodyPr rtlCol="0" anchor="ctr"/>
+          <a:lstStyle/>
+          <a:p>
+            <a:pPr algn="ctr"/>
+            <a:r>
+              <a:rPr lang="en-US" dirty="0"/>
+              <a:t>Byte Code Interpreter Application </a:t>
+            </a:r>
+          </a:p>
+          <a:p>
+            <a:pPr algn="ctr"/>
+            <a:endParaRPr lang="en-US" dirty="0"/>
+          </a:p>
+          <a:p>
+            <a:pPr algn="ctr"/>
+            <a:endParaRPr lang="en-US" dirty="0"/>
+          </a:p>
+          <a:p>
+            <a:pPr algn="ctr"/>
+            <a:endParaRPr lang="en-US" dirty="0"/>
+          </a:p>
+          <a:p>
+            <a:pPr algn="ctr"/>
+            <a:endParaRPr lang="en-US" dirty="0"/>
+          </a:p>
+          <a:p>
+            <a:pPr algn="ctr"/>
+            <a:endParaRPr lang="en-US" dirty="0"/>
+          </a:p>
+          <a:p>
+            <a:pPr algn="ctr"/>
+            <a:endParaRPr lang="en-US" dirty="0"/>
+          </a:p>
+          <a:p>
+            <a:pPr algn="ctr"/>
+            <a:endParaRPr lang="en-US" dirty="0"/>
+          </a:p>
+          <a:p>
+            <a:pPr algn="ctr"/>
+            <a:endParaRPr lang="en-US" dirty="0"/>
+          </a:p>
+          <a:p>
+            <a:pPr algn="ctr"/>
+            <a:endParaRPr lang="en-US" dirty="0"/>
+          </a:p>
+          <a:p>
+            <a:pPr algn="ctr"/>
+            <a:endParaRPr lang="en-DE" dirty="0"/>
+          </a:p>
+        </p:txBody>
+      </p:sp>
+      <p:sp>
+        <p:nvSpPr>
+          <p:cNvPr id="5" name="Rectangle: Rounded Corners 4">
+            <a:extLst>
+              <a:ext uri="{FF2B5EF4-FFF2-40B4-BE49-F238E27FC236}">
+                <a16:creationId xmlns:a16="http://schemas.microsoft.com/office/drawing/2014/main" id="{9174C2B0-6D66-92B5-FA14-713F0E6FBD67}"/>
+              </a:ext>
+            </a:extLst>
+          </p:cNvPr>
+          <p:cNvSpPr/>
+          <p:nvPr/>
+        </p:nvSpPr>
+        <p:spPr>
+          <a:xfrm>
+            <a:off x="7287208" y="4180115"/>
+            <a:ext cx="3228392" cy="1595534"/>
+          </a:xfrm>
+          <a:prstGeom prst="roundRect">
+            <a:avLst/>
+          </a:prstGeom>
+        </p:spPr>
+        <p:style>
+          <a:lnRef idx="1">
+            <a:schemeClr val="accent4"/>
+          </a:lnRef>
+          <a:fillRef idx="2">
+            <a:schemeClr val="accent4"/>
+          </a:fillRef>
+          <a:effectRef idx="1">
+            <a:schemeClr val="accent4"/>
+          </a:effectRef>
+          <a:fontRef idx="minor">
+            <a:schemeClr val="dk1"/>
+          </a:fontRef>
+        </p:style>
+        <p:txBody>
+          <a:bodyPr rtlCol="0" anchor="ctr"/>
+          <a:lstStyle/>
+          <a:p>
+            <a:pPr algn="ctr"/>
+            <a:r>
+              <a:rPr lang="en-US" dirty="0"/>
+              <a:t>Byte Code Interpreter</a:t>
+            </a:r>
+            <a:endParaRPr lang="en-DE" dirty="0"/>
+          </a:p>
+        </p:txBody>
+      </p:sp>
+      <p:sp>
+        <p:nvSpPr>
+          <p:cNvPr id="6" name="Rectangle: Rounded Corners 5">
+            <a:extLst>
+              <a:ext uri="{FF2B5EF4-FFF2-40B4-BE49-F238E27FC236}">
+                <a16:creationId xmlns:a16="http://schemas.microsoft.com/office/drawing/2014/main" id="{92695F2F-FA78-D8E9-B8D0-D1FE6B51B738}"/>
+              </a:ext>
+            </a:extLst>
+          </p:cNvPr>
+          <p:cNvSpPr/>
+          <p:nvPr/>
+        </p:nvSpPr>
+        <p:spPr>
+          <a:xfrm>
+            <a:off x="1035699" y="1926770"/>
+            <a:ext cx="2556587" cy="1502229"/>
+          </a:xfrm>
+          <a:prstGeom prst="roundRect">
+            <a:avLst/>
+          </a:prstGeom>
+        </p:spPr>
+        <p:style>
+          <a:lnRef idx="1">
+            <a:schemeClr val="accent6"/>
+          </a:lnRef>
+          <a:fillRef idx="2">
+            <a:schemeClr val="accent6"/>
+          </a:fillRef>
+          <a:effectRef idx="1">
+            <a:schemeClr val="accent6"/>
+          </a:effectRef>
+          <a:fontRef idx="minor">
+            <a:schemeClr val="dk1"/>
+          </a:fontRef>
+        </p:style>
+        <p:txBody>
+          <a:bodyPr rtlCol="0" anchor="ctr"/>
+          <a:lstStyle/>
+          <a:p>
+            <a:pPr algn="ctr"/>
+            <a:r>
+              <a:rPr lang="en-US" dirty="0"/>
+              <a:t>Software that wants to use the Bytecode Interpreter</a:t>
+            </a:r>
+            <a:endParaRPr lang="en-DE" dirty="0"/>
+          </a:p>
+        </p:txBody>
+      </p:sp>
+      <p:cxnSp>
+        <p:nvCxnSpPr>
+          <p:cNvPr id="8" name="Straight Arrow Connector 7">
+            <a:extLst>
+              <a:ext uri="{FF2B5EF4-FFF2-40B4-BE49-F238E27FC236}">
+                <a16:creationId xmlns:a16="http://schemas.microsoft.com/office/drawing/2014/main" id="{0BA24F0B-0F48-AC29-5064-0ED0E3FA3C20}"/>
+              </a:ext>
+            </a:extLst>
+          </p:cNvPr>
+          <p:cNvCxnSpPr>
+            <a:cxnSpLocks/>
+            <a:stCxn id="6" idx="3"/>
+          </p:cNvCxnSpPr>
+          <p:nvPr/>
+        </p:nvCxnSpPr>
+        <p:spPr>
+          <a:xfrm>
+            <a:off x="3592286" y="2677885"/>
+            <a:ext cx="3191069" cy="0"/>
+          </a:xfrm>
+          <a:prstGeom prst="straightConnector1">
+            <a:avLst/>
+          </a:prstGeom>
+          <a:ln>
+            <a:tailEnd type="triangle"/>
+          </a:ln>
+        </p:spPr>
+        <p:style>
+          <a:lnRef idx="1">
+            <a:schemeClr val="accent1"/>
+          </a:lnRef>
+          <a:fillRef idx="0">
+            <a:schemeClr val="accent1"/>
+          </a:fillRef>
+          <a:effectRef idx="0">
+            <a:schemeClr val="accent1"/>
+          </a:effectRef>
+          <a:fontRef idx="minor">
+            <a:schemeClr val="tx1"/>
+          </a:fontRef>
+        </p:style>
+      </p:cxnSp>
+      <p:sp>
+        <p:nvSpPr>
+          <p:cNvPr id="10" name="TextBox 9">
+            <a:extLst>
+              <a:ext uri="{FF2B5EF4-FFF2-40B4-BE49-F238E27FC236}">
+                <a16:creationId xmlns:a16="http://schemas.microsoft.com/office/drawing/2014/main" id="{1FC8F602-CFA0-C930-BEBD-FA3EA0D7085F}"/>
+              </a:ext>
+            </a:extLst>
+          </p:cNvPr>
+          <p:cNvSpPr txBox="1"/>
+          <p:nvPr/>
+        </p:nvSpPr>
+        <p:spPr>
+          <a:xfrm>
+            <a:off x="3592286" y="2351447"/>
+            <a:ext cx="3349690" cy="307777"/>
+          </a:xfrm>
+          <a:prstGeom prst="rect">
+            <a:avLst/>
+          </a:prstGeom>
+          <a:noFill/>
+        </p:spPr>
+        <p:txBody>
+          <a:bodyPr wrap="square" rtlCol="0">
+            <a:spAutoFit/>
+          </a:bodyPr>
+          <a:lstStyle/>
+          <a:p>
+            <a:r>
+              <a:rPr lang="en-US" sz="1400" dirty="0"/>
+              <a:t>Sends Bytecodes for desired functionality</a:t>
+            </a:r>
+            <a:endParaRPr lang="en-DE" sz="1400" dirty="0"/>
+          </a:p>
+        </p:txBody>
+      </p:sp>
+      <p:cxnSp>
+        <p:nvCxnSpPr>
+          <p:cNvPr id="12" name="Connector: Elbow 11">
+            <a:extLst>
+              <a:ext uri="{FF2B5EF4-FFF2-40B4-BE49-F238E27FC236}">
+                <a16:creationId xmlns:a16="http://schemas.microsoft.com/office/drawing/2014/main" id="{A899B673-B592-405A-3127-EDAE22E6C3E1}"/>
+              </a:ext>
+            </a:extLst>
+          </p:cNvPr>
+          <p:cNvCxnSpPr>
+            <a:stCxn id="4" idx="1"/>
+            <a:endCxn id="5" idx="1"/>
+          </p:cNvCxnSpPr>
+          <p:nvPr/>
+        </p:nvCxnSpPr>
+        <p:spPr>
+          <a:xfrm rot="10800000" flipH="1" flipV="1">
+            <a:off x="6783354" y="3429000"/>
+            <a:ext cx="503853" cy="1548882"/>
+          </a:xfrm>
+          <a:prstGeom prst="bentConnector3">
+            <a:avLst>
+              <a:gd name="adj1" fmla="val -223148"/>
+            </a:avLst>
+          </a:prstGeom>
+          <a:ln>
+            <a:tailEnd type="triangle"/>
+          </a:ln>
+        </p:spPr>
+        <p:style>
+          <a:lnRef idx="1">
+            <a:schemeClr val="accent1"/>
+          </a:lnRef>
+          <a:fillRef idx="0">
+            <a:schemeClr val="accent1"/>
+          </a:fillRef>
+          <a:effectRef idx="0">
+            <a:schemeClr val="accent1"/>
+          </a:effectRef>
+          <a:fontRef idx="minor">
+            <a:schemeClr val="tx1"/>
+          </a:fontRef>
+        </p:style>
+      </p:cxnSp>
+      <p:sp>
+        <p:nvSpPr>
+          <p:cNvPr id="14" name="TextBox 13">
+            <a:extLst>
+              <a:ext uri="{FF2B5EF4-FFF2-40B4-BE49-F238E27FC236}">
+                <a16:creationId xmlns:a16="http://schemas.microsoft.com/office/drawing/2014/main" id="{9046C62B-CD88-CA66-2E62-4B50421FEF4D}"/>
+              </a:ext>
+            </a:extLst>
+          </p:cNvPr>
+          <p:cNvSpPr txBox="1"/>
+          <p:nvPr/>
+        </p:nvSpPr>
+        <p:spPr>
+          <a:xfrm>
+            <a:off x="4273421" y="3726387"/>
+            <a:ext cx="1401142" cy="954107"/>
+          </a:xfrm>
+          <a:prstGeom prst="rect">
+            <a:avLst/>
+          </a:prstGeom>
+          <a:noFill/>
+        </p:spPr>
+        <p:txBody>
+          <a:bodyPr wrap="square" rtlCol="0">
+            <a:spAutoFit/>
+          </a:bodyPr>
+          <a:lstStyle/>
+          <a:p>
+            <a:r>
+              <a:rPr lang="en-US" sz="1400" dirty="0"/>
+              <a:t>The application sends the bytecodes to the interpreter</a:t>
+            </a:r>
+            <a:endParaRPr lang="en-DE" sz="1400" dirty="0"/>
+          </a:p>
+        </p:txBody>
+      </p:sp>
+    </p:spTree>
+    <p:extLst>
+      <p:ext uri="{BB962C8B-B14F-4D97-AF65-F5344CB8AC3E}">
+        <p14:creationId xmlns:p14="http://schemas.microsoft.com/office/powerpoint/2010/main" val="3278995232"/>
+      </p:ext>
+    </p:extLst>
+  </p:cSld>
+  <p:clrMapOvr>
+    <a:masterClrMapping/>
+  </p:clrMapOvr>
+</p:sld>
+</file>
+
+<file path=ppt/slides/slide19.xml><?xml version="1.0" encoding="utf-8"?>
+<p:sld xmlns:a="http://schemas.openxmlformats.org/drawingml/2006/main" xmlns:r="http://schemas.openxmlformats.org/officeDocument/2006/relationships" xmlns:p="http://schemas.openxmlformats.org/presentationml/2006/main">
+  <p:cSld>
+    <p:spTree>
+      <p:nvGrpSpPr>
+        <p:cNvPr id="1" name=""/>
+        <p:cNvGrpSpPr/>
+        <p:nvPr/>
+      </p:nvGrpSpPr>
+      <p:grpSpPr>
+        <a:xfrm>
+          <a:off x="0" y="0"/>
+          <a:ext cx="0" cy="0"/>
+          <a:chOff x="0" y="0"/>
+          <a:chExt cx="0" cy="0"/>
+        </a:xfrm>
+      </p:grpSpPr>
+      <p:pic>
+        <p:nvPicPr>
+          <p:cNvPr id="5" name="Picture 4">
+            <a:extLst>
+              <a:ext uri="{FF2B5EF4-FFF2-40B4-BE49-F238E27FC236}">
+                <a16:creationId xmlns:a16="http://schemas.microsoft.com/office/drawing/2014/main" id="{68F3982E-7C74-50BE-3753-6D08146B22A7}"/>
+              </a:ext>
+            </a:extLst>
+          </p:cNvPr>
+          <p:cNvPicPr>
+            <a:picLocks noChangeAspect="1"/>
+          </p:cNvPicPr>
+          <p:nvPr/>
+        </p:nvPicPr>
+        <p:blipFill>
+          <a:blip r:embed="rId2"/>
+          <a:stretch>
+            <a:fillRect/>
+          </a:stretch>
+        </p:blipFill>
+        <p:spPr>
+          <a:xfrm rot="5400000">
+            <a:off x="4976312" y="5221471"/>
+            <a:ext cx="1980346" cy="920164"/>
+          </a:xfrm>
+          <a:prstGeom prst="rect">
+            <a:avLst/>
+          </a:prstGeom>
+        </p:spPr>
+      </p:pic>
+      <p:sp>
+        <p:nvSpPr>
+          <p:cNvPr id="6" name="Flowchart: Manual Operation 5">
+            <a:extLst>
+              <a:ext uri="{FF2B5EF4-FFF2-40B4-BE49-F238E27FC236}">
+                <a16:creationId xmlns:a16="http://schemas.microsoft.com/office/drawing/2014/main" id="{547AC4FE-1A0C-078A-000E-3286D0FAE1E0}"/>
+              </a:ext>
+            </a:extLst>
+          </p:cNvPr>
+          <p:cNvSpPr/>
+          <p:nvPr/>
+        </p:nvSpPr>
+        <p:spPr>
+          <a:xfrm>
+            <a:off x="5915050" y="4611370"/>
+            <a:ext cx="102870" cy="80010"/>
+          </a:xfrm>
+          <a:prstGeom prst="flowChartManualOperation">
+            <a:avLst/>
+          </a:prstGeom>
+        </p:spPr>
+        <p:style>
+          <a:lnRef idx="2">
+            <a:schemeClr val="accent2">
+              <a:shade val="15000"/>
+            </a:schemeClr>
+          </a:lnRef>
+          <a:fillRef idx="1">
+            <a:schemeClr val="accent2"/>
+          </a:fillRef>
+          <a:effectRef idx="0">
+            <a:schemeClr val="accent2"/>
+          </a:effectRef>
+          <a:fontRef idx="minor">
+            <a:schemeClr val="lt1"/>
+          </a:fontRef>
+        </p:style>
+        <p:txBody>
+          <a:bodyPr rtlCol="0" anchor="ctr"/>
+          <a:lstStyle/>
+          <a:p>
+            <a:pPr algn="ctr"/>
+            <a:endParaRPr lang="en-DE"/>
+          </a:p>
+        </p:txBody>
+      </p:sp>
+      <p:pic>
+        <p:nvPicPr>
+          <p:cNvPr id="8" name="Picture 7">
+            <a:extLst>
+              <a:ext uri="{FF2B5EF4-FFF2-40B4-BE49-F238E27FC236}">
+                <a16:creationId xmlns:a16="http://schemas.microsoft.com/office/drawing/2014/main" id="{884079F2-E014-54A6-53F9-7C1739EB686E}"/>
+              </a:ext>
+            </a:extLst>
+          </p:cNvPr>
+          <p:cNvPicPr>
+            <a:picLocks noChangeAspect="1"/>
+          </p:cNvPicPr>
+          <p:nvPr/>
+        </p:nvPicPr>
+        <p:blipFill>
+          <a:blip r:embed="rId3"/>
+          <a:stretch>
+            <a:fillRect/>
+          </a:stretch>
+        </p:blipFill>
+        <p:spPr>
+          <a:xfrm rot="10800000">
+            <a:off x="3936634" y="983488"/>
+            <a:ext cx="920164" cy="1505793"/>
+          </a:xfrm>
+          <a:prstGeom prst="rect">
+            <a:avLst/>
+          </a:prstGeom>
+        </p:spPr>
+      </p:pic>
+      <p:cxnSp>
+        <p:nvCxnSpPr>
+          <p:cNvPr id="10" name="Straight Connector 9">
+            <a:extLst>
+              <a:ext uri="{FF2B5EF4-FFF2-40B4-BE49-F238E27FC236}">
+                <a16:creationId xmlns:a16="http://schemas.microsoft.com/office/drawing/2014/main" id="{9670100F-7C70-BF74-2824-064BA4A180D4}"/>
+              </a:ext>
+            </a:extLst>
+          </p:cNvPr>
+          <p:cNvCxnSpPr/>
+          <p:nvPr/>
+        </p:nvCxnSpPr>
+        <p:spPr>
+          <a:xfrm>
+            <a:off x="3586480" y="132080"/>
+            <a:ext cx="0" cy="6654800"/>
+          </a:xfrm>
+          <a:prstGeom prst="line">
+            <a:avLst/>
+          </a:prstGeom>
+          <a:ln w="50800"/>
+        </p:spPr>
+        <p:style>
+          <a:lnRef idx="1">
+            <a:schemeClr val="dk1"/>
+          </a:lnRef>
+          <a:fillRef idx="0">
+            <a:schemeClr val="dk1"/>
+          </a:fillRef>
+          <a:effectRef idx="0">
+            <a:schemeClr val="dk1"/>
+          </a:effectRef>
+          <a:fontRef idx="minor">
+            <a:schemeClr val="tx1"/>
+          </a:fontRef>
+        </p:style>
+      </p:cxnSp>
+      <p:cxnSp>
+        <p:nvCxnSpPr>
+          <p:cNvPr id="11" name="Straight Connector 10">
+            <a:extLst>
+              <a:ext uri="{FF2B5EF4-FFF2-40B4-BE49-F238E27FC236}">
+                <a16:creationId xmlns:a16="http://schemas.microsoft.com/office/drawing/2014/main" id="{8A66175B-B698-C8C1-AD6C-89F7D6C5F227}"/>
+              </a:ext>
+            </a:extLst>
+          </p:cNvPr>
+          <p:cNvCxnSpPr/>
+          <p:nvPr/>
+        </p:nvCxnSpPr>
+        <p:spPr>
+          <a:xfrm>
+            <a:off x="6797040" y="101600"/>
+            <a:ext cx="0" cy="6654800"/>
+          </a:xfrm>
+          <a:prstGeom prst="line">
+            <a:avLst/>
+          </a:prstGeom>
+          <a:ln w="50800"/>
+        </p:spPr>
+        <p:style>
+          <a:lnRef idx="1">
+            <a:schemeClr val="dk1"/>
+          </a:lnRef>
+          <a:fillRef idx="0">
+            <a:schemeClr val="dk1"/>
+          </a:fillRef>
+          <a:effectRef idx="0">
+            <a:schemeClr val="dk1"/>
+          </a:effectRef>
+          <a:fontRef idx="minor">
+            <a:schemeClr val="tx1"/>
+          </a:fontRef>
+        </p:style>
+      </p:cxnSp>
+      <p:cxnSp>
+        <p:nvCxnSpPr>
+          <p:cNvPr id="12" name="Straight Connector 11">
+            <a:extLst>
+              <a:ext uri="{FF2B5EF4-FFF2-40B4-BE49-F238E27FC236}">
+                <a16:creationId xmlns:a16="http://schemas.microsoft.com/office/drawing/2014/main" id="{B640D7DA-5F16-9C39-BDBA-5480B1C49940}"/>
+              </a:ext>
+            </a:extLst>
+          </p:cNvPr>
+          <p:cNvCxnSpPr/>
+          <p:nvPr/>
+        </p:nvCxnSpPr>
+        <p:spPr>
+          <a:xfrm>
+            <a:off x="5181600" y="132080"/>
+            <a:ext cx="0" cy="6654800"/>
+          </a:xfrm>
+          <a:prstGeom prst="line">
+            <a:avLst/>
+          </a:prstGeom>
+          <a:ln w="50800">
+            <a:prstDash val="dash"/>
+          </a:ln>
+        </p:spPr>
+        <p:style>
+          <a:lnRef idx="1">
+            <a:schemeClr val="dk1"/>
+          </a:lnRef>
+          <a:fillRef idx="0">
+            <a:schemeClr val="dk1"/>
+          </a:fillRef>
+          <a:effectRef idx="0">
+            <a:schemeClr val="dk1"/>
+          </a:effectRef>
+          <a:fontRef idx="minor">
+            <a:schemeClr val="tx1"/>
+          </a:fontRef>
+        </p:style>
+      </p:cxnSp>
+      <p:sp>
+        <p:nvSpPr>
+          <p:cNvPr id="14" name="Oval 13">
+            <a:extLst>
+              <a:ext uri="{FF2B5EF4-FFF2-40B4-BE49-F238E27FC236}">
+                <a16:creationId xmlns:a16="http://schemas.microsoft.com/office/drawing/2014/main" id="{FF29EB0D-C21C-A686-8CC9-93D5CCD75CC9}"/>
+              </a:ext>
+            </a:extLst>
+          </p:cNvPr>
+          <p:cNvSpPr/>
+          <p:nvPr/>
+        </p:nvSpPr>
+        <p:spPr>
+          <a:xfrm>
+            <a:off x="4693617" y="2308860"/>
+            <a:ext cx="45719" cy="48259"/>
+          </a:xfrm>
+          <a:prstGeom prst="ellipse">
+            <a:avLst/>
+          </a:prstGeom>
+          <a:solidFill>
+            <a:schemeClr val="accent6"/>
+          </a:solidFill>
+          <a:ln>
+            <a:solidFill>
+              <a:srgbClr val="00B050"/>
+            </a:solidFill>
+          </a:ln>
+        </p:spPr>
+        <p:style>
+          <a:lnRef idx="2">
+            <a:schemeClr val="accent1">
+              <a:shade val="15000"/>
+            </a:schemeClr>
+          </a:lnRef>
+          <a:fillRef idx="1">
+            <a:schemeClr val="accent1"/>
+          </a:fillRef>
+          <a:effectRef idx="0">
+            <a:schemeClr val="accent1"/>
+          </a:effectRef>
+          <a:fontRef idx="minor">
+            <a:schemeClr val="lt1"/>
+          </a:fontRef>
+        </p:style>
+        <p:txBody>
+          <a:bodyPr rtlCol="0" anchor="ctr"/>
+          <a:lstStyle/>
+          <a:p>
+            <a:pPr algn="ctr"/>
+            <a:endParaRPr lang="en-DE"/>
+          </a:p>
+        </p:txBody>
+      </p:sp>
+      <p:cxnSp>
+        <p:nvCxnSpPr>
+          <p:cNvPr id="16" name="Straight Arrow Connector 15">
+            <a:extLst>
+              <a:ext uri="{FF2B5EF4-FFF2-40B4-BE49-F238E27FC236}">
+                <a16:creationId xmlns:a16="http://schemas.microsoft.com/office/drawing/2014/main" id="{EA17A7E9-9339-AA3B-8126-5C7AF4B20384}"/>
+              </a:ext>
+            </a:extLst>
+          </p:cNvPr>
+          <p:cNvCxnSpPr>
+            <a:stCxn id="6" idx="0"/>
+          </p:cNvCxnSpPr>
+          <p:nvPr/>
+        </p:nvCxnSpPr>
+        <p:spPr>
+          <a:xfrm flipH="1" flipV="1">
+            <a:off x="5963920" y="3251200"/>
+            <a:ext cx="2565" cy="1360170"/>
+          </a:xfrm>
+          <a:prstGeom prst="straightConnector1">
+            <a:avLst/>
+          </a:prstGeom>
+          <a:ln w="25400">
+            <a:solidFill>
+              <a:schemeClr val="tx1"/>
+            </a:solidFill>
+            <a:tailEnd type="triangle"/>
+          </a:ln>
+        </p:spPr>
+        <p:style>
+          <a:lnRef idx="1">
+            <a:schemeClr val="accent1"/>
+          </a:lnRef>
+          <a:fillRef idx="0">
+            <a:schemeClr val="accent1"/>
+          </a:fillRef>
+          <a:effectRef idx="0">
+            <a:schemeClr val="accent1"/>
+          </a:effectRef>
+          <a:fontRef idx="minor">
+            <a:schemeClr val="tx1"/>
+          </a:fontRef>
+        </p:style>
+      </p:cxnSp>
+      <p:sp>
+        <p:nvSpPr>
+          <p:cNvPr id="17" name="Oval 16">
+            <a:extLst>
+              <a:ext uri="{FF2B5EF4-FFF2-40B4-BE49-F238E27FC236}">
+                <a16:creationId xmlns:a16="http://schemas.microsoft.com/office/drawing/2014/main" id="{766F8AED-6C66-7B5D-AEA1-E677C25FA4DA}"/>
+              </a:ext>
+            </a:extLst>
+          </p:cNvPr>
+          <p:cNvSpPr/>
+          <p:nvPr/>
+        </p:nvSpPr>
+        <p:spPr>
+          <a:xfrm>
+            <a:off x="4531584" y="2397189"/>
+            <a:ext cx="52416" cy="62099"/>
+          </a:xfrm>
+          <a:prstGeom prst="ellipse">
+            <a:avLst/>
+          </a:prstGeom>
+          <a:solidFill>
+            <a:schemeClr val="accent6"/>
+          </a:solidFill>
+          <a:ln>
+            <a:solidFill>
+              <a:srgbClr val="00B050"/>
+            </a:solidFill>
+          </a:ln>
+        </p:spPr>
+        <p:style>
+          <a:lnRef idx="2">
+            <a:schemeClr val="accent1">
+              <a:shade val="15000"/>
+            </a:schemeClr>
+          </a:lnRef>
+          <a:fillRef idx="1">
+            <a:schemeClr val="accent1"/>
+          </a:fillRef>
+          <a:effectRef idx="0">
+            <a:schemeClr val="accent1"/>
+          </a:effectRef>
+          <a:fontRef idx="minor">
+            <a:schemeClr val="lt1"/>
+          </a:fontRef>
+        </p:style>
+        <p:txBody>
+          <a:bodyPr rtlCol="0" anchor="ctr"/>
+          <a:lstStyle/>
+          <a:p>
+            <a:pPr algn="ctr"/>
+            <a:endParaRPr lang="en-DE"/>
+          </a:p>
+        </p:txBody>
+      </p:sp>
+      <p:sp>
+        <p:nvSpPr>
+          <p:cNvPr id="18" name="Oval 17">
+            <a:extLst>
+              <a:ext uri="{FF2B5EF4-FFF2-40B4-BE49-F238E27FC236}">
+                <a16:creationId xmlns:a16="http://schemas.microsoft.com/office/drawing/2014/main" id="{7906AC42-0908-4FED-6CE1-04468996FB34}"/>
+              </a:ext>
+            </a:extLst>
+          </p:cNvPr>
+          <p:cNvSpPr/>
+          <p:nvPr/>
+        </p:nvSpPr>
+        <p:spPr>
+          <a:xfrm>
+            <a:off x="4282151" y="2395220"/>
+            <a:ext cx="53944" cy="66039"/>
+          </a:xfrm>
+          <a:prstGeom prst="ellipse">
+            <a:avLst/>
+          </a:prstGeom>
+          <a:solidFill>
+            <a:schemeClr val="accent6"/>
+          </a:solidFill>
+          <a:ln>
+            <a:solidFill>
+              <a:srgbClr val="00B050"/>
+            </a:solidFill>
+          </a:ln>
+        </p:spPr>
+        <p:style>
+          <a:lnRef idx="2">
+            <a:schemeClr val="accent1">
+              <a:shade val="15000"/>
+            </a:schemeClr>
+          </a:lnRef>
+          <a:fillRef idx="1">
+            <a:schemeClr val="accent1"/>
+          </a:fillRef>
+          <a:effectRef idx="0">
+            <a:schemeClr val="accent1"/>
+          </a:effectRef>
+          <a:fontRef idx="minor">
+            <a:schemeClr val="lt1"/>
+          </a:fontRef>
+        </p:style>
+        <p:txBody>
+          <a:bodyPr rtlCol="0" anchor="ctr"/>
+          <a:lstStyle/>
+          <a:p>
+            <a:pPr algn="ctr"/>
+            <a:endParaRPr lang="en-DE"/>
+          </a:p>
+        </p:txBody>
+      </p:sp>
+      <p:sp>
+        <p:nvSpPr>
+          <p:cNvPr id="19" name="Oval 18">
+            <a:extLst>
+              <a:ext uri="{FF2B5EF4-FFF2-40B4-BE49-F238E27FC236}">
+                <a16:creationId xmlns:a16="http://schemas.microsoft.com/office/drawing/2014/main" id="{DEF5C68C-6594-8D9C-E766-AD5AC622D745}"/>
+              </a:ext>
+            </a:extLst>
+          </p:cNvPr>
+          <p:cNvSpPr/>
+          <p:nvPr/>
+        </p:nvSpPr>
+        <p:spPr>
+          <a:xfrm>
+            <a:off x="4621874" y="2346961"/>
+            <a:ext cx="45719" cy="48259"/>
+          </a:xfrm>
+          <a:prstGeom prst="ellipse">
+            <a:avLst/>
+          </a:prstGeom>
+          <a:solidFill>
+            <a:schemeClr val="accent6"/>
+          </a:solidFill>
+          <a:ln>
+            <a:solidFill>
+              <a:srgbClr val="00B050"/>
+            </a:solidFill>
+          </a:ln>
+        </p:spPr>
+        <p:style>
+          <a:lnRef idx="2">
+            <a:schemeClr val="accent1">
+              <a:shade val="15000"/>
+            </a:schemeClr>
+          </a:lnRef>
+          <a:fillRef idx="1">
+            <a:schemeClr val="accent1"/>
+          </a:fillRef>
+          <a:effectRef idx="0">
+            <a:schemeClr val="accent1"/>
+          </a:effectRef>
+          <a:fontRef idx="minor">
+            <a:schemeClr val="lt1"/>
+          </a:fontRef>
+        </p:style>
+        <p:txBody>
+          <a:bodyPr rtlCol="0" anchor="ctr"/>
+          <a:lstStyle/>
+          <a:p>
+            <a:pPr algn="ctr"/>
+            <a:endParaRPr lang="en-DE"/>
+          </a:p>
+        </p:txBody>
+      </p:sp>
+      <p:sp>
+        <p:nvSpPr>
+          <p:cNvPr id="20" name="Oval 19">
+            <a:extLst>
+              <a:ext uri="{FF2B5EF4-FFF2-40B4-BE49-F238E27FC236}">
+                <a16:creationId xmlns:a16="http://schemas.microsoft.com/office/drawing/2014/main" id="{2977DAF4-2C67-01C3-6F57-A9A622C35C32}"/>
+              </a:ext>
+            </a:extLst>
+          </p:cNvPr>
+          <p:cNvSpPr/>
+          <p:nvPr/>
+        </p:nvSpPr>
+        <p:spPr>
+          <a:xfrm>
+            <a:off x="4723462" y="2128440"/>
+            <a:ext cx="45719" cy="48258"/>
+          </a:xfrm>
+          <a:prstGeom prst="ellipse">
+            <a:avLst/>
+          </a:prstGeom>
+          <a:solidFill>
+            <a:schemeClr val="accent6"/>
+          </a:solidFill>
+          <a:ln>
+            <a:solidFill>
+              <a:srgbClr val="00B050"/>
+            </a:solidFill>
+          </a:ln>
+        </p:spPr>
+        <p:style>
+          <a:lnRef idx="2">
+            <a:schemeClr val="accent1">
+              <a:shade val="15000"/>
+            </a:schemeClr>
+          </a:lnRef>
+          <a:fillRef idx="1">
+            <a:schemeClr val="accent1"/>
+          </a:fillRef>
+          <a:effectRef idx="0">
+            <a:schemeClr val="accent1"/>
+          </a:effectRef>
+          <a:fontRef idx="minor">
+            <a:schemeClr val="lt1"/>
+          </a:fontRef>
+        </p:style>
+        <p:txBody>
+          <a:bodyPr rtlCol="0" anchor="ctr"/>
+          <a:lstStyle/>
+          <a:p>
+            <a:pPr algn="ctr"/>
+            <a:endParaRPr lang="en-DE"/>
+          </a:p>
+        </p:txBody>
+      </p:sp>
+      <p:cxnSp>
+        <p:nvCxnSpPr>
+          <p:cNvPr id="22" name="Straight Arrow Connector 21">
+            <a:extLst>
+              <a:ext uri="{FF2B5EF4-FFF2-40B4-BE49-F238E27FC236}">
+                <a16:creationId xmlns:a16="http://schemas.microsoft.com/office/drawing/2014/main" id="{A8A07094-B3DA-8F75-C9D8-6B7B2C4913AF}"/>
+              </a:ext>
+            </a:extLst>
+          </p:cNvPr>
+          <p:cNvCxnSpPr>
+            <a:stCxn id="6" idx="0"/>
+            <a:endCxn id="19" idx="5"/>
+          </p:cNvCxnSpPr>
+          <p:nvPr/>
+        </p:nvCxnSpPr>
+        <p:spPr>
+          <a:xfrm flipH="1" flipV="1">
+            <a:off x="4660898" y="2388153"/>
+            <a:ext cx="1305587" cy="2223217"/>
+          </a:xfrm>
+          <a:prstGeom prst="straightConnector1">
+            <a:avLst/>
+          </a:prstGeom>
+          <a:ln w="19050">
+            <a:solidFill>
+              <a:schemeClr val="accent2">
+                <a:lumMod val="75000"/>
+              </a:schemeClr>
+            </a:solidFill>
+            <a:prstDash val="dash"/>
+            <a:tailEnd type="none"/>
+          </a:ln>
+        </p:spPr>
+        <p:style>
+          <a:lnRef idx="1">
+            <a:schemeClr val="accent1"/>
+          </a:lnRef>
+          <a:fillRef idx="0">
+            <a:schemeClr val="accent1"/>
+          </a:fillRef>
+          <a:effectRef idx="0">
+            <a:schemeClr val="accent1"/>
+          </a:effectRef>
+          <a:fontRef idx="minor">
+            <a:schemeClr val="tx1"/>
+          </a:fontRef>
+        </p:style>
+      </p:cxnSp>
+      <p:cxnSp>
+        <p:nvCxnSpPr>
+          <p:cNvPr id="24" name="Straight Arrow Connector 23">
+            <a:extLst>
+              <a:ext uri="{FF2B5EF4-FFF2-40B4-BE49-F238E27FC236}">
+                <a16:creationId xmlns:a16="http://schemas.microsoft.com/office/drawing/2014/main" id="{67D8EBA9-C292-C709-1BB4-E23BBEF646C4}"/>
+              </a:ext>
+            </a:extLst>
+          </p:cNvPr>
+          <p:cNvCxnSpPr>
+            <a:cxnSpLocks/>
+            <a:stCxn id="19" idx="4"/>
+          </p:cNvCxnSpPr>
+          <p:nvPr/>
+        </p:nvCxnSpPr>
+        <p:spPr>
+          <a:xfrm>
+            <a:off x="4644734" y="2395220"/>
+            <a:ext cx="0" cy="399415"/>
+          </a:xfrm>
+          <a:prstGeom prst="straightConnector1">
+            <a:avLst/>
+          </a:prstGeom>
+          <a:ln w="12700">
+            <a:solidFill>
+              <a:schemeClr val="tx1"/>
+            </a:solidFill>
+            <a:tailEnd type="triangle"/>
+          </a:ln>
+        </p:spPr>
+        <p:style>
+          <a:lnRef idx="1">
+            <a:schemeClr val="accent1"/>
+          </a:lnRef>
+          <a:fillRef idx="0">
+            <a:schemeClr val="accent1"/>
+          </a:fillRef>
+          <a:effectRef idx="0">
+            <a:schemeClr val="accent1"/>
+          </a:effectRef>
+          <a:fontRef idx="minor">
+            <a:schemeClr val="tx1"/>
+          </a:fontRef>
+        </p:style>
+      </p:cxnSp>
+      <p:cxnSp>
+        <p:nvCxnSpPr>
+          <p:cNvPr id="26" name="Straight Arrow Connector 25">
+            <a:extLst>
+              <a:ext uri="{FF2B5EF4-FFF2-40B4-BE49-F238E27FC236}">
+                <a16:creationId xmlns:a16="http://schemas.microsoft.com/office/drawing/2014/main" id="{0E8CE2B0-1253-4656-784B-DEF23F172858}"/>
+              </a:ext>
+            </a:extLst>
+          </p:cNvPr>
+          <p:cNvCxnSpPr>
+            <a:stCxn id="19" idx="6"/>
+          </p:cNvCxnSpPr>
+          <p:nvPr/>
+        </p:nvCxnSpPr>
+        <p:spPr>
+          <a:xfrm flipV="1">
+            <a:off x="4667593" y="2371090"/>
+            <a:ext cx="366724" cy="1"/>
+          </a:xfrm>
+          <a:prstGeom prst="straightConnector1">
+            <a:avLst/>
+          </a:prstGeom>
+          <a:ln w="12700">
+            <a:solidFill>
+              <a:schemeClr val="tx1"/>
+            </a:solidFill>
+            <a:tailEnd type="triangle"/>
+          </a:ln>
+        </p:spPr>
+        <p:style>
+          <a:lnRef idx="1">
+            <a:schemeClr val="accent1"/>
+          </a:lnRef>
+          <a:fillRef idx="0">
+            <a:schemeClr val="accent1"/>
+          </a:fillRef>
+          <a:effectRef idx="0">
+            <a:schemeClr val="accent1"/>
+          </a:effectRef>
+          <a:fontRef idx="minor">
+            <a:schemeClr val="tx1"/>
+          </a:fontRef>
+        </p:style>
+      </p:cxnSp>
+      <p:cxnSp>
+        <p:nvCxnSpPr>
+          <p:cNvPr id="29" name="Straight Arrow Connector 28">
+            <a:extLst>
+              <a:ext uri="{FF2B5EF4-FFF2-40B4-BE49-F238E27FC236}">
+                <a16:creationId xmlns:a16="http://schemas.microsoft.com/office/drawing/2014/main" id="{AC5BF8C7-838C-A47B-389C-56F1EBDA5DAA}"/>
+              </a:ext>
+            </a:extLst>
+          </p:cNvPr>
+          <p:cNvCxnSpPr>
+            <a:stCxn id="19" idx="5"/>
+          </p:cNvCxnSpPr>
+          <p:nvPr/>
+        </p:nvCxnSpPr>
+        <p:spPr>
+          <a:xfrm>
+            <a:off x="4660898" y="2388153"/>
+            <a:ext cx="309247" cy="526497"/>
+          </a:xfrm>
+          <a:prstGeom prst="straightConnector1">
+            <a:avLst/>
+          </a:prstGeom>
+          <a:ln w="19050">
+            <a:solidFill>
+              <a:schemeClr val="accent2">
+                <a:lumMod val="75000"/>
+              </a:schemeClr>
+            </a:solidFill>
+            <a:tailEnd type="triangle"/>
+          </a:ln>
+        </p:spPr>
+        <p:style>
+          <a:lnRef idx="1">
+            <a:schemeClr val="accent1"/>
+          </a:lnRef>
+          <a:fillRef idx="0">
+            <a:schemeClr val="accent1"/>
+          </a:fillRef>
+          <a:effectRef idx="0">
+            <a:schemeClr val="accent1"/>
+          </a:effectRef>
+          <a:fontRef idx="minor">
+            <a:schemeClr val="tx1"/>
+          </a:fontRef>
+        </p:style>
+      </p:cxnSp>
+      <p:sp>
+        <p:nvSpPr>
+          <p:cNvPr id="30" name="TextBox 29">
+            <a:extLst>
+              <a:ext uri="{FF2B5EF4-FFF2-40B4-BE49-F238E27FC236}">
+                <a16:creationId xmlns:a16="http://schemas.microsoft.com/office/drawing/2014/main" id="{51854F20-673A-0BCB-E383-3553A3BC59F7}"/>
+              </a:ext>
+            </a:extLst>
+          </p:cNvPr>
+          <p:cNvSpPr txBox="1"/>
+          <p:nvPr/>
+        </p:nvSpPr>
+        <p:spPr>
+          <a:xfrm>
+            <a:off x="5656911" y="3007358"/>
+            <a:ext cx="664818" cy="307777"/>
+          </a:xfrm>
+          <a:prstGeom prst="rect">
+            <a:avLst/>
+          </a:prstGeom>
+          <a:noFill/>
+        </p:spPr>
+        <p:txBody>
+          <a:bodyPr wrap="square" rtlCol="0">
+            <a:spAutoFit/>
+          </a:bodyPr>
+          <a:lstStyle/>
+          <a:p>
+            <a:r>
+              <a:rPr lang="en-US" sz="1400" i="1" dirty="0"/>
+              <a:t>V_ego</a:t>
+            </a:r>
+            <a:endParaRPr lang="en-DE" sz="1400" i="1" dirty="0"/>
+          </a:p>
+        </p:txBody>
+      </p:sp>
+      <p:cxnSp>
+        <p:nvCxnSpPr>
+          <p:cNvPr id="40" name="Connector: Curved 39">
+            <a:extLst>
+              <a:ext uri="{FF2B5EF4-FFF2-40B4-BE49-F238E27FC236}">
+                <a16:creationId xmlns:a16="http://schemas.microsoft.com/office/drawing/2014/main" id="{D09CF691-5EE4-6DA6-4436-D2DCD599B64B}"/>
+              </a:ext>
+            </a:extLst>
+          </p:cNvPr>
+          <p:cNvCxnSpPr/>
+          <p:nvPr/>
+        </p:nvCxnSpPr>
+        <p:spPr>
+          <a:xfrm rot="10800000" flipV="1">
+            <a:off x="5753100" y="4198620"/>
+            <a:ext cx="210820" cy="60960"/>
+          </a:xfrm>
+          <a:prstGeom prst="curvedConnector3">
+            <a:avLst>
+              <a:gd name="adj1" fmla="val 68072"/>
+            </a:avLst>
+          </a:prstGeom>
+          <a:ln>
+            <a:solidFill>
+              <a:schemeClr val="tx2"/>
+            </a:solidFill>
+            <a:tailEnd type="triangle"/>
+          </a:ln>
+        </p:spPr>
+        <p:style>
+          <a:lnRef idx="1">
+            <a:schemeClr val="accent1"/>
+          </a:lnRef>
+          <a:fillRef idx="0">
+            <a:schemeClr val="accent1"/>
+          </a:fillRef>
+          <a:effectRef idx="0">
+            <a:schemeClr val="accent1"/>
+          </a:effectRef>
+          <a:fontRef idx="minor">
+            <a:schemeClr val="tx1"/>
+          </a:fontRef>
+        </p:style>
+      </p:cxnSp>
+      <p:cxnSp>
+        <p:nvCxnSpPr>
+          <p:cNvPr id="47" name="Connector: Curved 46">
+            <a:extLst>
+              <a:ext uri="{FF2B5EF4-FFF2-40B4-BE49-F238E27FC236}">
+                <a16:creationId xmlns:a16="http://schemas.microsoft.com/office/drawing/2014/main" id="{993070B9-4E82-8142-E39F-1EAB477F1408}"/>
+              </a:ext>
+            </a:extLst>
+          </p:cNvPr>
+          <p:cNvCxnSpPr>
+            <a:cxnSpLocks/>
+          </p:cNvCxnSpPr>
+          <p:nvPr/>
+        </p:nvCxnSpPr>
+        <p:spPr>
+          <a:xfrm flipV="1">
+            <a:off x="4644733" y="2551511"/>
+            <a:ext cx="124448" cy="43416"/>
+          </a:xfrm>
+          <a:prstGeom prst="curvedConnector3">
+            <a:avLst>
+              <a:gd name="adj1" fmla="val 74492"/>
+            </a:avLst>
+          </a:prstGeom>
+          <a:ln>
+            <a:tailEnd type="stealth"/>
+          </a:ln>
+        </p:spPr>
+        <p:style>
+          <a:lnRef idx="1">
+            <a:schemeClr val="accent1"/>
+          </a:lnRef>
+          <a:fillRef idx="0">
+            <a:schemeClr val="accent1"/>
+          </a:fillRef>
+          <a:effectRef idx="0">
+            <a:schemeClr val="accent1"/>
+          </a:effectRef>
+          <a:fontRef idx="minor">
+            <a:schemeClr val="tx1"/>
+          </a:fontRef>
+        </p:style>
+      </p:cxnSp>
+      <mc:AlternateContent xmlns:mc="http://schemas.openxmlformats.org/markup-compatibility/2006" xmlns:a14="http://schemas.microsoft.com/office/drawing/2010/main">
+        <mc:Choice Requires="a14">
+          <p:sp>
+            <p:nvSpPr>
+              <p:cNvPr id="54" name="TextBox 53">
+                <a:extLst>
+                  <a:ext uri="{FF2B5EF4-FFF2-40B4-BE49-F238E27FC236}">
+                    <a16:creationId xmlns:a16="http://schemas.microsoft.com/office/drawing/2014/main" id="{A022B67B-6D6D-46F1-1EF5-6D5183A74888}"/>
+                  </a:ext>
+                </a:extLst>
+              </p:cNvPr>
+              <p:cNvSpPr txBox="1"/>
+              <p:nvPr/>
+            </p:nvSpPr>
+            <p:spPr>
+              <a:xfrm>
+                <a:off x="5761855" y="4010888"/>
+                <a:ext cx="162168" cy="215444"/>
+              </a:xfrm>
+              <a:prstGeom prst="rect">
+                <a:avLst/>
+              </a:prstGeom>
+              <a:noFill/>
+            </p:spPr>
+            <p:txBody>
+              <a:bodyPr wrap="square" lIns="0" tIns="0" rIns="0" bIns="0" rtlCol="0">
+                <a:spAutoFit/>
+              </a:bodyPr>
+              <a:lstStyle/>
+              <a:p>
+                <a:pPr/>
+                <a14:m>
+                  <m:oMathPara xmlns:m="http://schemas.openxmlformats.org/officeDocument/2006/math">
+                    <m:oMathParaPr>
+                      <m:jc m:val="centerGroup"/>
+                    </m:oMathParaPr>
+                    <m:oMath xmlns:m="http://schemas.openxmlformats.org/officeDocument/2006/math">
+                      <m:r>
+                        <a:rPr lang="en-US" sz="1400" i="0" smtClean="0">
+                          <a:latin typeface="Cambria Math" panose="02040503050406030204" pitchFamily="18" charset="0"/>
+                        </a:rPr>
+                        <m:t>ɵ</m:t>
+                      </m:r>
+                    </m:oMath>
+                  </m:oMathPara>
+                </a14:m>
+                <a:endParaRPr lang="en-DE" sz="1400" dirty="0"/>
+              </a:p>
+            </p:txBody>
+          </p:sp>
+        </mc:Choice>
+        <mc:Fallback xmlns="">
+          <p:sp>
+            <p:nvSpPr>
+              <p:cNvPr id="54" name="TextBox 53">
+                <a:extLst>
+                  <a:ext uri="{FF2B5EF4-FFF2-40B4-BE49-F238E27FC236}">
+                    <a16:creationId xmlns:a16="http://schemas.microsoft.com/office/drawing/2014/main" id="{A022B67B-6D6D-46F1-1EF5-6D5183A74888}"/>
+                  </a:ext>
+                </a:extLst>
+              </p:cNvPr>
+              <p:cNvSpPr txBox="1">
+                <a:spLocks noRot="1" noChangeAspect="1" noMove="1" noResize="1" noEditPoints="1" noAdjustHandles="1" noChangeArrowheads="1" noChangeShapeType="1" noTextEdit="1"/>
+              </p:cNvSpPr>
+              <p:nvPr/>
+            </p:nvSpPr>
+            <p:spPr>
+              <a:xfrm>
+                <a:off x="5761855" y="4010888"/>
+                <a:ext cx="162168" cy="215444"/>
+              </a:xfrm>
+              <a:prstGeom prst="rect">
+                <a:avLst/>
+              </a:prstGeom>
+              <a:blipFill>
+                <a:blip r:embed="rId4"/>
+                <a:stretch>
+                  <a:fillRect l="-3704" r="-7407"/>
+                </a:stretch>
+              </a:blipFill>
+            </p:spPr>
+            <p:txBody>
+              <a:bodyPr/>
+              <a:lstStyle/>
+              <a:p>
+                <a:r>
+                  <a:rPr lang="en-DE">
+                    <a:noFill/>
+                  </a:rPr>
+                  <a:t> </a:t>
+                </a:r>
+              </a:p>
+            </p:txBody>
+          </p:sp>
+        </mc:Fallback>
+      </mc:AlternateContent>
+      <mc:AlternateContent xmlns:mc="http://schemas.openxmlformats.org/markup-compatibility/2006" xmlns:a14="http://schemas.microsoft.com/office/drawing/2010/main">
+        <mc:Choice Requires="a14">
+          <p:sp>
+            <p:nvSpPr>
+              <p:cNvPr id="55" name="TextBox 54">
+                <a:extLst>
+                  <a:ext uri="{FF2B5EF4-FFF2-40B4-BE49-F238E27FC236}">
+                    <a16:creationId xmlns:a16="http://schemas.microsoft.com/office/drawing/2014/main" id="{4D72A8C1-A9F8-034A-69E3-F74D6F910303}"/>
+                  </a:ext>
+                </a:extLst>
+              </p:cNvPr>
+              <p:cNvSpPr txBox="1"/>
+              <p:nvPr/>
+            </p:nvSpPr>
+            <p:spPr>
+              <a:xfrm>
+                <a:off x="4644732" y="2543679"/>
+                <a:ext cx="162168" cy="215444"/>
+              </a:xfrm>
+              <a:prstGeom prst="rect">
+                <a:avLst/>
+              </a:prstGeom>
+              <a:noFill/>
+            </p:spPr>
+            <p:txBody>
+              <a:bodyPr wrap="square" lIns="0" tIns="0" rIns="0" bIns="0" rtlCol="0">
+                <a:spAutoFit/>
+              </a:bodyPr>
+              <a:lstStyle/>
+              <a:p>
+                <a:pPr/>
+                <a14:m>
+                  <m:oMathPara xmlns:m="http://schemas.openxmlformats.org/officeDocument/2006/math">
+                    <m:oMathParaPr>
+                      <m:jc m:val="centerGroup"/>
+                    </m:oMathParaPr>
+                    <m:oMath xmlns:m="http://schemas.openxmlformats.org/officeDocument/2006/math">
+                      <m:r>
+                        <a:rPr lang="en-US" sz="1400" i="0" smtClean="0">
+                          <a:latin typeface="Cambria Math" panose="02040503050406030204" pitchFamily="18" charset="0"/>
+                        </a:rPr>
+                        <m:t>ɵ</m:t>
+                      </m:r>
+                    </m:oMath>
+                  </m:oMathPara>
+                </a14:m>
+                <a:endParaRPr lang="en-DE" sz="1400" dirty="0"/>
+              </a:p>
+            </p:txBody>
+          </p:sp>
+        </mc:Choice>
+        <mc:Fallback xmlns="">
+          <p:sp>
+            <p:nvSpPr>
+              <p:cNvPr id="55" name="TextBox 54">
+                <a:extLst>
+                  <a:ext uri="{FF2B5EF4-FFF2-40B4-BE49-F238E27FC236}">
+                    <a16:creationId xmlns:a16="http://schemas.microsoft.com/office/drawing/2014/main" id="{4D72A8C1-A9F8-034A-69E3-F74D6F910303}"/>
+                  </a:ext>
+                </a:extLst>
+              </p:cNvPr>
+              <p:cNvSpPr txBox="1">
+                <a:spLocks noRot="1" noChangeAspect="1" noMove="1" noResize="1" noEditPoints="1" noAdjustHandles="1" noChangeArrowheads="1" noChangeShapeType="1" noTextEdit="1"/>
+              </p:cNvSpPr>
+              <p:nvPr/>
+            </p:nvSpPr>
+            <p:spPr>
+              <a:xfrm>
+                <a:off x="4644732" y="2543679"/>
+                <a:ext cx="162168" cy="215444"/>
+              </a:xfrm>
+              <a:prstGeom prst="rect">
+                <a:avLst/>
+              </a:prstGeom>
+              <a:blipFill>
+                <a:blip r:embed="rId5"/>
+                <a:stretch>
+                  <a:fillRect l="-7407" r="-3704"/>
+                </a:stretch>
+              </a:blipFill>
+            </p:spPr>
+            <p:txBody>
+              <a:bodyPr/>
+              <a:lstStyle/>
+              <a:p>
+                <a:r>
+                  <a:rPr lang="en-DE">
+                    <a:noFill/>
+                  </a:rPr>
+                  <a:t> </a:t>
+                </a:r>
+              </a:p>
+            </p:txBody>
+          </p:sp>
+        </mc:Fallback>
+      </mc:AlternateContent>
+      <mc:AlternateContent xmlns:mc="http://schemas.openxmlformats.org/markup-compatibility/2006" xmlns:a14="http://schemas.microsoft.com/office/drawing/2010/main">
+        <mc:Choice Requires="a14">
+          <p:sp>
+            <p:nvSpPr>
+              <p:cNvPr id="56" name="TextBox 55">
+                <a:extLst>
+                  <a:ext uri="{FF2B5EF4-FFF2-40B4-BE49-F238E27FC236}">
+                    <a16:creationId xmlns:a16="http://schemas.microsoft.com/office/drawing/2014/main" id="{C32DF7C9-38DC-B2A7-6974-95A7550BD639}"/>
+                  </a:ext>
+                </a:extLst>
+              </p:cNvPr>
+              <p:cNvSpPr txBox="1"/>
+              <p:nvPr/>
+            </p:nvSpPr>
+            <p:spPr>
+              <a:xfrm>
+                <a:off x="5247083" y="3161246"/>
+                <a:ext cx="235321" cy="215444"/>
+              </a:xfrm>
+              <a:prstGeom prst="rect">
+                <a:avLst/>
+              </a:prstGeom>
+              <a:noFill/>
+            </p:spPr>
+            <p:txBody>
+              <a:bodyPr wrap="none" lIns="0" tIns="0" rIns="0" bIns="0" rtlCol="0">
+                <a:spAutoFit/>
+              </a:bodyPr>
+              <a:lstStyle/>
+              <a:p>
+                <a:pPr/>
+                <a14:m>
+                  <m:oMathPara xmlns:m="http://schemas.openxmlformats.org/officeDocument/2006/math">
+                    <m:oMathParaPr>
+                      <m:jc m:val="centerGroup"/>
+                    </m:oMathParaPr>
+                    <m:oMath xmlns:m="http://schemas.openxmlformats.org/officeDocument/2006/math">
+                      <m:sSub>
+                        <m:sSubPr>
+                          <m:ctrlPr>
+                            <a:rPr lang="en-US" sz="1400" b="0" i="1" smtClean="0">
+                              <a:latin typeface="Cambria Math" panose="02040503050406030204" pitchFamily="18" charset="0"/>
+                            </a:rPr>
+                          </m:ctrlPr>
+                        </m:sSubPr>
+                        <m:e>
+                          <m:r>
+                            <a:rPr lang="en-US" sz="1400" b="0" i="1" smtClean="0">
+                              <a:latin typeface="Cambria Math" panose="02040503050406030204" pitchFamily="18" charset="0"/>
+                            </a:rPr>
+                            <m:t>𝑅</m:t>
+                          </m:r>
+                        </m:e>
+                        <m:sub>
+                          <m:r>
+                            <a:rPr lang="en-US" sz="1400" b="0" i="1" smtClean="0">
+                              <a:latin typeface="Cambria Math" panose="02040503050406030204" pitchFamily="18" charset="0"/>
+                            </a:rPr>
+                            <m:t>𝑣</m:t>
+                          </m:r>
+                        </m:sub>
+                      </m:sSub>
+                    </m:oMath>
+                  </m:oMathPara>
+                </a14:m>
+                <a:endParaRPr lang="en-DE" sz="1400" dirty="0"/>
+              </a:p>
+            </p:txBody>
+          </p:sp>
+        </mc:Choice>
+        <mc:Fallback xmlns="">
+          <p:sp>
+            <p:nvSpPr>
+              <p:cNvPr id="56" name="TextBox 55">
+                <a:extLst>
+                  <a:ext uri="{FF2B5EF4-FFF2-40B4-BE49-F238E27FC236}">
+                    <a16:creationId xmlns:a16="http://schemas.microsoft.com/office/drawing/2014/main" id="{C32DF7C9-38DC-B2A7-6974-95A7550BD639}"/>
+                  </a:ext>
+                </a:extLst>
+              </p:cNvPr>
+              <p:cNvSpPr txBox="1">
+                <a:spLocks noRot="1" noChangeAspect="1" noMove="1" noResize="1" noEditPoints="1" noAdjustHandles="1" noChangeArrowheads="1" noChangeShapeType="1" noTextEdit="1"/>
+              </p:cNvSpPr>
+              <p:nvPr/>
+            </p:nvSpPr>
+            <p:spPr>
+              <a:xfrm>
+                <a:off x="5247083" y="3161246"/>
+                <a:ext cx="235321" cy="215444"/>
+              </a:xfrm>
+              <a:prstGeom prst="rect">
+                <a:avLst/>
+              </a:prstGeom>
+              <a:blipFill>
+                <a:blip r:embed="rId6"/>
+                <a:stretch>
+                  <a:fillRect l="-18421" b="-8571"/>
+                </a:stretch>
+              </a:blipFill>
+            </p:spPr>
+            <p:txBody>
+              <a:bodyPr/>
+              <a:lstStyle/>
+              <a:p>
+                <a:r>
+                  <a:rPr lang="en-DE">
+                    <a:noFill/>
+                  </a:rPr>
+                  <a:t> </a:t>
+                </a:r>
+              </a:p>
+            </p:txBody>
+          </p:sp>
+        </mc:Fallback>
+      </mc:AlternateContent>
+      <mc:AlternateContent xmlns:mc="http://schemas.openxmlformats.org/markup-compatibility/2006" xmlns:a14="http://schemas.microsoft.com/office/drawing/2010/main">
+        <mc:Choice Requires="a14">
+          <p:sp>
+            <p:nvSpPr>
+              <p:cNvPr id="57" name="TextBox 56">
+                <a:extLst>
+                  <a:ext uri="{FF2B5EF4-FFF2-40B4-BE49-F238E27FC236}">
+                    <a16:creationId xmlns:a16="http://schemas.microsoft.com/office/drawing/2014/main" id="{A3BA3668-BCB2-A671-B846-6001CEE251E4}"/>
+                  </a:ext>
+                </a:extLst>
+              </p:cNvPr>
+              <p:cNvSpPr txBox="1"/>
+              <p:nvPr/>
+            </p:nvSpPr>
+            <p:spPr>
+              <a:xfrm>
+                <a:off x="3917938" y="2534236"/>
+                <a:ext cx="639854" cy="215444"/>
+              </a:xfrm>
+              <a:prstGeom prst="rect">
+                <a:avLst/>
+              </a:prstGeom>
+              <a:noFill/>
+            </p:spPr>
+            <p:txBody>
+              <a:bodyPr wrap="none" lIns="0" tIns="0" rIns="0" bIns="0" rtlCol="0">
+                <a:spAutoFit/>
+              </a:bodyPr>
+              <a:lstStyle/>
+              <a:p>
+                <a:pPr algn="r"/>
+                <a14:m>
+                  <m:oMathPara xmlns:m="http://schemas.openxmlformats.org/officeDocument/2006/math">
+                    <m:oMathParaPr>
+                      <m:jc m:val="centerGroup"/>
+                    </m:oMathParaPr>
+                    <m:oMath xmlns:m="http://schemas.openxmlformats.org/officeDocument/2006/math">
+                      <m:sSub>
+                        <m:sSubPr>
+                          <m:ctrlPr>
+                            <a:rPr lang="en-DE" sz="1400" i="1" smtClean="0">
+                              <a:latin typeface="Cambria Math" panose="02040503050406030204" pitchFamily="18" charset="0"/>
+                            </a:rPr>
+                          </m:ctrlPr>
+                        </m:sSubPr>
+                        <m:e>
+                          <m:r>
+                            <a:rPr lang="en-US" sz="1400" b="0" i="1" smtClean="0">
+                              <a:latin typeface="Cambria Math" panose="02040503050406030204" pitchFamily="18" charset="0"/>
+                            </a:rPr>
+                            <m:t>𝑅</m:t>
+                          </m:r>
+                        </m:e>
+                        <m:sub>
+                          <m:r>
+                            <a:rPr lang="en-US" sz="1400" b="0" i="1" smtClean="0">
+                              <a:latin typeface="Cambria Math" panose="02040503050406030204" pitchFamily="18" charset="0"/>
+                            </a:rPr>
+                            <m:t>𝑣</m:t>
+                          </m:r>
+                        </m:sub>
+                      </m:sSub>
+                      <m:func>
+                        <m:funcPr>
+                          <m:ctrlPr>
+                            <a:rPr lang="en-US" sz="1400" i="1" smtClean="0">
+                              <a:latin typeface="Cambria Math" panose="02040503050406030204" pitchFamily="18" charset="0"/>
+                            </a:rPr>
+                          </m:ctrlPr>
+                        </m:funcPr>
+                        <m:fName>
+                          <m:r>
+                            <m:rPr>
+                              <m:sty m:val="p"/>
+                            </m:rPr>
+                            <a:rPr lang="en-US" sz="1400" i="0" smtClean="0">
+                              <a:latin typeface="Cambria Math" panose="02040503050406030204" pitchFamily="18" charset="0"/>
+                            </a:rPr>
+                            <m:t>cos</m:t>
+                          </m:r>
+                        </m:fName>
+                        <m:e>
+                          <m:r>
+                            <a:rPr lang="en-US" sz="1400" i="1" smtClean="0">
+                              <a:latin typeface="Cambria Math" panose="02040503050406030204" pitchFamily="18" charset="0"/>
+                            </a:rPr>
+                            <m:t>ɵ</m:t>
+                          </m:r>
+                        </m:e>
+                      </m:func>
+                    </m:oMath>
+                  </m:oMathPara>
+                </a14:m>
+                <a:endParaRPr lang="en-DE" sz="1400" dirty="0"/>
+              </a:p>
+            </p:txBody>
+          </p:sp>
+        </mc:Choice>
+        <mc:Fallback xmlns="">
+          <p:sp>
+            <p:nvSpPr>
+              <p:cNvPr id="57" name="TextBox 56">
+                <a:extLst>
+                  <a:ext uri="{FF2B5EF4-FFF2-40B4-BE49-F238E27FC236}">
+                    <a16:creationId xmlns:a16="http://schemas.microsoft.com/office/drawing/2014/main" id="{A3BA3668-BCB2-A671-B846-6001CEE251E4}"/>
+                  </a:ext>
+                </a:extLst>
+              </p:cNvPr>
+              <p:cNvSpPr txBox="1">
+                <a:spLocks noRot="1" noChangeAspect="1" noMove="1" noResize="1" noEditPoints="1" noAdjustHandles="1" noChangeArrowheads="1" noChangeShapeType="1" noTextEdit="1"/>
+              </p:cNvSpPr>
+              <p:nvPr/>
+            </p:nvSpPr>
+            <p:spPr>
+              <a:xfrm>
+                <a:off x="3917938" y="2534236"/>
+                <a:ext cx="639854" cy="215444"/>
+              </a:xfrm>
+              <a:prstGeom prst="rect">
+                <a:avLst/>
+              </a:prstGeom>
+              <a:blipFill>
+                <a:blip r:embed="rId7"/>
+                <a:stretch>
+                  <a:fillRect l="-5714" r="-2857" b="-8571"/>
+                </a:stretch>
+              </a:blipFill>
+            </p:spPr>
+            <p:txBody>
+              <a:bodyPr/>
+              <a:lstStyle/>
+              <a:p>
+                <a:r>
+                  <a:rPr lang="en-DE">
+                    <a:noFill/>
+                  </a:rPr>
+                  <a:t> </a:t>
+                </a:r>
+              </a:p>
+            </p:txBody>
+          </p:sp>
+        </mc:Fallback>
+      </mc:AlternateContent>
+      <mc:AlternateContent xmlns:mc="http://schemas.openxmlformats.org/markup-compatibility/2006" xmlns:a14="http://schemas.microsoft.com/office/drawing/2010/main">
+        <mc:Choice Requires="a14">
+          <p:sp>
+            <p:nvSpPr>
+              <p:cNvPr id="58" name="TextBox 57">
+                <a:extLst>
+                  <a:ext uri="{FF2B5EF4-FFF2-40B4-BE49-F238E27FC236}">
+                    <a16:creationId xmlns:a16="http://schemas.microsoft.com/office/drawing/2014/main" id="{6876FE90-7CB6-2F13-D53D-4094B8BF18C8}"/>
+                  </a:ext>
+                </a:extLst>
+              </p:cNvPr>
+              <p:cNvSpPr txBox="1"/>
+              <p:nvPr/>
+            </p:nvSpPr>
+            <p:spPr>
+              <a:xfrm>
+                <a:off x="4800317" y="2075124"/>
+                <a:ext cx="617413" cy="215444"/>
+              </a:xfrm>
+              <a:prstGeom prst="rect">
+                <a:avLst/>
+              </a:prstGeom>
+              <a:noFill/>
+            </p:spPr>
+            <p:txBody>
+              <a:bodyPr wrap="none" lIns="0" tIns="0" rIns="0" bIns="0" rtlCol="0">
+                <a:spAutoFit/>
+              </a:bodyPr>
+              <a:lstStyle/>
+              <a:p>
+                <a:pPr algn="r"/>
+                <a14:m>
+                  <m:oMathPara xmlns:m="http://schemas.openxmlformats.org/officeDocument/2006/math">
+                    <m:oMathParaPr>
+                      <m:jc m:val="centerGroup"/>
+                    </m:oMathParaPr>
+                    <m:oMath xmlns:m="http://schemas.openxmlformats.org/officeDocument/2006/math">
+                      <m:sSub>
+                        <m:sSubPr>
+                          <m:ctrlPr>
+                            <a:rPr lang="en-DE" sz="1400" i="1" smtClean="0">
+                              <a:latin typeface="Cambria Math" panose="02040503050406030204" pitchFamily="18" charset="0"/>
+                            </a:rPr>
+                          </m:ctrlPr>
+                        </m:sSubPr>
+                        <m:e>
+                          <m:r>
+                            <a:rPr lang="en-US" sz="1400" b="0" i="1" smtClean="0">
+                              <a:latin typeface="Cambria Math" panose="02040503050406030204" pitchFamily="18" charset="0"/>
+                            </a:rPr>
+                            <m:t>𝑅</m:t>
+                          </m:r>
+                        </m:e>
+                        <m:sub>
+                          <m:r>
+                            <a:rPr lang="en-US" sz="1400" b="0" i="1" smtClean="0">
+                              <a:latin typeface="Cambria Math" panose="02040503050406030204" pitchFamily="18" charset="0"/>
+                            </a:rPr>
+                            <m:t>𝑣</m:t>
+                          </m:r>
+                        </m:sub>
+                      </m:sSub>
+                      <m:func>
+                        <m:funcPr>
+                          <m:ctrlPr>
+                            <a:rPr lang="en-US" sz="1400" i="1" smtClean="0">
+                              <a:latin typeface="Cambria Math" panose="02040503050406030204" pitchFamily="18" charset="0"/>
+                            </a:rPr>
+                          </m:ctrlPr>
+                        </m:funcPr>
+                        <m:fName>
+                          <m:r>
+                            <m:rPr>
+                              <m:sty m:val="p"/>
+                            </m:rPr>
+                            <a:rPr lang="en-US" sz="1400" i="0" smtClean="0">
+                              <a:latin typeface="Cambria Math" panose="02040503050406030204" pitchFamily="18" charset="0"/>
+                            </a:rPr>
+                            <m:t>sin</m:t>
+                          </m:r>
+                        </m:fName>
+                        <m:e>
+                          <m:r>
+                            <a:rPr lang="en-US" sz="1400" i="1" smtClean="0">
+                              <a:latin typeface="Cambria Math" panose="02040503050406030204" pitchFamily="18" charset="0"/>
+                            </a:rPr>
+                            <m:t>ɵ</m:t>
+                          </m:r>
+                        </m:e>
+                      </m:func>
+                    </m:oMath>
+                  </m:oMathPara>
+                </a14:m>
+                <a:endParaRPr lang="en-DE" sz="1400" dirty="0"/>
+              </a:p>
+            </p:txBody>
+          </p:sp>
+        </mc:Choice>
+        <mc:Fallback xmlns="">
+          <p:sp>
+            <p:nvSpPr>
+              <p:cNvPr id="58" name="TextBox 57">
+                <a:extLst>
+                  <a:ext uri="{FF2B5EF4-FFF2-40B4-BE49-F238E27FC236}">
+                    <a16:creationId xmlns:a16="http://schemas.microsoft.com/office/drawing/2014/main" id="{6876FE90-7CB6-2F13-D53D-4094B8BF18C8}"/>
+                  </a:ext>
+                </a:extLst>
+              </p:cNvPr>
+              <p:cNvSpPr txBox="1">
+                <a:spLocks noRot="1" noChangeAspect="1" noMove="1" noResize="1" noEditPoints="1" noAdjustHandles="1" noChangeArrowheads="1" noChangeShapeType="1" noTextEdit="1"/>
+              </p:cNvSpPr>
+              <p:nvPr/>
+            </p:nvSpPr>
+            <p:spPr>
+              <a:xfrm>
+                <a:off x="4800317" y="2075124"/>
+                <a:ext cx="617413" cy="215444"/>
+              </a:xfrm>
+              <a:prstGeom prst="rect">
+                <a:avLst/>
+              </a:prstGeom>
+              <a:blipFill>
+                <a:blip r:embed="rId8"/>
+                <a:stretch>
+                  <a:fillRect l="-5882" r="-2941" b="-8333"/>
+                </a:stretch>
+              </a:blipFill>
+            </p:spPr>
+            <p:txBody>
+              <a:bodyPr/>
+              <a:lstStyle/>
+              <a:p>
+                <a:r>
+                  <a:rPr lang="en-DE">
+                    <a:noFill/>
+                  </a:rPr>
+                  <a:t> </a:t>
+                </a:r>
+              </a:p>
+            </p:txBody>
+          </p:sp>
+        </mc:Fallback>
+      </mc:AlternateContent>
+      <p:sp>
+        <p:nvSpPr>
+          <p:cNvPr id="59" name="Oval 58">
+            <a:extLst>
+              <a:ext uri="{FF2B5EF4-FFF2-40B4-BE49-F238E27FC236}">
+                <a16:creationId xmlns:a16="http://schemas.microsoft.com/office/drawing/2014/main" id="{AD4C88B7-6445-AED3-0ABC-5FBB70F9A877}"/>
+              </a:ext>
+            </a:extLst>
+          </p:cNvPr>
+          <p:cNvSpPr/>
+          <p:nvPr/>
+        </p:nvSpPr>
+        <p:spPr>
+          <a:xfrm>
+            <a:off x="4429030" y="2350901"/>
+            <a:ext cx="53944" cy="62099"/>
+          </a:xfrm>
+          <a:prstGeom prst="ellipse">
+            <a:avLst/>
+          </a:prstGeom>
+          <a:solidFill>
+            <a:schemeClr val="accent6"/>
+          </a:solidFill>
+          <a:ln>
+            <a:solidFill>
+              <a:srgbClr val="00B050"/>
+            </a:solidFill>
+          </a:ln>
+        </p:spPr>
+        <p:style>
+          <a:lnRef idx="2">
+            <a:schemeClr val="accent1">
+              <a:shade val="15000"/>
+            </a:schemeClr>
+          </a:lnRef>
+          <a:fillRef idx="1">
+            <a:schemeClr val="accent1"/>
+          </a:fillRef>
+          <a:effectRef idx="0">
+            <a:schemeClr val="accent1"/>
+          </a:effectRef>
+          <a:fontRef idx="minor">
+            <a:schemeClr val="lt1"/>
+          </a:fontRef>
+        </p:style>
+        <p:txBody>
+          <a:bodyPr rtlCol="0" anchor="ctr"/>
+          <a:lstStyle/>
+          <a:p>
+            <a:pPr algn="ctr"/>
+            <a:endParaRPr lang="en-DE"/>
+          </a:p>
+        </p:txBody>
+      </p:sp>
+      <p:sp>
+        <p:nvSpPr>
+          <p:cNvPr id="60" name="Oval 59">
+            <a:extLst>
+              <a:ext uri="{FF2B5EF4-FFF2-40B4-BE49-F238E27FC236}">
+                <a16:creationId xmlns:a16="http://schemas.microsoft.com/office/drawing/2014/main" id="{0530A916-A7AA-E08B-39DC-EC70ED271659}"/>
+              </a:ext>
+            </a:extLst>
+          </p:cNvPr>
+          <p:cNvSpPr/>
+          <p:nvPr/>
+        </p:nvSpPr>
+        <p:spPr>
+          <a:xfrm>
+            <a:off x="4157885" y="2346961"/>
+            <a:ext cx="58784" cy="66039"/>
+          </a:xfrm>
+          <a:prstGeom prst="ellipse">
+            <a:avLst/>
+          </a:prstGeom>
+          <a:solidFill>
+            <a:schemeClr val="accent6"/>
+          </a:solidFill>
+          <a:ln>
+            <a:solidFill>
+              <a:srgbClr val="00B050"/>
+            </a:solidFill>
+          </a:ln>
+        </p:spPr>
+        <p:style>
+          <a:lnRef idx="2">
+            <a:schemeClr val="accent1">
+              <a:shade val="15000"/>
+            </a:schemeClr>
+          </a:lnRef>
+          <a:fillRef idx="1">
+            <a:schemeClr val="accent1"/>
+          </a:fillRef>
+          <a:effectRef idx="0">
+            <a:schemeClr val="accent1"/>
+          </a:effectRef>
+          <a:fontRef idx="minor">
+            <a:schemeClr val="lt1"/>
+          </a:fontRef>
+        </p:style>
+        <p:txBody>
+          <a:bodyPr rtlCol="0" anchor="ctr"/>
+          <a:lstStyle/>
+          <a:p>
+            <a:pPr algn="ctr"/>
+            <a:endParaRPr lang="en-DE"/>
+          </a:p>
+        </p:txBody>
+      </p:sp>
+      <p:sp>
+        <p:nvSpPr>
+          <p:cNvPr id="61" name="Oval 60">
+            <a:extLst>
+              <a:ext uri="{FF2B5EF4-FFF2-40B4-BE49-F238E27FC236}">
+                <a16:creationId xmlns:a16="http://schemas.microsoft.com/office/drawing/2014/main" id="{CDCEB065-CE45-CF54-0197-F0EDFF7E8007}"/>
+              </a:ext>
+            </a:extLst>
+          </p:cNvPr>
+          <p:cNvSpPr/>
+          <p:nvPr/>
+        </p:nvSpPr>
+        <p:spPr>
+          <a:xfrm>
+            <a:off x="4734867" y="1736384"/>
+            <a:ext cx="45719" cy="48259"/>
+          </a:xfrm>
+          <a:prstGeom prst="ellipse">
+            <a:avLst/>
+          </a:prstGeom>
+          <a:solidFill>
+            <a:schemeClr val="accent6"/>
+          </a:solidFill>
+          <a:ln>
+            <a:solidFill>
+              <a:srgbClr val="00B050"/>
+            </a:solidFill>
+          </a:ln>
+        </p:spPr>
+        <p:style>
+          <a:lnRef idx="2">
+            <a:schemeClr val="accent1">
+              <a:shade val="15000"/>
+            </a:schemeClr>
+          </a:lnRef>
+          <a:fillRef idx="1">
+            <a:schemeClr val="accent1"/>
+          </a:fillRef>
+          <a:effectRef idx="0">
+            <a:schemeClr val="accent1"/>
+          </a:effectRef>
+          <a:fontRef idx="minor">
+            <a:schemeClr val="lt1"/>
+          </a:fontRef>
+        </p:style>
+        <p:txBody>
+          <a:bodyPr rtlCol="0" anchor="ctr"/>
+          <a:lstStyle/>
+          <a:p>
+            <a:pPr algn="ctr"/>
+            <a:endParaRPr lang="en-DE"/>
+          </a:p>
+        </p:txBody>
+      </p:sp>
+    </p:spTree>
+    <p:extLst>
+      <p:ext uri="{BB962C8B-B14F-4D97-AF65-F5344CB8AC3E}">
+        <p14:creationId xmlns:p14="http://schemas.microsoft.com/office/powerpoint/2010/main" val="4073194677"/>
+      </p:ext>
+    </p:extLst>
+  </p:cSld>
+  <p:clrMapOvr>
+    <a:masterClrMapping/>
+  </p:clrMapOvr>
+</p:sld>
+</file>
+
 <file path=ppt/slides/slide2.xml><?xml version="1.0" encoding="utf-8"?>
 <p:sld xmlns:a="http://schemas.openxmlformats.org/drawingml/2006/main" xmlns:r="http://schemas.openxmlformats.org/officeDocument/2006/relationships" xmlns:p="http://schemas.openxmlformats.org/presentationml/2006/main">
   <p:cSld>

</xml_diff>

<commit_message>
Applying Dbscan on segragated clusters is finished. Also the code is committed here which is done till proper legend for the dbscan graphs i.e. results
</commit_message>
<xml_diff>
--- a/Report/diagrams.pptx
+++ b/Report/diagrams.pptx
@@ -24,6 +24,11 @@
     <p:sldId id="276" r:id="rId18"/>
     <p:sldId id="278" r:id="rId19"/>
     <p:sldId id="279" r:id="rId20"/>
+    <p:sldId id="280" r:id="rId21"/>
+    <p:sldId id="281" r:id="rId22"/>
+    <p:sldId id="282" r:id="rId23"/>
+    <p:sldId id="283" r:id="rId24"/>
+    <p:sldId id="284" r:id="rId25"/>
   </p:sldIdLst>
   <p:sldSz cx="12192000" cy="6858000"/>
   <p:notesSz cx="6858000" cy="9144000"/>
@@ -279,7 +284,7 @@
           <a:p>
             <a:fld id="{474A10D8-129C-4533-999D-9A7118D03750}" type="datetimeFigureOut">
               <a:rPr lang="de-DE" smtClean="0"/>
-              <a:t>17.03.2024</a:t>
+              <a:t>09.04.2024</a:t>
             </a:fld>
             <a:endParaRPr lang="de-DE"/>
           </a:p>
@@ -479,7 +484,7 @@
           <a:p>
             <a:fld id="{474A10D8-129C-4533-999D-9A7118D03750}" type="datetimeFigureOut">
               <a:rPr lang="de-DE" smtClean="0"/>
-              <a:t>17.03.2024</a:t>
+              <a:t>09.04.2024</a:t>
             </a:fld>
             <a:endParaRPr lang="de-DE"/>
           </a:p>
@@ -689,7 +694,7 @@
           <a:p>
             <a:fld id="{474A10D8-129C-4533-999D-9A7118D03750}" type="datetimeFigureOut">
               <a:rPr lang="de-DE" smtClean="0"/>
-              <a:t>17.03.2024</a:t>
+              <a:t>09.04.2024</a:t>
             </a:fld>
             <a:endParaRPr lang="de-DE"/>
           </a:p>
@@ -889,7 +894,7 @@
           <a:p>
             <a:fld id="{474A10D8-129C-4533-999D-9A7118D03750}" type="datetimeFigureOut">
               <a:rPr lang="de-DE" smtClean="0"/>
-              <a:t>17.03.2024</a:t>
+              <a:t>09.04.2024</a:t>
             </a:fld>
             <a:endParaRPr lang="de-DE"/>
           </a:p>
@@ -1165,7 +1170,7 @@
           <a:p>
             <a:fld id="{474A10D8-129C-4533-999D-9A7118D03750}" type="datetimeFigureOut">
               <a:rPr lang="de-DE" smtClean="0"/>
-              <a:t>17.03.2024</a:t>
+              <a:t>09.04.2024</a:t>
             </a:fld>
             <a:endParaRPr lang="de-DE"/>
           </a:p>
@@ -1433,7 +1438,7 @@
           <a:p>
             <a:fld id="{474A10D8-129C-4533-999D-9A7118D03750}" type="datetimeFigureOut">
               <a:rPr lang="de-DE" smtClean="0"/>
-              <a:t>17.03.2024</a:t>
+              <a:t>09.04.2024</a:t>
             </a:fld>
             <a:endParaRPr lang="de-DE"/>
           </a:p>
@@ -1848,7 +1853,7 @@
           <a:p>
             <a:fld id="{474A10D8-129C-4533-999D-9A7118D03750}" type="datetimeFigureOut">
               <a:rPr lang="de-DE" smtClean="0"/>
-              <a:t>17.03.2024</a:t>
+              <a:t>09.04.2024</a:t>
             </a:fld>
             <a:endParaRPr lang="de-DE"/>
           </a:p>
@@ -1990,7 +1995,7 @@
           <a:p>
             <a:fld id="{474A10D8-129C-4533-999D-9A7118D03750}" type="datetimeFigureOut">
               <a:rPr lang="de-DE" smtClean="0"/>
-              <a:t>17.03.2024</a:t>
+              <a:t>09.04.2024</a:t>
             </a:fld>
             <a:endParaRPr lang="de-DE"/>
           </a:p>
@@ -2103,7 +2108,7 @@
           <a:p>
             <a:fld id="{474A10D8-129C-4533-999D-9A7118D03750}" type="datetimeFigureOut">
               <a:rPr lang="de-DE" smtClean="0"/>
-              <a:t>17.03.2024</a:t>
+              <a:t>09.04.2024</a:t>
             </a:fld>
             <a:endParaRPr lang="de-DE"/>
           </a:p>
@@ -2416,7 +2421,7 @@
           <a:p>
             <a:fld id="{474A10D8-129C-4533-999D-9A7118D03750}" type="datetimeFigureOut">
               <a:rPr lang="de-DE" smtClean="0"/>
-              <a:t>17.03.2024</a:t>
+              <a:t>09.04.2024</a:t>
             </a:fld>
             <a:endParaRPr lang="de-DE"/>
           </a:p>
@@ -2705,7 +2710,7 @@
           <a:p>
             <a:fld id="{474A10D8-129C-4533-999D-9A7118D03750}" type="datetimeFigureOut">
               <a:rPr lang="de-DE" smtClean="0"/>
-              <a:t>17.03.2024</a:t>
+              <a:t>09.04.2024</a:t>
             </a:fld>
             <a:endParaRPr lang="de-DE"/>
           </a:p>
@@ -2948,7 +2953,7 @@
           <a:p>
             <a:fld id="{474A10D8-129C-4533-999D-9A7118D03750}" type="datetimeFigureOut">
               <a:rPr lang="de-DE" smtClean="0"/>
-              <a:t>17.03.2024</a:t>
+              <a:t>09.04.2024</a:t>
             </a:fld>
             <a:endParaRPr lang="de-DE"/>
           </a:p>
@@ -9574,6 +9579,342 @@
 </p:sld>
 </file>
 
+<file path=ppt/slides/slide20.xml><?xml version="1.0" encoding="utf-8"?>
+<p:sld xmlns:a="http://schemas.openxmlformats.org/drawingml/2006/main" xmlns:r="http://schemas.openxmlformats.org/officeDocument/2006/relationships" xmlns:p="http://schemas.openxmlformats.org/presentationml/2006/main">
+  <p:cSld>
+    <p:spTree>
+      <p:nvGrpSpPr>
+        <p:cNvPr id="1" name=""/>
+        <p:cNvGrpSpPr/>
+        <p:nvPr/>
+      </p:nvGrpSpPr>
+      <p:grpSpPr>
+        <a:xfrm>
+          <a:off x="0" y="0"/>
+          <a:ext cx="0" cy="0"/>
+          <a:chOff x="0" y="0"/>
+          <a:chExt cx="0" cy="0"/>
+        </a:xfrm>
+      </p:grpSpPr>
+      <p:pic>
+        <p:nvPicPr>
+          <p:cNvPr id="5" name="Picture 4">
+            <a:extLst>
+              <a:ext uri="{FF2B5EF4-FFF2-40B4-BE49-F238E27FC236}">
+                <a16:creationId xmlns:a16="http://schemas.microsoft.com/office/drawing/2014/main" id="{B0F249FC-3DAB-FE09-0A13-EAAE47BEEA21}"/>
+              </a:ext>
+            </a:extLst>
+          </p:cNvPr>
+          <p:cNvPicPr>
+            <a:picLocks noChangeAspect="1"/>
+          </p:cNvPicPr>
+          <p:nvPr/>
+        </p:nvPicPr>
+        <p:blipFill>
+          <a:blip r:embed="rId2"/>
+          <a:stretch>
+            <a:fillRect/>
+          </a:stretch>
+        </p:blipFill>
+        <p:spPr>
+          <a:xfrm>
+            <a:off x="342900" y="788441"/>
+            <a:ext cx="11410950" cy="5281118"/>
+          </a:xfrm>
+          <a:prstGeom prst="rect">
+            <a:avLst/>
+          </a:prstGeom>
+        </p:spPr>
+      </p:pic>
+    </p:spTree>
+    <p:extLst>
+      <p:ext uri="{BB962C8B-B14F-4D97-AF65-F5344CB8AC3E}">
+        <p14:creationId xmlns:p14="http://schemas.microsoft.com/office/powerpoint/2010/main" val="937348136"/>
+      </p:ext>
+    </p:extLst>
+  </p:cSld>
+  <p:clrMapOvr>
+    <a:masterClrMapping/>
+  </p:clrMapOvr>
+</p:sld>
+</file>
+
+<file path=ppt/slides/slide21.xml><?xml version="1.0" encoding="utf-8"?>
+<p:sld xmlns:a="http://schemas.openxmlformats.org/drawingml/2006/main" xmlns:r="http://schemas.openxmlformats.org/officeDocument/2006/relationships" xmlns:p="http://schemas.openxmlformats.org/presentationml/2006/main">
+  <p:cSld>
+    <p:spTree>
+      <p:nvGrpSpPr>
+        <p:cNvPr id="1" name=""/>
+        <p:cNvGrpSpPr/>
+        <p:nvPr/>
+      </p:nvGrpSpPr>
+      <p:grpSpPr>
+        <a:xfrm>
+          <a:off x="0" y="0"/>
+          <a:ext cx="0" cy="0"/>
+          <a:chOff x="0" y="0"/>
+          <a:chExt cx="0" cy="0"/>
+        </a:xfrm>
+      </p:grpSpPr>
+      <p:pic>
+        <p:nvPicPr>
+          <p:cNvPr id="5" name="Picture 4">
+            <a:extLst>
+              <a:ext uri="{FF2B5EF4-FFF2-40B4-BE49-F238E27FC236}">
+                <a16:creationId xmlns:a16="http://schemas.microsoft.com/office/drawing/2014/main" id="{61AAB28D-163B-EBD4-7D57-206C08672EB9}"/>
+              </a:ext>
+            </a:extLst>
+          </p:cNvPr>
+          <p:cNvPicPr>
+            <a:picLocks noChangeAspect="1"/>
+          </p:cNvPicPr>
+          <p:nvPr/>
+        </p:nvPicPr>
+        <p:blipFill>
+          <a:blip r:embed="rId2"/>
+          <a:stretch>
+            <a:fillRect/>
+          </a:stretch>
+        </p:blipFill>
+        <p:spPr>
+          <a:xfrm>
+            <a:off x="262384" y="811303"/>
+            <a:ext cx="11667231" cy="5235394"/>
+          </a:xfrm>
+          <a:prstGeom prst="rect">
+            <a:avLst/>
+          </a:prstGeom>
+        </p:spPr>
+      </p:pic>
+      <p:sp>
+        <p:nvSpPr>
+          <p:cNvPr id="6" name="TextBox 5">
+            <a:extLst>
+              <a:ext uri="{FF2B5EF4-FFF2-40B4-BE49-F238E27FC236}">
+                <a16:creationId xmlns:a16="http://schemas.microsoft.com/office/drawing/2014/main" id="{CC879D8A-286D-AA70-A303-ABE6954CE50E}"/>
+              </a:ext>
+            </a:extLst>
+          </p:cNvPr>
+          <p:cNvSpPr txBox="1"/>
+          <p:nvPr/>
+        </p:nvSpPr>
+        <p:spPr>
+          <a:xfrm>
+            <a:off x="262384" y="219075"/>
+            <a:ext cx="2766566" cy="369332"/>
+          </a:xfrm>
+          <a:prstGeom prst="rect">
+            <a:avLst/>
+          </a:prstGeom>
+          <a:noFill/>
+        </p:spPr>
+        <p:txBody>
+          <a:bodyPr wrap="square" rtlCol="0">
+            <a:spAutoFit/>
+          </a:bodyPr>
+          <a:lstStyle/>
+          <a:p>
+            <a:r>
+              <a:rPr lang="en-US" dirty="0"/>
+              <a:t>used</a:t>
+            </a:r>
+            <a:endParaRPr lang="en-DE" dirty="0"/>
+          </a:p>
+        </p:txBody>
+      </p:sp>
+    </p:spTree>
+    <p:extLst>
+      <p:ext uri="{BB962C8B-B14F-4D97-AF65-F5344CB8AC3E}">
+        <p14:creationId xmlns:p14="http://schemas.microsoft.com/office/powerpoint/2010/main" val="1374619458"/>
+      </p:ext>
+    </p:extLst>
+  </p:cSld>
+  <p:clrMapOvr>
+    <a:masterClrMapping/>
+  </p:clrMapOvr>
+</p:sld>
+</file>
+
+<file path=ppt/slides/slide22.xml><?xml version="1.0" encoding="utf-8"?>
+<p:sld xmlns:a="http://schemas.openxmlformats.org/drawingml/2006/main" xmlns:r="http://schemas.openxmlformats.org/officeDocument/2006/relationships" xmlns:p="http://schemas.openxmlformats.org/presentationml/2006/main">
+  <p:cSld>
+    <p:spTree>
+      <p:nvGrpSpPr>
+        <p:cNvPr id="1" name=""/>
+        <p:cNvGrpSpPr/>
+        <p:nvPr/>
+      </p:nvGrpSpPr>
+      <p:grpSpPr>
+        <a:xfrm>
+          <a:off x="0" y="0"/>
+          <a:ext cx="0" cy="0"/>
+          <a:chOff x="0" y="0"/>
+          <a:chExt cx="0" cy="0"/>
+        </a:xfrm>
+      </p:grpSpPr>
+      <p:pic>
+        <p:nvPicPr>
+          <p:cNvPr id="5" name="Picture 4">
+            <a:extLst>
+              <a:ext uri="{FF2B5EF4-FFF2-40B4-BE49-F238E27FC236}">
+                <a16:creationId xmlns:a16="http://schemas.microsoft.com/office/drawing/2014/main" id="{841F1B0F-517D-65F7-27BC-D58BE3C7D28C}"/>
+              </a:ext>
+            </a:extLst>
+          </p:cNvPr>
+          <p:cNvPicPr>
+            <a:picLocks noChangeAspect="1"/>
+          </p:cNvPicPr>
+          <p:nvPr/>
+        </p:nvPicPr>
+        <p:blipFill>
+          <a:blip r:embed="rId2"/>
+          <a:stretch>
+            <a:fillRect/>
+          </a:stretch>
+        </p:blipFill>
+        <p:spPr>
+          <a:xfrm>
+            <a:off x="216660" y="754148"/>
+            <a:ext cx="11758679" cy="5349704"/>
+          </a:xfrm>
+          <a:prstGeom prst="rect">
+            <a:avLst/>
+          </a:prstGeom>
+        </p:spPr>
+      </p:pic>
+    </p:spTree>
+    <p:extLst>
+      <p:ext uri="{BB962C8B-B14F-4D97-AF65-F5344CB8AC3E}">
+        <p14:creationId xmlns:p14="http://schemas.microsoft.com/office/powerpoint/2010/main" val="2541238526"/>
+      </p:ext>
+    </p:extLst>
+  </p:cSld>
+  <p:clrMapOvr>
+    <a:masterClrMapping/>
+  </p:clrMapOvr>
+</p:sld>
+</file>
+
+<file path=ppt/slides/slide23.xml><?xml version="1.0" encoding="utf-8"?>
+<p:sld xmlns:a="http://schemas.openxmlformats.org/drawingml/2006/main" xmlns:r="http://schemas.openxmlformats.org/officeDocument/2006/relationships" xmlns:p="http://schemas.openxmlformats.org/presentationml/2006/main">
+  <p:cSld>
+    <p:spTree>
+      <p:nvGrpSpPr>
+        <p:cNvPr id="1" name=""/>
+        <p:cNvGrpSpPr/>
+        <p:nvPr/>
+      </p:nvGrpSpPr>
+      <p:grpSpPr>
+        <a:xfrm>
+          <a:off x="0" y="0"/>
+          <a:ext cx="0" cy="0"/>
+          <a:chOff x="0" y="0"/>
+          <a:chExt cx="0" cy="0"/>
+        </a:xfrm>
+      </p:grpSpPr>
+      <p:pic>
+        <p:nvPicPr>
+          <p:cNvPr id="5" name="Picture 4">
+            <a:extLst>
+              <a:ext uri="{FF2B5EF4-FFF2-40B4-BE49-F238E27FC236}">
+                <a16:creationId xmlns:a16="http://schemas.microsoft.com/office/drawing/2014/main" id="{1DA21228-FFEB-653C-A08B-2E399596C848}"/>
+              </a:ext>
+            </a:extLst>
+          </p:cNvPr>
+          <p:cNvPicPr>
+            <a:picLocks noChangeAspect="1"/>
+          </p:cNvPicPr>
+          <p:nvPr/>
+        </p:nvPicPr>
+        <p:blipFill>
+          <a:blip r:embed="rId2"/>
+          <a:stretch>
+            <a:fillRect/>
+          </a:stretch>
+        </p:blipFill>
+        <p:spPr>
+          <a:xfrm>
+            <a:off x="3344941" y="2350676"/>
+            <a:ext cx="5502117" cy="2156647"/>
+          </a:xfrm>
+          <a:prstGeom prst="rect">
+            <a:avLst/>
+          </a:prstGeom>
+        </p:spPr>
+      </p:pic>
+    </p:spTree>
+    <p:extLst>
+      <p:ext uri="{BB962C8B-B14F-4D97-AF65-F5344CB8AC3E}">
+        <p14:creationId xmlns:p14="http://schemas.microsoft.com/office/powerpoint/2010/main" val="4225650227"/>
+      </p:ext>
+    </p:extLst>
+  </p:cSld>
+  <p:clrMapOvr>
+    <a:masterClrMapping/>
+  </p:clrMapOvr>
+</p:sld>
+</file>
+
+<file path=ppt/slides/slide24.xml><?xml version="1.0" encoding="utf-8"?>
+<p:sld xmlns:a="http://schemas.openxmlformats.org/drawingml/2006/main" xmlns:r="http://schemas.openxmlformats.org/officeDocument/2006/relationships" xmlns:p="http://schemas.openxmlformats.org/presentationml/2006/main">
+  <p:cSld>
+    <p:spTree>
+      <p:nvGrpSpPr>
+        <p:cNvPr id="1" name=""/>
+        <p:cNvGrpSpPr/>
+        <p:nvPr/>
+      </p:nvGrpSpPr>
+      <p:grpSpPr>
+        <a:xfrm>
+          <a:off x="0" y="0"/>
+          <a:ext cx="0" cy="0"/>
+          <a:chOff x="0" y="0"/>
+          <a:chExt cx="0" cy="0"/>
+        </a:xfrm>
+      </p:grpSpPr>
+      <p:pic>
+        <p:nvPicPr>
+          <p:cNvPr id="4" name="Picture 3" descr="A black and white text on a white background&#10;&#10;Description automatically generated">
+            <a:extLst>
+              <a:ext uri="{FF2B5EF4-FFF2-40B4-BE49-F238E27FC236}">
+                <a16:creationId xmlns:a16="http://schemas.microsoft.com/office/drawing/2014/main" id="{F384B221-D1A1-BBC4-4A15-8DB0CB8029FC}"/>
+              </a:ext>
+            </a:extLst>
+          </p:cNvPr>
+          <p:cNvPicPr>
+            <a:picLocks noChangeAspect="1"/>
+          </p:cNvPicPr>
+          <p:nvPr/>
+        </p:nvPicPr>
+        <p:blipFill>
+          <a:blip r:embed="rId2"/>
+          <a:stretch>
+            <a:fillRect/>
+          </a:stretch>
+        </p:blipFill>
+        <p:spPr>
+          <a:xfrm>
+            <a:off x="3455670" y="2076450"/>
+            <a:ext cx="5280660" cy="2705100"/>
+          </a:xfrm>
+          <a:prstGeom prst="rect">
+            <a:avLst/>
+          </a:prstGeom>
+        </p:spPr>
+      </p:pic>
+    </p:spTree>
+    <p:extLst>
+      <p:ext uri="{BB962C8B-B14F-4D97-AF65-F5344CB8AC3E}">
+        <p14:creationId xmlns:p14="http://schemas.microsoft.com/office/powerpoint/2010/main" val="2581780117"/>
+      </p:ext>
+    </p:extLst>
+  </p:cSld>
+  <p:clrMapOvr>
+    <a:masterClrMapping/>
+  </p:clrMapOvr>
+</p:sld>
+</file>
+
 <file path=ppt/slides/slide3.xml><?xml version="1.0" encoding="utf-8"?>
 <p:sld xmlns:a="http://schemas.openxmlformats.org/drawingml/2006/main" xmlns:r="http://schemas.openxmlformats.org/officeDocument/2006/relationships" xmlns:p="http://schemas.openxmlformats.org/presentationml/2006/main">
   <p:cSld>

</xml_diff>